<commit_message>
Brian: Added higher order function examples.
</commit_message>
<xml_diff>
--- a/FoundationsOfFunctionalProgramming.pptx
+++ b/FoundationsOfFunctionalProgramming.pptx
@@ -19,17 +19,25 @@
     <p:sldId id="272" r:id="rId13"/>
     <p:sldId id="273" r:id="rId14"/>
     <p:sldId id="260" r:id="rId15"/>
-    <p:sldId id="271" r:id="rId16"/>
-    <p:sldId id="257" r:id="rId17"/>
-    <p:sldId id="259" r:id="rId18"/>
-    <p:sldId id="277" r:id="rId19"/>
-    <p:sldId id="280" r:id="rId20"/>
-    <p:sldId id="276" r:id="rId21"/>
-    <p:sldId id="278" r:id="rId22"/>
-    <p:sldId id="279" r:id="rId23"/>
-    <p:sldId id="270" r:id="rId24"/>
-    <p:sldId id="258" r:id="rId25"/>
-    <p:sldId id="263" r:id="rId26"/>
+    <p:sldId id="288" r:id="rId16"/>
+    <p:sldId id="271" r:id="rId17"/>
+    <p:sldId id="257" r:id="rId18"/>
+    <p:sldId id="259" r:id="rId19"/>
+    <p:sldId id="277" r:id="rId20"/>
+    <p:sldId id="282" r:id="rId21"/>
+    <p:sldId id="280" r:id="rId22"/>
+    <p:sldId id="281" r:id="rId23"/>
+    <p:sldId id="283" r:id="rId24"/>
+    <p:sldId id="285" r:id="rId25"/>
+    <p:sldId id="284" r:id="rId26"/>
+    <p:sldId id="286" r:id="rId27"/>
+    <p:sldId id="287" r:id="rId28"/>
+    <p:sldId id="276" r:id="rId29"/>
+    <p:sldId id="278" r:id="rId30"/>
+    <p:sldId id="279" r:id="rId31"/>
+    <p:sldId id="270" r:id="rId32"/>
+    <p:sldId id="258" r:id="rId33"/>
+    <p:sldId id="263" r:id="rId34"/>
   </p:sldIdLst>
   <p:sldSz cx="9144000" cy="6858000" type="screen4x3"/>
   <p:notesSz cx="6858000" cy="9144000"/>
@@ -147,11 +155,19 @@
             <p14:sldId id="272"/>
             <p14:sldId id="273"/>
             <p14:sldId id="260"/>
+            <p14:sldId id="288"/>
             <p14:sldId id="271"/>
             <p14:sldId id="257"/>
             <p14:sldId id="259"/>
             <p14:sldId id="277"/>
+            <p14:sldId id="282"/>
             <p14:sldId id="280"/>
+            <p14:sldId id="281"/>
+            <p14:sldId id="283"/>
+            <p14:sldId id="285"/>
+            <p14:sldId id="284"/>
+            <p14:sldId id="286"/>
+            <p14:sldId id="287"/>
             <p14:sldId id="276"/>
             <p14:sldId id="278"/>
             <p14:sldId id="279"/>
@@ -360,7 +376,7 @@
           <a:p>
             <a:fld id="{3CBAD435-14A8-46F2-8968-23B8E604A030}" type="datetimeFigureOut">
               <a:rPr lang="en-US" smtClean="0"/>
-              <a:t>04/29/2014</a:t>
+              <a:t>04/30/2014</a:t>
             </a:fld>
             <a:endParaRPr lang="en-US"/>
           </a:p>
@@ -525,7 +541,7 @@
           <a:p>
             <a:fld id="{3CBAD435-14A8-46F2-8968-23B8E604A030}" type="datetimeFigureOut">
               <a:rPr lang="en-US" smtClean="0"/>
-              <a:t>04/29/2014</a:t>
+              <a:t>04/30/2014</a:t>
             </a:fld>
             <a:endParaRPr lang="en-US"/>
           </a:p>
@@ -700,7 +716,7 @@
           <a:p>
             <a:fld id="{3CBAD435-14A8-46F2-8968-23B8E604A030}" type="datetimeFigureOut">
               <a:rPr lang="en-US" smtClean="0"/>
-              <a:t>04/29/2014</a:t>
+              <a:t>04/30/2014</a:t>
             </a:fld>
             <a:endParaRPr lang="en-US"/>
           </a:p>
@@ -865,7 +881,7 @@
           <a:p>
             <a:fld id="{3CBAD435-14A8-46F2-8968-23B8E604A030}" type="datetimeFigureOut">
               <a:rPr lang="en-US" smtClean="0"/>
-              <a:t>04/29/2014</a:t>
+              <a:t>04/30/2014</a:t>
             </a:fld>
             <a:endParaRPr lang="en-US"/>
           </a:p>
@@ -1106,7 +1122,7 @@
           <a:p>
             <a:fld id="{3CBAD435-14A8-46F2-8968-23B8E604A030}" type="datetimeFigureOut">
               <a:rPr lang="en-US" smtClean="0"/>
-              <a:t>04/29/2014</a:t>
+              <a:t>04/30/2014</a:t>
             </a:fld>
             <a:endParaRPr lang="en-US"/>
           </a:p>
@@ -1389,7 +1405,7 @@
           <a:p>
             <a:fld id="{3CBAD435-14A8-46F2-8968-23B8E604A030}" type="datetimeFigureOut">
               <a:rPr lang="en-US" smtClean="0"/>
-              <a:t>04/29/2014</a:t>
+              <a:t>04/30/2014</a:t>
             </a:fld>
             <a:endParaRPr lang="en-US"/>
           </a:p>
@@ -1818,7 +1834,7 @@
           <a:p>
             <a:fld id="{3CBAD435-14A8-46F2-8968-23B8E604A030}" type="datetimeFigureOut">
               <a:rPr lang="en-US" smtClean="0"/>
-              <a:t>04/29/2014</a:t>
+              <a:t>04/30/2014</a:t>
             </a:fld>
             <a:endParaRPr lang="en-US"/>
           </a:p>
@@ -1931,7 +1947,7 @@
           <a:p>
             <a:fld id="{3CBAD435-14A8-46F2-8968-23B8E604A030}" type="datetimeFigureOut">
               <a:rPr lang="en-US" smtClean="0"/>
-              <a:t>04/29/2014</a:t>
+              <a:t>04/30/2014</a:t>
             </a:fld>
             <a:endParaRPr lang="en-US"/>
           </a:p>
@@ -2021,7 +2037,7 @@
           <a:p>
             <a:fld id="{3CBAD435-14A8-46F2-8968-23B8E604A030}" type="datetimeFigureOut">
               <a:rPr lang="en-US" smtClean="0"/>
-              <a:t>04/29/2014</a:t>
+              <a:t>04/30/2014</a:t>
             </a:fld>
             <a:endParaRPr lang="en-US"/>
           </a:p>
@@ -2210,7 +2226,7 @@
           <a:p>
             <a:fld id="{3CBAD435-14A8-46F2-8968-23B8E604A030}" type="datetimeFigureOut">
               <a:rPr lang="en-US" smtClean="0"/>
-              <a:t>04/29/2014</a:t>
+              <a:t>04/30/2014</a:t>
             </a:fld>
             <a:endParaRPr lang="en-US"/>
           </a:p>
@@ -2528,7 +2544,7 @@
           <a:p>
             <a:fld id="{3CBAD435-14A8-46F2-8968-23B8E604A030}" type="datetimeFigureOut">
               <a:rPr lang="en-US" smtClean="0"/>
-              <a:t>04/29/2014</a:t>
+              <a:t>04/30/2014</a:t>
             </a:fld>
             <a:endParaRPr lang="en-US"/>
           </a:p>
@@ -2907,7 +2923,7 @@
           <a:p>
             <a:fld id="{3CBAD435-14A8-46F2-8968-23B8E604A030}" type="datetimeFigureOut">
               <a:rPr lang="en-US" smtClean="0"/>
-              <a:t>04/29/2014</a:t>
+              <a:t>04/30/2014</a:t>
             </a:fld>
             <a:endParaRPr lang="en-US"/>
           </a:p>
@@ -3347,7 +3363,7 @@
         <p:spPr/>
         <p:txBody>
           <a:bodyPr>
-            <a:normAutofit lnSpcReduction="10000"/>
+            <a:normAutofit/>
           </a:bodyPr>
           <a:lstStyle/>
           <a:p>
@@ -3372,38 +3388,66 @@
           </a:p>
           <a:p>
             <a:r>
-              <a:rPr lang="en-US" dirty="0" smtClean="0"/>
-              <a:t>Higher order and first class functions</a:t>
-            </a:r>
-          </a:p>
-          <a:p>
-            <a:r>
-              <a:rPr lang="en-US" dirty="0" smtClean="0"/>
+              <a:rPr lang="en-US" dirty="0"/>
               <a:t>Immutability</a:t>
             </a:r>
           </a:p>
           <a:p>
             <a:r>
               <a:rPr lang="en-US" dirty="0" smtClean="0"/>
-              <a:t>List comprehensions</a:t>
-            </a:r>
-          </a:p>
-          <a:p>
-            <a:r>
-              <a:rPr lang="en-US" dirty="0" smtClean="0"/>
-              <a:t>Algebraic data types</a:t>
-            </a:r>
-          </a:p>
-          <a:p>
-            <a:r>
-              <a:rPr lang="en-US" dirty="0" smtClean="0"/>
+              <a:t>Higher </a:t>
+            </a:r>
+            <a:r>
+              <a:rPr lang="en-US" dirty="0" smtClean="0"/>
+              <a:t>order and first class </a:t>
+            </a:r>
+            <a:r>
+              <a:rPr lang="en-US" dirty="0" smtClean="0"/>
+              <a:t>functions</a:t>
+            </a:r>
+          </a:p>
+          <a:p>
+            <a:r>
+              <a:rPr lang="en-US" dirty="0"/>
+              <a:t>Declarative </a:t>
+            </a:r>
+            <a:r>
+              <a:rPr lang="en-US" dirty="0" smtClean="0"/>
+              <a:t>programming</a:t>
+            </a:r>
+          </a:p>
+          <a:p>
+            <a:pPr lvl="1"/>
+            <a:r>
+              <a:rPr lang="en-US" dirty="0"/>
+              <a:t>Recursion</a:t>
+            </a:r>
+          </a:p>
+          <a:p>
+            <a:r>
+              <a:rPr lang="en-US" dirty="0" smtClean="0"/>
+              <a:t>List </a:t>
+            </a:r>
+            <a:r>
+              <a:rPr lang="en-US" dirty="0" smtClean="0"/>
+              <a:t>comprehensions</a:t>
+            </a:r>
+          </a:p>
+          <a:p>
+            <a:r>
+              <a:rPr lang="en-US" dirty="0"/>
               <a:t>Pattern matching</a:t>
             </a:r>
           </a:p>
           <a:p>
-            <a:r>
-              <a:rPr lang="en-US" dirty="0" smtClean="0"/>
-              <a:t>Recursion</a:t>
+            <a:pPr lvl="1"/>
+            <a:r>
+              <a:rPr lang="en-US" dirty="0" smtClean="0"/>
+              <a:t>Algebraic </a:t>
+            </a:r>
+            <a:r>
+              <a:rPr lang="en-US" dirty="0" smtClean="0"/>
+              <a:t>data types</a:t>
             </a:r>
           </a:p>
           <a:p>
@@ -3411,24 +3455,25 @@
               <a:rPr lang="en-US" dirty="0" smtClean="0"/>
               <a:t>Composition</a:t>
             </a:r>
-          </a:p>
-          <a:p>
-            <a:r>
-              <a:rPr lang="en-US" dirty="0" smtClean="0"/>
+            <a:endParaRPr lang="en-US" dirty="0" smtClean="0"/>
+          </a:p>
+          <a:p>
+            <a:r>
+              <a:rPr lang="en-US" dirty="0" smtClean="0"/>
+              <a:t>Lazy evaluation</a:t>
+            </a:r>
+          </a:p>
+          <a:p>
+            <a:r>
+              <a:rPr lang="en-US" dirty="0"/>
               <a:t>Partial application and currying</a:t>
             </a:r>
           </a:p>
           <a:p>
-            <a:r>
-              <a:rPr lang="en-US" dirty="0" smtClean="0"/>
-              <a:t>Declarative programming</a:t>
-            </a:r>
-          </a:p>
-          <a:p>
-            <a:r>
-              <a:rPr lang="en-US" dirty="0" smtClean="0"/>
-              <a:t>Lazy evaluation</a:t>
-            </a:r>
+            <a:pPr marL="114300" indent="0">
+              <a:buNone/>
+            </a:pPr>
+            <a:endParaRPr lang="en-US" dirty="0" smtClean="0"/>
           </a:p>
           <a:p>
             <a:endParaRPr lang="en-US" dirty="0" smtClean="0"/>
@@ -4345,10 +4390,18 @@
           <a:lstStyle/>
           <a:p>
             <a:r>
-              <a:rPr lang="en-US" dirty="0" smtClean="0"/>
+              <a:rPr lang="en-US" dirty="0" smtClean="0">
+                <a:solidFill>
+                  <a:srgbClr val="FF0000"/>
+                </a:solidFill>
+              </a:rPr>
               <a:t>What is the name for the property which prohibits reassigning of variables</a:t>
             </a:r>
-            <a:endParaRPr lang="en-US" dirty="0"/>
+            <a:endParaRPr lang="en-US" dirty="0">
+              <a:solidFill>
+                <a:srgbClr val="FF0000"/>
+              </a:solidFill>
+            </a:endParaRPr>
           </a:p>
         </p:txBody>
       </p:sp>
@@ -4620,181 +4673,119 @@
         <p:spPr>
           <a:xfrm>
             <a:off x="457200" y="1524000"/>
-            <a:ext cx="7620000" cy="1143000"/>
+            <a:ext cx="7620000" cy="4343400"/>
           </a:xfrm>
         </p:spPr>
         <p:txBody>
           <a:bodyPr>
-            <a:normAutofit fontScale="85000" lnSpcReduction="20000"/>
+            <a:normAutofit/>
           </a:bodyPr>
           <a:lstStyle/>
           <a:p>
             <a:r>
               <a:rPr lang="en-US" dirty="0" smtClean="0"/>
-              <a:t>A variable cannot be reassigned, once assigned</a:t>
-            </a:r>
-          </a:p>
-          <a:p>
-            <a:r>
-              <a:rPr lang="en-US" dirty="0" smtClean="0"/>
-              <a:t>An instance of a type (a value, or object in OO) cannot be changed, once created</a:t>
-            </a:r>
+              <a:t>A </a:t>
+            </a:r>
+            <a:r>
+              <a:rPr lang="en-US" dirty="0" smtClean="0"/>
+              <a:t>value cannot </a:t>
+            </a:r>
+            <a:r>
+              <a:rPr lang="en-US" dirty="0" smtClean="0"/>
+              <a:t>be </a:t>
+            </a:r>
+            <a:r>
+              <a:rPr lang="en-US" dirty="0" smtClean="0"/>
+              <a:t>changed, </a:t>
+            </a:r>
+            <a:r>
+              <a:rPr lang="en-US" dirty="0" smtClean="0"/>
+              <a:t>once assigned</a:t>
+            </a:r>
+          </a:p>
+          <a:p>
+            <a:pPr lvl="1"/>
+            <a:r>
+              <a:rPr lang="en-US" dirty="0" smtClean="0"/>
+              <a:t>Instead, new values are created</a:t>
+            </a:r>
+          </a:p>
+          <a:p>
+            <a:r>
+              <a:rPr lang="en-US" dirty="0" smtClean="0"/>
+              <a:t>Required for referential transparency – mutable types make </a:t>
+            </a:r>
+            <a:r>
+              <a:rPr lang="en-US" dirty="0"/>
+              <a:t>expressions </a:t>
+            </a:r>
+            <a:r>
+              <a:rPr lang="en-US" i="1" dirty="0"/>
+              <a:t>referentially </a:t>
+            </a:r>
+            <a:r>
+              <a:rPr lang="en-US" i="1" dirty="0" smtClean="0"/>
+              <a:t>opaque</a:t>
+            </a:r>
+          </a:p>
+          <a:p>
+            <a:pPr lvl="1"/>
+            <a:r>
+              <a:rPr lang="en-US" dirty="0" smtClean="0"/>
+              <a:t>Breaks </a:t>
+            </a:r>
+            <a:r>
+              <a:rPr lang="en-US" dirty="0"/>
+              <a:t>many key FP features</a:t>
+            </a:r>
+          </a:p>
+          <a:p>
+            <a:pPr lvl="1"/>
+            <a:r>
+              <a:rPr lang="en-US" dirty="0"/>
+              <a:t>An expression cannot be replaced with its computed value</a:t>
+            </a:r>
+          </a:p>
+          <a:p>
+            <a:pPr lvl="1"/>
+            <a:r>
+              <a:rPr lang="en-US" dirty="0"/>
+              <a:t>Pattern matching cannot work</a:t>
+            </a:r>
+          </a:p>
+          <a:p>
+            <a:pPr lvl="1"/>
+            <a:r>
+              <a:rPr lang="en-US" dirty="0"/>
+              <a:t>Lazy evaluation cannot work</a:t>
+            </a:r>
+          </a:p>
+          <a:p>
+            <a:pPr lvl="1"/>
+            <a:r>
+              <a:rPr lang="en-US" dirty="0" err="1"/>
+              <a:t>Memoizing</a:t>
+            </a:r>
+            <a:r>
+              <a:rPr lang="en-US" dirty="0"/>
+              <a:t> cannot work (think String interning in Java)</a:t>
+            </a:r>
+          </a:p>
+          <a:p>
+            <a:pPr lvl="1"/>
+            <a:r>
+              <a:rPr lang="en-US" b="1" dirty="0"/>
+              <a:t>Be very aware of this if you ‘sprinkle’ functional programming into OO</a:t>
+            </a:r>
+          </a:p>
+          <a:p>
             <a:endParaRPr lang="en-US" dirty="0"/>
           </a:p>
           <a:p>
-            <a:r>
-              <a:rPr lang="en-US" dirty="0" smtClean="0"/>
-              <a:t>A </a:t>
-            </a:r>
-            <a:r>
-              <a:rPr lang="en-US" dirty="0" smtClean="0"/>
-              <a:t>function cannot change its parameters</a:t>
-            </a:r>
+            <a:endParaRPr lang="en-US" dirty="0" smtClean="0"/>
           </a:p>
           <a:p>
             <a:endParaRPr lang="en-US" dirty="0"/>
-          </a:p>
-        </p:txBody>
-      </p:sp>
-      <p:sp>
-        <p:nvSpPr>
-          <p:cNvPr id="5" name="TextBox 4"/>
-          <p:cNvSpPr txBox="1"/>
-          <p:nvPr/>
-        </p:nvSpPr>
-        <p:spPr>
-          <a:xfrm>
-            <a:off x="558800" y="2743200"/>
-            <a:ext cx="7197436" cy="830997"/>
-          </a:xfrm>
-          <a:prstGeom prst="rect">
-            <a:avLst/>
-          </a:prstGeom>
-          <a:solidFill>
-            <a:schemeClr val="accent1">
-              <a:lumMod val="20000"/>
-              <a:lumOff val="80000"/>
-            </a:schemeClr>
-          </a:solidFill>
-          <a:ln>
-            <a:solidFill>
-              <a:schemeClr val="tx1"/>
-            </a:solidFill>
-          </a:ln>
-          <a:effectLst>
-            <a:outerShdw blurRad="50800" dist="50800" dir="3240000" sx="101000" sy="101000" algn="ctr" rotWithShape="0">
-              <a:schemeClr val="accent1">
-                <a:lumMod val="75000"/>
-              </a:schemeClr>
-            </a:outerShdw>
-          </a:effectLst>
-        </p:spPr>
-        <p:txBody>
-          <a:bodyPr wrap="square" rtlCol="0">
-            <a:spAutoFit/>
-          </a:bodyPr>
-          <a:lstStyle/>
-          <a:p>
-            <a:r>
-              <a:rPr lang="en-US" sz="1600" dirty="0" smtClean="0">
-                <a:solidFill>
-                  <a:schemeClr val="accent2">
-                    <a:lumMod val="50000"/>
-                  </a:schemeClr>
-                </a:solidFill>
-                <a:latin typeface="Consolas" pitchFamily="49" charset="0"/>
-                <a:cs typeface="Consolas" pitchFamily="49" charset="0"/>
-              </a:rPr>
-              <a:t>Product hammer = new Product(“Hammer”, 5.99);</a:t>
-            </a:r>
-          </a:p>
-          <a:p>
-            <a:r>
-              <a:rPr lang="en-US" sz="1600" dirty="0" err="1" smtClean="0">
-                <a:solidFill>
-                  <a:schemeClr val="accent2">
-                    <a:lumMod val="50000"/>
-                  </a:schemeClr>
-                </a:solidFill>
-                <a:latin typeface="Consolas" pitchFamily="49" charset="0"/>
-                <a:cs typeface="Consolas" pitchFamily="49" charset="0"/>
-              </a:rPr>
-              <a:t>inventorySystem.add</a:t>
-            </a:r>
-            <a:r>
-              <a:rPr lang="en-US" sz="1600" dirty="0" smtClean="0">
-                <a:solidFill>
-                  <a:schemeClr val="accent2">
-                    <a:lumMod val="50000"/>
-                  </a:schemeClr>
-                </a:solidFill>
-                <a:latin typeface="Consolas" pitchFamily="49" charset="0"/>
-                <a:cs typeface="Consolas" pitchFamily="49" charset="0"/>
-              </a:rPr>
-              <a:t>(hammer);</a:t>
-            </a:r>
-          </a:p>
-          <a:p>
-            <a:r>
-              <a:rPr lang="en-US" sz="1600" dirty="0" err="1" smtClean="0">
-                <a:solidFill>
-                  <a:schemeClr val="accent2">
-                    <a:lumMod val="50000"/>
-                  </a:schemeClr>
-                </a:solidFill>
-                <a:latin typeface="Consolas" pitchFamily="49" charset="0"/>
-                <a:cs typeface="Consolas" pitchFamily="49" charset="0"/>
-              </a:rPr>
-              <a:t>assertEqual</a:t>
-            </a:r>
-            <a:r>
-              <a:rPr lang="en-US" sz="1600" dirty="0" smtClean="0">
-                <a:solidFill>
-                  <a:schemeClr val="accent2">
-                    <a:lumMod val="50000"/>
-                  </a:schemeClr>
-                </a:solidFill>
-                <a:latin typeface="Consolas" pitchFamily="49" charset="0"/>
-                <a:cs typeface="Consolas" pitchFamily="49" charset="0"/>
-              </a:rPr>
-              <a:t>(5.99, </a:t>
-            </a:r>
-            <a:r>
-              <a:rPr lang="en-US" sz="1600" dirty="0" err="1" smtClean="0">
-                <a:solidFill>
-                  <a:schemeClr val="accent2">
-                    <a:lumMod val="50000"/>
-                  </a:schemeClr>
-                </a:solidFill>
-                <a:latin typeface="Consolas" pitchFamily="49" charset="0"/>
-                <a:cs typeface="Consolas" pitchFamily="49" charset="0"/>
-              </a:rPr>
-              <a:t>hammer.getPrice</a:t>
-            </a:r>
-            <a:r>
-              <a:rPr lang="en-US" sz="1600" dirty="0" smtClean="0">
-                <a:solidFill>
-                  <a:schemeClr val="accent2">
-                    <a:lumMod val="50000"/>
-                  </a:schemeClr>
-                </a:solidFill>
-                <a:latin typeface="Consolas" pitchFamily="49" charset="0"/>
-                <a:cs typeface="Consolas" pitchFamily="49" charset="0"/>
-              </a:rPr>
-              <a:t>());  // </a:t>
-            </a:r>
-            <a:r>
-              <a:rPr lang="en-US" sz="1600" b="1" dirty="0" smtClean="0">
-                <a:solidFill>
-                  <a:schemeClr val="accent2">
-                    <a:lumMod val="50000"/>
-                  </a:schemeClr>
-                </a:solidFill>
-                <a:latin typeface="Consolas" pitchFamily="49" charset="0"/>
-                <a:cs typeface="Consolas" pitchFamily="49" charset="0"/>
-              </a:rPr>
-              <a:t>This cannot fail</a:t>
-            </a:r>
           </a:p>
         </p:txBody>
       </p:sp>
@@ -4984,57 +4975,6 @@
             </a:lvl9pPr>
           </a:lstStyle>
           <a:p>
-            <a:r>
-              <a:rPr lang="en-US" sz="2000" dirty="0" smtClean="0"/>
-              <a:t>Mutable types make expressions </a:t>
-            </a:r>
-            <a:r>
-              <a:rPr lang="en-US" sz="2000" i="1" dirty="0" smtClean="0"/>
-              <a:t>referentially opaque, </a:t>
-            </a:r>
-            <a:r>
-              <a:rPr lang="en-US" sz="2000" dirty="0" smtClean="0"/>
-              <a:t>breaking many key FP features</a:t>
-            </a:r>
-          </a:p>
-          <a:p>
-            <a:pPr lvl="1"/>
-            <a:r>
-              <a:rPr lang="en-US" sz="1800" dirty="0" smtClean="0"/>
-              <a:t>An expression cannot be replaced with its computed value</a:t>
-            </a:r>
-          </a:p>
-          <a:p>
-            <a:pPr lvl="1"/>
-            <a:r>
-              <a:rPr lang="en-US" sz="1800" dirty="0" smtClean="0"/>
-              <a:t>Pattern matching cannot work</a:t>
-            </a:r>
-          </a:p>
-          <a:p>
-            <a:pPr lvl="1"/>
-            <a:r>
-              <a:rPr lang="en-US" sz="1800" dirty="0" smtClean="0"/>
-              <a:t>Lazy evaluation cannot work</a:t>
-            </a:r>
-          </a:p>
-          <a:p>
-            <a:pPr lvl="1"/>
-            <a:r>
-              <a:rPr lang="en-US" sz="1800" dirty="0" err="1" smtClean="0"/>
-              <a:t>Memoizing</a:t>
-            </a:r>
-            <a:r>
-              <a:rPr lang="en-US" sz="1800" dirty="0" smtClean="0"/>
-              <a:t> cannot work (think String interning in Java)</a:t>
-            </a:r>
-          </a:p>
-          <a:p>
-            <a:pPr lvl="1"/>
-            <a:r>
-              <a:rPr lang="en-US" sz="1800" b="1" dirty="0" smtClean="0"/>
-              <a:t>Be very aware of this if you ‘sprinkle’ functional programming into OO</a:t>
-            </a:r>
             <a:endParaRPr lang="en-US" sz="1800" b="1" dirty="0"/>
           </a:p>
         </p:txBody>
@@ -5107,265 +5047,14 @@
           <a:bodyPr/>
           <a:lstStyle/>
           <a:p>
-            <a:r>
-              <a:rPr lang="en-US" dirty="0" smtClean="0"/>
-              <a:t>Consider all of the problems that go away entirely if values (objects) are immutable.</a:t>
-            </a:r>
-          </a:p>
-          <a:p>
-            <a:r>
-              <a:rPr lang="en-US" dirty="0" smtClean="0"/>
-              <a:t>On the JVM, you will need to deal with mutable types.	</a:t>
-            </a:r>
-          </a:p>
-          <a:p>
-            <a:pPr lvl="1"/>
-            <a:r>
-              <a:rPr lang="en-US" dirty="0" smtClean="0"/>
-              <a:t>You will interact with frameworks that expect mutable classes.</a:t>
-            </a:r>
-          </a:p>
-          <a:p>
-            <a:r>
-              <a:rPr lang="en-US" dirty="0" smtClean="0"/>
-              <a:t>A good strategy is to push mutability to the boundary of a module.</a:t>
-            </a:r>
-          </a:p>
-          <a:p>
-            <a:pPr lvl="1"/>
-            <a:r>
-              <a:rPr lang="en-US" dirty="0" smtClean="0"/>
-              <a:t>This allows you take advantage of some pure FP benefits within the module.</a:t>
-            </a:r>
-          </a:p>
-        </p:txBody>
-      </p:sp>
-      <p:sp>
-        <p:nvSpPr>
-          <p:cNvPr id="4" name="Content Placeholder 2"/>
-          <p:cNvSpPr txBox="1">
-            <a:spLocks/>
-          </p:cNvSpPr>
-          <p:nvPr/>
-        </p:nvSpPr>
-        <p:spPr>
-          <a:xfrm>
-            <a:off x="443345" y="5715000"/>
-            <a:ext cx="7620000" cy="762000"/>
-          </a:xfrm>
-          <a:prstGeom prst="rect">
-            <a:avLst/>
-          </a:prstGeom>
-        </p:spPr>
-        <p:txBody>
-          <a:bodyPr vert="horz" lIns="91440" tIns="45720" rIns="91440" bIns="45720" rtlCol="0">
-            <a:normAutofit/>
-          </a:bodyPr>
-          <a:lstStyle>
-            <a:lvl1pPr marL="342900" indent="-228600" algn="l" defTabSz="914400" rtl="0" eaLnBrk="1" latinLnBrk="0" hangingPunct="1">
-              <a:spcBef>
-                <a:spcPct val="20000"/>
-              </a:spcBef>
-              <a:buClr>
-                <a:schemeClr val="accent1"/>
-              </a:buClr>
-              <a:buFont typeface="Arial" pitchFamily="34" charset="0"/>
-              <a:buChar char="•"/>
-              <a:defRPr sz="2200" kern="1200">
-                <a:solidFill>
-                  <a:schemeClr val="tx1"/>
-                </a:solidFill>
-                <a:latin typeface="+mn-lt"/>
-                <a:ea typeface="+mn-ea"/>
-                <a:cs typeface="+mn-cs"/>
-              </a:defRPr>
-            </a:lvl1pPr>
-            <a:lvl2pPr marL="640080" indent="-228600" algn="l" defTabSz="914400" rtl="0" eaLnBrk="1" latinLnBrk="0" hangingPunct="1">
-              <a:spcBef>
-                <a:spcPct val="20000"/>
-              </a:spcBef>
-              <a:buClr>
-                <a:schemeClr val="accent2"/>
-              </a:buClr>
-              <a:buFont typeface="Arial" pitchFamily="34" charset="0"/>
-              <a:buChar char="•"/>
-              <a:defRPr sz="2000" kern="1200">
-                <a:solidFill>
-                  <a:schemeClr val="tx1"/>
-                </a:solidFill>
-                <a:latin typeface="+mn-lt"/>
-                <a:ea typeface="+mn-ea"/>
-                <a:cs typeface="+mn-cs"/>
-              </a:defRPr>
-            </a:lvl2pPr>
-            <a:lvl3pPr marL="1005840" indent="-228600" algn="l" defTabSz="914400" rtl="0" eaLnBrk="1" latinLnBrk="0" hangingPunct="1">
-              <a:spcBef>
-                <a:spcPct val="20000"/>
-              </a:spcBef>
-              <a:buClr>
-                <a:schemeClr val="accent3"/>
-              </a:buClr>
-              <a:buFont typeface="Arial" pitchFamily="34" charset="0"/>
-              <a:buChar char="•"/>
-              <a:defRPr sz="1800" kern="1200">
-                <a:solidFill>
-                  <a:schemeClr val="tx1"/>
-                </a:solidFill>
-                <a:latin typeface="+mn-lt"/>
-                <a:ea typeface="+mn-ea"/>
-                <a:cs typeface="+mn-cs"/>
-              </a:defRPr>
-            </a:lvl3pPr>
-            <a:lvl4pPr marL="1280160" indent="-228600" algn="l" defTabSz="914400" rtl="0" eaLnBrk="1" latinLnBrk="0" hangingPunct="1">
-              <a:spcBef>
-                <a:spcPct val="20000"/>
-              </a:spcBef>
-              <a:buClr>
-                <a:schemeClr val="accent4"/>
-              </a:buClr>
-              <a:buFont typeface="Arial" pitchFamily="34" charset="0"/>
-              <a:buChar char="•"/>
-              <a:defRPr sz="1600" kern="1200">
-                <a:solidFill>
-                  <a:schemeClr val="tx1"/>
-                </a:solidFill>
-                <a:latin typeface="+mn-lt"/>
-                <a:ea typeface="+mn-ea"/>
-                <a:cs typeface="+mn-cs"/>
-              </a:defRPr>
-            </a:lvl4pPr>
-            <a:lvl5pPr marL="1554480" indent="-228600" algn="l" defTabSz="914400" rtl="0" eaLnBrk="1" latinLnBrk="0" hangingPunct="1">
-              <a:spcBef>
-                <a:spcPct val="20000"/>
-              </a:spcBef>
-              <a:buClr>
-                <a:schemeClr val="accent5"/>
-              </a:buClr>
-              <a:buFont typeface="Arial" pitchFamily="34" charset="0"/>
-              <a:buChar char="•"/>
-              <a:defRPr sz="1400" kern="1200" baseline="0">
-                <a:solidFill>
-                  <a:schemeClr val="tx1"/>
-                </a:solidFill>
-                <a:latin typeface="+mn-lt"/>
-                <a:ea typeface="+mn-ea"/>
-                <a:cs typeface="+mn-cs"/>
-              </a:defRPr>
-            </a:lvl5pPr>
-            <a:lvl6pPr marL="1737360" indent="-182880" algn="l" defTabSz="914400" rtl="0" eaLnBrk="1" latinLnBrk="0" hangingPunct="1">
-              <a:spcBef>
-                <a:spcPct val="20000"/>
-              </a:spcBef>
-              <a:buClr>
-                <a:schemeClr val="accent1"/>
-              </a:buClr>
-              <a:buFont typeface="Arial" pitchFamily="34" charset="0"/>
-              <a:buChar char="•"/>
-              <a:defRPr sz="1400" kern="1200" baseline="0">
-                <a:solidFill>
-                  <a:schemeClr val="tx1"/>
-                </a:solidFill>
-                <a:latin typeface="+mn-lt"/>
-                <a:ea typeface="+mn-ea"/>
-                <a:cs typeface="+mn-cs"/>
-              </a:defRPr>
-            </a:lvl6pPr>
-            <a:lvl7pPr marL="1920240" indent="-182880" algn="l" defTabSz="914400" rtl="0" eaLnBrk="1" latinLnBrk="0" hangingPunct="1">
-              <a:spcBef>
-                <a:spcPct val="20000"/>
-              </a:spcBef>
-              <a:buClr>
-                <a:schemeClr val="accent2"/>
-              </a:buClr>
-              <a:buFont typeface="Arial" pitchFamily="34" charset="0"/>
-              <a:buChar char="•"/>
-              <a:defRPr sz="1400" kern="1200">
-                <a:solidFill>
-                  <a:schemeClr val="tx1"/>
-                </a:solidFill>
-                <a:latin typeface="+mn-lt"/>
-                <a:ea typeface="+mn-ea"/>
-                <a:cs typeface="+mn-cs"/>
-              </a:defRPr>
-            </a:lvl7pPr>
-            <a:lvl8pPr marL="2103120" indent="-182880" algn="l" defTabSz="914400" rtl="0" eaLnBrk="1" latinLnBrk="0" hangingPunct="1">
-              <a:spcBef>
-                <a:spcPct val="20000"/>
-              </a:spcBef>
-              <a:buClr>
-                <a:schemeClr val="accent3"/>
-              </a:buClr>
-              <a:buFont typeface="Arial" pitchFamily="34" charset="0"/>
-              <a:buChar char="•"/>
-              <a:defRPr sz="1400" kern="1200">
-                <a:solidFill>
-                  <a:schemeClr val="tx1"/>
-                </a:solidFill>
-                <a:latin typeface="+mn-lt"/>
-                <a:ea typeface="+mn-ea"/>
-                <a:cs typeface="+mn-cs"/>
-              </a:defRPr>
-            </a:lvl8pPr>
-            <a:lvl9pPr marL="2286000" indent="-182880" algn="l" defTabSz="914400" rtl="0" eaLnBrk="1" latinLnBrk="0" hangingPunct="1">
-              <a:spcBef>
-                <a:spcPct val="20000"/>
-              </a:spcBef>
-              <a:buClr>
-                <a:schemeClr val="accent4"/>
-              </a:buClr>
-              <a:buFont typeface="Arial" pitchFamily="34" charset="0"/>
-              <a:buChar char="•"/>
-              <a:defRPr sz="1400" kern="1200">
-                <a:solidFill>
-                  <a:schemeClr val="tx1"/>
-                </a:solidFill>
-                <a:latin typeface="+mn-lt"/>
-                <a:ea typeface="+mn-ea"/>
-                <a:cs typeface="+mn-cs"/>
-              </a:defRPr>
-            </a:lvl9pPr>
-          </a:lstStyle>
-          <a:p>
-            <a:pPr marL="114300" indent="0">
-              <a:buNone/>
-            </a:pPr>
-            <a:r>
-              <a:rPr lang="en-US" b="1" i="1" dirty="0" smtClean="0">
-                <a:solidFill>
-                  <a:schemeClr val="accent3">
-                    <a:lumMod val="50000"/>
-                  </a:schemeClr>
-                </a:solidFill>
-              </a:rPr>
-              <a:t>FP Big Idea ™:  Making entire </a:t>
-            </a:r>
-            <a:r>
-              <a:rPr lang="en-US" b="1" i="1" u="sng" dirty="0" smtClean="0">
-                <a:solidFill>
-                  <a:schemeClr val="accent3">
-                    <a:lumMod val="50000"/>
-                  </a:schemeClr>
-                </a:solidFill>
-              </a:rPr>
-              <a:t>categories</a:t>
-            </a:r>
-            <a:r>
-              <a:rPr lang="en-US" b="1" i="1" dirty="0" smtClean="0">
-                <a:solidFill>
-                  <a:schemeClr val="accent3">
-                    <a:lumMod val="50000"/>
-                  </a:schemeClr>
-                </a:solidFill>
-              </a:rPr>
-              <a:t> of errors impossible to express</a:t>
-            </a:r>
+            <a:endParaRPr lang="en-US" dirty="0"/>
           </a:p>
         </p:txBody>
       </p:sp>
     </p:spTree>
     <p:extLst>
       <p:ext uri="{BB962C8B-B14F-4D97-AF65-F5344CB8AC3E}">
-        <p14:creationId xmlns:p14="http://schemas.microsoft.com/office/powerpoint/2010/main" val="3587371574"/>
+        <p14:creationId xmlns:p14="http://schemas.microsoft.com/office/powerpoint/2010/main" val="2666207004"/>
       </p:ext>
     </p:extLst>
   </p:cSld>
@@ -5409,7 +5098,7 @@
           <a:p>
             <a:r>
               <a:rPr lang="en-US" dirty="0" smtClean="0"/>
-              <a:t>Expressions  vs.  Statements</a:t>
+              <a:t>Immutability, cont.</a:t>
             </a:r>
             <a:endParaRPr lang="en-US" dirty="0"/>
           </a:p>
@@ -5424,75 +5113,64 @@
           <p:nvPr>
             <p:ph idx="1"/>
           </p:nvPr>
+        </p:nvSpPr>
+        <p:spPr/>
+        <p:txBody>
+          <a:bodyPr/>
+          <a:lstStyle/>
+          <a:p>
+            <a:r>
+              <a:rPr lang="en-US" dirty="0" smtClean="0"/>
+              <a:t>Consider all of the problems that go away entirely if values (objects) are immutable.</a:t>
+            </a:r>
+          </a:p>
+          <a:p>
+            <a:r>
+              <a:rPr lang="en-US" dirty="0" smtClean="0"/>
+              <a:t>On the JVM, you will need to deal with mutable types.	</a:t>
+            </a:r>
+          </a:p>
+          <a:p>
+            <a:pPr lvl="1"/>
+            <a:r>
+              <a:rPr lang="en-US" dirty="0" smtClean="0"/>
+              <a:t>You will interact with frameworks that expect mutable classes.</a:t>
+            </a:r>
+          </a:p>
+          <a:p>
+            <a:r>
+              <a:rPr lang="en-US" dirty="0" smtClean="0"/>
+              <a:t>A good strategy is to push mutability to the boundary of a module.</a:t>
+            </a:r>
+          </a:p>
+          <a:p>
+            <a:pPr lvl="1"/>
+            <a:r>
+              <a:rPr lang="en-US" dirty="0" smtClean="0"/>
+              <a:t>This allows you take advantage of some pure FP benefits within the module.</a:t>
+            </a:r>
+          </a:p>
+        </p:txBody>
+      </p:sp>
+      <p:sp>
+        <p:nvSpPr>
+          <p:cNvPr id="4" name="Content Placeholder 2"/>
+          <p:cNvSpPr txBox="1">
+            <a:spLocks/>
+          </p:cNvSpPr>
+          <p:nvPr/>
         </p:nvSpPr>
         <p:spPr>
           <a:xfrm>
-            <a:off x="457200" y="1600200"/>
-            <a:ext cx="7620000" cy="990600"/>
-          </a:xfrm>
-        </p:spPr>
-        <p:txBody>
-          <a:bodyPr>
-            <a:normAutofit fontScale="92500" lnSpcReduction="20000"/>
-          </a:bodyPr>
-          <a:lstStyle/>
-          <a:p>
-            <a:r>
-              <a:rPr lang="en-US" dirty="0" smtClean="0"/>
-              <a:t>Functional languages emphasize </a:t>
-            </a:r>
-            <a:r>
-              <a:rPr lang="en-US" i="1" dirty="0" smtClean="0"/>
-              <a:t>expressions </a:t>
-            </a:r>
-            <a:r>
-              <a:rPr lang="en-US" dirty="0" smtClean="0"/>
-              <a:t>over </a:t>
-            </a:r>
-            <a:r>
-              <a:rPr lang="en-US" i="1" dirty="0" smtClean="0"/>
-              <a:t>statements</a:t>
-            </a:r>
-          </a:p>
-          <a:p>
-            <a:pPr marL="114300" indent="0">
-              <a:buNone/>
-            </a:pPr>
-            <a:endParaRPr lang="en-US" dirty="0" smtClean="0"/>
-          </a:p>
-          <a:p>
-            <a:pPr marL="114300" indent="0">
-              <a:buNone/>
-            </a:pPr>
-            <a:r>
-              <a:rPr lang="en-US" dirty="0" smtClean="0"/>
-              <a:t>Expressions</a:t>
-            </a:r>
-          </a:p>
-          <a:p>
-            <a:endParaRPr lang="en-US" dirty="0"/>
-          </a:p>
-        </p:txBody>
-      </p:sp>
-      <p:sp>
-        <p:nvSpPr>
-          <p:cNvPr id="6" name="Content Placeholder 2"/>
-          <p:cNvSpPr txBox="1">
-            <a:spLocks/>
-          </p:cNvSpPr>
-          <p:nvPr/>
-        </p:nvSpPr>
-        <p:spPr>
-          <a:xfrm>
-            <a:off x="598055" y="2590800"/>
-            <a:ext cx="7315200" cy="3733800"/>
+            <a:off x="443345" y="5715000"/>
+            <a:ext cx="7620000" cy="762000"/>
           </a:xfrm>
           <a:prstGeom prst="rect">
             <a:avLst/>
           </a:prstGeom>
         </p:spPr>
         <p:txBody>
-          <a:bodyPr vert="horz" lIns="91440" tIns="45720" rIns="91440" bIns="45720" numCol="2" rtlCol="0">
+          <a:bodyPr vert="horz" lIns="91440" tIns="45720" rIns="91440" bIns="45720" rtlCol="0">
             <a:normAutofit/>
           </a:bodyPr>
           <a:lstStyle>
@@ -5660,212 +5338,46 @@
             </a:lvl9pPr>
           </a:lstStyle>
           <a:p>
-            <a:r>
-              <a:rPr lang="en-US" sz="1700" dirty="0" smtClean="0"/>
-              <a:t>Express a typed value</a:t>
-            </a:r>
-          </a:p>
-          <a:p>
-            <a:r>
-              <a:rPr lang="en-US" sz="1700" dirty="0" smtClean="0"/>
-              <a:t>Consist of values, operators and other expressions</a:t>
-            </a:r>
-          </a:p>
-          <a:p>
-            <a:r>
-              <a:rPr lang="en-US" sz="1700" dirty="0" smtClean="0"/>
-              <a:t>Can be substituted for a value of the same type</a:t>
-            </a:r>
-          </a:p>
-          <a:p>
-            <a:r>
-              <a:rPr lang="en-US" sz="1700" dirty="0" smtClean="0">
-                <a:cs typeface="Consolas" pitchFamily="49" charset="0"/>
-              </a:rPr>
-              <a:t>Can be referentially transparent</a:t>
-            </a:r>
-          </a:p>
-          <a:p>
-            <a:r>
-              <a:rPr lang="en-US" sz="1700" dirty="0" smtClean="0">
-                <a:cs typeface="Consolas" pitchFamily="49" charset="0"/>
-              </a:rPr>
-              <a:t>May be more concise</a:t>
-            </a:r>
-          </a:p>
-          <a:p>
-            <a:endParaRPr lang="en-US" sz="1700" dirty="0" smtClean="0">
-              <a:cs typeface="Consolas" pitchFamily="49" charset="0"/>
-            </a:endParaRPr>
-          </a:p>
-          <a:p>
             <a:pPr marL="114300" indent="0">
               <a:buNone/>
             </a:pPr>
-            <a:endParaRPr lang="en-US" sz="1700" dirty="0" smtClean="0">
-              <a:solidFill>
-                <a:schemeClr val="accent2"/>
-              </a:solidFill>
-              <a:latin typeface="Consolas" pitchFamily="49" charset="0"/>
-              <a:cs typeface="Consolas" pitchFamily="49" charset="0"/>
-            </a:endParaRPr>
-          </a:p>
-          <a:p>
-            <a:pPr marL="114300" indent="0">
-              <a:buNone/>
-            </a:pPr>
-            <a:endParaRPr lang="en-US" sz="1700" dirty="0">
-              <a:solidFill>
-                <a:schemeClr val="accent2"/>
-              </a:solidFill>
-              <a:latin typeface="Consolas" pitchFamily="49" charset="0"/>
-              <a:cs typeface="Consolas" pitchFamily="49" charset="0"/>
-            </a:endParaRPr>
-          </a:p>
-          <a:p>
-            <a:pPr marL="114300" indent="0">
-              <a:buNone/>
-            </a:pPr>
-            <a:endParaRPr lang="en-US" sz="1700" dirty="0" smtClean="0">
-              <a:solidFill>
-                <a:schemeClr val="accent2"/>
-              </a:solidFill>
-              <a:latin typeface="Consolas" pitchFamily="49" charset="0"/>
-              <a:cs typeface="Consolas" pitchFamily="49" charset="0"/>
-            </a:endParaRPr>
-          </a:p>
-          <a:p>
-            <a:pPr marL="114300" indent="0">
-              <a:buNone/>
-            </a:pPr>
-            <a:endParaRPr lang="en-US" sz="1700" dirty="0">
-              <a:solidFill>
-                <a:schemeClr val="accent2"/>
-              </a:solidFill>
-              <a:latin typeface="Consolas" pitchFamily="49" charset="0"/>
-              <a:cs typeface="Consolas" pitchFamily="49" charset="0"/>
-            </a:endParaRPr>
-          </a:p>
-          <a:p>
-            <a:pPr marL="114300" indent="0">
-              <a:buNone/>
-            </a:pPr>
-            <a:r>
-              <a:rPr lang="en-US" sz="1700" dirty="0" smtClean="0">
-                <a:solidFill>
-                  <a:schemeClr val="accent2"/>
-                </a:solidFill>
-                <a:cs typeface="Consolas" pitchFamily="49" charset="0"/>
+            <a:r>
+              <a:rPr lang="en-US" b="1" i="1" dirty="0" smtClean="0">
+                <a:solidFill>
+                  <a:schemeClr val="accent3">
+                    <a:lumMod val="50000"/>
+                  </a:schemeClr>
+                </a:solidFill>
               </a:rPr>
-              <a:t>1 + 2  </a:t>
-            </a:r>
-            <a:r>
-              <a:rPr lang="en-US" sz="1700" dirty="0" smtClean="0">
-                <a:solidFill>
-                  <a:schemeClr val="accent6"/>
-                </a:solidFill>
-                <a:cs typeface="Consolas" pitchFamily="49" charset="0"/>
+              <a:t>FP Big Idea ™:  Making entire </a:t>
+            </a:r>
+            <a:r>
+              <a:rPr lang="en-US" b="1" i="1" u="sng" dirty="0" smtClean="0">
+                <a:solidFill>
+                  <a:schemeClr val="accent3">
+                    <a:lumMod val="50000"/>
+                  </a:schemeClr>
+                </a:solidFill>
               </a:rPr>
-              <a:t>// of type </a:t>
-            </a:r>
-            <a:r>
-              <a:rPr lang="en-US" sz="1700" dirty="0" err="1" smtClean="0">
-                <a:solidFill>
-                  <a:schemeClr val="accent6"/>
-                </a:solidFill>
-                <a:cs typeface="Consolas" pitchFamily="49" charset="0"/>
+              <a:t>categories</a:t>
+            </a:r>
+            <a:r>
+              <a:rPr lang="en-US" b="1" i="1" dirty="0" smtClean="0">
+                <a:solidFill>
+                  <a:schemeClr val="accent3">
+                    <a:lumMod val="50000"/>
+                  </a:schemeClr>
+                </a:solidFill>
               </a:rPr>
-              <a:t>int</a:t>
-            </a:r>
-            <a:endParaRPr lang="en-US" sz="1700" dirty="0" smtClean="0">
-              <a:solidFill>
-                <a:schemeClr val="accent6"/>
-              </a:solidFill>
-              <a:cs typeface="Consolas" pitchFamily="49" charset="0"/>
-            </a:endParaRPr>
-          </a:p>
-          <a:p>
-            <a:pPr marL="114300" indent="0">
-              <a:buNone/>
-            </a:pPr>
-            <a:r>
-              <a:rPr lang="en-US" sz="1700" dirty="0" smtClean="0">
-                <a:solidFill>
-                  <a:schemeClr val="accent2"/>
-                </a:solidFill>
-                <a:cs typeface="Consolas" pitchFamily="49" charset="0"/>
-              </a:rPr>
-              <a:t>1 + x + foo(1)</a:t>
-            </a:r>
-          </a:p>
-          <a:p>
-            <a:pPr marL="114300" indent="0">
-              <a:buNone/>
-            </a:pPr>
-            <a:endParaRPr lang="en-US" sz="1700" dirty="0">
-              <a:solidFill>
-                <a:schemeClr val="accent2"/>
-              </a:solidFill>
-              <a:cs typeface="Consolas" pitchFamily="49" charset="0"/>
-            </a:endParaRPr>
-          </a:p>
-          <a:p>
-            <a:pPr marL="114300" indent="0">
-              <a:buNone/>
-            </a:pPr>
-            <a:r>
-              <a:rPr lang="en-US" sz="1700" dirty="0" smtClean="0">
-                <a:solidFill>
-                  <a:schemeClr val="accent2"/>
-                </a:solidFill>
-                <a:cs typeface="Consolas" pitchFamily="49" charset="0"/>
-              </a:rPr>
-              <a:t>bar(3, (x + foo(1)))</a:t>
-            </a:r>
-          </a:p>
-          <a:p>
-            <a:pPr marL="114300" indent="0">
-              <a:buNone/>
-            </a:pPr>
-            <a:endParaRPr lang="en-US" sz="1700" dirty="0" smtClean="0"/>
-          </a:p>
-          <a:p>
-            <a:pPr marL="114300" indent="0">
-              <a:buNone/>
-            </a:pPr>
-            <a:r>
-              <a:rPr lang="en-US" sz="1700" dirty="0" smtClean="0">
-                <a:solidFill>
-                  <a:schemeClr val="accent2"/>
-                </a:solidFill>
-              </a:rPr>
-              <a:t>(1+2) can be replaced by 3</a:t>
-            </a:r>
-          </a:p>
-          <a:p>
-            <a:pPr marL="114300" indent="0">
-              <a:buNone/>
-            </a:pPr>
-            <a:r>
-              <a:rPr lang="en-US" sz="1700" dirty="0" smtClean="0">
-                <a:solidFill>
-                  <a:schemeClr val="accent2"/>
-                </a:solidFill>
-              </a:rPr>
-              <a:t>x = if(…)</a:t>
-            </a:r>
-            <a:endParaRPr lang="en-US" sz="1700" dirty="0">
-              <a:solidFill>
-                <a:schemeClr val="accent2"/>
-              </a:solidFill>
-            </a:endParaRPr>
+              <a:t> of errors impossible to express</a:t>
+            </a:r>
           </a:p>
         </p:txBody>
       </p:sp>
     </p:spTree>
     <p:extLst>
       <p:ext uri="{BB962C8B-B14F-4D97-AF65-F5344CB8AC3E}">
-        <p14:creationId xmlns:p14="http://schemas.microsoft.com/office/powerpoint/2010/main" val="3278326394"/>
+        <p14:creationId xmlns:p14="http://schemas.microsoft.com/office/powerpoint/2010/main" val="3587371574"/>
       </p:ext>
     </p:extLst>
   </p:cSld>
@@ -5917,6 +5429,65 @@
       </p:sp>
       <p:sp>
         <p:nvSpPr>
+          <p:cNvPr id="3" name="Content Placeholder 2"/>
+          <p:cNvSpPr>
+            <a:spLocks noGrp="1"/>
+          </p:cNvSpPr>
+          <p:nvPr>
+            <p:ph idx="1"/>
+          </p:nvPr>
+        </p:nvSpPr>
+        <p:spPr>
+          <a:xfrm>
+            <a:off x="457200" y="1600200"/>
+            <a:ext cx="7620000" cy="990600"/>
+          </a:xfrm>
+        </p:spPr>
+        <p:txBody>
+          <a:bodyPr>
+            <a:normAutofit fontScale="92500" lnSpcReduction="20000"/>
+          </a:bodyPr>
+          <a:lstStyle/>
+          <a:p>
+            <a:r>
+              <a:rPr lang="en-US" dirty="0" smtClean="0"/>
+              <a:t>Functional languages emphasize </a:t>
+            </a:r>
+            <a:r>
+              <a:rPr lang="en-US" i="1" dirty="0" smtClean="0"/>
+              <a:t>expressions </a:t>
+            </a:r>
+            <a:r>
+              <a:rPr lang="en-US" dirty="0" smtClean="0"/>
+              <a:t>over </a:t>
+            </a:r>
+            <a:r>
+              <a:rPr lang="en-US" i="1" dirty="0" smtClean="0"/>
+              <a:t>statements</a:t>
+            </a:r>
+          </a:p>
+          <a:p>
+            <a:pPr marL="114300" indent="0">
+              <a:buNone/>
+            </a:pPr>
+            <a:endParaRPr lang="en-US" dirty="0" smtClean="0"/>
+          </a:p>
+          <a:p>
+            <a:pPr marL="114300" indent="0">
+              <a:buNone/>
+            </a:pPr>
+            <a:r>
+              <a:rPr lang="en-US" dirty="0" smtClean="0"/>
+              <a:t>Expressions</a:t>
+            </a:r>
+          </a:p>
+          <a:p>
+            <a:endParaRPr lang="en-US" dirty="0"/>
+          </a:p>
+        </p:txBody>
+      </p:sp>
+      <p:sp>
+        <p:nvSpPr>
           <p:cNvPr id="6" name="Content Placeholder 2"/>
           <p:cNvSpPr txBox="1">
             <a:spLocks/>
@@ -5925,15 +5496,15 @@
         </p:nvSpPr>
         <p:spPr>
           <a:xfrm>
-            <a:off x="445655" y="4572000"/>
-            <a:ext cx="7620000" cy="762000"/>
+            <a:off x="598055" y="2590800"/>
+            <a:ext cx="7315200" cy="3733800"/>
           </a:xfrm>
           <a:prstGeom prst="rect">
             <a:avLst/>
           </a:prstGeom>
         </p:spPr>
         <p:txBody>
-          <a:bodyPr vert="horz" lIns="91440" tIns="45720" rIns="91440" bIns="45720" rtlCol="0">
+          <a:bodyPr vert="horz" lIns="91440" tIns="45720" rIns="91440" bIns="45720" numCol="2" rtlCol="0">
             <a:normAutofit/>
           </a:bodyPr>
           <a:lstStyle>
@@ -6101,25 +5672,264 @@
             </a:lvl9pPr>
           </a:lstStyle>
           <a:p>
+            <a:r>
+              <a:rPr lang="en-US" sz="1700" dirty="0" smtClean="0"/>
+              <a:t>Express a typed value</a:t>
+            </a:r>
+          </a:p>
+          <a:p>
+            <a:r>
+              <a:rPr lang="en-US" sz="1700" dirty="0" smtClean="0"/>
+              <a:t>Consist of values, operators and other expressions</a:t>
+            </a:r>
+          </a:p>
+          <a:p>
+            <a:r>
+              <a:rPr lang="en-US" sz="1700" dirty="0" smtClean="0"/>
+              <a:t>Can be substituted for a value of the same type</a:t>
+            </a:r>
+          </a:p>
+          <a:p>
+            <a:r>
+              <a:rPr lang="en-US" sz="1700" dirty="0" smtClean="0">
+                <a:cs typeface="Consolas" pitchFamily="49" charset="0"/>
+              </a:rPr>
+              <a:t>Can be referentially transparent</a:t>
+            </a:r>
+          </a:p>
+          <a:p>
+            <a:r>
+              <a:rPr lang="en-US" sz="1700" dirty="0" smtClean="0">
+                <a:cs typeface="Consolas" pitchFamily="49" charset="0"/>
+              </a:rPr>
+              <a:t>May be more concise</a:t>
+            </a:r>
+          </a:p>
+          <a:p>
+            <a:endParaRPr lang="en-US" sz="1700" dirty="0" smtClean="0">
+              <a:cs typeface="Consolas" pitchFamily="49" charset="0"/>
+            </a:endParaRPr>
+          </a:p>
+          <a:p>
             <a:pPr marL="114300" indent="0">
               <a:buNone/>
             </a:pPr>
-            <a:r>
-              <a:rPr lang="en-US" b="1" i="1" dirty="0" smtClean="0">
-                <a:solidFill>
-                  <a:schemeClr val="accent3">
-                    <a:lumMod val="50000"/>
-                  </a:schemeClr>
-                </a:solidFill>
+            <a:endParaRPr lang="en-US" sz="1700" dirty="0" smtClean="0">
+              <a:solidFill>
+                <a:schemeClr val="accent2"/>
+              </a:solidFill>
+              <a:latin typeface="Consolas" pitchFamily="49" charset="0"/>
+              <a:cs typeface="Consolas" pitchFamily="49" charset="0"/>
+            </a:endParaRPr>
+          </a:p>
+          <a:p>
+            <a:pPr marL="114300" indent="0">
+              <a:buNone/>
+            </a:pPr>
+            <a:endParaRPr lang="en-US" sz="1700" dirty="0">
+              <a:solidFill>
+                <a:schemeClr val="accent2"/>
+              </a:solidFill>
+              <a:latin typeface="Consolas" pitchFamily="49" charset="0"/>
+              <a:cs typeface="Consolas" pitchFamily="49" charset="0"/>
+            </a:endParaRPr>
+          </a:p>
+          <a:p>
+            <a:pPr marL="114300" indent="0">
+              <a:buNone/>
+            </a:pPr>
+            <a:endParaRPr lang="en-US" sz="1700" dirty="0" smtClean="0">
+              <a:solidFill>
+                <a:schemeClr val="accent2"/>
+              </a:solidFill>
+              <a:latin typeface="Consolas" pitchFamily="49" charset="0"/>
+              <a:cs typeface="Consolas" pitchFamily="49" charset="0"/>
+            </a:endParaRPr>
+          </a:p>
+          <a:p>
+            <a:pPr marL="114300" indent="0">
+              <a:buNone/>
+            </a:pPr>
+            <a:endParaRPr lang="en-US" sz="1700" dirty="0">
+              <a:solidFill>
+                <a:schemeClr val="accent2"/>
+              </a:solidFill>
+              <a:latin typeface="Consolas" pitchFamily="49" charset="0"/>
+              <a:cs typeface="Consolas" pitchFamily="49" charset="0"/>
+            </a:endParaRPr>
+          </a:p>
+          <a:p>
+            <a:pPr marL="114300" indent="0">
+              <a:buNone/>
+            </a:pPr>
+            <a:r>
+              <a:rPr lang="en-US" sz="1700" dirty="0" smtClean="0">
+                <a:solidFill>
+                  <a:schemeClr val="accent2"/>
+                </a:solidFill>
+                <a:cs typeface="Consolas" pitchFamily="49" charset="0"/>
               </a:rPr>
-              <a:t>FP Big Idea ™:   Statements tell the computer to do something.  Expressions define a value as a computation.</a:t>
-            </a:r>
-          </a:p>
-        </p:txBody>
-      </p:sp>
-      <p:sp>
-        <p:nvSpPr>
-          <p:cNvPr id="7" name="Content Placeholder 2"/>
+              <a:t>1 + 2  </a:t>
+            </a:r>
+            <a:r>
+              <a:rPr lang="en-US" sz="1700" dirty="0" smtClean="0">
+                <a:solidFill>
+                  <a:schemeClr val="accent6"/>
+                </a:solidFill>
+                <a:cs typeface="Consolas" pitchFamily="49" charset="0"/>
+              </a:rPr>
+              <a:t>// of type </a:t>
+            </a:r>
+            <a:r>
+              <a:rPr lang="en-US" sz="1700" dirty="0" err="1" smtClean="0">
+                <a:solidFill>
+                  <a:schemeClr val="accent6"/>
+                </a:solidFill>
+                <a:cs typeface="Consolas" pitchFamily="49" charset="0"/>
+              </a:rPr>
+              <a:t>int</a:t>
+            </a:r>
+            <a:endParaRPr lang="en-US" sz="1700" dirty="0" smtClean="0">
+              <a:solidFill>
+                <a:schemeClr val="accent6"/>
+              </a:solidFill>
+              <a:cs typeface="Consolas" pitchFamily="49" charset="0"/>
+            </a:endParaRPr>
+          </a:p>
+          <a:p>
+            <a:pPr marL="114300" indent="0">
+              <a:buNone/>
+            </a:pPr>
+            <a:r>
+              <a:rPr lang="en-US" sz="1700" dirty="0" smtClean="0">
+                <a:solidFill>
+                  <a:schemeClr val="accent2"/>
+                </a:solidFill>
+                <a:cs typeface="Consolas" pitchFamily="49" charset="0"/>
+              </a:rPr>
+              <a:t>1 + x + foo(1)</a:t>
+            </a:r>
+          </a:p>
+          <a:p>
+            <a:pPr marL="114300" indent="0">
+              <a:buNone/>
+            </a:pPr>
+            <a:endParaRPr lang="en-US" sz="1700" dirty="0">
+              <a:solidFill>
+                <a:schemeClr val="accent2"/>
+              </a:solidFill>
+              <a:cs typeface="Consolas" pitchFamily="49" charset="0"/>
+            </a:endParaRPr>
+          </a:p>
+          <a:p>
+            <a:pPr marL="114300" indent="0">
+              <a:buNone/>
+            </a:pPr>
+            <a:r>
+              <a:rPr lang="en-US" sz="1700" dirty="0" smtClean="0">
+                <a:solidFill>
+                  <a:schemeClr val="accent2"/>
+                </a:solidFill>
+                <a:cs typeface="Consolas" pitchFamily="49" charset="0"/>
+              </a:rPr>
+              <a:t>bar(3, (x + foo(1)))</a:t>
+            </a:r>
+          </a:p>
+          <a:p>
+            <a:pPr marL="114300" indent="0">
+              <a:buNone/>
+            </a:pPr>
+            <a:endParaRPr lang="en-US" sz="1700" dirty="0" smtClean="0"/>
+          </a:p>
+          <a:p>
+            <a:pPr marL="114300" indent="0">
+              <a:buNone/>
+            </a:pPr>
+            <a:r>
+              <a:rPr lang="en-US" sz="1700" dirty="0" smtClean="0">
+                <a:solidFill>
+                  <a:schemeClr val="accent2"/>
+                </a:solidFill>
+              </a:rPr>
+              <a:t>(1+2) can be replaced by 3</a:t>
+            </a:r>
+          </a:p>
+          <a:p>
+            <a:pPr marL="114300" indent="0">
+              <a:buNone/>
+            </a:pPr>
+            <a:r>
+              <a:rPr lang="en-US" sz="1700" dirty="0" smtClean="0">
+                <a:solidFill>
+                  <a:schemeClr val="accent2"/>
+                </a:solidFill>
+              </a:rPr>
+              <a:t>x = if(…)</a:t>
+            </a:r>
+            <a:endParaRPr lang="en-US" sz="1700" dirty="0">
+              <a:solidFill>
+                <a:schemeClr val="accent2"/>
+              </a:solidFill>
+            </a:endParaRPr>
+          </a:p>
+        </p:txBody>
+      </p:sp>
+    </p:spTree>
+    <p:extLst>
+      <p:ext uri="{BB962C8B-B14F-4D97-AF65-F5344CB8AC3E}">
+        <p14:creationId xmlns:p14="http://schemas.microsoft.com/office/powerpoint/2010/main" val="3278326394"/>
+      </p:ext>
+    </p:extLst>
+  </p:cSld>
+  <p:clrMapOvr>
+    <a:masterClrMapping/>
+  </p:clrMapOvr>
+</p:sld>
+</file>
+
+<file path=ppt/slides/slide18.xml><?xml version="1.0" encoding="utf-8"?>
+<p:sld xmlns:a="http://schemas.openxmlformats.org/drawingml/2006/main" xmlns:r="http://schemas.openxmlformats.org/officeDocument/2006/relationships" xmlns:p="http://schemas.openxmlformats.org/presentationml/2006/main">
+  <p:cSld>
+    <p:spTree>
+      <p:nvGrpSpPr>
+        <p:cNvPr id="1" name=""/>
+        <p:cNvGrpSpPr/>
+        <p:nvPr/>
+      </p:nvGrpSpPr>
+      <p:grpSpPr>
+        <a:xfrm>
+          <a:off x="0" y="0"/>
+          <a:ext cx="0" cy="0"/>
+          <a:chOff x="0" y="0"/>
+          <a:chExt cx="0" cy="0"/>
+        </a:xfrm>
+      </p:grpSpPr>
+      <p:sp>
+        <p:nvSpPr>
+          <p:cNvPr id="2" name="Title 1"/>
+          <p:cNvSpPr>
+            <a:spLocks noGrp="1"/>
+          </p:cNvSpPr>
+          <p:nvPr>
+            <p:ph type="title"/>
+          </p:nvPr>
+        </p:nvSpPr>
+        <p:spPr/>
+        <p:txBody>
+          <a:bodyPr/>
+          <a:lstStyle/>
+          <a:p>
+            <a:r>
+              <a:rPr lang="en-US" dirty="0" smtClean="0"/>
+              <a:t>Expressions  vs.  Statements</a:t>
+            </a:r>
+            <a:endParaRPr lang="en-US" dirty="0"/>
+          </a:p>
+        </p:txBody>
+      </p:sp>
+      <p:sp>
+        <p:nvSpPr>
+          <p:cNvPr id="6" name="Content Placeholder 2"/>
           <p:cNvSpPr txBox="1">
             <a:spLocks/>
           </p:cNvSpPr>
@@ -6127,15 +5937,15 @@
         </p:nvSpPr>
         <p:spPr>
           <a:xfrm>
-            <a:off x="762000" y="1981200"/>
-            <a:ext cx="7315200" cy="1828800"/>
+            <a:off x="445655" y="5715000"/>
+            <a:ext cx="7620000" cy="762000"/>
           </a:xfrm>
           <a:prstGeom prst="rect">
             <a:avLst/>
           </a:prstGeom>
         </p:spPr>
         <p:txBody>
-          <a:bodyPr vert="horz" lIns="91440" tIns="45720" rIns="91440" bIns="45720" numCol="2" rtlCol="0">
+          <a:bodyPr vert="horz" lIns="91440" tIns="45720" rIns="91440" bIns="45720" rtlCol="0">
             <a:normAutofit/>
           </a:bodyPr>
           <a:lstStyle>
@@ -6303,151 +6113,42 @@
             </a:lvl9pPr>
           </a:lstStyle>
           <a:p>
-            <a:r>
-              <a:rPr lang="en-US" sz="1700" dirty="0" smtClean="0"/>
-              <a:t>Do not return a value</a:t>
-            </a:r>
-          </a:p>
-          <a:p>
-            <a:r>
-              <a:rPr lang="en-US" sz="1700" dirty="0" smtClean="0"/>
-              <a:t>Are illegal in some places</a:t>
-            </a:r>
-          </a:p>
-          <a:p>
-            <a:r>
-              <a:rPr lang="en-US" sz="1700" dirty="0" smtClean="0"/>
-              <a:t>Exist </a:t>
-            </a:r>
-            <a:r>
-              <a:rPr lang="en-US" sz="1700" i="1" dirty="0" smtClean="0"/>
-              <a:t>solely</a:t>
-            </a:r>
-            <a:r>
-              <a:rPr lang="en-US" sz="1700" dirty="0" smtClean="0"/>
-              <a:t> for the purpose of their side effect</a:t>
-            </a:r>
-          </a:p>
-          <a:p>
-            <a:r>
-              <a:rPr lang="en-US" sz="1700" dirty="0" smtClean="0"/>
-              <a:t>Typically change some global state of the program or the system</a:t>
-            </a:r>
-          </a:p>
-          <a:p>
             <a:pPr marL="114300" indent="0">
               <a:buNone/>
             </a:pPr>
             <a:r>
-              <a:rPr lang="en-US" sz="1700" i="1" dirty="0" smtClean="0">
-                <a:solidFill>
-                  <a:srgbClr val="FF5050"/>
-                </a:solidFill>
-                <a:cs typeface="Consolas" pitchFamily="49" charset="0"/>
+              <a:rPr lang="en-US" b="1" i="1" dirty="0" smtClean="0">
+                <a:solidFill>
+                  <a:schemeClr val="accent3">
+                    <a:lumMod val="50000"/>
+                  </a:schemeClr>
+                </a:solidFill>
               </a:rPr>
-              <a:t>y = (</a:t>
-            </a:r>
-            <a:r>
-              <a:rPr lang="en-US" sz="1700" i="1" dirty="0" err="1" smtClean="0">
-                <a:solidFill>
-                  <a:srgbClr val="FF5050"/>
-                </a:solidFill>
-                <a:cs typeface="Consolas" pitchFamily="49" charset="0"/>
+              <a:t>FP Big Idea ™:   Statements tell the computer to do something.  Expressions define </a:t>
+            </a:r>
+            <a:r>
+              <a:rPr lang="en-US" b="1" i="1" dirty="0" smtClean="0">
+                <a:solidFill>
+                  <a:schemeClr val="accent3">
+                    <a:lumMod val="50000"/>
+                  </a:schemeClr>
+                </a:solidFill>
               </a:rPr>
-              <a:t>int</a:t>
-            </a:r>
-            <a:r>
-              <a:rPr lang="en-US" sz="1700" i="1" dirty="0" smtClean="0">
-                <a:solidFill>
-                  <a:srgbClr val="FF5050"/>
-                </a:solidFill>
-                <a:cs typeface="Consolas" pitchFamily="49" charset="0"/>
-              </a:rPr>
-              <a:t> x = 1)</a:t>
-            </a:r>
-          </a:p>
-          <a:p>
-            <a:pPr marL="114300" indent="0">
-              <a:buNone/>
-            </a:pPr>
-            <a:r>
-              <a:rPr lang="en-US" sz="1700" i="1" dirty="0" smtClean="0">
-                <a:solidFill>
-                  <a:srgbClr val="FF5050"/>
-                </a:solidFill>
-                <a:cs typeface="Consolas" pitchFamily="49" charset="0"/>
-              </a:rPr>
-              <a:t>return (</a:t>
-            </a:r>
-            <a:r>
-              <a:rPr lang="en-US" sz="1700" i="1" dirty="0" err="1" smtClean="0">
-                <a:solidFill>
-                  <a:srgbClr val="FF5050"/>
-                </a:solidFill>
-                <a:cs typeface="Consolas" pitchFamily="49" charset="0"/>
-              </a:rPr>
-              <a:t>int</a:t>
-            </a:r>
-            <a:r>
-              <a:rPr lang="en-US" sz="1700" i="1" dirty="0" smtClean="0">
-                <a:solidFill>
-                  <a:srgbClr val="FF5050"/>
-                </a:solidFill>
-                <a:cs typeface="Consolas" pitchFamily="49" charset="0"/>
-              </a:rPr>
-              <a:t> y = 2)</a:t>
-            </a:r>
-          </a:p>
-          <a:p>
-            <a:pPr marL="114300" indent="0">
-              <a:buNone/>
-            </a:pPr>
-            <a:r>
-              <a:rPr lang="en-US" sz="1700" dirty="0" err="1" smtClean="0">
-                <a:solidFill>
-                  <a:schemeClr val="accent2"/>
-                </a:solidFill>
-                <a:cs typeface="Consolas" pitchFamily="49" charset="0"/>
-              </a:rPr>
-              <a:t>System.out.println</a:t>
-            </a:r>
-            <a:r>
-              <a:rPr lang="en-US" sz="1700" dirty="0" smtClean="0">
-                <a:solidFill>
-                  <a:schemeClr val="accent2"/>
-                </a:solidFill>
-                <a:cs typeface="Consolas" pitchFamily="49" charset="0"/>
-              </a:rPr>
-              <a:t>(“Hi”)</a:t>
-            </a:r>
-          </a:p>
-          <a:p>
-            <a:pPr marL="114300" indent="0">
-              <a:buNone/>
-            </a:pPr>
-            <a:endParaRPr lang="en-US" sz="1700" dirty="0">
+              <a:t>a computation.</a:t>
+            </a:r>
+            <a:endParaRPr lang="en-US" b="1" i="1" dirty="0" smtClean="0">
               <a:solidFill>
-                <a:schemeClr val="accent2"/>
+                <a:schemeClr val="accent3">
+                  <a:lumMod val="50000"/>
+                </a:schemeClr>
               </a:solidFill>
-              <a:cs typeface="Consolas" pitchFamily="49" charset="0"/>
             </a:endParaRPr>
           </a:p>
-          <a:p>
-            <a:pPr marL="114300" indent="0">
-              <a:buNone/>
-            </a:pPr>
-            <a:endParaRPr lang="en-US" sz="1700" dirty="0">
-              <a:solidFill>
-                <a:schemeClr val="accent2"/>
-              </a:solidFill>
-              <a:cs typeface="Consolas" pitchFamily="49" charset="0"/>
-            </a:endParaRPr>
-          </a:p>
-        </p:txBody>
-      </p:sp>
-      <p:sp>
-        <p:nvSpPr>
-          <p:cNvPr id="8" name="Content Placeholder 2"/>
+        </p:txBody>
+      </p:sp>
+      <p:sp>
+        <p:nvSpPr>
+          <p:cNvPr id="7" name="Content Placeholder 2"/>
           <p:cNvSpPr txBox="1">
             <a:spLocks/>
           </p:cNvSpPr>
@@ -6455,15 +6156,15 @@
         </p:nvSpPr>
         <p:spPr>
           <a:xfrm>
-            <a:off x="609600" y="1524000"/>
-            <a:ext cx="7620000" cy="762000"/>
+            <a:off x="762000" y="1981200"/>
+            <a:ext cx="7315200" cy="1828800"/>
           </a:xfrm>
           <a:prstGeom prst="rect">
             <a:avLst/>
           </a:prstGeom>
         </p:spPr>
         <p:txBody>
-          <a:bodyPr vert="horz" lIns="91440" tIns="45720" rIns="91440" bIns="45720" rtlCol="0">
+          <a:bodyPr vert="horz" lIns="91440" tIns="45720" rIns="91440" bIns="45720" numCol="2" rtlCol="0">
             <a:normAutofit/>
           </a:bodyPr>
           <a:lstStyle>
@@ -6631,6 +6332,334 @@
             </a:lvl9pPr>
           </a:lstStyle>
           <a:p>
+            <a:r>
+              <a:rPr lang="en-US" sz="1700" dirty="0" smtClean="0"/>
+              <a:t>Do not return a value</a:t>
+            </a:r>
+          </a:p>
+          <a:p>
+            <a:r>
+              <a:rPr lang="en-US" sz="1700" dirty="0" smtClean="0"/>
+              <a:t>Are illegal in some places</a:t>
+            </a:r>
+          </a:p>
+          <a:p>
+            <a:r>
+              <a:rPr lang="en-US" sz="1700" dirty="0" smtClean="0"/>
+              <a:t>Exist </a:t>
+            </a:r>
+            <a:r>
+              <a:rPr lang="en-US" sz="1700" i="1" dirty="0" smtClean="0"/>
+              <a:t>solely</a:t>
+            </a:r>
+            <a:r>
+              <a:rPr lang="en-US" sz="1700" dirty="0" smtClean="0"/>
+              <a:t> for the purpose of their side effect</a:t>
+            </a:r>
+          </a:p>
+          <a:p>
+            <a:r>
+              <a:rPr lang="en-US" sz="1700" dirty="0" smtClean="0"/>
+              <a:t>Typically change some global state of the program or the system</a:t>
+            </a:r>
+          </a:p>
+          <a:p>
+            <a:pPr marL="114300" indent="0">
+              <a:buNone/>
+            </a:pPr>
+            <a:r>
+              <a:rPr lang="en-US" sz="1700" i="1" dirty="0" smtClean="0">
+                <a:solidFill>
+                  <a:srgbClr val="FF5050"/>
+                </a:solidFill>
+                <a:cs typeface="Consolas" pitchFamily="49" charset="0"/>
+              </a:rPr>
+              <a:t>y = (</a:t>
+            </a:r>
+            <a:r>
+              <a:rPr lang="en-US" sz="1700" i="1" dirty="0" err="1" smtClean="0">
+                <a:solidFill>
+                  <a:srgbClr val="FF5050"/>
+                </a:solidFill>
+                <a:cs typeface="Consolas" pitchFamily="49" charset="0"/>
+              </a:rPr>
+              <a:t>int</a:t>
+            </a:r>
+            <a:r>
+              <a:rPr lang="en-US" sz="1700" i="1" dirty="0" smtClean="0">
+                <a:solidFill>
+                  <a:srgbClr val="FF5050"/>
+                </a:solidFill>
+                <a:cs typeface="Consolas" pitchFamily="49" charset="0"/>
+              </a:rPr>
+              <a:t> x = 1)</a:t>
+            </a:r>
+          </a:p>
+          <a:p>
+            <a:pPr marL="114300" indent="0">
+              <a:buNone/>
+            </a:pPr>
+            <a:r>
+              <a:rPr lang="en-US" sz="1700" i="1" dirty="0" smtClean="0">
+                <a:solidFill>
+                  <a:srgbClr val="FF5050"/>
+                </a:solidFill>
+                <a:cs typeface="Consolas" pitchFamily="49" charset="0"/>
+              </a:rPr>
+              <a:t>return (</a:t>
+            </a:r>
+            <a:r>
+              <a:rPr lang="en-US" sz="1700" i="1" dirty="0" err="1" smtClean="0">
+                <a:solidFill>
+                  <a:srgbClr val="FF5050"/>
+                </a:solidFill>
+                <a:cs typeface="Consolas" pitchFamily="49" charset="0"/>
+              </a:rPr>
+              <a:t>int</a:t>
+            </a:r>
+            <a:r>
+              <a:rPr lang="en-US" sz="1700" i="1" dirty="0" smtClean="0">
+                <a:solidFill>
+                  <a:srgbClr val="FF5050"/>
+                </a:solidFill>
+                <a:cs typeface="Consolas" pitchFamily="49" charset="0"/>
+              </a:rPr>
+              <a:t> y = 2)</a:t>
+            </a:r>
+          </a:p>
+          <a:p>
+            <a:pPr marL="114300" indent="0">
+              <a:buNone/>
+            </a:pPr>
+            <a:r>
+              <a:rPr lang="en-US" sz="1700" dirty="0" err="1" smtClean="0">
+                <a:solidFill>
+                  <a:schemeClr val="accent2"/>
+                </a:solidFill>
+                <a:cs typeface="Consolas" pitchFamily="49" charset="0"/>
+              </a:rPr>
+              <a:t>System.out.println</a:t>
+            </a:r>
+            <a:r>
+              <a:rPr lang="en-US" sz="1700" dirty="0" smtClean="0">
+                <a:solidFill>
+                  <a:schemeClr val="accent2"/>
+                </a:solidFill>
+                <a:cs typeface="Consolas" pitchFamily="49" charset="0"/>
+              </a:rPr>
+              <a:t>(“Hi”)</a:t>
+            </a:r>
+          </a:p>
+          <a:p>
+            <a:pPr marL="114300" indent="0">
+              <a:buNone/>
+            </a:pPr>
+            <a:endParaRPr lang="en-US" sz="1700" dirty="0">
+              <a:solidFill>
+                <a:schemeClr val="accent2"/>
+              </a:solidFill>
+              <a:cs typeface="Consolas" pitchFamily="49" charset="0"/>
+            </a:endParaRPr>
+          </a:p>
+          <a:p>
+            <a:pPr marL="114300" indent="0">
+              <a:buNone/>
+            </a:pPr>
+            <a:endParaRPr lang="en-US" sz="1700" dirty="0">
+              <a:solidFill>
+                <a:schemeClr val="accent2"/>
+              </a:solidFill>
+              <a:cs typeface="Consolas" pitchFamily="49" charset="0"/>
+            </a:endParaRPr>
+          </a:p>
+        </p:txBody>
+      </p:sp>
+      <p:sp>
+        <p:nvSpPr>
+          <p:cNvPr id="8" name="Content Placeholder 2"/>
+          <p:cNvSpPr txBox="1">
+            <a:spLocks/>
+          </p:cNvSpPr>
+          <p:nvPr/>
+        </p:nvSpPr>
+        <p:spPr>
+          <a:xfrm>
+            <a:off x="609600" y="1524000"/>
+            <a:ext cx="7620000" cy="762000"/>
+          </a:xfrm>
+          <a:prstGeom prst="rect">
+            <a:avLst/>
+          </a:prstGeom>
+        </p:spPr>
+        <p:txBody>
+          <a:bodyPr vert="horz" lIns="91440" tIns="45720" rIns="91440" bIns="45720" rtlCol="0">
+            <a:normAutofit/>
+          </a:bodyPr>
+          <a:lstStyle>
+            <a:lvl1pPr marL="342900" indent="-228600" algn="l" defTabSz="914400" rtl="0" eaLnBrk="1" latinLnBrk="0" hangingPunct="1">
+              <a:spcBef>
+                <a:spcPct val="20000"/>
+              </a:spcBef>
+              <a:buClr>
+                <a:schemeClr val="accent1"/>
+              </a:buClr>
+              <a:buFont typeface="Arial" pitchFamily="34" charset="0"/>
+              <a:buChar char="•"/>
+              <a:defRPr sz="2200" kern="1200">
+                <a:solidFill>
+                  <a:schemeClr val="tx1"/>
+                </a:solidFill>
+                <a:latin typeface="+mn-lt"/>
+                <a:ea typeface="+mn-ea"/>
+                <a:cs typeface="+mn-cs"/>
+              </a:defRPr>
+            </a:lvl1pPr>
+            <a:lvl2pPr marL="640080" indent="-228600" algn="l" defTabSz="914400" rtl="0" eaLnBrk="1" latinLnBrk="0" hangingPunct="1">
+              <a:spcBef>
+                <a:spcPct val="20000"/>
+              </a:spcBef>
+              <a:buClr>
+                <a:schemeClr val="accent2"/>
+              </a:buClr>
+              <a:buFont typeface="Arial" pitchFamily="34" charset="0"/>
+              <a:buChar char="•"/>
+              <a:defRPr sz="2000" kern="1200">
+                <a:solidFill>
+                  <a:schemeClr val="tx1"/>
+                </a:solidFill>
+                <a:latin typeface="+mn-lt"/>
+                <a:ea typeface="+mn-ea"/>
+                <a:cs typeface="+mn-cs"/>
+              </a:defRPr>
+            </a:lvl2pPr>
+            <a:lvl3pPr marL="1005840" indent="-228600" algn="l" defTabSz="914400" rtl="0" eaLnBrk="1" latinLnBrk="0" hangingPunct="1">
+              <a:spcBef>
+                <a:spcPct val="20000"/>
+              </a:spcBef>
+              <a:buClr>
+                <a:schemeClr val="accent3"/>
+              </a:buClr>
+              <a:buFont typeface="Arial" pitchFamily="34" charset="0"/>
+              <a:buChar char="•"/>
+              <a:defRPr sz="1800" kern="1200">
+                <a:solidFill>
+                  <a:schemeClr val="tx1"/>
+                </a:solidFill>
+                <a:latin typeface="+mn-lt"/>
+                <a:ea typeface="+mn-ea"/>
+                <a:cs typeface="+mn-cs"/>
+              </a:defRPr>
+            </a:lvl3pPr>
+            <a:lvl4pPr marL="1280160" indent="-228600" algn="l" defTabSz="914400" rtl="0" eaLnBrk="1" latinLnBrk="0" hangingPunct="1">
+              <a:spcBef>
+                <a:spcPct val="20000"/>
+              </a:spcBef>
+              <a:buClr>
+                <a:schemeClr val="accent4"/>
+              </a:buClr>
+              <a:buFont typeface="Arial" pitchFamily="34" charset="0"/>
+              <a:buChar char="•"/>
+              <a:defRPr sz="1600" kern="1200">
+                <a:solidFill>
+                  <a:schemeClr val="tx1"/>
+                </a:solidFill>
+                <a:latin typeface="+mn-lt"/>
+                <a:ea typeface="+mn-ea"/>
+                <a:cs typeface="+mn-cs"/>
+              </a:defRPr>
+            </a:lvl4pPr>
+            <a:lvl5pPr marL="1554480" indent="-228600" algn="l" defTabSz="914400" rtl="0" eaLnBrk="1" latinLnBrk="0" hangingPunct="1">
+              <a:spcBef>
+                <a:spcPct val="20000"/>
+              </a:spcBef>
+              <a:buClr>
+                <a:schemeClr val="accent5"/>
+              </a:buClr>
+              <a:buFont typeface="Arial" pitchFamily="34" charset="0"/>
+              <a:buChar char="•"/>
+              <a:defRPr sz="1400" kern="1200" baseline="0">
+                <a:solidFill>
+                  <a:schemeClr val="tx1"/>
+                </a:solidFill>
+                <a:latin typeface="+mn-lt"/>
+                <a:ea typeface="+mn-ea"/>
+                <a:cs typeface="+mn-cs"/>
+              </a:defRPr>
+            </a:lvl5pPr>
+            <a:lvl6pPr marL="1737360" indent="-182880" algn="l" defTabSz="914400" rtl="0" eaLnBrk="1" latinLnBrk="0" hangingPunct="1">
+              <a:spcBef>
+                <a:spcPct val="20000"/>
+              </a:spcBef>
+              <a:buClr>
+                <a:schemeClr val="accent1"/>
+              </a:buClr>
+              <a:buFont typeface="Arial" pitchFamily="34" charset="0"/>
+              <a:buChar char="•"/>
+              <a:defRPr sz="1400" kern="1200" baseline="0">
+                <a:solidFill>
+                  <a:schemeClr val="tx1"/>
+                </a:solidFill>
+                <a:latin typeface="+mn-lt"/>
+                <a:ea typeface="+mn-ea"/>
+                <a:cs typeface="+mn-cs"/>
+              </a:defRPr>
+            </a:lvl6pPr>
+            <a:lvl7pPr marL="1920240" indent="-182880" algn="l" defTabSz="914400" rtl="0" eaLnBrk="1" latinLnBrk="0" hangingPunct="1">
+              <a:spcBef>
+                <a:spcPct val="20000"/>
+              </a:spcBef>
+              <a:buClr>
+                <a:schemeClr val="accent2"/>
+              </a:buClr>
+              <a:buFont typeface="Arial" pitchFamily="34" charset="0"/>
+              <a:buChar char="•"/>
+              <a:defRPr sz="1400" kern="1200">
+                <a:solidFill>
+                  <a:schemeClr val="tx1"/>
+                </a:solidFill>
+                <a:latin typeface="+mn-lt"/>
+                <a:ea typeface="+mn-ea"/>
+                <a:cs typeface="+mn-cs"/>
+              </a:defRPr>
+            </a:lvl7pPr>
+            <a:lvl8pPr marL="2103120" indent="-182880" algn="l" defTabSz="914400" rtl="0" eaLnBrk="1" latinLnBrk="0" hangingPunct="1">
+              <a:spcBef>
+                <a:spcPct val="20000"/>
+              </a:spcBef>
+              <a:buClr>
+                <a:schemeClr val="accent3"/>
+              </a:buClr>
+              <a:buFont typeface="Arial" pitchFamily="34" charset="0"/>
+              <a:buChar char="•"/>
+              <a:defRPr sz="1400" kern="1200">
+                <a:solidFill>
+                  <a:schemeClr val="tx1"/>
+                </a:solidFill>
+                <a:latin typeface="+mn-lt"/>
+                <a:ea typeface="+mn-ea"/>
+                <a:cs typeface="+mn-cs"/>
+              </a:defRPr>
+            </a:lvl8pPr>
+            <a:lvl9pPr marL="2286000" indent="-182880" algn="l" defTabSz="914400" rtl="0" eaLnBrk="1" latinLnBrk="0" hangingPunct="1">
+              <a:spcBef>
+                <a:spcPct val="20000"/>
+              </a:spcBef>
+              <a:buClr>
+                <a:schemeClr val="accent4"/>
+              </a:buClr>
+              <a:buFont typeface="Arial" pitchFamily="34" charset="0"/>
+              <a:buChar char="•"/>
+              <a:defRPr sz="1400" kern="1200">
+                <a:solidFill>
+                  <a:schemeClr val="tx1"/>
+                </a:solidFill>
+                <a:latin typeface="+mn-lt"/>
+                <a:ea typeface="+mn-ea"/>
+                <a:cs typeface="+mn-cs"/>
+              </a:defRPr>
+            </a:lvl9pPr>
+          </a:lstStyle>
+          <a:p>
             <a:pPr marL="114300" indent="0">
               <a:buNone/>
             </a:pPr>
@@ -6660,7 +6689,7 @@
 </p:sld>
 </file>
 
-<file path=ppt/slides/slide18.xml><?xml version="1.0" encoding="utf-8"?>
+<file path=ppt/slides/slide19.xml><?xml version="1.0" encoding="utf-8"?>
 <p:sld xmlns:a="http://schemas.openxmlformats.org/drawingml/2006/main" xmlns:r="http://schemas.openxmlformats.org/officeDocument/2006/relationships" xmlns:p="http://schemas.openxmlformats.org/presentationml/2006/main">
   <p:cSld>
     <p:spTree>
@@ -6884,15 +6913,6 @@
               </a:rPr>
               <a:t>//Called via ()</a:t>
             </a:r>
-            <a:endParaRPr lang="en-US" sz="1600" dirty="0" smtClean="0">
-              <a:solidFill>
-                <a:schemeClr val="accent5">
-                  <a:lumMod val="75000"/>
-                </a:schemeClr>
-              </a:solidFill>
-              <a:latin typeface="Consolas" pitchFamily="49" charset="0"/>
-              <a:cs typeface="Consolas" pitchFamily="49" charset="0"/>
-            </a:endParaRPr>
           </a:p>
         </p:txBody>
       </p:sp>
@@ -7248,67 +7268,79 @@
                 <a:latin typeface="Consolas" pitchFamily="49" charset="0"/>
                 <a:cs typeface="Consolas" pitchFamily="49" charset="0"/>
               </a:rPr>
-              <a:t>-- assigned as value</a:t>
-            </a:r>
-          </a:p>
-          <a:p>
-            <a:r>
-              <a:rPr lang="en-US" sz="1600" dirty="0" err="1" smtClean="0">
-                <a:solidFill>
-                  <a:schemeClr val="accent2">
-                    <a:lumMod val="50000"/>
+              <a:t>-- assigned as </a:t>
+            </a:r>
+            <a:r>
+              <a:rPr lang="en-US" sz="1600" dirty="0" smtClean="0">
+                <a:solidFill>
+                  <a:schemeClr val="accent5">
+                    <a:lumMod val="75000"/>
                   </a:schemeClr>
                 </a:solidFill>
                 <a:latin typeface="Consolas" pitchFamily="49" charset="0"/>
                 <a:cs typeface="Consolas" pitchFamily="49" charset="0"/>
               </a:rPr>
-              <a:t>TestCase</a:t>
-            </a:r>
-            <a:r>
-              <a:rPr lang="en-US" sz="1600" dirty="0" smtClean="0">
-                <a:solidFill>
-                  <a:schemeClr val="accent2">
-                    <a:lumMod val="50000"/>
-                  </a:schemeClr>
-                </a:solidFill>
-                <a:latin typeface="Consolas" pitchFamily="49" charset="0"/>
-                <a:cs typeface="Consolas" pitchFamily="49" charset="0"/>
-              </a:rPr>
-              <a:t>(</a:t>
-            </a:r>
-            <a:r>
-              <a:rPr lang="en-US" sz="1600" dirty="0" err="1" smtClean="0">
-                <a:solidFill>
-                  <a:schemeClr val="accent2">
-                    <a:lumMod val="50000"/>
-                  </a:schemeClr>
-                </a:solidFill>
-                <a:latin typeface="Consolas" pitchFamily="49" charset="0"/>
-                <a:cs typeface="Consolas" pitchFamily="49" charset="0"/>
-              </a:rPr>
-              <a:t>assertEqual</a:t>
-            </a:r>
-            <a:r>
-              <a:rPr lang="en-US" sz="1600" dirty="0" smtClean="0">
-                <a:solidFill>
-                  <a:schemeClr val="accent2">
-                    <a:lumMod val="50000"/>
-                  </a:schemeClr>
-                </a:solidFill>
-                <a:latin typeface="Consolas" pitchFamily="49" charset="0"/>
-                <a:cs typeface="Consolas" pitchFamily="49" charset="0"/>
-              </a:rPr>
-              <a:t> “Hello you!” (g2 name))</a:t>
+              <a:t>value</a:t>
             </a:r>
             <a:endParaRPr lang="en-US" sz="1600" dirty="0" smtClean="0">
               <a:solidFill>
-                <a:schemeClr val="accent2">
-                  <a:lumMod val="50000"/>
+                <a:schemeClr val="accent5">
+                  <a:lumMod val="75000"/>
                 </a:schemeClr>
               </a:solidFill>
               <a:latin typeface="Consolas" pitchFamily="49" charset="0"/>
               <a:cs typeface="Consolas" pitchFamily="49" charset="0"/>
             </a:endParaRPr>
+          </a:p>
+          <a:p>
+            <a:r>
+              <a:rPr lang="en-US" sz="1600" dirty="0" err="1" smtClean="0">
+                <a:solidFill>
+                  <a:schemeClr val="accent2">
+                    <a:lumMod val="50000"/>
+                  </a:schemeClr>
+                </a:solidFill>
+                <a:latin typeface="Consolas" pitchFamily="49" charset="0"/>
+                <a:cs typeface="Consolas" pitchFamily="49" charset="0"/>
+              </a:rPr>
+              <a:t>TestCase</a:t>
+            </a:r>
+            <a:r>
+              <a:rPr lang="en-US" sz="1600" dirty="0" smtClean="0">
+                <a:solidFill>
+                  <a:schemeClr val="accent2">
+                    <a:lumMod val="50000"/>
+                  </a:schemeClr>
+                </a:solidFill>
+                <a:latin typeface="Consolas" pitchFamily="49" charset="0"/>
+                <a:cs typeface="Consolas" pitchFamily="49" charset="0"/>
+              </a:rPr>
+              <a:t>(</a:t>
+            </a:r>
+            <a:r>
+              <a:rPr lang="en-US" sz="1600" dirty="0" err="1" smtClean="0">
+                <a:solidFill>
+                  <a:schemeClr val="accent2">
+                    <a:lumMod val="50000"/>
+                  </a:schemeClr>
+                </a:solidFill>
+                <a:latin typeface="Consolas" pitchFamily="49" charset="0"/>
+                <a:cs typeface="Consolas" pitchFamily="49" charset="0"/>
+              </a:rPr>
+              <a:t>assertEqual</a:t>
+            </a:r>
+            <a:r>
+              <a:rPr lang="en-US" sz="1600" dirty="0" smtClean="0">
+                <a:solidFill>
+                  <a:schemeClr val="accent2">
+                    <a:lumMod val="50000"/>
+                  </a:schemeClr>
+                </a:solidFill>
+                <a:latin typeface="Consolas" pitchFamily="49" charset="0"/>
+                <a:cs typeface="Consolas" pitchFamily="49" charset="0"/>
+              </a:rPr>
+              <a:t> “Hello you!” (g2 name))</a:t>
+            </a:r>
           </a:p>
         </p:txBody>
       </p:sp>
@@ -7362,102 +7394,6 @@
     <p:extLst>
       <p:ext uri="{BB962C8B-B14F-4D97-AF65-F5344CB8AC3E}">
         <p14:creationId xmlns:p14="http://schemas.microsoft.com/office/powerpoint/2010/main" val="2708595944"/>
-      </p:ext>
-    </p:extLst>
-  </p:cSld>
-  <p:clrMapOvr>
-    <a:masterClrMapping/>
-  </p:clrMapOvr>
-</p:sld>
-</file>
-
-<file path=ppt/slides/slide19.xml><?xml version="1.0" encoding="utf-8"?>
-<p:sld xmlns:a="http://schemas.openxmlformats.org/drawingml/2006/main" xmlns:r="http://schemas.openxmlformats.org/officeDocument/2006/relationships" xmlns:p="http://schemas.openxmlformats.org/presentationml/2006/main">
-  <p:cSld>
-    <p:spTree>
-      <p:nvGrpSpPr>
-        <p:cNvPr id="1" name=""/>
-        <p:cNvGrpSpPr/>
-        <p:nvPr/>
-      </p:nvGrpSpPr>
-      <p:grpSpPr>
-        <a:xfrm>
-          <a:off x="0" y="0"/>
-          <a:ext cx="0" cy="0"/>
-          <a:chOff x="0" y="0"/>
-          <a:chExt cx="0" cy="0"/>
-        </a:xfrm>
-      </p:grpSpPr>
-      <p:sp>
-        <p:nvSpPr>
-          <p:cNvPr id="2" name="Title 1"/>
-          <p:cNvSpPr>
-            <a:spLocks noGrp="1"/>
-          </p:cNvSpPr>
-          <p:nvPr>
-            <p:ph type="title"/>
-          </p:nvPr>
-        </p:nvSpPr>
-        <p:spPr/>
-        <p:txBody>
-          <a:bodyPr/>
-          <a:lstStyle/>
-          <a:p>
-            <a:r>
-              <a:rPr lang="en-US" dirty="0" smtClean="0"/>
-              <a:t>Higher Order Functions</a:t>
-            </a:r>
-            <a:endParaRPr lang="en-US" dirty="0"/>
-          </a:p>
-        </p:txBody>
-      </p:sp>
-      <p:sp>
-        <p:nvSpPr>
-          <p:cNvPr id="3" name="Content Placeholder 2"/>
-          <p:cNvSpPr>
-            <a:spLocks noGrp="1"/>
-          </p:cNvSpPr>
-          <p:nvPr>
-            <p:ph idx="1"/>
-          </p:nvPr>
-        </p:nvSpPr>
-        <p:spPr/>
-        <p:txBody>
-          <a:bodyPr/>
-          <a:lstStyle/>
-          <a:p>
-            <a:r>
-              <a:rPr lang="en-US" dirty="0" smtClean="0"/>
-              <a:t>Functions can have functions as parameters and return types</a:t>
-            </a:r>
-          </a:p>
-          <a:p>
-            <a:r>
-              <a:rPr lang="en-US" dirty="0" smtClean="0"/>
-              <a:t>Goes hand-in-hand with first-class functions</a:t>
-            </a:r>
-          </a:p>
-          <a:p>
-            <a:r>
-              <a:rPr lang="en-US" dirty="0" smtClean="0"/>
-              <a:t>Necessary to support many other features</a:t>
-            </a:r>
-          </a:p>
-          <a:p>
-            <a:r>
-              <a:rPr lang="en-US" b="1" dirty="0" smtClean="0"/>
-              <a:t>Examples</a:t>
-            </a:r>
-          </a:p>
-          <a:p>
-            <a:endParaRPr lang="en-US" dirty="0" smtClean="0"/>
-          </a:p>
-        </p:txBody>
-      </p:sp>
-    </p:spTree>
-    <p:extLst>
-      <p:ext uri="{BB962C8B-B14F-4D97-AF65-F5344CB8AC3E}">
-        <p14:creationId xmlns:p14="http://schemas.microsoft.com/office/powerpoint/2010/main" val="4196640344"/>
       </p:ext>
     </p:extLst>
   </p:cSld>
@@ -7500,10 +7436,10 @@
           <a:lstStyle/>
           <a:p>
             <a:r>
-              <a:rPr lang="en-US" dirty="0" smtClean="0"/>
-              <a:t>Goals of this Presentation</a:t>
-            </a:r>
-            <a:endParaRPr lang="en-US" dirty="0"/>
+              <a:rPr lang="en-US" sz="4000" dirty="0" smtClean="0"/>
+              <a:t>Goals</a:t>
+            </a:r>
+            <a:endParaRPr lang="en-US" sz="4000" dirty="0"/>
           </a:p>
         </p:txBody>
       </p:sp>
@@ -7517,9 +7453,16 @@
             <p:ph idx="1"/>
           </p:nvPr>
         </p:nvSpPr>
-        <p:spPr/>
-        <p:txBody>
-          <a:bodyPr/>
+        <p:spPr>
+          <a:xfrm>
+            <a:off x="685800" y="1905000"/>
+            <a:ext cx="7467600" cy="2438400"/>
+          </a:xfrm>
+        </p:spPr>
+        <p:txBody>
+          <a:bodyPr>
+            <a:normAutofit fontScale="92500"/>
+          </a:bodyPr>
           <a:lstStyle/>
           <a:p>
             <a:r>
@@ -7530,13 +7473,33 @@
           <a:p>
             <a:r>
               <a:rPr lang="en-US" dirty="0" smtClean="0"/>
-              <a:t>An introduction to some fundamental FP concepts, and their value</a:t>
-            </a:r>
-          </a:p>
-          <a:p>
-            <a:r>
-              <a:rPr lang="en-US" dirty="0" smtClean="0"/>
-              <a:t>An appreciation of what kinds of problems are good candidates for FP</a:t>
+              <a:t>A language-neutral introduction </a:t>
+            </a:r>
+            <a:r>
+              <a:rPr lang="en-US" dirty="0" smtClean="0"/>
+              <a:t>to </a:t>
+            </a:r>
+            <a:r>
+              <a:rPr lang="en-US" dirty="0" smtClean="0"/>
+              <a:t>important FP concepts</a:t>
+            </a:r>
+          </a:p>
+          <a:p>
+            <a:pPr lvl="1"/>
+            <a:r>
+              <a:rPr lang="en-US" dirty="0" smtClean="0"/>
+              <a:t>Some understanding of the implications of each</a:t>
+            </a:r>
+            <a:endParaRPr lang="en-US" dirty="0" smtClean="0"/>
+          </a:p>
+          <a:p>
+            <a:r>
+              <a:rPr lang="en-US" dirty="0" smtClean="0"/>
+              <a:t>An </a:t>
+            </a:r>
+            <a:r>
+              <a:rPr lang="en-US" dirty="0" smtClean="0"/>
+              <a:t>appreciation of what kinds of problems are good candidates for FP</a:t>
             </a:r>
           </a:p>
           <a:p>
@@ -7544,6 +7507,203 @@
               <a:rPr lang="en-US" dirty="0" smtClean="0"/>
               <a:t>A curiosity about some of the deeper ideas which underpin FP</a:t>
             </a:r>
+          </a:p>
+        </p:txBody>
+      </p:sp>
+      <p:sp>
+        <p:nvSpPr>
+          <p:cNvPr id="4" name="Content Placeholder 2"/>
+          <p:cNvSpPr txBox="1">
+            <a:spLocks/>
+          </p:cNvSpPr>
+          <p:nvPr/>
+        </p:nvSpPr>
+        <p:spPr>
+          <a:xfrm>
+            <a:off x="457200" y="1371600"/>
+            <a:ext cx="7620000" cy="533400"/>
+          </a:xfrm>
+          <a:prstGeom prst="rect">
+            <a:avLst/>
+          </a:prstGeom>
+        </p:spPr>
+        <p:txBody>
+          <a:bodyPr vert="horz" lIns="91440" tIns="45720" rIns="91440" bIns="45720" rtlCol="0">
+            <a:normAutofit/>
+          </a:bodyPr>
+          <a:lstStyle>
+            <a:lvl1pPr marL="342900" indent="-228600" algn="l" defTabSz="914400" rtl="0" eaLnBrk="1" latinLnBrk="0" hangingPunct="1">
+              <a:spcBef>
+                <a:spcPct val="20000"/>
+              </a:spcBef>
+              <a:buClr>
+                <a:schemeClr val="accent1"/>
+              </a:buClr>
+              <a:buFont typeface="Arial" pitchFamily="34" charset="0"/>
+              <a:buChar char="•"/>
+              <a:defRPr sz="2200" kern="1200">
+                <a:solidFill>
+                  <a:schemeClr val="tx1"/>
+                </a:solidFill>
+                <a:latin typeface="+mn-lt"/>
+                <a:ea typeface="+mn-ea"/>
+                <a:cs typeface="+mn-cs"/>
+              </a:defRPr>
+            </a:lvl1pPr>
+            <a:lvl2pPr marL="640080" indent="-228600" algn="l" defTabSz="914400" rtl="0" eaLnBrk="1" latinLnBrk="0" hangingPunct="1">
+              <a:spcBef>
+                <a:spcPct val="20000"/>
+              </a:spcBef>
+              <a:buClr>
+                <a:schemeClr val="accent2"/>
+              </a:buClr>
+              <a:buFont typeface="Arial" pitchFamily="34" charset="0"/>
+              <a:buChar char="•"/>
+              <a:defRPr sz="2000" kern="1200">
+                <a:solidFill>
+                  <a:schemeClr val="tx1"/>
+                </a:solidFill>
+                <a:latin typeface="+mn-lt"/>
+                <a:ea typeface="+mn-ea"/>
+                <a:cs typeface="+mn-cs"/>
+              </a:defRPr>
+            </a:lvl2pPr>
+            <a:lvl3pPr marL="1005840" indent="-228600" algn="l" defTabSz="914400" rtl="0" eaLnBrk="1" latinLnBrk="0" hangingPunct="1">
+              <a:spcBef>
+                <a:spcPct val="20000"/>
+              </a:spcBef>
+              <a:buClr>
+                <a:schemeClr val="accent3"/>
+              </a:buClr>
+              <a:buFont typeface="Arial" pitchFamily="34" charset="0"/>
+              <a:buChar char="•"/>
+              <a:defRPr sz="1800" kern="1200">
+                <a:solidFill>
+                  <a:schemeClr val="tx1"/>
+                </a:solidFill>
+                <a:latin typeface="+mn-lt"/>
+                <a:ea typeface="+mn-ea"/>
+                <a:cs typeface="+mn-cs"/>
+              </a:defRPr>
+            </a:lvl3pPr>
+            <a:lvl4pPr marL="1280160" indent="-228600" algn="l" defTabSz="914400" rtl="0" eaLnBrk="1" latinLnBrk="0" hangingPunct="1">
+              <a:spcBef>
+                <a:spcPct val="20000"/>
+              </a:spcBef>
+              <a:buClr>
+                <a:schemeClr val="accent4"/>
+              </a:buClr>
+              <a:buFont typeface="Arial" pitchFamily="34" charset="0"/>
+              <a:buChar char="•"/>
+              <a:defRPr sz="1600" kern="1200">
+                <a:solidFill>
+                  <a:schemeClr val="tx1"/>
+                </a:solidFill>
+                <a:latin typeface="+mn-lt"/>
+                <a:ea typeface="+mn-ea"/>
+                <a:cs typeface="+mn-cs"/>
+              </a:defRPr>
+            </a:lvl4pPr>
+            <a:lvl5pPr marL="1554480" indent="-228600" algn="l" defTabSz="914400" rtl="0" eaLnBrk="1" latinLnBrk="0" hangingPunct="1">
+              <a:spcBef>
+                <a:spcPct val="20000"/>
+              </a:spcBef>
+              <a:buClr>
+                <a:schemeClr val="accent5"/>
+              </a:buClr>
+              <a:buFont typeface="Arial" pitchFamily="34" charset="0"/>
+              <a:buChar char="•"/>
+              <a:defRPr sz="1400" kern="1200" baseline="0">
+                <a:solidFill>
+                  <a:schemeClr val="tx1"/>
+                </a:solidFill>
+                <a:latin typeface="+mn-lt"/>
+                <a:ea typeface="+mn-ea"/>
+                <a:cs typeface="+mn-cs"/>
+              </a:defRPr>
+            </a:lvl5pPr>
+            <a:lvl6pPr marL="1737360" indent="-182880" algn="l" defTabSz="914400" rtl="0" eaLnBrk="1" latinLnBrk="0" hangingPunct="1">
+              <a:spcBef>
+                <a:spcPct val="20000"/>
+              </a:spcBef>
+              <a:buClr>
+                <a:schemeClr val="accent1"/>
+              </a:buClr>
+              <a:buFont typeface="Arial" pitchFamily="34" charset="0"/>
+              <a:buChar char="•"/>
+              <a:defRPr sz="1400" kern="1200" baseline="0">
+                <a:solidFill>
+                  <a:schemeClr val="tx1"/>
+                </a:solidFill>
+                <a:latin typeface="+mn-lt"/>
+                <a:ea typeface="+mn-ea"/>
+                <a:cs typeface="+mn-cs"/>
+              </a:defRPr>
+            </a:lvl6pPr>
+            <a:lvl7pPr marL="1920240" indent="-182880" algn="l" defTabSz="914400" rtl="0" eaLnBrk="1" latinLnBrk="0" hangingPunct="1">
+              <a:spcBef>
+                <a:spcPct val="20000"/>
+              </a:spcBef>
+              <a:buClr>
+                <a:schemeClr val="accent2"/>
+              </a:buClr>
+              <a:buFont typeface="Arial" pitchFamily="34" charset="0"/>
+              <a:buChar char="•"/>
+              <a:defRPr sz="1400" kern="1200">
+                <a:solidFill>
+                  <a:schemeClr val="tx1"/>
+                </a:solidFill>
+                <a:latin typeface="+mn-lt"/>
+                <a:ea typeface="+mn-ea"/>
+                <a:cs typeface="+mn-cs"/>
+              </a:defRPr>
+            </a:lvl7pPr>
+            <a:lvl8pPr marL="2103120" indent="-182880" algn="l" defTabSz="914400" rtl="0" eaLnBrk="1" latinLnBrk="0" hangingPunct="1">
+              <a:spcBef>
+                <a:spcPct val="20000"/>
+              </a:spcBef>
+              <a:buClr>
+                <a:schemeClr val="accent3"/>
+              </a:buClr>
+              <a:buFont typeface="Arial" pitchFamily="34" charset="0"/>
+              <a:buChar char="•"/>
+              <a:defRPr sz="1400" kern="1200">
+                <a:solidFill>
+                  <a:schemeClr val="tx1"/>
+                </a:solidFill>
+                <a:latin typeface="+mn-lt"/>
+                <a:ea typeface="+mn-ea"/>
+                <a:cs typeface="+mn-cs"/>
+              </a:defRPr>
+            </a:lvl8pPr>
+            <a:lvl9pPr marL="2286000" indent="-182880" algn="l" defTabSz="914400" rtl="0" eaLnBrk="1" latinLnBrk="0" hangingPunct="1">
+              <a:spcBef>
+                <a:spcPct val="20000"/>
+              </a:spcBef>
+              <a:buClr>
+                <a:schemeClr val="accent4"/>
+              </a:buClr>
+              <a:buFont typeface="Arial" pitchFamily="34" charset="0"/>
+              <a:buChar char="•"/>
+              <a:defRPr sz="1400" kern="1200">
+                <a:solidFill>
+                  <a:schemeClr val="tx1"/>
+                </a:solidFill>
+                <a:latin typeface="+mn-lt"/>
+                <a:ea typeface="+mn-ea"/>
+                <a:cs typeface="+mn-cs"/>
+              </a:defRPr>
+            </a:lvl9pPr>
+          </a:lstStyle>
+          <a:p>
+            <a:pPr marL="114300" indent="0">
+              <a:buNone/>
+            </a:pPr>
+            <a:r>
+              <a:rPr lang="en-US" dirty="0" smtClean="0"/>
+              <a:t>What I hope you will get from this presentation:</a:t>
+            </a:r>
+            <a:endParaRPr lang="en-US" dirty="0" smtClean="0"/>
           </a:p>
         </p:txBody>
       </p:sp>
@@ -7594,7 +7754,7 @@
           <a:p>
             <a:r>
               <a:rPr lang="en-US" dirty="0" smtClean="0"/>
-              <a:t>Complexity</a:t>
+              <a:t>First Class Functions, cont.</a:t>
             </a:r>
             <a:endParaRPr lang="en-US" dirty="0"/>
           </a:p>
@@ -7616,41 +7776,25 @@
           <a:lstStyle/>
           <a:p>
             <a:r>
-              <a:rPr lang="en-US" dirty="0" smtClean="0"/>
-              <a:t>Example: Shared state as complexity</a:t>
-            </a:r>
-          </a:p>
-          <a:p>
-            <a:r>
-              <a:rPr lang="en-US" dirty="0" smtClean="0"/>
-              <a:t>Example: Mutable state as complexity</a:t>
-            </a:r>
-          </a:p>
-          <a:p>
-            <a:r>
-              <a:rPr lang="en-US" dirty="0" smtClean="0"/>
-              <a:t>Example: Non-determinism as complexity</a:t>
-            </a:r>
-          </a:p>
-          <a:p>
-            <a:r>
-              <a:rPr lang="en-US" dirty="0" smtClean="0"/>
-              <a:t>Example: Side-effects as complexity</a:t>
-            </a:r>
-          </a:p>
-          <a:p>
-            <a:r>
-              <a:rPr lang="en-US" dirty="0" smtClean="0"/>
-              <a:t>Example: Sequencing as complexity</a:t>
-            </a:r>
-            <a:endParaRPr lang="en-US" dirty="0"/>
+              <a:rPr lang="en-US" b="1" dirty="0" smtClean="0">
+                <a:solidFill>
+                  <a:srgbClr val="FF0000"/>
+                </a:solidFill>
+              </a:rPr>
+              <a:t>Comments about how many FP concepts need special syntax in hybrid languages, whereas in Haskell they are the default and more concise</a:t>
+            </a:r>
+            <a:endParaRPr lang="en-US" b="1" dirty="0">
+              <a:solidFill>
+                <a:srgbClr val="FF0000"/>
+              </a:solidFill>
+            </a:endParaRPr>
           </a:p>
         </p:txBody>
       </p:sp>
     </p:spTree>
     <p:extLst>
       <p:ext uri="{BB962C8B-B14F-4D97-AF65-F5344CB8AC3E}">
-        <p14:creationId xmlns:p14="http://schemas.microsoft.com/office/powerpoint/2010/main" val="3233297951"/>
+        <p14:creationId xmlns:p14="http://schemas.microsoft.com/office/powerpoint/2010/main" val="2342392140"/>
       </p:ext>
     </p:extLst>
   </p:cSld>
@@ -7694,7 +7838,7 @@
           <a:p>
             <a:r>
               <a:rPr lang="en-US" dirty="0" smtClean="0"/>
-              <a:t>What’s in Java 8</a:t>
+              <a:t>Higher Order Functions</a:t>
             </a:r>
             <a:endParaRPr lang="en-US" dirty="0"/>
           </a:p>
@@ -7715,14 +7859,105 @@
           <a:bodyPr/>
           <a:lstStyle/>
           <a:p>
-            <a:endParaRPr lang="en-US"/>
+            <a:r>
+              <a:rPr lang="en-US" dirty="0" smtClean="0"/>
+              <a:t>Functions can have functions as parameters and return types</a:t>
+            </a:r>
+          </a:p>
+          <a:p>
+            <a:r>
+              <a:rPr lang="en-US" dirty="0" smtClean="0"/>
+              <a:t>Goes hand-in-hand with first-class functions</a:t>
+            </a:r>
+          </a:p>
+          <a:p>
+            <a:r>
+              <a:rPr lang="en-US" dirty="0" smtClean="0"/>
+              <a:t>Necessary to support many other features</a:t>
+            </a:r>
+          </a:p>
+          <a:p>
+            <a:r>
+              <a:rPr lang="en-US" b="1" dirty="0" smtClean="0">
+                <a:solidFill>
+                  <a:srgbClr val="FF0000"/>
+                </a:solidFill>
+              </a:rPr>
+              <a:t>Examples: Around-pattern for cleanup, logging, benchmarking, transactions</a:t>
+            </a:r>
+          </a:p>
+          <a:p>
+            <a:r>
+              <a:rPr lang="en-US" b="1" dirty="0" smtClean="0">
+                <a:solidFill>
+                  <a:srgbClr val="FF0000"/>
+                </a:solidFill>
+              </a:rPr>
+              <a:t>Comments about template method pattern</a:t>
+            </a:r>
+          </a:p>
+          <a:p>
+            <a:r>
+              <a:rPr lang="en-US" b="1" dirty="0" smtClean="0">
+                <a:solidFill>
+                  <a:srgbClr val="FF0000"/>
+                </a:solidFill>
+              </a:rPr>
+              <a:t>Comments abou</a:t>
+            </a:r>
+            <a:r>
+              <a:rPr lang="en-US" b="1" dirty="0" smtClean="0">
+                <a:solidFill>
+                  <a:srgbClr val="FF0000"/>
+                </a:solidFill>
+              </a:rPr>
+              <a:t>t anonymous classes</a:t>
+            </a:r>
+          </a:p>
+          <a:p>
+            <a:r>
+              <a:rPr lang="en-US" b="1" dirty="0" smtClean="0">
+                <a:solidFill>
+                  <a:srgbClr val="FF0000"/>
+                </a:solidFill>
+              </a:rPr>
+              <a:t>Comments about visitor pattern</a:t>
+            </a:r>
+          </a:p>
+          <a:p>
+            <a:r>
+              <a:rPr lang="en-US" b="1" dirty="0" smtClean="0">
+                <a:solidFill>
+                  <a:srgbClr val="FF0000"/>
+                </a:solidFill>
+              </a:rPr>
+              <a:t>Comments about strategy, command patterns</a:t>
+            </a:r>
+          </a:p>
+          <a:p>
+            <a:r>
+              <a:rPr lang="en-US" b="1" dirty="0" smtClean="0">
+                <a:solidFill>
+                  <a:srgbClr val="FF0000"/>
+                </a:solidFill>
+              </a:rPr>
+              <a:t>Comments about iteration – lead in to list comprehensions</a:t>
+            </a:r>
+            <a:endParaRPr lang="en-US" b="1" dirty="0" smtClean="0">
+              <a:solidFill>
+                <a:srgbClr val="FF0000"/>
+              </a:solidFill>
+            </a:endParaRPr>
+          </a:p>
+          <a:p>
+            <a:endParaRPr lang="en-US" dirty="0" smtClean="0"/>
           </a:p>
         </p:txBody>
       </p:sp>
     </p:spTree>
     <p:extLst>
       <p:ext uri="{BB962C8B-B14F-4D97-AF65-F5344CB8AC3E}">
-        <p14:creationId xmlns:p14="http://schemas.microsoft.com/office/powerpoint/2010/main" val="3713724773"/>
+        <p14:creationId xmlns:p14="http://schemas.microsoft.com/office/powerpoint/2010/main" val="4196640344"/>
       </p:ext>
     </p:extLst>
   </p:cSld>
@@ -7765,10 +8000,10 @@
           <a:lstStyle/>
           <a:p>
             <a:r>
-              <a:rPr lang="en-US" sz="4000" dirty="0" smtClean="0"/>
-              <a:t>Functional Languages on the JVM</a:t>
-            </a:r>
-            <a:endParaRPr lang="en-US" sz="4000" dirty="0"/>
+              <a:rPr lang="en-US" dirty="0" smtClean="0"/>
+              <a:t>List Comprehensions</a:t>
+            </a:r>
+            <a:endParaRPr lang="en-US" dirty="0"/>
           </a:p>
         </p:txBody>
       </p:sp>
@@ -7794,7 +8029,7 @@
     </p:spTree>
     <p:extLst>
       <p:ext uri="{BB962C8B-B14F-4D97-AF65-F5344CB8AC3E}">
-        <p14:creationId xmlns:p14="http://schemas.microsoft.com/office/powerpoint/2010/main" val="1949244033"/>
+        <p14:creationId xmlns:p14="http://schemas.microsoft.com/office/powerpoint/2010/main" val="292100415"/>
       </p:ext>
     </p:extLst>
   </p:cSld>
@@ -7838,7 +8073,7 @@
           <a:p>
             <a:r>
               <a:rPr lang="en-US" dirty="0" smtClean="0"/>
-              <a:t>Related, Interesting Topics</a:t>
+              <a:t>Pattern Matching</a:t>
             </a:r>
             <a:endParaRPr lang="en-US" dirty="0"/>
           </a:p>
@@ -7859,50 +8094,37 @@
           <a:bodyPr/>
           <a:lstStyle/>
           <a:p>
-            <a:endParaRPr lang="en-US" dirty="0" smtClean="0"/>
+            <a:r>
+              <a:rPr lang="en-US" dirty="0" smtClean="0"/>
+              <a:t>Examples</a:t>
+            </a:r>
+          </a:p>
+          <a:p>
+            <a:r>
+              <a:rPr lang="en-US" dirty="0" smtClean="0"/>
+              <a:t>Algebraic Data Types</a:t>
+            </a:r>
+          </a:p>
+          <a:p>
+            <a:r>
+              <a:rPr lang="en-US" dirty="0" smtClean="0"/>
+              <a:t>Examples of using types as ‘cases’ / polymorphism on values</a:t>
+            </a:r>
           </a:p>
           <a:p>
             <a:pPr lvl="1"/>
             <a:r>
               <a:rPr lang="en-US" dirty="0" smtClean="0"/>
-              <a:t>Non-Von Neumann computer architectures</a:t>
-            </a:r>
-          </a:p>
-          <a:p>
-            <a:pPr lvl="1"/>
-            <a:r>
-              <a:rPr lang="en-US" dirty="0" smtClean="0"/>
-              <a:t>Lambda calculus</a:t>
-            </a:r>
-          </a:p>
-          <a:p>
-            <a:pPr lvl="1"/>
-            <a:r>
-              <a:rPr lang="en-US" dirty="0" smtClean="0"/>
-              <a:t>Applying functional thinking outside your program</a:t>
-            </a:r>
-          </a:p>
-          <a:p>
-            <a:pPr lvl="1"/>
-            <a:r>
-              <a:rPr lang="en-US" dirty="0" smtClean="0"/>
-              <a:t>Logic programming</a:t>
-            </a:r>
-            <a:endParaRPr lang="en-US" dirty="0" smtClean="0"/>
-          </a:p>
-          <a:p>
-            <a:pPr lvl="1"/>
-            <a:endParaRPr lang="en-US" dirty="0" smtClean="0"/>
-          </a:p>
-          <a:p>
-            <a:endParaRPr lang="en-US" dirty="0" smtClean="0"/>
+              <a:t>Example of line processing with valid/invalid types, either[] and list comprehension</a:t>
+            </a:r>
+            <a:endParaRPr lang="en-US" dirty="0"/>
           </a:p>
         </p:txBody>
       </p:sp>
     </p:spTree>
     <p:extLst>
       <p:ext uri="{BB962C8B-B14F-4D97-AF65-F5344CB8AC3E}">
-        <p14:creationId xmlns:p14="http://schemas.microsoft.com/office/powerpoint/2010/main" val="4057990024"/>
+        <p14:creationId xmlns:p14="http://schemas.microsoft.com/office/powerpoint/2010/main" val="2184790991"/>
       </p:ext>
     </p:extLst>
   </p:cSld>
@@ -7945,8 +8167,8 @@
           <a:lstStyle/>
           <a:p>
             <a:r>
-              <a:rPr lang="en-US" dirty="0" err="1" smtClean="0"/>
-              <a:t>Scratchpage</a:t>
+              <a:rPr lang="en-US" dirty="0" smtClean="0"/>
+              <a:t>Declarative Programming</a:t>
             </a:r>
             <a:endParaRPr lang="en-US" dirty="0"/>
           </a:p>
@@ -7967,84 +8189,14 @@
           <a:bodyPr/>
           <a:lstStyle/>
           <a:p>
-            <a:r>
-              <a:rPr lang="en-US" dirty="0" smtClean="0"/>
-              <a:t>Referential Transparency</a:t>
-            </a:r>
-          </a:p>
-          <a:p>
-            <a:r>
-              <a:rPr lang="en-US" dirty="0" smtClean="0"/>
-              <a:t>Side-effect free</a:t>
-            </a:r>
-          </a:p>
-          <a:p>
-            <a:r>
-              <a:rPr lang="en-US" dirty="0" smtClean="0"/>
-              <a:t>Purity</a:t>
-            </a:r>
-          </a:p>
-          <a:p>
-            <a:r>
-              <a:rPr lang="en-US" dirty="0" smtClean="0"/>
-              <a:t>“</a:t>
-            </a:r>
-            <a:r>
-              <a:rPr lang="en-US" dirty="0"/>
-              <a:t>In functional programming, programs are executed by evaluating </a:t>
-            </a:r>
-            <a:r>
-              <a:rPr lang="en-US" i="1" dirty="0"/>
-              <a:t>expressions</a:t>
-            </a:r>
-            <a:r>
-              <a:rPr lang="en-US" dirty="0"/>
-              <a:t>, in contrast with imperative programming where programs are composed of </a:t>
-            </a:r>
-            <a:r>
-              <a:rPr lang="en-US" i="1" dirty="0"/>
-              <a:t>statements</a:t>
-            </a:r>
-            <a:r>
-              <a:rPr lang="en-US" dirty="0"/>
-              <a:t> which change global </a:t>
-            </a:r>
-            <a:r>
-              <a:rPr lang="en-US" i="1" dirty="0"/>
-              <a:t>state</a:t>
-            </a:r>
-            <a:r>
-              <a:rPr lang="en-US" dirty="0"/>
-              <a:t> when executed. ” [http://</a:t>
-            </a:r>
-            <a:r>
-              <a:rPr lang="en-US" dirty="0" smtClean="0"/>
-              <a:t>www.haskell.org/haskellwiki/Functional_programming]</a:t>
-            </a:r>
-          </a:p>
-          <a:p>
-            <a:r>
-              <a:rPr lang="en-US" dirty="0" smtClean="0"/>
-              <a:t>FP Big ideas: reasoning axiomatically, taking problems off the </a:t>
-            </a:r>
-            <a:r>
-              <a:rPr lang="en-US" dirty="0" smtClean="0"/>
-              <a:t>table</a:t>
-            </a:r>
-          </a:p>
-          <a:p>
-            <a:r>
-              <a:rPr lang="en-US" dirty="0" smtClean="0"/>
-              <a:t>Show some non-functional code and examine the problems reasoning about part of it in isolation</a:t>
-            </a:r>
-            <a:endParaRPr lang="en-US" dirty="0"/>
+            <a:endParaRPr lang="en-US"/>
           </a:p>
         </p:txBody>
       </p:sp>
     </p:spTree>
     <p:extLst>
       <p:ext uri="{BB962C8B-B14F-4D97-AF65-F5344CB8AC3E}">
-        <p14:creationId xmlns:p14="http://schemas.microsoft.com/office/powerpoint/2010/main" val="19788565"/>
+        <p14:creationId xmlns:p14="http://schemas.microsoft.com/office/powerpoint/2010/main" val="3220380213"/>
       </p:ext>
     </p:extLst>
   </p:cSld>
@@ -8088,7 +8240,7 @@
           <a:p>
             <a:r>
               <a:rPr lang="en-US" dirty="0" smtClean="0"/>
-              <a:t>References</a:t>
+              <a:t>Lazy Evaluation</a:t>
             </a:r>
             <a:endParaRPr lang="en-US" dirty="0"/>
           </a:p>
@@ -8109,94 +8261,340 @@
           <a:bodyPr/>
           <a:lstStyle/>
           <a:p>
-            <a:pPr marL="571500" indent="-457200">
-              <a:buFont typeface="+mj-lt"/>
-              <a:buAutoNum type="arabicPeriod"/>
-            </a:pPr>
-            <a:r>
-              <a:rPr lang="en-US" dirty="0" smtClean="0"/>
-              <a:t>“Can Programming be Liberated from its Von Neumann Style?” (1977 Turing award lecture by John Backus)</a:t>
-            </a:r>
-          </a:p>
-          <a:p>
-            <a:pPr lvl="1"/>
-            <a:r>
-              <a:rPr lang="en-US" dirty="0">
-                <a:hlinkClick r:id="rId2"/>
-              </a:rPr>
-              <a:t>http://</a:t>
-            </a:r>
-            <a:r>
-              <a:rPr lang="en-US" dirty="0" smtClean="0">
-                <a:hlinkClick r:id="rId2"/>
-              </a:rPr>
-              <a:t>www.thocp.net/biographies/papers/backus_turingaward_lecture.pdf</a:t>
-            </a:r>
-            <a:endParaRPr lang="en-US" dirty="0" smtClean="0"/>
-          </a:p>
-          <a:p>
-            <a:pPr marL="571500" indent="-457200">
-              <a:buFont typeface="+mj-lt"/>
-              <a:buAutoNum type="arabicPeriod"/>
-            </a:pPr>
-            <a:r>
-              <a:rPr lang="en-US" dirty="0" smtClean="0"/>
-              <a:t>“Functional Thinking” series by Neal Ford</a:t>
-            </a:r>
-          </a:p>
-          <a:p>
-            <a:pPr marL="571500" indent="-457200">
-              <a:buFont typeface="+mj-lt"/>
-              <a:buAutoNum type="arabicPeriod"/>
-            </a:pPr>
-            <a:r>
-              <a:rPr lang="en-US" dirty="0" smtClean="0"/>
-              <a:t>“Referential Transparency” – Wikipedia</a:t>
-            </a:r>
-          </a:p>
-          <a:p>
-            <a:pPr lvl="1"/>
-            <a:r>
-              <a:rPr lang="en-US" dirty="0" smtClean="0">
-                <a:hlinkClick r:id="rId3"/>
-              </a:rPr>
-              <a:t>http</a:t>
-            </a:r>
-            <a:r>
-              <a:rPr lang="en-US" dirty="0">
-                <a:hlinkClick r:id="rId3"/>
-              </a:rPr>
-              <a:t>://en.wikipedia.org/wiki/Referential_transparency_(computer_science</a:t>
-            </a:r>
-            <a:r>
-              <a:rPr lang="en-US" dirty="0" smtClean="0">
-                <a:hlinkClick r:id="rId3"/>
-              </a:rPr>
-              <a:t>)</a:t>
-            </a:r>
-            <a:endParaRPr lang="en-US" dirty="0" smtClean="0"/>
-          </a:p>
-          <a:p>
-            <a:pPr marL="571500" indent="-457200">
-              <a:buFont typeface="+mj-lt"/>
-              <a:buAutoNum type="arabicPeriod"/>
-            </a:pPr>
-            <a:r>
-              <a:rPr lang="en-US" dirty="0" smtClean="0"/>
-              <a:t>Learn You a Haskell for Great Good!</a:t>
-            </a:r>
-            <a:endParaRPr lang="en-US" dirty="0" smtClean="0"/>
-          </a:p>
-          <a:p>
-            <a:pPr lvl="1"/>
-            <a:endParaRPr lang="en-US" dirty="0"/>
+            <a:endParaRPr lang="en-US"/>
           </a:p>
         </p:txBody>
       </p:sp>
     </p:spTree>
     <p:extLst>
       <p:ext uri="{BB962C8B-B14F-4D97-AF65-F5344CB8AC3E}">
-        <p14:creationId xmlns:p14="http://schemas.microsoft.com/office/powerpoint/2010/main" val="4065328229"/>
+        <p14:creationId xmlns:p14="http://schemas.microsoft.com/office/powerpoint/2010/main" val="1094933596"/>
+      </p:ext>
+    </p:extLst>
+  </p:cSld>
+  <p:clrMapOvr>
+    <a:masterClrMapping/>
+  </p:clrMapOvr>
+</p:sld>
+</file>
+
+<file path=ppt/slides/slide26.xml><?xml version="1.0" encoding="utf-8"?>
+<p:sld xmlns:a="http://schemas.openxmlformats.org/drawingml/2006/main" xmlns:r="http://schemas.openxmlformats.org/officeDocument/2006/relationships" xmlns:p="http://schemas.openxmlformats.org/presentationml/2006/main">
+  <p:cSld>
+    <p:spTree>
+      <p:nvGrpSpPr>
+        <p:cNvPr id="1" name=""/>
+        <p:cNvGrpSpPr/>
+        <p:nvPr/>
+      </p:nvGrpSpPr>
+      <p:grpSpPr>
+        <a:xfrm>
+          <a:off x="0" y="0"/>
+          <a:ext cx="0" cy="0"/>
+          <a:chOff x="0" y="0"/>
+          <a:chExt cx="0" cy="0"/>
+        </a:xfrm>
+      </p:grpSpPr>
+      <p:sp>
+        <p:nvSpPr>
+          <p:cNvPr id="2" name="Title 1"/>
+          <p:cNvSpPr>
+            <a:spLocks noGrp="1"/>
+          </p:cNvSpPr>
+          <p:nvPr>
+            <p:ph type="title"/>
+          </p:nvPr>
+        </p:nvSpPr>
+        <p:spPr/>
+        <p:txBody>
+          <a:bodyPr/>
+          <a:lstStyle/>
+          <a:p>
+            <a:r>
+              <a:rPr lang="en-US" dirty="0" smtClean="0"/>
+              <a:t>Composition</a:t>
+            </a:r>
+            <a:endParaRPr lang="en-US" dirty="0"/>
+          </a:p>
+        </p:txBody>
+      </p:sp>
+      <p:sp>
+        <p:nvSpPr>
+          <p:cNvPr id="3" name="Content Placeholder 2"/>
+          <p:cNvSpPr>
+            <a:spLocks noGrp="1"/>
+          </p:cNvSpPr>
+          <p:nvPr>
+            <p:ph idx="1"/>
+          </p:nvPr>
+        </p:nvSpPr>
+        <p:spPr/>
+        <p:txBody>
+          <a:bodyPr/>
+          <a:lstStyle/>
+          <a:p>
+            <a:endParaRPr lang="en-US"/>
+          </a:p>
+        </p:txBody>
+      </p:sp>
+    </p:spTree>
+    <p:extLst>
+      <p:ext uri="{BB962C8B-B14F-4D97-AF65-F5344CB8AC3E}">
+        <p14:creationId xmlns:p14="http://schemas.microsoft.com/office/powerpoint/2010/main" val="4258554683"/>
+      </p:ext>
+    </p:extLst>
+  </p:cSld>
+  <p:clrMapOvr>
+    <a:masterClrMapping/>
+  </p:clrMapOvr>
+</p:sld>
+</file>
+
+<file path=ppt/slides/slide27.xml><?xml version="1.0" encoding="utf-8"?>
+<p:sld xmlns:a="http://schemas.openxmlformats.org/drawingml/2006/main" xmlns:r="http://schemas.openxmlformats.org/officeDocument/2006/relationships" xmlns:p="http://schemas.openxmlformats.org/presentationml/2006/main">
+  <p:cSld>
+    <p:spTree>
+      <p:nvGrpSpPr>
+        <p:cNvPr id="1" name=""/>
+        <p:cNvGrpSpPr/>
+        <p:nvPr/>
+      </p:nvGrpSpPr>
+      <p:grpSpPr>
+        <a:xfrm>
+          <a:off x="0" y="0"/>
+          <a:ext cx="0" cy="0"/>
+          <a:chOff x="0" y="0"/>
+          <a:chExt cx="0" cy="0"/>
+        </a:xfrm>
+      </p:grpSpPr>
+      <p:sp>
+        <p:nvSpPr>
+          <p:cNvPr id="2" name="Title 1"/>
+          <p:cNvSpPr>
+            <a:spLocks noGrp="1"/>
+          </p:cNvSpPr>
+          <p:nvPr>
+            <p:ph type="title"/>
+          </p:nvPr>
+        </p:nvSpPr>
+        <p:spPr>
+          <a:xfrm>
+            <a:off x="457200" y="274638"/>
+            <a:ext cx="7620000" cy="944562"/>
+          </a:xfrm>
+        </p:spPr>
+        <p:txBody>
+          <a:bodyPr/>
+          <a:lstStyle/>
+          <a:p>
+            <a:r>
+              <a:rPr lang="en-US" sz="4000" dirty="0" smtClean="0"/>
+              <a:t>Partial Application &amp; Currying</a:t>
+            </a:r>
+            <a:endParaRPr lang="en-US" sz="4000" dirty="0"/>
+          </a:p>
+        </p:txBody>
+      </p:sp>
+      <p:sp>
+        <p:nvSpPr>
+          <p:cNvPr id="3" name="Content Placeholder 2"/>
+          <p:cNvSpPr>
+            <a:spLocks noGrp="1"/>
+          </p:cNvSpPr>
+          <p:nvPr>
+            <p:ph idx="1"/>
+          </p:nvPr>
+        </p:nvSpPr>
+        <p:spPr>
+          <a:xfrm>
+            <a:off x="457200" y="1371600"/>
+            <a:ext cx="7620000" cy="5029200"/>
+          </a:xfrm>
+        </p:spPr>
+        <p:txBody>
+          <a:bodyPr/>
+          <a:lstStyle/>
+          <a:p>
+            <a:endParaRPr lang="en-US" dirty="0"/>
+          </a:p>
+        </p:txBody>
+      </p:sp>
+    </p:spTree>
+    <p:extLst>
+      <p:ext uri="{BB962C8B-B14F-4D97-AF65-F5344CB8AC3E}">
+        <p14:creationId xmlns:p14="http://schemas.microsoft.com/office/powerpoint/2010/main" val="559379232"/>
+      </p:ext>
+    </p:extLst>
+  </p:cSld>
+  <p:clrMapOvr>
+    <a:masterClrMapping/>
+  </p:clrMapOvr>
+</p:sld>
+</file>
+
+<file path=ppt/slides/slide28.xml><?xml version="1.0" encoding="utf-8"?>
+<p:sld xmlns:a="http://schemas.openxmlformats.org/drawingml/2006/main" xmlns:r="http://schemas.openxmlformats.org/officeDocument/2006/relationships" xmlns:p="http://schemas.openxmlformats.org/presentationml/2006/main">
+  <p:cSld>
+    <p:spTree>
+      <p:nvGrpSpPr>
+        <p:cNvPr id="1" name=""/>
+        <p:cNvGrpSpPr/>
+        <p:nvPr/>
+      </p:nvGrpSpPr>
+      <p:grpSpPr>
+        <a:xfrm>
+          <a:off x="0" y="0"/>
+          <a:ext cx="0" cy="0"/>
+          <a:chOff x="0" y="0"/>
+          <a:chExt cx="0" cy="0"/>
+        </a:xfrm>
+      </p:grpSpPr>
+      <p:sp>
+        <p:nvSpPr>
+          <p:cNvPr id="2" name="Title 1"/>
+          <p:cNvSpPr>
+            <a:spLocks noGrp="1"/>
+          </p:cNvSpPr>
+          <p:nvPr>
+            <p:ph type="title"/>
+          </p:nvPr>
+        </p:nvSpPr>
+        <p:spPr/>
+        <p:txBody>
+          <a:bodyPr/>
+          <a:lstStyle/>
+          <a:p>
+            <a:r>
+              <a:rPr lang="en-US" dirty="0" smtClean="0"/>
+              <a:t>Complexity</a:t>
+            </a:r>
+            <a:endParaRPr lang="en-US" dirty="0"/>
+          </a:p>
+        </p:txBody>
+      </p:sp>
+      <p:sp>
+        <p:nvSpPr>
+          <p:cNvPr id="3" name="Content Placeholder 2"/>
+          <p:cNvSpPr>
+            <a:spLocks noGrp="1"/>
+          </p:cNvSpPr>
+          <p:nvPr>
+            <p:ph idx="1"/>
+          </p:nvPr>
+        </p:nvSpPr>
+        <p:spPr/>
+        <p:txBody>
+          <a:bodyPr/>
+          <a:lstStyle/>
+          <a:p>
+            <a:r>
+              <a:rPr lang="en-US" dirty="0" smtClean="0"/>
+              <a:t>Example: Shared state as complexity</a:t>
+            </a:r>
+          </a:p>
+          <a:p>
+            <a:r>
+              <a:rPr lang="en-US" dirty="0" smtClean="0"/>
+              <a:t>Example: Mutable state as complexity</a:t>
+            </a:r>
+          </a:p>
+          <a:p>
+            <a:r>
+              <a:rPr lang="en-US" dirty="0" smtClean="0"/>
+              <a:t>Example: Non-determinism as complexity</a:t>
+            </a:r>
+          </a:p>
+          <a:p>
+            <a:r>
+              <a:rPr lang="en-US" dirty="0" smtClean="0"/>
+              <a:t>Example: Side-effects as complexity</a:t>
+            </a:r>
+          </a:p>
+          <a:p>
+            <a:r>
+              <a:rPr lang="en-US" dirty="0" smtClean="0"/>
+              <a:t>Example: Sequencing as complexity</a:t>
+            </a:r>
+            <a:endParaRPr lang="en-US" dirty="0"/>
+          </a:p>
+        </p:txBody>
+      </p:sp>
+    </p:spTree>
+    <p:extLst>
+      <p:ext uri="{BB962C8B-B14F-4D97-AF65-F5344CB8AC3E}">
+        <p14:creationId xmlns:p14="http://schemas.microsoft.com/office/powerpoint/2010/main" val="3233297951"/>
+      </p:ext>
+    </p:extLst>
+  </p:cSld>
+  <p:clrMapOvr>
+    <a:masterClrMapping/>
+  </p:clrMapOvr>
+</p:sld>
+</file>
+
+<file path=ppt/slides/slide29.xml><?xml version="1.0" encoding="utf-8"?>
+<p:sld xmlns:a="http://schemas.openxmlformats.org/drawingml/2006/main" xmlns:r="http://schemas.openxmlformats.org/officeDocument/2006/relationships" xmlns:p="http://schemas.openxmlformats.org/presentationml/2006/main">
+  <p:cSld>
+    <p:spTree>
+      <p:nvGrpSpPr>
+        <p:cNvPr id="1" name=""/>
+        <p:cNvGrpSpPr/>
+        <p:nvPr/>
+      </p:nvGrpSpPr>
+      <p:grpSpPr>
+        <a:xfrm>
+          <a:off x="0" y="0"/>
+          <a:ext cx="0" cy="0"/>
+          <a:chOff x="0" y="0"/>
+          <a:chExt cx="0" cy="0"/>
+        </a:xfrm>
+      </p:grpSpPr>
+      <p:sp>
+        <p:nvSpPr>
+          <p:cNvPr id="2" name="Title 1"/>
+          <p:cNvSpPr>
+            <a:spLocks noGrp="1"/>
+          </p:cNvSpPr>
+          <p:nvPr>
+            <p:ph type="title"/>
+          </p:nvPr>
+        </p:nvSpPr>
+        <p:spPr/>
+        <p:txBody>
+          <a:bodyPr/>
+          <a:lstStyle/>
+          <a:p>
+            <a:r>
+              <a:rPr lang="en-US" dirty="0" smtClean="0"/>
+              <a:t>What’s in Java 8</a:t>
+            </a:r>
+            <a:endParaRPr lang="en-US" dirty="0"/>
+          </a:p>
+        </p:txBody>
+      </p:sp>
+      <p:sp>
+        <p:nvSpPr>
+          <p:cNvPr id="3" name="Content Placeholder 2"/>
+          <p:cNvSpPr>
+            <a:spLocks noGrp="1"/>
+          </p:cNvSpPr>
+          <p:nvPr>
+            <p:ph idx="1"/>
+          </p:nvPr>
+        </p:nvSpPr>
+        <p:spPr/>
+        <p:txBody>
+          <a:bodyPr/>
+          <a:lstStyle/>
+          <a:p>
+            <a:endParaRPr lang="en-US"/>
+          </a:p>
+        </p:txBody>
+      </p:sp>
+    </p:spTree>
+    <p:extLst>
+      <p:ext uri="{BB962C8B-B14F-4D97-AF65-F5344CB8AC3E}">
+        <p14:creationId xmlns:p14="http://schemas.microsoft.com/office/powerpoint/2010/main" val="3713724773"/>
       </p:ext>
     </p:extLst>
   </p:cSld>
@@ -8270,11 +8668,7 @@
           <a:p>
             <a:r>
               <a:rPr lang="en-US" dirty="0" smtClean="0"/>
-              <a:t>Most </a:t>
-            </a:r>
-            <a:r>
-              <a:rPr lang="en-US" dirty="0" smtClean="0"/>
-              <a:t>popular programming languages of the last fifty years are loose representations of the computer architecture</a:t>
+              <a:t>Most popular programming languages of the last fifty years are loose representations of the computer architecture</a:t>
             </a:r>
           </a:p>
           <a:p>
@@ -8288,11 +8682,7 @@
             <a:pPr lvl="1"/>
             <a:r>
               <a:rPr lang="en-US" dirty="0" smtClean="0"/>
-              <a:t>Their </a:t>
-            </a:r>
-            <a:r>
-              <a:rPr lang="en-US" dirty="0" smtClean="0"/>
-              <a:t>building blocks represent activities of the CPU and memory</a:t>
+              <a:t>Their building blocks represent activities of the CPU and memory</a:t>
             </a:r>
           </a:p>
           <a:p>
@@ -8545,6 +8935,474 @@
 </p:sld>
 </file>
 
+<file path=ppt/slides/slide30.xml><?xml version="1.0" encoding="utf-8"?>
+<p:sld xmlns:a="http://schemas.openxmlformats.org/drawingml/2006/main" xmlns:r="http://schemas.openxmlformats.org/officeDocument/2006/relationships" xmlns:p="http://schemas.openxmlformats.org/presentationml/2006/main">
+  <p:cSld>
+    <p:spTree>
+      <p:nvGrpSpPr>
+        <p:cNvPr id="1" name=""/>
+        <p:cNvGrpSpPr/>
+        <p:nvPr/>
+      </p:nvGrpSpPr>
+      <p:grpSpPr>
+        <a:xfrm>
+          <a:off x="0" y="0"/>
+          <a:ext cx="0" cy="0"/>
+          <a:chOff x="0" y="0"/>
+          <a:chExt cx="0" cy="0"/>
+        </a:xfrm>
+      </p:grpSpPr>
+      <p:sp>
+        <p:nvSpPr>
+          <p:cNvPr id="2" name="Title 1"/>
+          <p:cNvSpPr>
+            <a:spLocks noGrp="1"/>
+          </p:cNvSpPr>
+          <p:nvPr>
+            <p:ph type="title"/>
+          </p:nvPr>
+        </p:nvSpPr>
+        <p:spPr/>
+        <p:txBody>
+          <a:bodyPr/>
+          <a:lstStyle/>
+          <a:p>
+            <a:r>
+              <a:rPr lang="en-US" sz="4000" dirty="0" smtClean="0"/>
+              <a:t>Functional Languages on the JVM</a:t>
+            </a:r>
+            <a:endParaRPr lang="en-US" sz="4000" dirty="0"/>
+          </a:p>
+        </p:txBody>
+      </p:sp>
+      <p:sp>
+        <p:nvSpPr>
+          <p:cNvPr id="3" name="Content Placeholder 2"/>
+          <p:cNvSpPr>
+            <a:spLocks noGrp="1"/>
+          </p:cNvSpPr>
+          <p:nvPr>
+            <p:ph idx="1"/>
+          </p:nvPr>
+        </p:nvSpPr>
+        <p:spPr/>
+        <p:txBody>
+          <a:bodyPr/>
+          <a:lstStyle/>
+          <a:p>
+            <a:endParaRPr lang="en-US" dirty="0"/>
+          </a:p>
+        </p:txBody>
+      </p:sp>
+    </p:spTree>
+    <p:extLst>
+      <p:ext uri="{BB962C8B-B14F-4D97-AF65-F5344CB8AC3E}">
+        <p14:creationId xmlns:p14="http://schemas.microsoft.com/office/powerpoint/2010/main" val="1949244033"/>
+      </p:ext>
+    </p:extLst>
+  </p:cSld>
+  <p:clrMapOvr>
+    <a:masterClrMapping/>
+  </p:clrMapOvr>
+</p:sld>
+</file>
+
+<file path=ppt/slides/slide31.xml><?xml version="1.0" encoding="utf-8"?>
+<p:sld xmlns:a="http://schemas.openxmlformats.org/drawingml/2006/main" xmlns:r="http://schemas.openxmlformats.org/officeDocument/2006/relationships" xmlns:p="http://schemas.openxmlformats.org/presentationml/2006/main">
+  <p:cSld>
+    <p:spTree>
+      <p:nvGrpSpPr>
+        <p:cNvPr id="1" name=""/>
+        <p:cNvGrpSpPr/>
+        <p:nvPr/>
+      </p:nvGrpSpPr>
+      <p:grpSpPr>
+        <a:xfrm>
+          <a:off x="0" y="0"/>
+          <a:ext cx="0" cy="0"/>
+          <a:chOff x="0" y="0"/>
+          <a:chExt cx="0" cy="0"/>
+        </a:xfrm>
+      </p:grpSpPr>
+      <p:sp>
+        <p:nvSpPr>
+          <p:cNvPr id="2" name="Title 1"/>
+          <p:cNvSpPr>
+            <a:spLocks noGrp="1"/>
+          </p:cNvSpPr>
+          <p:nvPr>
+            <p:ph type="title"/>
+          </p:nvPr>
+        </p:nvSpPr>
+        <p:spPr/>
+        <p:txBody>
+          <a:bodyPr/>
+          <a:lstStyle/>
+          <a:p>
+            <a:r>
+              <a:rPr lang="en-US" dirty="0" smtClean="0"/>
+              <a:t>Related, Interesting Topics</a:t>
+            </a:r>
+            <a:endParaRPr lang="en-US" dirty="0"/>
+          </a:p>
+        </p:txBody>
+      </p:sp>
+      <p:sp>
+        <p:nvSpPr>
+          <p:cNvPr id="3" name="Content Placeholder 2"/>
+          <p:cNvSpPr>
+            <a:spLocks noGrp="1"/>
+          </p:cNvSpPr>
+          <p:nvPr>
+            <p:ph idx="1"/>
+          </p:nvPr>
+        </p:nvSpPr>
+        <p:spPr/>
+        <p:txBody>
+          <a:bodyPr/>
+          <a:lstStyle/>
+          <a:p>
+            <a:endParaRPr lang="en-US" dirty="0" smtClean="0"/>
+          </a:p>
+          <a:p>
+            <a:pPr lvl="1"/>
+            <a:r>
+              <a:rPr lang="en-US" dirty="0" smtClean="0"/>
+              <a:t>Non-Von Neumann computer architectures</a:t>
+            </a:r>
+          </a:p>
+          <a:p>
+            <a:pPr lvl="1"/>
+            <a:r>
+              <a:rPr lang="en-US" dirty="0" smtClean="0"/>
+              <a:t>Lambda calculus</a:t>
+            </a:r>
+          </a:p>
+          <a:p>
+            <a:pPr lvl="1"/>
+            <a:r>
+              <a:rPr lang="en-US" dirty="0" smtClean="0"/>
+              <a:t>Applying functional thinking outside your program</a:t>
+            </a:r>
+          </a:p>
+          <a:p>
+            <a:pPr lvl="1"/>
+            <a:r>
+              <a:rPr lang="en-US" dirty="0" smtClean="0"/>
+              <a:t>Logic programming</a:t>
+            </a:r>
+          </a:p>
+          <a:p>
+            <a:pPr lvl="1"/>
+            <a:endParaRPr lang="en-US" dirty="0" smtClean="0"/>
+          </a:p>
+          <a:p>
+            <a:endParaRPr lang="en-US" dirty="0" smtClean="0"/>
+          </a:p>
+        </p:txBody>
+      </p:sp>
+    </p:spTree>
+    <p:extLst>
+      <p:ext uri="{BB962C8B-B14F-4D97-AF65-F5344CB8AC3E}">
+        <p14:creationId xmlns:p14="http://schemas.microsoft.com/office/powerpoint/2010/main" val="4057990024"/>
+      </p:ext>
+    </p:extLst>
+  </p:cSld>
+  <p:clrMapOvr>
+    <a:masterClrMapping/>
+  </p:clrMapOvr>
+</p:sld>
+</file>
+
+<file path=ppt/slides/slide32.xml><?xml version="1.0" encoding="utf-8"?>
+<p:sld xmlns:a="http://schemas.openxmlformats.org/drawingml/2006/main" xmlns:r="http://schemas.openxmlformats.org/officeDocument/2006/relationships" xmlns:p="http://schemas.openxmlformats.org/presentationml/2006/main">
+  <p:cSld>
+    <p:spTree>
+      <p:nvGrpSpPr>
+        <p:cNvPr id="1" name=""/>
+        <p:cNvGrpSpPr/>
+        <p:nvPr/>
+      </p:nvGrpSpPr>
+      <p:grpSpPr>
+        <a:xfrm>
+          <a:off x="0" y="0"/>
+          <a:ext cx="0" cy="0"/>
+          <a:chOff x="0" y="0"/>
+          <a:chExt cx="0" cy="0"/>
+        </a:xfrm>
+      </p:grpSpPr>
+      <p:sp>
+        <p:nvSpPr>
+          <p:cNvPr id="2" name="Title 1"/>
+          <p:cNvSpPr>
+            <a:spLocks noGrp="1"/>
+          </p:cNvSpPr>
+          <p:nvPr>
+            <p:ph type="title"/>
+          </p:nvPr>
+        </p:nvSpPr>
+        <p:spPr/>
+        <p:txBody>
+          <a:bodyPr/>
+          <a:lstStyle/>
+          <a:p>
+            <a:r>
+              <a:rPr lang="en-US" dirty="0" err="1" smtClean="0"/>
+              <a:t>Scratchpage</a:t>
+            </a:r>
+            <a:endParaRPr lang="en-US" dirty="0"/>
+          </a:p>
+        </p:txBody>
+      </p:sp>
+      <p:sp>
+        <p:nvSpPr>
+          <p:cNvPr id="3" name="Content Placeholder 2"/>
+          <p:cNvSpPr>
+            <a:spLocks noGrp="1"/>
+          </p:cNvSpPr>
+          <p:nvPr>
+            <p:ph idx="1"/>
+          </p:nvPr>
+        </p:nvSpPr>
+        <p:spPr/>
+        <p:txBody>
+          <a:bodyPr/>
+          <a:lstStyle/>
+          <a:p>
+            <a:r>
+              <a:rPr lang="en-US" dirty="0" smtClean="0"/>
+              <a:t>Referential Transparency</a:t>
+            </a:r>
+          </a:p>
+          <a:p>
+            <a:r>
+              <a:rPr lang="en-US" dirty="0" smtClean="0"/>
+              <a:t>Side-effect free</a:t>
+            </a:r>
+          </a:p>
+          <a:p>
+            <a:r>
+              <a:rPr lang="en-US" dirty="0" smtClean="0"/>
+              <a:t>Purity</a:t>
+            </a:r>
+          </a:p>
+          <a:p>
+            <a:r>
+              <a:rPr lang="en-US" dirty="0" smtClean="0"/>
+              <a:t>“</a:t>
+            </a:r>
+            <a:r>
+              <a:rPr lang="en-US" dirty="0"/>
+              <a:t>In functional programming, programs are executed by evaluating </a:t>
+            </a:r>
+            <a:r>
+              <a:rPr lang="en-US" i="1" dirty="0"/>
+              <a:t>expressions</a:t>
+            </a:r>
+            <a:r>
+              <a:rPr lang="en-US" dirty="0"/>
+              <a:t>, in contrast with imperative programming where programs are composed of </a:t>
+            </a:r>
+            <a:r>
+              <a:rPr lang="en-US" i="1" dirty="0"/>
+              <a:t>statements</a:t>
+            </a:r>
+            <a:r>
+              <a:rPr lang="en-US" dirty="0"/>
+              <a:t> which change global </a:t>
+            </a:r>
+            <a:r>
+              <a:rPr lang="en-US" i="1" dirty="0"/>
+              <a:t>state</a:t>
+            </a:r>
+            <a:r>
+              <a:rPr lang="en-US" dirty="0"/>
+              <a:t> when executed. ” [http://</a:t>
+            </a:r>
+            <a:r>
+              <a:rPr lang="en-US" dirty="0" smtClean="0"/>
+              <a:t>www.haskell.org/haskellwiki/Functional_programming]</a:t>
+            </a:r>
+          </a:p>
+          <a:p>
+            <a:r>
+              <a:rPr lang="en-US" dirty="0" smtClean="0"/>
+              <a:t>FP Big ideas: reasoning axiomatically, taking problems off the table</a:t>
+            </a:r>
+          </a:p>
+          <a:p>
+            <a:r>
+              <a:rPr lang="en-US" dirty="0" smtClean="0"/>
+              <a:t>Show some non-functional code and examine the problems reasoning about part of it in isolation</a:t>
+            </a:r>
+            <a:endParaRPr lang="en-US" dirty="0"/>
+          </a:p>
+        </p:txBody>
+      </p:sp>
+    </p:spTree>
+    <p:extLst>
+      <p:ext uri="{BB962C8B-B14F-4D97-AF65-F5344CB8AC3E}">
+        <p14:creationId xmlns:p14="http://schemas.microsoft.com/office/powerpoint/2010/main" val="19788565"/>
+      </p:ext>
+    </p:extLst>
+  </p:cSld>
+  <p:clrMapOvr>
+    <a:masterClrMapping/>
+  </p:clrMapOvr>
+</p:sld>
+</file>
+
+<file path=ppt/slides/slide33.xml><?xml version="1.0" encoding="utf-8"?>
+<p:sld xmlns:a="http://schemas.openxmlformats.org/drawingml/2006/main" xmlns:r="http://schemas.openxmlformats.org/officeDocument/2006/relationships" xmlns:p="http://schemas.openxmlformats.org/presentationml/2006/main">
+  <p:cSld>
+    <p:spTree>
+      <p:nvGrpSpPr>
+        <p:cNvPr id="1" name=""/>
+        <p:cNvGrpSpPr/>
+        <p:nvPr/>
+      </p:nvGrpSpPr>
+      <p:grpSpPr>
+        <a:xfrm>
+          <a:off x="0" y="0"/>
+          <a:ext cx="0" cy="0"/>
+          <a:chOff x="0" y="0"/>
+          <a:chExt cx="0" cy="0"/>
+        </a:xfrm>
+      </p:grpSpPr>
+      <p:sp>
+        <p:nvSpPr>
+          <p:cNvPr id="2" name="Title 1"/>
+          <p:cNvSpPr>
+            <a:spLocks noGrp="1"/>
+          </p:cNvSpPr>
+          <p:nvPr>
+            <p:ph type="title"/>
+          </p:nvPr>
+        </p:nvSpPr>
+        <p:spPr/>
+        <p:txBody>
+          <a:bodyPr/>
+          <a:lstStyle/>
+          <a:p>
+            <a:r>
+              <a:rPr lang="en-US" dirty="0" smtClean="0"/>
+              <a:t>References</a:t>
+            </a:r>
+            <a:endParaRPr lang="en-US" dirty="0"/>
+          </a:p>
+        </p:txBody>
+      </p:sp>
+      <p:sp>
+        <p:nvSpPr>
+          <p:cNvPr id="3" name="Content Placeholder 2"/>
+          <p:cNvSpPr>
+            <a:spLocks noGrp="1"/>
+          </p:cNvSpPr>
+          <p:nvPr>
+            <p:ph idx="1"/>
+          </p:nvPr>
+        </p:nvSpPr>
+        <p:spPr/>
+        <p:txBody>
+          <a:bodyPr/>
+          <a:lstStyle/>
+          <a:p>
+            <a:pPr marL="571500" indent="-457200">
+              <a:buFont typeface="+mj-lt"/>
+              <a:buAutoNum type="arabicPeriod"/>
+            </a:pPr>
+            <a:r>
+              <a:rPr lang="en-US" dirty="0" smtClean="0"/>
+              <a:t>“Can Programming be Liberated from its Von Neumann Style?” (1977 Turing award lecture by John Backus)</a:t>
+            </a:r>
+          </a:p>
+          <a:p>
+            <a:pPr lvl="1"/>
+            <a:r>
+              <a:rPr lang="en-US" dirty="0">
+                <a:hlinkClick r:id="rId2"/>
+              </a:rPr>
+              <a:t>http://</a:t>
+            </a:r>
+            <a:r>
+              <a:rPr lang="en-US" dirty="0" smtClean="0">
+                <a:hlinkClick r:id="rId2"/>
+              </a:rPr>
+              <a:t>www.thocp.net/biographies/papers/backus_turingaward_lecture.pdf</a:t>
+            </a:r>
+            <a:endParaRPr lang="en-US" dirty="0" smtClean="0"/>
+          </a:p>
+          <a:p>
+            <a:pPr marL="571500" indent="-457200">
+              <a:buFont typeface="+mj-lt"/>
+              <a:buAutoNum type="arabicPeriod"/>
+            </a:pPr>
+            <a:r>
+              <a:rPr lang="en-US" dirty="0" smtClean="0"/>
+              <a:t>“Functional Thinking” series by Neal Ford</a:t>
+            </a:r>
+          </a:p>
+          <a:p>
+            <a:pPr marL="571500" indent="-457200">
+              <a:buFont typeface="+mj-lt"/>
+              <a:buAutoNum type="arabicPeriod"/>
+            </a:pPr>
+            <a:r>
+              <a:rPr lang="en-US" dirty="0" smtClean="0"/>
+              <a:t>“Referential Transparency” – Wikipedia</a:t>
+            </a:r>
+          </a:p>
+          <a:p>
+            <a:pPr lvl="1"/>
+            <a:r>
+              <a:rPr lang="en-US" dirty="0" smtClean="0">
+                <a:hlinkClick r:id="rId3"/>
+              </a:rPr>
+              <a:t>http</a:t>
+            </a:r>
+            <a:r>
+              <a:rPr lang="en-US" dirty="0">
+                <a:hlinkClick r:id="rId3"/>
+              </a:rPr>
+              <a:t>://en.wikipedia.org/wiki/Referential_transparency_(computer_science</a:t>
+            </a:r>
+            <a:r>
+              <a:rPr lang="en-US" dirty="0" smtClean="0">
+                <a:hlinkClick r:id="rId3"/>
+              </a:rPr>
+              <a:t>)</a:t>
+            </a:r>
+            <a:endParaRPr lang="en-US" dirty="0" smtClean="0"/>
+          </a:p>
+          <a:p>
+            <a:pPr marL="571500" indent="-457200">
+              <a:buFont typeface="+mj-lt"/>
+              <a:buAutoNum type="arabicPeriod"/>
+            </a:pPr>
+            <a:r>
+              <a:rPr lang="en-US" dirty="0" smtClean="0"/>
+              <a:t>Learn You a Haskell for Great Good!</a:t>
+            </a:r>
+          </a:p>
+          <a:p>
+            <a:pPr lvl="1"/>
+            <a:endParaRPr lang="en-US" dirty="0"/>
+          </a:p>
+        </p:txBody>
+      </p:sp>
+    </p:spTree>
+    <p:extLst>
+      <p:ext uri="{BB962C8B-B14F-4D97-AF65-F5344CB8AC3E}">
+        <p14:creationId xmlns:p14="http://schemas.microsoft.com/office/powerpoint/2010/main" val="4065328229"/>
+      </p:ext>
+    </p:extLst>
+  </p:cSld>
+  <p:clrMapOvr>
+    <a:masterClrMapping/>
+  </p:clrMapOvr>
+</p:sld>
+</file>
+
 <file path=ppt/slides/slide4.xml><?xml version="1.0" encoding="utf-8"?>
 <p:sld xmlns:a="http://schemas.openxmlformats.org/drawingml/2006/main" xmlns:r="http://schemas.openxmlformats.org/officeDocument/2006/relationships" xmlns:p="http://schemas.openxmlformats.org/presentationml/2006/main">
   <p:cSld>
@@ -8598,12 +9456,12 @@
         <p:spPr>
           <a:xfrm>
             <a:off x="457200" y="1600200"/>
-            <a:ext cx="5562600" cy="4800600"/>
+            <a:ext cx="5334000" cy="4800600"/>
           </a:xfrm>
         </p:spPr>
         <p:txBody>
           <a:bodyPr>
-            <a:normAutofit lnSpcReduction="10000"/>
+            <a:normAutofit fontScale="92500" lnSpcReduction="10000"/>
           </a:bodyPr>
           <a:lstStyle/>
           <a:p>
@@ -8652,8 +9510,24 @@
             <a:pPr lvl="1"/>
             <a:r>
               <a:rPr lang="en-US" dirty="0" smtClean="0"/>
-              <a:t>Mutable state is prohibited</a:t>
-            </a:r>
+              <a:t>Mutable state is </a:t>
+            </a:r>
+            <a:r>
+              <a:rPr lang="en-US" dirty="0" smtClean="0"/>
+              <a:t>prohibited</a:t>
+            </a:r>
+          </a:p>
+          <a:p>
+            <a:pPr lvl="1"/>
+            <a:r>
+              <a:rPr lang="en-US" dirty="0" smtClean="0"/>
+              <a:t>The primary operation is function </a:t>
+            </a:r>
+            <a:r>
+              <a:rPr lang="en-US" i="1" dirty="0" smtClean="0"/>
+              <a:t>application</a:t>
+            </a:r>
+            <a:endParaRPr lang="en-US" i="1" dirty="0" smtClean="0"/>
           </a:p>
           <a:p>
             <a:pPr lvl="1"/>
@@ -8904,8 +9778,25 @@
             <a:pPr lvl="1"/>
             <a:r>
               <a:rPr lang="en-US" dirty="0" smtClean="0"/>
-              <a:t>This leads to complexities which are not necessarily inherent to the computations themselves</a:t>
-            </a:r>
+              <a:t>This leads to complexities which are not necessarily inherent to the computations </a:t>
+            </a:r>
+            <a:r>
+              <a:rPr lang="en-US" dirty="0" smtClean="0"/>
+              <a:t>themselves </a:t>
+            </a:r>
+            <a:r>
+              <a:rPr lang="en-US" b="1" dirty="0" smtClean="0">
+                <a:solidFill>
+                  <a:srgbClr val="FF0000"/>
+                </a:solidFill>
+              </a:rPr>
+              <a:t>(example?)</a:t>
+            </a:r>
+            <a:endParaRPr lang="en-US" b="1" dirty="0" smtClean="0">
+              <a:solidFill>
+                <a:srgbClr val="FF0000"/>
+              </a:solidFill>
+            </a:endParaRPr>
           </a:p>
           <a:p>
             <a:r>
@@ -8931,13 +9822,8 @@
             <a:pPr lvl="1"/>
             <a:r>
               <a:rPr lang="en-US" dirty="0" smtClean="0"/>
-              <a:t>It is difficult to formally reason about them, or write proofs</a:t>
-            </a:r>
-            <a:r>
-              <a:rPr lang="en-US" dirty="0" smtClean="0"/>
-              <a:t>.</a:t>
-            </a:r>
-            <a:endParaRPr lang="en-US" dirty="0" smtClean="0"/>
+              <a:t>It is difficult to formally reason about them, or write proofs.</a:t>
+            </a:r>
           </a:p>
         </p:txBody>
       </p:sp>
@@ -9042,7 +9928,6 @@
               <a:rPr lang="en-US" dirty="0" smtClean="0"/>
               <a:t>instead of computers</a:t>
             </a:r>
-            <a:endParaRPr lang="en-US" dirty="0" smtClean="0"/>
           </a:p>
           <a:p>
             <a:pPr lvl="1"/>
@@ -9051,7 +9936,11 @@
               <a:t>Breaking things into pure functions, composed of expressions (</a:t>
             </a:r>
             <a:r>
-              <a:rPr lang="en-US" b="1" dirty="0" smtClean="0"/>
+              <a:rPr lang="en-US" b="1" dirty="0" smtClean="0">
+                <a:solidFill>
+                  <a:srgbClr val="FF0000"/>
+                </a:solidFill>
+              </a:rPr>
               <a:t>example</a:t>
             </a:r>
             <a:r>
@@ -9090,7 +9979,11 @@
               <a:t>(</a:t>
             </a:r>
             <a:r>
-              <a:rPr lang="en-US" b="1" dirty="0" smtClean="0"/>
+              <a:rPr lang="en-US" b="1" dirty="0" smtClean="0">
+                <a:solidFill>
+                  <a:srgbClr val="FF0000"/>
+                </a:solidFill>
+              </a:rPr>
               <a:t>example</a:t>
             </a:r>
             <a:r>
@@ -9105,7 +9998,11 @@
               <a:t>Can use types in a much stronger way (</a:t>
             </a:r>
             <a:r>
-              <a:rPr lang="en-US" b="1" dirty="0" smtClean="0"/>
+              <a:rPr lang="en-US" b="1" dirty="0" smtClean="0">
+                <a:solidFill>
+                  <a:srgbClr val="FF0000"/>
+                </a:solidFill>
+              </a:rPr>
               <a:t>example</a:t>
             </a:r>
             <a:r>
@@ -9125,7 +10022,11 @@
               <a:t>We can more easily understand a part of a program without understanding the whole (</a:t>
             </a:r>
             <a:r>
-              <a:rPr lang="en-US" b="1" dirty="0" smtClean="0"/>
+              <a:rPr lang="en-US" b="1" dirty="0" smtClean="0">
+                <a:solidFill>
+                  <a:srgbClr val="FF0000"/>
+                </a:solidFill>
+              </a:rPr>
               <a:t>example</a:t>
             </a:r>
             <a:r>
@@ -9145,7 +10046,11 @@
               <a:t>Can leverage some of these ideas in non-functional languages (</a:t>
             </a:r>
             <a:r>
-              <a:rPr lang="en-US" b="1" dirty="0" smtClean="0"/>
+              <a:rPr lang="en-US" b="1" dirty="0" smtClean="0">
+                <a:solidFill>
+                  <a:srgbClr val="FF0000"/>
+                </a:solidFill>
+              </a:rPr>
               <a:t>example</a:t>
             </a:r>
             <a:r>
@@ -9229,7 +10134,11 @@
               <a:t>Can more easily parallelize computations (</a:t>
             </a:r>
             <a:r>
-              <a:rPr lang="en-US" b="1" dirty="0" smtClean="0"/>
+              <a:rPr lang="en-US" b="1" dirty="0" smtClean="0">
+                <a:solidFill>
+                  <a:srgbClr val="FF0000"/>
+                </a:solidFill>
+              </a:rPr>
               <a:t>example</a:t>
             </a:r>
             <a:r>
@@ -9251,7 +10160,11 @@
               <a:t> computations (</a:t>
             </a:r>
             <a:r>
-              <a:rPr lang="en-US" b="1" dirty="0" smtClean="0"/>
+              <a:rPr lang="en-US" b="1" dirty="0" smtClean="0">
+                <a:solidFill>
+                  <a:srgbClr val="FF0000"/>
+                </a:solidFill>
+              </a:rPr>
               <a:t>example</a:t>
             </a:r>
             <a:r>
@@ -9353,11 +10266,7 @@
           <a:p>
             <a:r>
               <a:rPr lang="en-US" dirty="0" smtClean="0"/>
-              <a:t>‘</a:t>
-            </a:r>
-            <a:r>
-              <a:rPr lang="en-US" dirty="0" smtClean="0"/>
-              <a:t>Pure’ Functional Programming</a:t>
+              <a:t>‘Pure’ Functional Programming</a:t>
             </a:r>
             <a:endParaRPr lang="en-US" dirty="0"/>
           </a:p>
@@ -9449,31 +10358,14 @@
             <a:pPr lvl="1"/>
             <a:r>
               <a:rPr lang="en-US" dirty="0" smtClean="0"/>
-              <a:t>No </a:t>
-            </a:r>
-            <a:r>
-              <a:rPr lang="en-US" dirty="0" smtClean="0"/>
-              <a:t>mutable </a:t>
-            </a:r>
-            <a:r>
-              <a:rPr lang="en-US" dirty="0" smtClean="0"/>
-              <a:t>types, or very few mutable types</a:t>
-            </a:r>
-            <a:endParaRPr lang="en-US" dirty="0" smtClean="0"/>
+              <a:t>No mutable types, or very few mutable types</a:t>
+            </a:r>
           </a:p>
           <a:p>
             <a:pPr lvl="1"/>
             <a:r>
               <a:rPr lang="en-US" dirty="0" smtClean="0"/>
-              <a:t>I/O </a:t>
-            </a:r>
-            <a:r>
-              <a:rPr lang="en-US" dirty="0" smtClean="0"/>
-              <a:t>is accommodated via special constructs such as </a:t>
-            </a:r>
-            <a:r>
-              <a:rPr lang="en-US" dirty="0" smtClean="0"/>
-              <a:t>monads</a:t>
+              <a:t>I/O is accommodated via special constructs such as monads</a:t>
             </a:r>
           </a:p>
           <a:p>
@@ -9482,7 +10374,6 @@
               <a:rPr lang="en-US" dirty="0" smtClean="0"/>
               <a:t>Programming is generally declarative – sequencing is up to the computer</a:t>
             </a:r>
-            <a:endParaRPr lang="en-US" dirty="0" smtClean="0"/>
           </a:p>
           <a:p>
             <a:r>
@@ -9495,7 +10386,6 @@
               <a:rPr lang="en-US" dirty="0" smtClean="0"/>
               <a:t>Some languages, e.g. Haskell, actually enforce these rules</a:t>
             </a:r>
-            <a:endParaRPr lang="en-US" dirty="0" smtClean="0"/>
           </a:p>
         </p:txBody>
       </p:sp>

</xml_diff>

<commit_message>
Brian: Added slides and examples for list comprehensions.
</commit_message>
<xml_diff>
--- a/FoundationsOfFunctionalProgramming.pptx
+++ b/FoundationsOfFunctionalProgramming.pptx
@@ -26,18 +26,22 @@
     <p:sldId id="277" r:id="rId20"/>
     <p:sldId id="282" r:id="rId21"/>
     <p:sldId id="280" r:id="rId22"/>
-    <p:sldId id="281" r:id="rId23"/>
-    <p:sldId id="283" r:id="rId24"/>
-    <p:sldId id="285" r:id="rId25"/>
-    <p:sldId id="284" r:id="rId26"/>
-    <p:sldId id="286" r:id="rId27"/>
-    <p:sldId id="287" r:id="rId28"/>
-    <p:sldId id="276" r:id="rId29"/>
-    <p:sldId id="278" r:id="rId30"/>
-    <p:sldId id="279" r:id="rId31"/>
-    <p:sldId id="270" r:id="rId32"/>
-    <p:sldId id="258" r:id="rId33"/>
-    <p:sldId id="263" r:id="rId34"/>
+    <p:sldId id="291" r:id="rId23"/>
+    <p:sldId id="292" r:id="rId24"/>
+    <p:sldId id="289" r:id="rId25"/>
+    <p:sldId id="281" r:id="rId26"/>
+    <p:sldId id="283" r:id="rId27"/>
+    <p:sldId id="285" r:id="rId28"/>
+    <p:sldId id="284" r:id="rId29"/>
+    <p:sldId id="286" r:id="rId30"/>
+    <p:sldId id="287" r:id="rId31"/>
+    <p:sldId id="276" r:id="rId32"/>
+    <p:sldId id="279" r:id="rId33"/>
+    <p:sldId id="278" r:id="rId34"/>
+    <p:sldId id="290" r:id="rId35"/>
+    <p:sldId id="270" r:id="rId36"/>
+    <p:sldId id="258" r:id="rId37"/>
+    <p:sldId id="263" r:id="rId38"/>
   </p:sldIdLst>
   <p:sldSz cx="9144000" cy="6858000" type="screen4x3"/>
   <p:notesSz cx="6858000" cy="9144000"/>
@@ -162,6 +166,9 @@
             <p14:sldId id="277"/>
             <p14:sldId id="282"/>
             <p14:sldId id="280"/>
+            <p14:sldId id="291"/>
+            <p14:sldId id="292"/>
+            <p14:sldId id="289"/>
             <p14:sldId id="281"/>
             <p14:sldId id="283"/>
             <p14:sldId id="285"/>
@@ -169,8 +176,9 @@
             <p14:sldId id="286"/>
             <p14:sldId id="287"/>
             <p14:sldId id="276"/>
+            <p14:sldId id="279"/>
             <p14:sldId id="278"/>
-            <p14:sldId id="279"/>
+            <p14:sldId id="290"/>
             <p14:sldId id="270"/>
             <p14:sldId id="258"/>
             <p14:sldId id="263"/>
@@ -6760,216 +6768,6 @@
         </p:nvSpPr>
         <p:spPr>
           <a:xfrm>
-            <a:off x="609600" y="2930098"/>
-            <a:ext cx="7197436" cy="584775"/>
-          </a:xfrm>
-          <a:prstGeom prst="rect">
-            <a:avLst/>
-          </a:prstGeom>
-          <a:solidFill>
-            <a:schemeClr val="accent1">
-              <a:lumMod val="20000"/>
-              <a:lumOff val="80000"/>
-            </a:schemeClr>
-          </a:solidFill>
-          <a:ln>
-            <a:solidFill>
-              <a:schemeClr val="tx1"/>
-            </a:solidFill>
-          </a:ln>
-          <a:effectLst>
-            <a:outerShdw blurRad="50800" dist="50800" dir="3240000" sx="101000" sy="101000" algn="ctr" rotWithShape="0">
-              <a:schemeClr val="accent1">
-                <a:lumMod val="75000"/>
-              </a:schemeClr>
-            </a:outerShdw>
-          </a:effectLst>
-        </p:spPr>
-        <p:txBody>
-          <a:bodyPr wrap="square" rtlCol="0">
-            <a:spAutoFit/>
-          </a:bodyPr>
-          <a:lstStyle/>
-          <a:p>
-            <a:r>
-              <a:rPr lang="en-US" sz="1600" dirty="0">
-                <a:solidFill>
-                  <a:schemeClr val="accent2">
-                    <a:lumMod val="50000"/>
-                  </a:schemeClr>
-                </a:solidFill>
-                <a:latin typeface="Consolas" pitchFamily="49" charset="0"/>
-                <a:cs typeface="Consolas" pitchFamily="49" charset="0"/>
-              </a:rPr>
-              <a:t>Closure </a:t>
-            </a:r>
-            <a:r>
-              <a:rPr lang="en-US" sz="1600" dirty="0" smtClean="0">
-                <a:solidFill>
-                  <a:schemeClr val="accent2">
-                    <a:lumMod val="50000"/>
-                  </a:schemeClr>
-                </a:solidFill>
-                <a:latin typeface="Consolas" pitchFamily="49" charset="0"/>
-                <a:cs typeface="Consolas" pitchFamily="49" charset="0"/>
-              </a:rPr>
-              <a:t>g </a:t>
-            </a:r>
-            <a:r>
-              <a:rPr lang="en-US" sz="1600" dirty="0">
-                <a:solidFill>
-                  <a:schemeClr val="accent2">
-                    <a:lumMod val="50000"/>
-                  </a:schemeClr>
-                </a:solidFill>
-                <a:latin typeface="Consolas" pitchFamily="49" charset="0"/>
-                <a:cs typeface="Consolas" pitchFamily="49" charset="0"/>
-              </a:rPr>
-              <a:t>= </a:t>
-            </a:r>
-            <a:r>
-              <a:rPr lang="en-US" sz="1600" dirty="0" smtClean="0">
-                <a:solidFill>
-                  <a:schemeClr val="accent2">
-                    <a:lumMod val="50000"/>
-                  </a:schemeClr>
-                </a:solidFill>
-                <a:latin typeface="Consolas" pitchFamily="49" charset="0"/>
-                <a:cs typeface="Consolas" pitchFamily="49" charset="0"/>
-              </a:rPr>
-              <a:t>{String name -&gt; "</a:t>
-            </a:r>
-            <a:r>
-              <a:rPr lang="en-US" sz="1600" dirty="0">
-                <a:solidFill>
-                  <a:schemeClr val="accent2">
-                    <a:lumMod val="50000"/>
-                  </a:schemeClr>
-                </a:solidFill>
-                <a:latin typeface="Consolas" pitchFamily="49" charset="0"/>
-                <a:cs typeface="Consolas" pitchFamily="49" charset="0"/>
-              </a:rPr>
-              <a:t>Hello " + name + "!"}</a:t>
-            </a:r>
-          </a:p>
-          <a:p>
-            <a:r>
-              <a:rPr lang="en-US" sz="1600" dirty="0">
-                <a:solidFill>
-                  <a:schemeClr val="accent2">
-                    <a:lumMod val="50000"/>
-                  </a:schemeClr>
-                </a:solidFill>
-                <a:latin typeface="Consolas" pitchFamily="49" charset="0"/>
-                <a:cs typeface="Consolas" pitchFamily="49" charset="0"/>
-              </a:rPr>
-              <a:t>assert </a:t>
-            </a:r>
-            <a:r>
-              <a:rPr lang="en-US" sz="1600" dirty="0" smtClean="0">
-                <a:solidFill>
-                  <a:schemeClr val="accent2">
-                    <a:lumMod val="50000"/>
-                  </a:schemeClr>
-                </a:solidFill>
-                <a:latin typeface="Consolas" pitchFamily="49" charset="0"/>
-                <a:cs typeface="Consolas" pitchFamily="49" charset="0"/>
-              </a:rPr>
-              <a:t>g("</a:t>
-            </a:r>
-            <a:r>
-              <a:rPr lang="en-US" sz="1600" dirty="0">
-                <a:solidFill>
-                  <a:schemeClr val="accent2">
-                    <a:lumMod val="50000"/>
-                  </a:schemeClr>
-                </a:solidFill>
-                <a:latin typeface="Consolas" pitchFamily="49" charset="0"/>
-                <a:cs typeface="Consolas" pitchFamily="49" charset="0"/>
-              </a:rPr>
-              <a:t>you") == "Hello you</a:t>
-            </a:r>
-            <a:r>
-              <a:rPr lang="en-US" sz="1600" dirty="0" smtClean="0">
-                <a:solidFill>
-                  <a:schemeClr val="accent2">
-                    <a:lumMod val="50000"/>
-                  </a:schemeClr>
-                </a:solidFill>
-                <a:latin typeface="Consolas" pitchFamily="49" charset="0"/>
-                <a:cs typeface="Consolas" pitchFamily="49" charset="0"/>
-              </a:rPr>
-              <a:t>!"  </a:t>
-            </a:r>
-            <a:r>
-              <a:rPr lang="en-US" sz="1600" dirty="0" smtClean="0">
-                <a:solidFill>
-                  <a:schemeClr val="accent5">
-                    <a:lumMod val="75000"/>
-                  </a:schemeClr>
-                </a:solidFill>
-                <a:latin typeface="Consolas" pitchFamily="49" charset="0"/>
-                <a:cs typeface="Consolas" pitchFamily="49" charset="0"/>
-              </a:rPr>
-              <a:t>//Called via ()</a:t>
-            </a:r>
-          </a:p>
-        </p:txBody>
-      </p:sp>
-      <p:sp>
-        <p:nvSpPr>
-          <p:cNvPr id="5" name="TextBox 4"/>
-          <p:cNvSpPr txBox="1"/>
-          <p:nvPr/>
-        </p:nvSpPr>
-        <p:spPr>
-          <a:xfrm>
-            <a:off x="609600" y="2544587"/>
-            <a:ext cx="7197436" cy="369332"/>
-          </a:xfrm>
-          <a:prstGeom prst="rect">
-            <a:avLst/>
-          </a:prstGeom>
-          <a:solidFill>
-            <a:schemeClr val="accent2">
-              <a:lumMod val="50000"/>
-            </a:schemeClr>
-          </a:solidFill>
-        </p:spPr>
-        <p:txBody>
-          <a:bodyPr wrap="square" rtlCol="0">
-            <a:spAutoFit/>
-          </a:bodyPr>
-          <a:lstStyle/>
-          <a:p>
-            <a:r>
-              <a:rPr lang="en-US" dirty="0" smtClean="0">
-                <a:solidFill>
-                  <a:schemeClr val="bg1"/>
-                </a:solidFill>
-                <a:latin typeface="Consolas" pitchFamily="49" charset="0"/>
-                <a:cs typeface="Consolas" pitchFamily="49" charset="0"/>
-              </a:rPr>
-              <a:t>Groovy</a:t>
-            </a:r>
-            <a:endParaRPr lang="en-US" dirty="0">
-              <a:solidFill>
-                <a:schemeClr val="bg1"/>
-              </a:solidFill>
-              <a:latin typeface="Consolas" pitchFamily="49" charset="0"/>
-              <a:cs typeface="Consolas" pitchFamily="49" charset="0"/>
-            </a:endParaRPr>
-          </a:p>
-        </p:txBody>
-      </p:sp>
-      <p:sp>
-        <p:nvSpPr>
-          <p:cNvPr id="6" name="TextBox 5"/>
-          <p:cNvSpPr txBox="1"/>
-          <p:nvPr/>
-        </p:nvSpPr>
-        <p:spPr>
-          <a:xfrm>
             <a:off x="609600" y="4119311"/>
             <a:ext cx="7197436" cy="584775"/>
           </a:xfrm>
@@ -7002,6 +6800,216 @@
           <a:lstStyle/>
           <a:p>
             <a:r>
+              <a:rPr lang="en-US" sz="1600" dirty="0">
+                <a:solidFill>
+                  <a:schemeClr val="accent2">
+                    <a:lumMod val="50000"/>
+                  </a:schemeClr>
+                </a:solidFill>
+                <a:latin typeface="Consolas" pitchFamily="49" charset="0"/>
+                <a:cs typeface="Consolas" pitchFamily="49" charset="0"/>
+              </a:rPr>
+              <a:t>Closure </a:t>
+            </a:r>
+            <a:r>
+              <a:rPr lang="en-US" sz="1600" dirty="0" smtClean="0">
+                <a:solidFill>
+                  <a:schemeClr val="accent2">
+                    <a:lumMod val="50000"/>
+                  </a:schemeClr>
+                </a:solidFill>
+                <a:latin typeface="Consolas" pitchFamily="49" charset="0"/>
+                <a:cs typeface="Consolas" pitchFamily="49" charset="0"/>
+              </a:rPr>
+              <a:t>g </a:t>
+            </a:r>
+            <a:r>
+              <a:rPr lang="en-US" sz="1600" dirty="0">
+                <a:solidFill>
+                  <a:schemeClr val="accent2">
+                    <a:lumMod val="50000"/>
+                  </a:schemeClr>
+                </a:solidFill>
+                <a:latin typeface="Consolas" pitchFamily="49" charset="0"/>
+                <a:cs typeface="Consolas" pitchFamily="49" charset="0"/>
+              </a:rPr>
+              <a:t>= </a:t>
+            </a:r>
+            <a:r>
+              <a:rPr lang="en-US" sz="1600" dirty="0" smtClean="0">
+                <a:solidFill>
+                  <a:schemeClr val="accent2">
+                    <a:lumMod val="50000"/>
+                  </a:schemeClr>
+                </a:solidFill>
+                <a:latin typeface="Consolas" pitchFamily="49" charset="0"/>
+                <a:cs typeface="Consolas" pitchFamily="49" charset="0"/>
+              </a:rPr>
+              <a:t>{String name -&gt; "</a:t>
+            </a:r>
+            <a:r>
+              <a:rPr lang="en-US" sz="1600" dirty="0">
+                <a:solidFill>
+                  <a:schemeClr val="accent2">
+                    <a:lumMod val="50000"/>
+                  </a:schemeClr>
+                </a:solidFill>
+                <a:latin typeface="Consolas" pitchFamily="49" charset="0"/>
+                <a:cs typeface="Consolas" pitchFamily="49" charset="0"/>
+              </a:rPr>
+              <a:t>Hello " + name + "!"}</a:t>
+            </a:r>
+          </a:p>
+          <a:p>
+            <a:r>
+              <a:rPr lang="en-US" sz="1600" dirty="0">
+                <a:solidFill>
+                  <a:schemeClr val="accent2">
+                    <a:lumMod val="50000"/>
+                  </a:schemeClr>
+                </a:solidFill>
+                <a:latin typeface="Consolas" pitchFamily="49" charset="0"/>
+                <a:cs typeface="Consolas" pitchFamily="49" charset="0"/>
+              </a:rPr>
+              <a:t>assert </a:t>
+            </a:r>
+            <a:r>
+              <a:rPr lang="en-US" sz="1600" dirty="0" smtClean="0">
+                <a:solidFill>
+                  <a:schemeClr val="accent2">
+                    <a:lumMod val="50000"/>
+                  </a:schemeClr>
+                </a:solidFill>
+                <a:latin typeface="Consolas" pitchFamily="49" charset="0"/>
+                <a:cs typeface="Consolas" pitchFamily="49" charset="0"/>
+              </a:rPr>
+              <a:t>g("</a:t>
+            </a:r>
+            <a:r>
+              <a:rPr lang="en-US" sz="1600" dirty="0">
+                <a:solidFill>
+                  <a:schemeClr val="accent2">
+                    <a:lumMod val="50000"/>
+                  </a:schemeClr>
+                </a:solidFill>
+                <a:latin typeface="Consolas" pitchFamily="49" charset="0"/>
+                <a:cs typeface="Consolas" pitchFamily="49" charset="0"/>
+              </a:rPr>
+              <a:t>you") == "Hello you</a:t>
+            </a:r>
+            <a:r>
+              <a:rPr lang="en-US" sz="1600" dirty="0" smtClean="0">
+                <a:solidFill>
+                  <a:schemeClr val="accent2">
+                    <a:lumMod val="50000"/>
+                  </a:schemeClr>
+                </a:solidFill>
+                <a:latin typeface="Consolas" pitchFamily="49" charset="0"/>
+                <a:cs typeface="Consolas" pitchFamily="49" charset="0"/>
+              </a:rPr>
+              <a:t>!"  </a:t>
+            </a:r>
+            <a:r>
+              <a:rPr lang="en-US" sz="1600" dirty="0" smtClean="0">
+                <a:solidFill>
+                  <a:schemeClr val="accent5">
+                    <a:lumMod val="75000"/>
+                  </a:schemeClr>
+                </a:solidFill>
+                <a:latin typeface="Consolas" pitchFamily="49" charset="0"/>
+                <a:cs typeface="Consolas" pitchFamily="49" charset="0"/>
+              </a:rPr>
+              <a:t>//Called via ()</a:t>
+            </a:r>
+          </a:p>
+        </p:txBody>
+      </p:sp>
+      <p:sp>
+        <p:nvSpPr>
+          <p:cNvPr id="5" name="TextBox 4"/>
+          <p:cNvSpPr txBox="1"/>
+          <p:nvPr/>
+        </p:nvSpPr>
+        <p:spPr>
+          <a:xfrm>
+            <a:off x="609600" y="3733800"/>
+            <a:ext cx="7197436" cy="369332"/>
+          </a:xfrm>
+          <a:prstGeom prst="rect">
+            <a:avLst/>
+          </a:prstGeom>
+          <a:solidFill>
+            <a:schemeClr val="accent2">
+              <a:lumMod val="50000"/>
+            </a:schemeClr>
+          </a:solidFill>
+        </p:spPr>
+        <p:txBody>
+          <a:bodyPr wrap="square" rtlCol="0">
+            <a:spAutoFit/>
+          </a:bodyPr>
+          <a:lstStyle/>
+          <a:p>
+            <a:r>
+              <a:rPr lang="en-US" dirty="0" smtClean="0">
+                <a:solidFill>
+                  <a:schemeClr val="bg1"/>
+                </a:solidFill>
+                <a:latin typeface="Consolas" pitchFamily="49" charset="0"/>
+                <a:cs typeface="Consolas" pitchFamily="49" charset="0"/>
+              </a:rPr>
+              <a:t>Groovy</a:t>
+            </a:r>
+            <a:endParaRPr lang="en-US" dirty="0">
+              <a:solidFill>
+                <a:schemeClr val="bg1"/>
+              </a:solidFill>
+              <a:latin typeface="Consolas" pitchFamily="49" charset="0"/>
+              <a:cs typeface="Consolas" pitchFamily="49" charset="0"/>
+            </a:endParaRPr>
+          </a:p>
+        </p:txBody>
+      </p:sp>
+      <p:sp>
+        <p:nvSpPr>
+          <p:cNvPr id="6" name="TextBox 5"/>
+          <p:cNvSpPr txBox="1"/>
+          <p:nvPr/>
+        </p:nvSpPr>
+        <p:spPr>
+          <a:xfrm>
+            <a:off x="609600" y="2920753"/>
+            <a:ext cx="7197436" cy="584775"/>
+          </a:xfrm>
+          <a:prstGeom prst="rect">
+            <a:avLst/>
+          </a:prstGeom>
+          <a:solidFill>
+            <a:schemeClr val="accent1">
+              <a:lumMod val="20000"/>
+              <a:lumOff val="80000"/>
+            </a:schemeClr>
+          </a:solidFill>
+          <a:ln>
+            <a:solidFill>
+              <a:schemeClr val="tx1"/>
+            </a:solidFill>
+          </a:ln>
+          <a:effectLst>
+            <a:outerShdw blurRad="50800" dist="50800" dir="3240000" sx="101000" sy="101000" algn="ctr" rotWithShape="0">
+              <a:schemeClr val="accent1">
+                <a:lumMod val="75000"/>
+              </a:schemeClr>
+            </a:outerShdw>
+          </a:effectLst>
+        </p:spPr>
+        <p:txBody>
+          <a:bodyPr wrap="square" rtlCol="0">
+            <a:spAutoFit/>
+          </a:bodyPr>
+          <a:lstStyle/>
+          <a:p>
+            <a:r>
               <a:rPr lang="en-US" sz="1600" dirty="0" err="1">
                 <a:solidFill>
                   <a:schemeClr val="accent2">
@@ -7117,7 +7125,7 @@
         </p:nvSpPr>
         <p:spPr>
           <a:xfrm>
-            <a:off x="609600" y="3733800"/>
+            <a:off x="609600" y="2535242"/>
             <a:ext cx="7197436" cy="369332"/>
           </a:xfrm>
           <a:prstGeom prst="rect">
@@ -7856,93 +7864,43 @@
         </p:nvSpPr>
         <p:spPr/>
         <p:txBody>
-          <a:bodyPr/>
-          <a:lstStyle/>
-          <a:p>
-            <a:r>
-              <a:rPr lang="en-US" dirty="0" smtClean="0"/>
-              <a:t>Functions can have functions as parameters and return types</a:t>
-            </a:r>
-          </a:p>
-          <a:p>
-            <a:r>
-              <a:rPr lang="en-US" dirty="0" smtClean="0"/>
-              <a:t>Goes hand-in-hand with first-class functions</a:t>
-            </a:r>
-          </a:p>
-          <a:p>
-            <a:r>
-              <a:rPr lang="en-US" dirty="0" smtClean="0"/>
-              <a:t>Necessary to support many other features</a:t>
-            </a:r>
-          </a:p>
-          <a:p>
-            <a:r>
-              <a:rPr lang="en-US" b="1" dirty="0" smtClean="0">
-                <a:solidFill>
-                  <a:srgbClr val="FF0000"/>
-                </a:solidFill>
-              </a:rPr>
-              <a:t>Examples: Around-pattern for cleanup, logging, benchmarking, transactions</a:t>
-            </a:r>
-          </a:p>
-          <a:p>
-            <a:r>
-              <a:rPr lang="en-US" b="1" dirty="0" smtClean="0">
-                <a:solidFill>
-                  <a:srgbClr val="FF0000"/>
-                </a:solidFill>
-              </a:rPr>
-              <a:t>Comments about template method pattern</a:t>
-            </a:r>
-          </a:p>
-          <a:p>
-            <a:r>
-              <a:rPr lang="en-US" b="1" dirty="0" smtClean="0">
-                <a:solidFill>
-                  <a:srgbClr val="FF0000"/>
-                </a:solidFill>
-              </a:rPr>
-              <a:t>Comments abou</a:t>
-            </a:r>
-            <a:r>
-              <a:rPr lang="en-US" b="1" dirty="0" smtClean="0">
-                <a:solidFill>
-                  <a:srgbClr val="FF0000"/>
-                </a:solidFill>
-              </a:rPr>
-              <a:t>t anonymous classes</a:t>
-            </a:r>
-          </a:p>
-          <a:p>
-            <a:r>
-              <a:rPr lang="en-US" b="1" dirty="0" smtClean="0">
-                <a:solidFill>
-                  <a:srgbClr val="FF0000"/>
-                </a:solidFill>
-              </a:rPr>
-              <a:t>Comments about visitor pattern</a:t>
-            </a:r>
-          </a:p>
-          <a:p>
-            <a:r>
-              <a:rPr lang="en-US" b="1" dirty="0" smtClean="0">
-                <a:solidFill>
-                  <a:srgbClr val="FF0000"/>
-                </a:solidFill>
-              </a:rPr>
-              <a:t>Comments about strategy, command patterns</a:t>
-            </a:r>
-          </a:p>
-          <a:p>
-            <a:r>
-              <a:rPr lang="en-US" b="1" dirty="0" smtClean="0">
-                <a:solidFill>
-                  <a:srgbClr val="FF0000"/>
-                </a:solidFill>
-              </a:rPr>
-              <a:t>Comments about iteration – lead in to list comprehensions</a:t>
-            </a:r>
+          <a:bodyPr>
+            <a:normAutofit/>
+          </a:bodyPr>
+          <a:lstStyle/>
+          <a:p>
+            <a:r>
+              <a:rPr lang="en-US" dirty="0" smtClean="0"/>
+              <a:t>Functions can </a:t>
+            </a:r>
+            <a:r>
+              <a:rPr lang="en-US" dirty="0" smtClean="0"/>
+              <a:t>acce</a:t>
+            </a:r>
+            <a:r>
+              <a:rPr lang="en-US" dirty="0" smtClean="0"/>
+              <a:t>pt </a:t>
+            </a:r>
+            <a:r>
+              <a:rPr lang="en-US" dirty="0" smtClean="0"/>
+              <a:t>functions </a:t>
+            </a:r>
+            <a:r>
+              <a:rPr lang="en-US" dirty="0" smtClean="0"/>
+              <a:t>as parameters and return </a:t>
+            </a:r>
+            <a:r>
+              <a:rPr lang="en-US" dirty="0" smtClean="0"/>
+              <a:t>them</a:t>
+            </a:r>
+          </a:p>
+          <a:p>
+            <a:endParaRPr lang="en-US" dirty="0"/>
+          </a:p>
+          <a:p>
+            <a:endParaRPr lang="en-US" dirty="0" smtClean="0"/>
+          </a:p>
+          <a:p>
             <a:endParaRPr lang="en-US" b="1" dirty="0" smtClean="0">
               <a:solidFill>
                 <a:srgbClr val="FF0000"/>
@@ -7951,6 +7909,614 @@
           </a:p>
           <a:p>
             <a:endParaRPr lang="en-US" dirty="0" smtClean="0"/>
+          </a:p>
+        </p:txBody>
+      </p:sp>
+      <p:sp>
+        <p:nvSpPr>
+          <p:cNvPr id="6" name="TextBox 5"/>
+          <p:cNvSpPr txBox="1"/>
+          <p:nvPr/>
+        </p:nvSpPr>
+        <p:spPr>
+          <a:xfrm>
+            <a:off x="609600" y="2671511"/>
+            <a:ext cx="7197436" cy="2554545"/>
+          </a:xfrm>
+          <a:prstGeom prst="rect">
+            <a:avLst/>
+          </a:prstGeom>
+          <a:solidFill>
+            <a:schemeClr val="accent1">
+              <a:lumMod val="20000"/>
+              <a:lumOff val="80000"/>
+            </a:schemeClr>
+          </a:solidFill>
+          <a:ln>
+            <a:solidFill>
+              <a:schemeClr val="tx1"/>
+            </a:solidFill>
+          </a:ln>
+          <a:effectLst>
+            <a:outerShdw blurRad="50800" dist="50800" dir="3240000" sx="101000" sy="101000" algn="ctr" rotWithShape="0">
+              <a:schemeClr val="accent1">
+                <a:lumMod val="75000"/>
+              </a:schemeClr>
+            </a:outerShdw>
+          </a:effectLst>
+        </p:spPr>
+        <p:txBody>
+          <a:bodyPr wrap="square" rtlCol="0">
+            <a:spAutoFit/>
+          </a:bodyPr>
+          <a:lstStyle/>
+          <a:p>
+            <a:r>
+              <a:rPr lang="en-US" sz="1600" dirty="0" err="1" smtClean="0">
+                <a:solidFill>
+                  <a:schemeClr val="accent2">
+                    <a:lumMod val="50000"/>
+                  </a:schemeClr>
+                </a:solidFill>
+                <a:latin typeface="Consolas" pitchFamily="49" charset="0"/>
+                <a:cs typeface="Consolas" pitchFamily="49" charset="0"/>
+              </a:rPr>
+              <a:t>def</a:t>
+            </a:r>
+            <a:r>
+              <a:rPr lang="en-US" sz="1600" dirty="0" smtClean="0">
+                <a:solidFill>
+                  <a:schemeClr val="accent2">
+                    <a:lumMod val="50000"/>
+                  </a:schemeClr>
+                </a:solidFill>
+                <a:latin typeface="Consolas" pitchFamily="49" charset="0"/>
+                <a:cs typeface="Consolas" pitchFamily="49" charset="0"/>
+              </a:rPr>
+              <a:t> </a:t>
+            </a:r>
+            <a:r>
+              <a:rPr lang="en-US" sz="1600" dirty="0" err="1" smtClean="0">
+                <a:solidFill>
+                  <a:schemeClr val="accent2">
+                    <a:lumMod val="50000"/>
+                  </a:schemeClr>
+                </a:solidFill>
+                <a:latin typeface="Consolas" pitchFamily="49" charset="0"/>
+                <a:cs typeface="Consolas" pitchFamily="49" charset="0"/>
+              </a:rPr>
+              <a:t>isEven</a:t>
+            </a:r>
+            <a:r>
+              <a:rPr lang="en-US" sz="1600" dirty="0" smtClean="0">
+                <a:solidFill>
+                  <a:schemeClr val="accent2">
+                    <a:lumMod val="50000"/>
+                  </a:schemeClr>
+                </a:solidFill>
+                <a:latin typeface="Consolas" pitchFamily="49" charset="0"/>
+                <a:cs typeface="Consolas" pitchFamily="49" charset="0"/>
+              </a:rPr>
+              <a:t>(n: </a:t>
+            </a:r>
+            <a:r>
+              <a:rPr lang="en-US" sz="1600" dirty="0" err="1" smtClean="0">
+                <a:solidFill>
+                  <a:schemeClr val="accent2">
+                    <a:lumMod val="50000"/>
+                  </a:schemeClr>
+                </a:solidFill>
+                <a:latin typeface="Consolas" pitchFamily="49" charset="0"/>
+                <a:cs typeface="Consolas" pitchFamily="49" charset="0"/>
+              </a:rPr>
+              <a:t>Int</a:t>
+            </a:r>
+            <a:r>
+              <a:rPr lang="en-US" sz="1600" dirty="0" smtClean="0">
+                <a:solidFill>
+                  <a:schemeClr val="accent2">
+                    <a:lumMod val="50000"/>
+                  </a:schemeClr>
+                </a:solidFill>
+                <a:latin typeface="Consolas" pitchFamily="49" charset="0"/>
+                <a:cs typeface="Consolas" pitchFamily="49" charset="0"/>
+              </a:rPr>
+              <a:t>) = {n % 2 == 0}</a:t>
+            </a:r>
+          </a:p>
+          <a:p>
+            <a:endParaRPr lang="en-US" sz="1600" dirty="0">
+              <a:solidFill>
+                <a:schemeClr val="accent5">
+                  <a:lumMod val="75000"/>
+                </a:schemeClr>
+              </a:solidFill>
+              <a:latin typeface="Consolas" pitchFamily="49" charset="0"/>
+              <a:cs typeface="Consolas" pitchFamily="49" charset="0"/>
+            </a:endParaRPr>
+          </a:p>
+          <a:p>
+            <a:r>
+              <a:rPr lang="en-US" sz="1600" dirty="0" smtClean="0">
+                <a:solidFill>
+                  <a:schemeClr val="accent5">
+                    <a:lumMod val="75000"/>
+                  </a:schemeClr>
+                </a:solidFill>
+                <a:latin typeface="Consolas" pitchFamily="49" charset="0"/>
+                <a:cs typeface="Consolas" pitchFamily="49" charset="0"/>
+              </a:rPr>
+              <a:t>// Accepts a function</a:t>
+            </a:r>
+          </a:p>
+          <a:p>
+            <a:r>
+              <a:rPr lang="en-US" sz="1600" dirty="0" err="1" smtClean="0">
+                <a:solidFill>
+                  <a:schemeClr val="accent2">
+                    <a:lumMod val="50000"/>
+                  </a:schemeClr>
+                </a:solidFill>
+                <a:latin typeface="Consolas" pitchFamily="49" charset="0"/>
+                <a:cs typeface="Consolas" pitchFamily="49" charset="0"/>
+              </a:rPr>
+              <a:t>def</a:t>
+            </a:r>
+            <a:r>
+              <a:rPr lang="en-US" sz="1600" dirty="0" smtClean="0">
+                <a:solidFill>
+                  <a:schemeClr val="accent2">
+                    <a:lumMod val="50000"/>
+                  </a:schemeClr>
+                </a:solidFill>
+                <a:latin typeface="Consolas" pitchFamily="49" charset="0"/>
+                <a:cs typeface="Consolas" pitchFamily="49" charset="0"/>
+              </a:rPr>
+              <a:t> </a:t>
+            </a:r>
+            <a:r>
+              <a:rPr lang="en-US" sz="1600" dirty="0" err="1" smtClean="0">
+                <a:solidFill>
+                  <a:schemeClr val="accent2">
+                    <a:lumMod val="50000"/>
+                  </a:schemeClr>
+                </a:solidFill>
+                <a:latin typeface="Consolas" pitchFamily="49" charset="0"/>
+                <a:cs typeface="Consolas" pitchFamily="49" charset="0"/>
+              </a:rPr>
+              <a:t>checkNumber</a:t>
+            </a:r>
+            <a:r>
+              <a:rPr lang="en-US" sz="1600" dirty="0" smtClean="0">
+                <a:solidFill>
+                  <a:schemeClr val="accent2">
+                    <a:lumMod val="50000"/>
+                  </a:schemeClr>
+                </a:solidFill>
+                <a:latin typeface="Consolas" pitchFamily="49" charset="0"/>
+                <a:cs typeface="Consolas" pitchFamily="49" charset="0"/>
+              </a:rPr>
+              <a:t>(n: </a:t>
+            </a:r>
+            <a:r>
+              <a:rPr lang="en-US" sz="1600" dirty="0" err="1">
+                <a:solidFill>
+                  <a:schemeClr val="accent2">
+                    <a:lumMod val="50000"/>
+                  </a:schemeClr>
+                </a:solidFill>
+                <a:latin typeface="Consolas" pitchFamily="49" charset="0"/>
+                <a:cs typeface="Consolas" pitchFamily="49" charset="0"/>
+              </a:rPr>
+              <a:t>Int</a:t>
+            </a:r>
+            <a:r>
+              <a:rPr lang="en-US" sz="1600" dirty="0">
+                <a:solidFill>
+                  <a:schemeClr val="accent2">
+                    <a:lumMod val="50000"/>
+                  </a:schemeClr>
+                </a:solidFill>
+                <a:latin typeface="Consolas" pitchFamily="49" charset="0"/>
+                <a:cs typeface="Consolas" pitchFamily="49" charset="0"/>
+              </a:rPr>
+              <a:t>, check: </a:t>
+            </a:r>
+            <a:r>
+              <a:rPr lang="en-US" sz="1600" dirty="0" err="1">
+                <a:solidFill>
+                  <a:schemeClr val="accent2">
+                    <a:lumMod val="50000"/>
+                  </a:schemeClr>
+                </a:solidFill>
+                <a:latin typeface="Consolas" pitchFamily="49" charset="0"/>
+                <a:cs typeface="Consolas" pitchFamily="49" charset="0"/>
+              </a:rPr>
+              <a:t>Int</a:t>
+            </a:r>
+            <a:r>
+              <a:rPr lang="en-US" sz="1600" dirty="0">
+                <a:solidFill>
+                  <a:schemeClr val="accent2">
+                    <a:lumMod val="50000"/>
+                  </a:schemeClr>
+                </a:solidFill>
+                <a:latin typeface="Consolas" pitchFamily="49" charset="0"/>
+                <a:cs typeface="Consolas" pitchFamily="49" charset="0"/>
+              </a:rPr>
+              <a:t> =&gt; Boolean</a:t>
+            </a:r>
+            <a:r>
+              <a:rPr lang="en-US" sz="1600" dirty="0" smtClean="0">
+                <a:solidFill>
+                  <a:schemeClr val="accent2">
+                    <a:lumMod val="50000"/>
+                  </a:schemeClr>
+                </a:solidFill>
+                <a:latin typeface="Consolas" pitchFamily="49" charset="0"/>
+                <a:cs typeface="Consolas" pitchFamily="49" charset="0"/>
+              </a:rPr>
+              <a:t>) = {check(n)}</a:t>
+            </a:r>
+          </a:p>
+          <a:p>
+            <a:endParaRPr lang="en-US" sz="1600" dirty="0" smtClean="0">
+              <a:solidFill>
+                <a:schemeClr val="accent2">
+                  <a:lumMod val="50000"/>
+                </a:schemeClr>
+              </a:solidFill>
+              <a:latin typeface="Consolas" pitchFamily="49" charset="0"/>
+              <a:cs typeface="Consolas" pitchFamily="49" charset="0"/>
+            </a:endParaRPr>
+          </a:p>
+          <a:p>
+            <a:r>
+              <a:rPr lang="en-US" sz="1600" dirty="0" smtClean="0">
+                <a:solidFill>
+                  <a:schemeClr val="accent5">
+                    <a:lumMod val="75000"/>
+                  </a:schemeClr>
+                </a:solidFill>
+                <a:latin typeface="Consolas" pitchFamily="49" charset="0"/>
+                <a:cs typeface="Consolas" pitchFamily="49" charset="0"/>
+              </a:rPr>
+              <a:t>// Returns a function</a:t>
+            </a:r>
+            <a:endParaRPr lang="en-US" sz="1600" dirty="0">
+              <a:solidFill>
+                <a:schemeClr val="accent5">
+                  <a:lumMod val="75000"/>
+                </a:schemeClr>
+              </a:solidFill>
+              <a:latin typeface="Consolas" pitchFamily="49" charset="0"/>
+              <a:cs typeface="Consolas" pitchFamily="49" charset="0"/>
+            </a:endParaRPr>
+          </a:p>
+          <a:p>
+            <a:r>
+              <a:rPr lang="en-US" sz="1600" dirty="0" err="1">
+                <a:solidFill>
+                  <a:schemeClr val="accent2">
+                    <a:lumMod val="50000"/>
+                  </a:schemeClr>
+                </a:solidFill>
+                <a:latin typeface="Consolas" pitchFamily="49" charset="0"/>
+                <a:cs typeface="Consolas" pitchFamily="49" charset="0"/>
+              </a:rPr>
+              <a:t>def</a:t>
+            </a:r>
+            <a:r>
+              <a:rPr lang="en-US" sz="1600" dirty="0">
+                <a:solidFill>
+                  <a:schemeClr val="accent2">
+                    <a:lumMod val="50000"/>
+                  </a:schemeClr>
+                </a:solidFill>
+                <a:latin typeface="Consolas" pitchFamily="49" charset="0"/>
+                <a:cs typeface="Consolas" pitchFamily="49" charset="0"/>
+              </a:rPr>
+              <a:t> </a:t>
+            </a:r>
+            <a:r>
+              <a:rPr lang="en-US" sz="1600" dirty="0" err="1" smtClean="0">
+                <a:solidFill>
+                  <a:schemeClr val="accent2">
+                    <a:lumMod val="50000"/>
+                  </a:schemeClr>
+                </a:solidFill>
+                <a:latin typeface="Consolas" pitchFamily="49" charset="0"/>
+                <a:cs typeface="Consolas" pitchFamily="49" charset="0"/>
+              </a:rPr>
+              <a:t>multiplyBy</a:t>
+            </a:r>
+            <a:r>
+              <a:rPr lang="en-US" sz="1600" dirty="0" smtClean="0">
+                <a:solidFill>
+                  <a:schemeClr val="accent2">
+                    <a:lumMod val="50000"/>
+                  </a:schemeClr>
+                </a:solidFill>
+                <a:latin typeface="Consolas" pitchFamily="49" charset="0"/>
+                <a:cs typeface="Consolas" pitchFamily="49" charset="0"/>
+              </a:rPr>
+              <a:t>(m: </a:t>
+            </a:r>
+            <a:r>
+              <a:rPr lang="en-US" sz="1600" dirty="0" err="1">
+                <a:solidFill>
+                  <a:schemeClr val="accent2">
+                    <a:lumMod val="50000"/>
+                  </a:schemeClr>
+                </a:solidFill>
+                <a:latin typeface="Consolas" pitchFamily="49" charset="0"/>
+                <a:cs typeface="Consolas" pitchFamily="49" charset="0"/>
+              </a:rPr>
+              <a:t>Int</a:t>
+            </a:r>
+            <a:r>
+              <a:rPr lang="en-US" sz="1600" dirty="0" smtClean="0">
+                <a:solidFill>
+                  <a:schemeClr val="accent2">
+                    <a:lumMod val="50000"/>
+                  </a:schemeClr>
+                </a:solidFill>
+                <a:latin typeface="Consolas" pitchFamily="49" charset="0"/>
+                <a:cs typeface="Consolas" pitchFamily="49" charset="0"/>
+              </a:rPr>
+              <a:t>) </a:t>
+            </a:r>
+            <a:r>
+              <a:rPr lang="en-US" sz="1600" dirty="0">
+                <a:solidFill>
+                  <a:schemeClr val="accent2">
+                    <a:lumMod val="50000"/>
+                  </a:schemeClr>
+                </a:solidFill>
+                <a:latin typeface="Consolas" pitchFamily="49" charset="0"/>
+                <a:cs typeface="Consolas" pitchFamily="49" charset="0"/>
+              </a:rPr>
+              <a:t>= </a:t>
+            </a:r>
+            <a:r>
+              <a:rPr lang="en-US" sz="1600" dirty="0" smtClean="0">
+                <a:solidFill>
+                  <a:schemeClr val="accent2">
+                    <a:lumMod val="50000"/>
+                  </a:schemeClr>
+                </a:solidFill>
+                <a:latin typeface="Consolas" pitchFamily="49" charset="0"/>
+                <a:cs typeface="Consolas" pitchFamily="49" charset="0"/>
+              </a:rPr>
+              <a:t>(</a:t>
+            </a:r>
+            <a:r>
+              <a:rPr lang="en-US" sz="1600" dirty="0" err="1" smtClean="0">
+                <a:solidFill>
+                  <a:schemeClr val="accent2">
+                    <a:lumMod val="50000"/>
+                  </a:schemeClr>
+                </a:solidFill>
+                <a:latin typeface="Consolas" pitchFamily="49" charset="0"/>
+                <a:cs typeface="Consolas" pitchFamily="49" charset="0"/>
+              </a:rPr>
+              <a:t>n:Int</a:t>
+            </a:r>
+            <a:r>
+              <a:rPr lang="en-US" sz="1600" dirty="0">
+                <a:solidFill>
+                  <a:schemeClr val="accent2">
+                    <a:lumMod val="50000"/>
+                  </a:schemeClr>
+                </a:solidFill>
+                <a:latin typeface="Consolas" pitchFamily="49" charset="0"/>
+                <a:cs typeface="Consolas" pitchFamily="49" charset="0"/>
+              </a:rPr>
+              <a:t>) =&gt; </a:t>
+            </a:r>
+            <a:r>
+              <a:rPr lang="en-US" sz="1600" dirty="0" smtClean="0">
+                <a:solidFill>
+                  <a:schemeClr val="accent2">
+                    <a:lumMod val="50000"/>
+                  </a:schemeClr>
+                </a:solidFill>
+                <a:latin typeface="Consolas" pitchFamily="49" charset="0"/>
+                <a:cs typeface="Consolas" pitchFamily="49" charset="0"/>
+              </a:rPr>
+              <a:t>{n </a:t>
+            </a:r>
+            <a:r>
+              <a:rPr lang="en-US" sz="1600" dirty="0">
+                <a:solidFill>
+                  <a:schemeClr val="accent2">
+                    <a:lumMod val="50000"/>
+                  </a:schemeClr>
+                </a:solidFill>
+                <a:latin typeface="Consolas" pitchFamily="49" charset="0"/>
+                <a:cs typeface="Consolas" pitchFamily="49" charset="0"/>
+              </a:rPr>
+              <a:t>* </a:t>
+            </a:r>
+            <a:r>
+              <a:rPr lang="en-US" sz="1600" dirty="0" smtClean="0">
+                <a:solidFill>
+                  <a:schemeClr val="accent2">
+                    <a:lumMod val="50000"/>
+                  </a:schemeClr>
+                </a:solidFill>
+                <a:latin typeface="Consolas" pitchFamily="49" charset="0"/>
+                <a:cs typeface="Consolas" pitchFamily="49" charset="0"/>
+              </a:rPr>
+              <a:t>m}</a:t>
+            </a:r>
+          </a:p>
+          <a:p>
+            <a:endParaRPr lang="en-US" sz="1600" dirty="0">
+              <a:solidFill>
+                <a:schemeClr val="accent2">
+                  <a:lumMod val="50000"/>
+                </a:schemeClr>
+              </a:solidFill>
+              <a:latin typeface="Consolas" pitchFamily="49" charset="0"/>
+              <a:cs typeface="Consolas" pitchFamily="49" charset="0"/>
+            </a:endParaRPr>
+          </a:p>
+          <a:p>
+            <a:r>
+              <a:rPr lang="en-US" sz="1600" dirty="0" err="1" smtClean="0">
+                <a:solidFill>
+                  <a:schemeClr val="accent2">
+                    <a:lumMod val="50000"/>
+                  </a:schemeClr>
+                </a:solidFill>
+                <a:latin typeface="Consolas" pitchFamily="49" charset="0"/>
+                <a:cs typeface="Consolas" pitchFamily="49" charset="0"/>
+              </a:rPr>
+              <a:t>checkNumber</a:t>
+            </a:r>
+            <a:r>
+              <a:rPr lang="en-US" sz="1600" dirty="0" smtClean="0">
+                <a:solidFill>
+                  <a:schemeClr val="accent2">
+                    <a:lumMod val="50000"/>
+                  </a:schemeClr>
+                </a:solidFill>
+                <a:latin typeface="Consolas" pitchFamily="49" charset="0"/>
+                <a:cs typeface="Consolas" pitchFamily="49" charset="0"/>
+              </a:rPr>
+              <a:t>(2, </a:t>
+            </a:r>
+            <a:r>
+              <a:rPr lang="en-US" sz="1600" dirty="0" err="1" smtClean="0">
+                <a:solidFill>
+                  <a:schemeClr val="accent2">
+                    <a:lumMod val="50000"/>
+                  </a:schemeClr>
+                </a:solidFill>
+                <a:latin typeface="Consolas" pitchFamily="49" charset="0"/>
+                <a:cs typeface="Consolas" pitchFamily="49" charset="0"/>
+              </a:rPr>
+              <a:t>isEven</a:t>
+            </a:r>
+            <a:r>
+              <a:rPr lang="en-US" sz="1600" dirty="0" smtClean="0">
+                <a:solidFill>
+                  <a:schemeClr val="accent2">
+                    <a:lumMod val="50000"/>
+                  </a:schemeClr>
+                </a:solidFill>
+                <a:latin typeface="Consolas" pitchFamily="49" charset="0"/>
+                <a:cs typeface="Consolas" pitchFamily="49" charset="0"/>
+              </a:rPr>
+              <a:t>)   </a:t>
+            </a:r>
+            <a:r>
+              <a:rPr lang="en-US" sz="1600" dirty="0" smtClean="0">
+                <a:solidFill>
+                  <a:schemeClr val="accent5">
+                    <a:lumMod val="75000"/>
+                  </a:schemeClr>
+                </a:solidFill>
+                <a:latin typeface="Consolas" pitchFamily="49" charset="0"/>
+                <a:cs typeface="Consolas" pitchFamily="49" charset="0"/>
+              </a:rPr>
+              <a:t>// true</a:t>
+            </a:r>
+          </a:p>
+          <a:p>
+            <a:r>
+              <a:rPr lang="en-US" sz="1600" dirty="0" err="1" smtClean="0">
+                <a:solidFill>
+                  <a:schemeClr val="accent2">
+                    <a:lumMod val="50000"/>
+                  </a:schemeClr>
+                </a:solidFill>
+                <a:latin typeface="Consolas" pitchFamily="49" charset="0"/>
+                <a:cs typeface="Consolas" pitchFamily="49" charset="0"/>
+              </a:rPr>
+              <a:t>multiplyBy</a:t>
+            </a:r>
+            <a:r>
+              <a:rPr lang="en-US" sz="1600" dirty="0" smtClean="0">
+                <a:solidFill>
+                  <a:schemeClr val="accent2">
+                    <a:lumMod val="50000"/>
+                  </a:schemeClr>
+                </a:solidFill>
+                <a:latin typeface="Consolas" pitchFamily="49" charset="0"/>
+                <a:cs typeface="Consolas" pitchFamily="49" charset="0"/>
+              </a:rPr>
+              <a:t>(5)(6)        </a:t>
+            </a:r>
+            <a:r>
+              <a:rPr lang="en-US" sz="1600" dirty="0" smtClean="0">
+                <a:solidFill>
+                  <a:schemeClr val="accent5">
+                    <a:lumMod val="75000"/>
+                  </a:schemeClr>
+                </a:solidFill>
+                <a:latin typeface="Consolas" pitchFamily="49" charset="0"/>
+                <a:cs typeface="Consolas" pitchFamily="49" charset="0"/>
+              </a:rPr>
+              <a:t> // 30</a:t>
+            </a:r>
+          </a:p>
+        </p:txBody>
+      </p:sp>
+      <p:sp>
+        <p:nvSpPr>
+          <p:cNvPr id="7" name="TextBox 6"/>
+          <p:cNvSpPr txBox="1"/>
+          <p:nvPr/>
+        </p:nvSpPr>
+        <p:spPr>
+          <a:xfrm>
+            <a:off x="609600" y="2286000"/>
+            <a:ext cx="7197436" cy="369332"/>
+          </a:xfrm>
+          <a:prstGeom prst="rect">
+            <a:avLst/>
+          </a:prstGeom>
+          <a:solidFill>
+            <a:schemeClr val="accent2">
+              <a:lumMod val="50000"/>
+            </a:schemeClr>
+          </a:solidFill>
+        </p:spPr>
+        <p:txBody>
+          <a:bodyPr wrap="square" rtlCol="0">
+            <a:spAutoFit/>
+          </a:bodyPr>
+          <a:lstStyle/>
+          <a:p>
+            <a:r>
+              <a:rPr lang="en-US" dirty="0" err="1" smtClean="0">
+                <a:solidFill>
+                  <a:schemeClr val="bg1"/>
+                </a:solidFill>
+                <a:latin typeface="Consolas" pitchFamily="49" charset="0"/>
+                <a:cs typeface="Consolas" pitchFamily="49" charset="0"/>
+              </a:rPr>
+              <a:t>Scala</a:t>
+            </a:r>
+            <a:r>
+              <a:rPr lang="en-US" dirty="0" smtClean="0">
+                <a:solidFill>
+                  <a:schemeClr val="bg1"/>
+                </a:solidFill>
+                <a:latin typeface="Consolas" pitchFamily="49" charset="0"/>
+                <a:cs typeface="Consolas" pitchFamily="49" charset="0"/>
+              </a:rPr>
+              <a:t> – Higher Order Functions</a:t>
+            </a:r>
+            <a:endParaRPr lang="en-US" dirty="0">
+              <a:solidFill>
+                <a:schemeClr val="bg1"/>
+              </a:solidFill>
+              <a:latin typeface="Consolas" pitchFamily="49" charset="0"/>
+              <a:cs typeface="Consolas" pitchFamily="49" charset="0"/>
+            </a:endParaRPr>
           </a:p>
         </p:txBody>
       </p:sp>
@@ -8001,7 +8567,7 @@
           <a:p>
             <a:r>
               <a:rPr lang="en-US" dirty="0" smtClean="0"/>
-              <a:t>List Comprehensions</a:t>
+              <a:t>Higher Order Functions, cont.</a:t>
             </a:r>
             <a:endParaRPr lang="en-US" dirty="0"/>
           </a:p>
@@ -8019,17 +8585,78 @@
         </p:nvSpPr>
         <p:spPr/>
         <p:txBody>
-          <a:bodyPr/>
-          <a:lstStyle/>
-          <a:p>
-            <a:endParaRPr lang="en-US" dirty="0"/>
+          <a:bodyPr>
+            <a:normAutofit/>
+          </a:bodyPr>
+          <a:lstStyle/>
+          <a:p>
+            <a:r>
+              <a:rPr lang="en-US" dirty="0" smtClean="0"/>
+              <a:t>Goes </a:t>
+            </a:r>
+            <a:r>
+              <a:rPr lang="en-US" dirty="0"/>
+              <a:t>hand-in-hand with first-class </a:t>
+            </a:r>
+            <a:r>
+              <a:rPr lang="en-US" dirty="0" smtClean="0"/>
+              <a:t>functions</a:t>
+            </a:r>
+          </a:p>
+          <a:p>
+            <a:r>
+              <a:rPr lang="en-US" dirty="0" smtClean="0"/>
+              <a:t>May replace certain OO patterns &amp; features:</a:t>
+            </a:r>
+          </a:p>
+          <a:p>
+            <a:pPr lvl="1"/>
+            <a:r>
+              <a:rPr lang="en-US" dirty="0" smtClean="0"/>
+              <a:t>Template method</a:t>
+            </a:r>
+          </a:p>
+          <a:p>
+            <a:pPr lvl="1"/>
+            <a:r>
+              <a:rPr lang="en-US" dirty="0" smtClean="0"/>
+              <a:t>Visitor</a:t>
+            </a:r>
+          </a:p>
+          <a:p>
+            <a:pPr lvl="1"/>
+            <a:r>
+              <a:rPr lang="en-US" dirty="0" smtClean="0"/>
+              <a:t>Strategy</a:t>
+            </a:r>
+          </a:p>
+          <a:p>
+            <a:pPr lvl="1"/>
+            <a:r>
+              <a:rPr lang="en-US" dirty="0" smtClean="0"/>
+              <a:t>Command</a:t>
+            </a:r>
+          </a:p>
+          <a:p>
+            <a:pPr lvl="1"/>
+            <a:r>
+              <a:rPr lang="en-US" dirty="0"/>
+              <a:t>Iterator</a:t>
+            </a:r>
+          </a:p>
+          <a:p>
+            <a:pPr lvl="1"/>
+            <a:r>
+              <a:rPr lang="en-US" dirty="0" smtClean="0"/>
+              <a:t>Anonymous inner classes</a:t>
+            </a:r>
           </a:p>
         </p:txBody>
       </p:sp>
     </p:spTree>
     <p:extLst>
       <p:ext uri="{BB962C8B-B14F-4D97-AF65-F5344CB8AC3E}">
-        <p14:creationId xmlns:p14="http://schemas.microsoft.com/office/powerpoint/2010/main" val="292100415"/>
+        <p14:creationId xmlns:p14="http://schemas.microsoft.com/office/powerpoint/2010/main" val="1188103287"/>
       </p:ext>
     </p:extLst>
   </p:cSld>
@@ -8073,7 +8700,7 @@
           <a:p>
             <a:r>
               <a:rPr lang="en-US" dirty="0" smtClean="0"/>
-              <a:t>Pattern Matching</a:t>
+              <a:t>Higher Order Functions, cont.</a:t>
             </a:r>
             <a:endParaRPr lang="en-US" dirty="0"/>
           </a:p>
@@ -8081,7 +8708,7 @@
       </p:sp>
       <p:sp>
         <p:nvSpPr>
-          <p:cNvPr id="3" name="Content Placeholder 2"/>
+          <p:cNvPr id="6" name="Content Placeholder 5"/>
           <p:cNvSpPr>
             <a:spLocks noGrp="1"/>
           </p:cNvSpPr>
@@ -8089,33 +8716,610 @@
             <p:ph idx="1"/>
           </p:nvPr>
         </p:nvSpPr>
-        <p:spPr/>
-        <p:txBody>
-          <a:bodyPr/>
-          <a:lstStyle/>
-          <a:p>
-            <a:r>
-              <a:rPr lang="en-US" dirty="0" smtClean="0"/>
-              <a:t>Examples</a:t>
-            </a:r>
-          </a:p>
-          <a:p>
-            <a:r>
-              <a:rPr lang="en-US" dirty="0" smtClean="0"/>
-              <a:t>Algebraic Data Types</a:t>
-            </a:r>
-          </a:p>
-          <a:p>
-            <a:r>
-              <a:rPr lang="en-US" dirty="0" smtClean="0"/>
-              <a:t>Examples of using types as ‘cases’ / polymorphism on values</a:t>
+        <p:spPr>
+          <a:xfrm>
+            <a:off x="457200" y="1600200"/>
+            <a:ext cx="7620000" cy="1143000"/>
+          </a:xfrm>
+        </p:spPr>
+        <p:txBody>
+          <a:bodyPr>
+            <a:normAutofit/>
+          </a:bodyPr>
+          <a:lstStyle/>
+          <a:p>
+            <a:r>
+              <a:rPr lang="en-US" dirty="0"/>
+              <a:t>Great for when you want to ‘wrap’ behavior </a:t>
+            </a:r>
+            <a:r>
+              <a:rPr lang="en-US" i="1" dirty="0"/>
+              <a:t>around</a:t>
+            </a:r>
+            <a:r>
+              <a:rPr lang="en-US" dirty="0"/>
+              <a:t> other behavior, e.g.</a:t>
             </a:r>
           </a:p>
           <a:p>
             <a:pPr lvl="1"/>
             <a:r>
-              <a:rPr lang="en-US" dirty="0" smtClean="0"/>
-              <a:t>Example of line processing with valid/invalid types, either[] and list comprehension</a:t>
+              <a:rPr lang="en-US" dirty="0"/>
+              <a:t>Closing files or database connections</a:t>
+            </a:r>
+          </a:p>
+          <a:p>
+            <a:endParaRPr lang="en-US" dirty="0"/>
+          </a:p>
+        </p:txBody>
+      </p:sp>
+      <p:sp>
+        <p:nvSpPr>
+          <p:cNvPr id="7" name="TextBox 6"/>
+          <p:cNvSpPr txBox="1"/>
+          <p:nvPr/>
+        </p:nvSpPr>
+        <p:spPr>
+          <a:xfrm>
+            <a:off x="609600" y="3357311"/>
+            <a:ext cx="7197436" cy="2062103"/>
+          </a:xfrm>
+          <a:prstGeom prst="rect">
+            <a:avLst/>
+          </a:prstGeom>
+          <a:solidFill>
+            <a:schemeClr val="accent1">
+              <a:lumMod val="20000"/>
+              <a:lumOff val="80000"/>
+            </a:schemeClr>
+          </a:solidFill>
+          <a:ln>
+            <a:solidFill>
+              <a:schemeClr val="tx1"/>
+            </a:solidFill>
+          </a:ln>
+          <a:effectLst>
+            <a:outerShdw blurRad="50800" dist="50800" dir="3240000" sx="101000" sy="101000" algn="ctr" rotWithShape="0">
+              <a:schemeClr val="accent1">
+                <a:lumMod val="75000"/>
+              </a:schemeClr>
+            </a:outerShdw>
+          </a:effectLst>
+        </p:spPr>
+        <p:txBody>
+          <a:bodyPr wrap="square" rtlCol="0">
+            <a:spAutoFit/>
+          </a:bodyPr>
+          <a:lstStyle/>
+          <a:p>
+            <a:r>
+              <a:rPr lang="en-US" sz="1600" dirty="0" err="1" smtClean="0">
+                <a:solidFill>
+                  <a:schemeClr val="accent2">
+                    <a:lumMod val="50000"/>
+                  </a:schemeClr>
+                </a:solidFill>
+                <a:latin typeface="Consolas" pitchFamily="49" charset="0"/>
+                <a:cs typeface="Consolas" pitchFamily="49" charset="0"/>
+              </a:rPr>
+              <a:t>def</a:t>
+            </a:r>
+            <a:r>
+              <a:rPr lang="en-US" sz="1600" dirty="0" smtClean="0">
+                <a:solidFill>
+                  <a:schemeClr val="accent2">
+                    <a:lumMod val="50000"/>
+                  </a:schemeClr>
+                </a:solidFill>
+                <a:latin typeface="Consolas" pitchFamily="49" charset="0"/>
+                <a:cs typeface="Consolas" pitchFamily="49" charset="0"/>
+              </a:rPr>
+              <a:t> </a:t>
+            </a:r>
+            <a:r>
+              <a:rPr lang="en-US" sz="1600" dirty="0" err="1" smtClean="0">
+                <a:solidFill>
+                  <a:schemeClr val="accent2">
+                    <a:lumMod val="50000"/>
+                  </a:schemeClr>
+                </a:solidFill>
+                <a:latin typeface="Consolas" pitchFamily="49" charset="0"/>
+                <a:cs typeface="Consolas" pitchFamily="49" charset="0"/>
+              </a:rPr>
+              <a:t>doWithWriter</a:t>
+            </a:r>
+            <a:r>
+              <a:rPr lang="en-US" sz="1600" dirty="0" smtClean="0">
+                <a:solidFill>
+                  <a:schemeClr val="accent2">
+                    <a:lumMod val="50000"/>
+                  </a:schemeClr>
+                </a:solidFill>
+                <a:latin typeface="Consolas" pitchFamily="49" charset="0"/>
+                <a:cs typeface="Consolas" pitchFamily="49" charset="0"/>
+              </a:rPr>
+              <a:t>(filename: String, f: </a:t>
+            </a:r>
+            <a:r>
+              <a:rPr lang="en-US" sz="1600" dirty="0" err="1" smtClean="0">
+                <a:solidFill>
+                  <a:schemeClr val="accent2">
+                    <a:lumMod val="50000"/>
+                  </a:schemeClr>
+                </a:solidFill>
+                <a:latin typeface="Consolas" pitchFamily="49" charset="0"/>
+                <a:cs typeface="Consolas" pitchFamily="49" charset="0"/>
+              </a:rPr>
+              <a:t>PrintWriter</a:t>
+            </a:r>
+            <a:r>
+              <a:rPr lang="en-US" sz="1600" dirty="0" smtClean="0">
+                <a:solidFill>
+                  <a:schemeClr val="accent2">
+                    <a:lumMod val="50000"/>
+                  </a:schemeClr>
+                </a:solidFill>
+                <a:latin typeface="Consolas" pitchFamily="49" charset="0"/>
+                <a:cs typeface="Consolas" pitchFamily="49" charset="0"/>
+              </a:rPr>
+              <a:t> =&gt; Any) = {</a:t>
+            </a:r>
+          </a:p>
+          <a:p>
+            <a:r>
+              <a:rPr lang="en-US" sz="1600" dirty="0" smtClean="0">
+                <a:solidFill>
+                  <a:schemeClr val="accent2">
+                    <a:lumMod val="50000"/>
+                  </a:schemeClr>
+                </a:solidFill>
+                <a:latin typeface="Consolas" pitchFamily="49" charset="0"/>
+                <a:cs typeface="Consolas" pitchFamily="49" charset="0"/>
+              </a:rPr>
+              <a:t>  </a:t>
+            </a:r>
+            <a:r>
+              <a:rPr lang="en-US" sz="1600" dirty="0" err="1" smtClean="0">
+                <a:solidFill>
+                  <a:schemeClr val="accent2">
+                    <a:lumMod val="50000"/>
+                  </a:schemeClr>
+                </a:solidFill>
+                <a:latin typeface="Consolas" pitchFamily="49" charset="0"/>
+                <a:cs typeface="Consolas" pitchFamily="49" charset="0"/>
+              </a:rPr>
+              <a:t>val</a:t>
+            </a:r>
+            <a:r>
+              <a:rPr lang="en-US" sz="1600" dirty="0" smtClean="0">
+                <a:solidFill>
+                  <a:schemeClr val="accent2">
+                    <a:lumMod val="50000"/>
+                  </a:schemeClr>
+                </a:solidFill>
+                <a:latin typeface="Consolas" pitchFamily="49" charset="0"/>
+                <a:cs typeface="Consolas" pitchFamily="49" charset="0"/>
+              </a:rPr>
+              <a:t> writer = new </a:t>
+            </a:r>
+            <a:r>
+              <a:rPr lang="en-US" sz="1600" dirty="0" err="1" smtClean="0">
+                <a:solidFill>
+                  <a:schemeClr val="accent2">
+                    <a:lumMod val="50000"/>
+                  </a:schemeClr>
+                </a:solidFill>
+                <a:latin typeface="Consolas" pitchFamily="49" charset="0"/>
+                <a:cs typeface="Consolas" pitchFamily="49" charset="0"/>
+              </a:rPr>
+              <a:t>PrintWriter</a:t>
+            </a:r>
+            <a:r>
+              <a:rPr lang="en-US" sz="1600" dirty="0" smtClean="0">
+                <a:solidFill>
+                  <a:schemeClr val="accent2">
+                    <a:lumMod val="50000"/>
+                  </a:schemeClr>
+                </a:solidFill>
+                <a:latin typeface="Consolas" pitchFamily="49" charset="0"/>
+                <a:cs typeface="Consolas" pitchFamily="49" charset="0"/>
+              </a:rPr>
+              <a:t>(new File(filename))</a:t>
+            </a:r>
+          </a:p>
+          <a:p>
+            <a:r>
+              <a:rPr lang="en-US" sz="1600" dirty="0">
+                <a:solidFill>
+                  <a:schemeClr val="accent2">
+                    <a:lumMod val="50000"/>
+                  </a:schemeClr>
+                </a:solidFill>
+                <a:latin typeface="Consolas" pitchFamily="49" charset="0"/>
+                <a:cs typeface="Consolas" pitchFamily="49" charset="0"/>
+              </a:rPr>
+              <a:t> </a:t>
+            </a:r>
+            <a:r>
+              <a:rPr lang="en-US" sz="1600" dirty="0" smtClean="0">
+                <a:solidFill>
+                  <a:schemeClr val="accent2">
+                    <a:lumMod val="50000"/>
+                  </a:schemeClr>
+                </a:solidFill>
+                <a:latin typeface="Consolas" pitchFamily="49" charset="0"/>
+                <a:cs typeface="Consolas" pitchFamily="49" charset="0"/>
+              </a:rPr>
+              <a:t> try {</a:t>
+            </a:r>
+          </a:p>
+          <a:p>
+            <a:r>
+              <a:rPr lang="en-US" sz="1600" dirty="0" smtClean="0">
+                <a:solidFill>
+                  <a:schemeClr val="accent2">
+                    <a:lumMod val="50000"/>
+                  </a:schemeClr>
+                </a:solidFill>
+                <a:latin typeface="Consolas" pitchFamily="49" charset="0"/>
+                <a:cs typeface="Consolas" pitchFamily="49" charset="0"/>
+              </a:rPr>
+              <a:t>    f(writer)    </a:t>
+            </a:r>
+            <a:r>
+              <a:rPr lang="en-US" sz="1600" dirty="0" smtClean="0">
+                <a:solidFill>
+                  <a:schemeClr val="accent5">
+                    <a:lumMod val="75000"/>
+                  </a:schemeClr>
+                </a:solidFill>
+                <a:latin typeface="Consolas" pitchFamily="49" charset="0"/>
+                <a:cs typeface="Consolas" pitchFamily="49" charset="0"/>
+              </a:rPr>
+              <a:t>//  f doesn’t open or close the file</a:t>
+            </a:r>
+            <a:endParaRPr lang="en-US" sz="1600" dirty="0">
+              <a:solidFill>
+                <a:schemeClr val="accent5">
+                  <a:lumMod val="75000"/>
+                </a:schemeClr>
+              </a:solidFill>
+              <a:latin typeface="Consolas" pitchFamily="49" charset="0"/>
+              <a:cs typeface="Consolas" pitchFamily="49" charset="0"/>
+            </a:endParaRPr>
+          </a:p>
+          <a:p>
+            <a:r>
+              <a:rPr lang="en-US" sz="1600" dirty="0" smtClean="0">
+                <a:solidFill>
+                  <a:schemeClr val="accent2">
+                    <a:lumMod val="50000"/>
+                  </a:schemeClr>
+                </a:solidFill>
+                <a:latin typeface="Consolas" pitchFamily="49" charset="0"/>
+                <a:cs typeface="Consolas" pitchFamily="49" charset="0"/>
+              </a:rPr>
+              <a:t>  } finally {</a:t>
+            </a:r>
+          </a:p>
+          <a:p>
+            <a:r>
+              <a:rPr lang="en-US" sz="1600" dirty="0" smtClean="0">
+                <a:solidFill>
+                  <a:schemeClr val="accent2">
+                    <a:lumMod val="50000"/>
+                  </a:schemeClr>
+                </a:solidFill>
+                <a:latin typeface="Consolas" pitchFamily="49" charset="0"/>
+                <a:cs typeface="Consolas" pitchFamily="49" charset="0"/>
+              </a:rPr>
+              <a:t>    </a:t>
+            </a:r>
+            <a:r>
+              <a:rPr lang="en-US" sz="1600" dirty="0" err="1" smtClean="0">
+                <a:solidFill>
+                  <a:schemeClr val="accent2">
+                    <a:lumMod val="50000"/>
+                  </a:schemeClr>
+                </a:solidFill>
+                <a:latin typeface="Consolas" pitchFamily="49" charset="0"/>
+                <a:cs typeface="Consolas" pitchFamily="49" charset="0"/>
+              </a:rPr>
+              <a:t>writer.close</a:t>
+            </a:r>
+            <a:endParaRPr lang="en-US" sz="1600" dirty="0">
+              <a:solidFill>
+                <a:schemeClr val="accent2">
+                  <a:lumMod val="50000"/>
+                </a:schemeClr>
+              </a:solidFill>
+              <a:latin typeface="Consolas" pitchFamily="49" charset="0"/>
+              <a:cs typeface="Consolas" pitchFamily="49" charset="0"/>
+            </a:endParaRPr>
+          </a:p>
+          <a:p>
+            <a:r>
+              <a:rPr lang="en-US" sz="1600" dirty="0" smtClean="0">
+                <a:solidFill>
+                  <a:schemeClr val="accent2">
+                    <a:lumMod val="50000"/>
+                  </a:schemeClr>
+                </a:solidFill>
+                <a:latin typeface="Consolas" pitchFamily="49" charset="0"/>
+                <a:cs typeface="Consolas" pitchFamily="49" charset="0"/>
+              </a:rPr>
+              <a:t>  }</a:t>
+            </a:r>
+            <a:endParaRPr lang="en-US" sz="1600" dirty="0">
+              <a:solidFill>
+                <a:schemeClr val="accent2">
+                  <a:lumMod val="50000"/>
+                </a:schemeClr>
+              </a:solidFill>
+              <a:latin typeface="Consolas" pitchFamily="49" charset="0"/>
+              <a:cs typeface="Consolas" pitchFamily="49" charset="0"/>
+            </a:endParaRPr>
+          </a:p>
+          <a:p>
+            <a:r>
+              <a:rPr lang="en-US" sz="1600" dirty="0" smtClean="0">
+                <a:solidFill>
+                  <a:schemeClr val="accent2">
+                    <a:lumMod val="50000"/>
+                  </a:schemeClr>
+                </a:solidFill>
+                <a:latin typeface="Consolas" pitchFamily="49" charset="0"/>
+                <a:cs typeface="Consolas" pitchFamily="49" charset="0"/>
+              </a:rPr>
+              <a:t>}</a:t>
+            </a:r>
+            <a:endParaRPr lang="en-US" sz="1600" dirty="0" smtClean="0">
+              <a:solidFill>
+                <a:schemeClr val="accent5">
+                  <a:lumMod val="75000"/>
+                </a:schemeClr>
+              </a:solidFill>
+              <a:latin typeface="Consolas" pitchFamily="49" charset="0"/>
+              <a:cs typeface="Consolas" pitchFamily="49" charset="0"/>
+            </a:endParaRPr>
+          </a:p>
+        </p:txBody>
+      </p:sp>
+      <p:sp>
+        <p:nvSpPr>
+          <p:cNvPr id="8" name="TextBox 7"/>
+          <p:cNvSpPr txBox="1"/>
+          <p:nvPr/>
+        </p:nvSpPr>
+        <p:spPr>
+          <a:xfrm>
+            <a:off x="609600" y="2971800"/>
+            <a:ext cx="7197436" cy="369332"/>
+          </a:xfrm>
+          <a:prstGeom prst="rect">
+            <a:avLst/>
+          </a:prstGeom>
+          <a:solidFill>
+            <a:schemeClr val="accent2">
+              <a:lumMod val="50000"/>
+            </a:schemeClr>
+          </a:solidFill>
+        </p:spPr>
+        <p:txBody>
+          <a:bodyPr wrap="square" rtlCol="0">
+            <a:spAutoFit/>
+          </a:bodyPr>
+          <a:lstStyle/>
+          <a:p>
+            <a:r>
+              <a:rPr lang="en-US" dirty="0" err="1" smtClean="0">
+                <a:solidFill>
+                  <a:schemeClr val="bg1"/>
+                </a:solidFill>
+                <a:latin typeface="Consolas" pitchFamily="49" charset="0"/>
+                <a:cs typeface="Consolas" pitchFamily="49" charset="0"/>
+              </a:rPr>
+              <a:t>Scala</a:t>
+            </a:r>
+            <a:endParaRPr lang="en-US" dirty="0">
+              <a:solidFill>
+                <a:schemeClr val="bg1"/>
+              </a:solidFill>
+              <a:latin typeface="Consolas" pitchFamily="49" charset="0"/>
+              <a:cs typeface="Consolas" pitchFamily="49" charset="0"/>
+            </a:endParaRPr>
+          </a:p>
+        </p:txBody>
+      </p:sp>
+      <p:sp>
+        <p:nvSpPr>
+          <p:cNvPr id="9" name="Content Placeholder 5"/>
+          <p:cNvSpPr txBox="1">
+            <a:spLocks/>
+          </p:cNvSpPr>
+          <p:nvPr/>
+        </p:nvSpPr>
+        <p:spPr>
+          <a:xfrm>
+            <a:off x="304800" y="5562600"/>
+            <a:ext cx="7620000" cy="1009050"/>
+          </a:xfrm>
+          <a:prstGeom prst="rect">
+            <a:avLst/>
+          </a:prstGeom>
+        </p:spPr>
+        <p:txBody>
+          <a:bodyPr vert="horz" lIns="91440" tIns="45720" rIns="91440" bIns="45720" rtlCol="0">
+            <a:normAutofit/>
+          </a:bodyPr>
+          <a:lstStyle>
+            <a:lvl1pPr marL="342900" indent="-228600" algn="l" defTabSz="914400" rtl="0" eaLnBrk="1" latinLnBrk="0" hangingPunct="1">
+              <a:spcBef>
+                <a:spcPct val="20000"/>
+              </a:spcBef>
+              <a:buClr>
+                <a:schemeClr val="accent1"/>
+              </a:buClr>
+              <a:buFont typeface="Arial" pitchFamily="34" charset="0"/>
+              <a:buChar char="•"/>
+              <a:defRPr sz="2200" kern="1200">
+                <a:solidFill>
+                  <a:schemeClr val="tx1"/>
+                </a:solidFill>
+                <a:latin typeface="+mn-lt"/>
+                <a:ea typeface="+mn-ea"/>
+                <a:cs typeface="+mn-cs"/>
+              </a:defRPr>
+            </a:lvl1pPr>
+            <a:lvl2pPr marL="640080" indent="-228600" algn="l" defTabSz="914400" rtl="0" eaLnBrk="1" latinLnBrk="0" hangingPunct="1">
+              <a:spcBef>
+                <a:spcPct val="20000"/>
+              </a:spcBef>
+              <a:buClr>
+                <a:schemeClr val="accent2"/>
+              </a:buClr>
+              <a:buFont typeface="Arial" pitchFamily="34" charset="0"/>
+              <a:buChar char="•"/>
+              <a:defRPr sz="2000" kern="1200">
+                <a:solidFill>
+                  <a:schemeClr val="tx1"/>
+                </a:solidFill>
+                <a:latin typeface="+mn-lt"/>
+                <a:ea typeface="+mn-ea"/>
+                <a:cs typeface="+mn-cs"/>
+              </a:defRPr>
+            </a:lvl2pPr>
+            <a:lvl3pPr marL="1005840" indent="-228600" algn="l" defTabSz="914400" rtl="0" eaLnBrk="1" latinLnBrk="0" hangingPunct="1">
+              <a:spcBef>
+                <a:spcPct val="20000"/>
+              </a:spcBef>
+              <a:buClr>
+                <a:schemeClr val="accent3"/>
+              </a:buClr>
+              <a:buFont typeface="Arial" pitchFamily="34" charset="0"/>
+              <a:buChar char="•"/>
+              <a:defRPr sz="1800" kern="1200">
+                <a:solidFill>
+                  <a:schemeClr val="tx1"/>
+                </a:solidFill>
+                <a:latin typeface="+mn-lt"/>
+                <a:ea typeface="+mn-ea"/>
+                <a:cs typeface="+mn-cs"/>
+              </a:defRPr>
+            </a:lvl3pPr>
+            <a:lvl4pPr marL="1280160" indent="-228600" algn="l" defTabSz="914400" rtl="0" eaLnBrk="1" latinLnBrk="0" hangingPunct="1">
+              <a:spcBef>
+                <a:spcPct val="20000"/>
+              </a:spcBef>
+              <a:buClr>
+                <a:schemeClr val="accent4"/>
+              </a:buClr>
+              <a:buFont typeface="Arial" pitchFamily="34" charset="0"/>
+              <a:buChar char="•"/>
+              <a:defRPr sz="1600" kern="1200">
+                <a:solidFill>
+                  <a:schemeClr val="tx1"/>
+                </a:solidFill>
+                <a:latin typeface="+mn-lt"/>
+                <a:ea typeface="+mn-ea"/>
+                <a:cs typeface="+mn-cs"/>
+              </a:defRPr>
+            </a:lvl4pPr>
+            <a:lvl5pPr marL="1554480" indent="-228600" algn="l" defTabSz="914400" rtl="0" eaLnBrk="1" latinLnBrk="0" hangingPunct="1">
+              <a:spcBef>
+                <a:spcPct val="20000"/>
+              </a:spcBef>
+              <a:buClr>
+                <a:schemeClr val="accent5"/>
+              </a:buClr>
+              <a:buFont typeface="Arial" pitchFamily="34" charset="0"/>
+              <a:buChar char="•"/>
+              <a:defRPr sz="1400" kern="1200" baseline="0">
+                <a:solidFill>
+                  <a:schemeClr val="tx1"/>
+                </a:solidFill>
+                <a:latin typeface="+mn-lt"/>
+                <a:ea typeface="+mn-ea"/>
+                <a:cs typeface="+mn-cs"/>
+              </a:defRPr>
+            </a:lvl5pPr>
+            <a:lvl6pPr marL="1737360" indent="-182880" algn="l" defTabSz="914400" rtl="0" eaLnBrk="1" latinLnBrk="0" hangingPunct="1">
+              <a:spcBef>
+                <a:spcPct val="20000"/>
+              </a:spcBef>
+              <a:buClr>
+                <a:schemeClr val="accent1"/>
+              </a:buClr>
+              <a:buFont typeface="Arial" pitchFamily="34" charset="0"/>
+              <a:buChar char="•"/>
+              <a:defRPr sz="1400" kern="1200" baseline="0">
+                <a:solidFill>
+                  <a:schemeClr val="tx1"/>
+                </a:solidFill>
+                <a:latin typeface="+mn-lt"/>
+                <a:ea typeface="+mn-ea"/>
+                <a:cs typeface="+mn-cs"/>
+              </a:defRPr>
+            </a:lvl6pPr>
+            <a:lvl7pPr marL="1920240" indent="-182880" algn="l" defTabSz="914400" rtl="0" eaLnBrk="1" latinLnBrk="0" hangingPunct="1">
+              <a:spcBef>
+                <a:spcPct val="20000"/>
+              </a:spcBef>
+              <a:buClr>
+                <a:schemeClr val="accent2"/>
+              </a:buClr>
+              <a:buFont typeface="Arial" pitchFamily="34" charset="0"/>
+              <a:buChar char="•"/>
+              <a:defRPr sz="1400" kern="1200">
+                <a:solidFill>
+                  <a:schemeClr val="tx1"/>
+                </a:solidFill>
+                <a:latin typeface="+mn-lt"/>
+                <a:ea typeface="+mn-ea"/>
+                <a:cs typeface="+mn-cs"/>
+              </a:defRPr>
+            </a:lvl7pPr>
+            <a:lvl8pPr marL="2103120" indent="-182880" algn="l" defTabSz="914400" rtl="0" eaLnBrk="1" latinLnBrk="0" hangingPunct="1">
+              <a:spcBef>
+                <a:spcPct val="20000"/>
+              </a:spcBef>
+              <a:buClr>
+                <a:schemeClr val="accent3"/>
+              </a:buClr>
+              <a:buFont typeface="Arial" pitchFamily="34" charset="0"/>
+              <a:buChar char="•"/>
+              <a:defRPr sz="1400" kern="1200">
+                <a:solidFill>
+                  <a:schemeClr val="tx1"/>
+                </a:solidFill>
+                <a:latin typeface="+mn-lt"/>
+                <a:ea typeface="+mn-ea"/>
+                <a:cs typeface="+mn-cs"/>
+              </a:defRPr>
+            </a:lvl8pPr>
+            <a:lvl9pPr marL="2286000" indent="-182880" algn="l" defTabSz="914400" rtl="0" eaLnBrk="1" latinLnBrk="0" hangingPunct="1">
+              <a:spcBef>
+                <a:spcPct val="20000"/>
+              </a:spcBef>
+              <a:buClr>
+                <a:schemeClr val="accent4"/>
+              </a:buClr>
+              <a:buFont typeface="Arial" pitchFamily="34" charset="0"/>
+              <a:buChar char="•"/>
+              <a:defRPr sz="1400" kern="1200">
+                <a:solidFill>
+                  <a:schemeClr val="tx1"/>
+                </a:solidFill>
+                <a:latin typeface="+mn-lt"/>
+                <a:ea typeface="+mn-ea"/>
+                <a:cs typeface="+mn-cs"/>
+              </a:defRPr>
+            </a:lvl9pPr>
+          </a:lstStyle>
+          <a:p>
+            <a:r>
+              <a:rPr lang="en-US" dirty="0" smtClean="0"/>
+              <a:t>Also useful for other cross-cutting concerns like transactions, benchmarking, logging, etc.</a:t>
             </a:r>
             <a:endParaRPr lang="en-US" dirty="0"/>
           </a:p>
@@ -8124,7 +9328,7 @@
     </p:spTree>
     <p:extLst>
       <p:ext uri="{BB962C8B-B14F-4D97-AF65-F5344CB8AC3E}">
-        <p14:creationId xmlns:p14="http://schemas.microsoft.com/office/powerpoint/2010/main" val="2184790991"/>
+        <p14:creationId xmlns:p14="http://schemas.microsoft.com/office/powerpoint/2010/main" val="2957548083"/>
       </p:ext>
     </p:extLst>
   </p:cSld>
@@ -8168,7 +9372,7 @@
           <a:p>
             <a:r>
               <a:rPr lang="en-US" dirty="0" smtClean="0"/>
-              <a:t>Declarative Programming</a:t>
+              <a:t>Closures</a:t>
             </a:r>
             <a:endParaRPr lang="en-US" dirty="0"/>
           </a:p>
@@ -8196,7 +9400,7 @@
     </p:spTree>
     <p:extLst>
       <p:ext uri="{BB962C8B-B14F-4D97-AF65-F5344CB8AC3E}">
-        <p14:creationId xmlns:p14="http://schemas.microsoft.com/office/powerpoint/2010/main" val="3220380213"/>
+        <p14:creationId xmlns:p14="http://schemas.microsoft.com/office/powerpoint/2010/main" val="4045539791"/>
       </p:ext>
     </p:extLst>
   </p:cSld>
@@ -8240,7 +9444,7 @@
           <a:p>
             <a:r>
               <a:rPr lang="en-US" dirty="0" smtClean="0"/>
-              <a:t>Lazy Evaluation</a:t>
+              <a:t>List Comprehensions</a:t>
             </a:r>
             <a:endParaRPr lang="en-US" dirty="0"/>
           </a:p>
@@ -8261,14 +9465,14 @@
           <a:bodyPr/>
           <a:lstStyle/>
           <a:p>
-            <a:endParaRPr lang="en-US"/>
+            <a:endParaRPr lang="en-US" dirty="0"/>
           </a:p>
         </p:txBody>
       </p:sp>
     </p:spTree>
     <p:extLst>
       <p:ext uri="{BB962C8B-B14F-4D97-AF65-F5344CB8AC3E}">
-        <p14:creationId xmlns:p14="http://schemas.microsoft.com/office/powerpoint/2010/main" val="1094933596"/>
+        <p14:creationId xmlns:p14="http://schemas.microsoft.com/office/powerpoint/2010/main" val="292100415"/>
       </p:ext>
     </p:extLst>
   </p:cSld>
@@ -8312,7 +9516,7 @@
           <a:p>
             <a:r>
               <a:rPr lang="en-US" dirty="0" smtClean="0"/>
-              <a:t>Composition</a:t>
+              <a:t>Pattern Matching</a:t>
             </a:r>
             <a:endParaRPr lang="en-US" dirty="0"/>
           </a:p>
@@ -8333,14 +9537,37 @@
           <a:bodyPr/>
           <a:lstStyle/>
           <a:p>
-            <a:endParaRPr lang="en-US"/>
+            <a:r>
+              <a:rPr lang="en-US" dirty="0" smtClean="0"/>
+              <a:t>Examples</a:t>
+            </a:r>
+          </a:p>
+          <a:p>
+            <a:r>
+              <a:rPr lang="en-US" dirty="0" smtClean="0"/>
+              <a:t>Algebraic Data Types</a:t>
+            </a:r>
+          </a:p>
+          <a:p>
+            <a:r>
+              <a:rPr lang="en-US" dirty="0" smtClean="0"/>
+              <a:t>Examples of using types as ‘cases’ / polymorphism on values</a:t>
+            </a:r>
+          </a:p>
+          <a:p>
+            <a:pPr lvl="1"/>
+            <a:r>
+              <a:rPr lang="en-US" dirty="0" smtClean="0"/>
+              <a:t>Example of line processing with valid/invalid types, either[] and list comprehension</a:t>
+            </a:r>
+            <a:endParaRPr lang="en-US" dirty="0"/>
           </a:p>
         </p:txBody>
       </p:sp>
     </p:spTree>
     <p:extLst>
       <p:ext uri="{BB962C8B-B14F-4D97-AF65-F5344CB8AC3E}">
-        <p14:creationId xmlns:p14="http://schemas.microsoft.com/office/powerpoint/2010/main" val="4258554683"/>
+        <p14:creationId xmlns:p14="http://schemas.microsoft.com/office/powerpoint/2010/main" val="2184790991"/>
       </p:ext>
     </p:extLst>
   </p:cSld>
@@ -8377,21 +9604,16 @@
             <p:ph type="title"/>
           </p:nvPr>
         </p:nvSpPr>
-        <p:spPr>
-          <a:xfrm>
-            <a:off x="457200" y="274638"/>
-            <a:ext cx="7620000" cy="944562"/>
-          </a:xfrm>
-        </p:spPr>
+        <p:spPr/>
         <p:txBody>
           <a:bodyPr/>
           <a:lstStyle/>
           <a:p>
             <a:r>
-              <a:rPr lang="en-US" sz="4000" dirty="0" smtClean="0"/>
-              <a:t>Partial Application &amp; Currying</a:t>
-            </a:r>
-            <a:endParaRPr lang="en-US" sz="4000" dirty="0"/>
+              <a:rPr lang="en-US" dirty="0" smtClean="0"/>
+              <a:t>Declarative Programming</a:t>
+            </a:r>
+            <a:endParaRPr lang="en-US" dirty="0"/>
           </a:p>
         </p:txBody>
       </p:sp>
@@ -8405,24 +9627,19 @@
             <p:ph idx="1"/>
           </p:nvPr>
         </p:nvSpPr>
-        <p:spPr>
-          <a:xfrm>
-            <a:off x="457200" y="1371600"/>
-            <a:ext cx="7620000" cy="5029200"/>
-          </a:xfrm>
-        </p:spPr>
+        <p:spPr/>
         <p:txBody>
           <a:bodyPr/>
           <a:lstStyle/>
           <a:p>
-            <a:endParaRPr lang="en-US" dirty="0"/>
+            <a:endParaRPr lang="en-US"/>
           </a:p>
         </p:txBody>
       </p:sp>
     </p:spTree>
     <p:extLst>
       <p:ext uri="{BB962C8B-B14F-4D97-AF65-F5344CB8AC3E}">
-        <p14:creationId xmlns:p14="http://schemas.microsoft.com/office/powerpoint/2010/main" val="559379232"/>
+        <p14:creationId xmlns:p14="http://schemas.microsoft.com/office/powerpoint/2010/main" val="3220380213"/>
       </p:ext>
     </p:extLst>
   </p:cSld>
@@ -8466,7 +9683,7 @@
           <a:p>
             <a:r>
               <a:rPr lang="en-US" dirty="0" smtClean="0"/>
-              <a:t>Complexity</a:t>
+              <a:t>Lazy Evaluation</a:t>
             </a:r>
             <a:endParaRPr lang="en-US" dirty="0"/>
           </a:p>
@@ -8487,42 +9704,14 @@
           <a:bodyPr/>
           <a:lstStyle/>
           <a:p>
-            <a:r>
-              <a:rPr lang="en-US" dirty="0" smtClean="0"/>
-              <a:t>Example: Shared state as complexity</a:t>
-            </a:r>
-          </a:p>
-          <a:p>
-            <a:r>
-              <a:rPr lang="en-US" dirty="0" smtClean="0"/>
-              <a:t>Example: Mutable state as complexity</a:t>
-            </a:r>
-          </a:p>
-          <a:p>
-            <a:r>
-              <a:rPr lang="en-US" dirty="0" smtClean="0"/>
-              <a:t>Example: Non-determinism as complexity</a:t>
-            </a:r>
-          </a:p>
-          <a:p>
-            <a:r>
-              <a:rPr lang="en-US" dirty="0" smtClean="0"/>
-              <a:t>Example: Side-effects as complexity</a:t>
-            </a:r>
-          </a:p>
-          <a:p>
-            <a:r>
-              <a:rPr lang="en-US" dirty="0" smtClean="0"/>
-              <a:t>Example: Sequencing as complexity</a:t>
-            </a:r>
-            <a:endParaRPr lang="en-US" dirty="0"/>
+            <a:endParaRPr lang="en-US"/>
           </a:p>
         </p:txBody>
       </p:sp>
     </p:spTree>
     <p:extLst>
       <p:ext uri="{BB962C8B-B14F-4D97-AF65-F5344CB8AC3E}">
-        <p14:creationId xmlns:p14="http://schemas.microsoft.com/office/powerpoint/2010/main" val="3233297951"/>
+        <p14:creationId xmlns:p14="http://schemas.microsoft.com/office/powerpoint/2010/main" val="1094933596"/>
       </p:ext>
     </p:extLst>
   </p:cSld>
@@ -8566,7 +9755,7 @@
           <a:p>
             <a:r>
               <a:rPr lang="en-US" dirty="0" smtClean="0"/>
-              <a:t>What’s in Java 8</a:t>
+              <a:t>Composition</a:t>
             </a:r>
             <a:endParaRPr lang="en-US" dirty="0"/>
           </a:p>
@@ -8594,7 +9783,7 @@
     </p:spTree>
     <p:extLst>
       <p:ext uri="{BB962C8B-B14F-4D97-AF65-F5344CB8AC3E}">
-        <p14:creationId xmlns:p14="http://schemas.microsoft.com/office/powerpoint/2010/main" val="3713724773"/>
+        <p14:creationId xmlns:p14="http://schemas.microsoft.com/office/powerpoint/2010/main" val="4258554683"/>
       </p:ext>
     </p:extLst>
   </p:cSld>
@@ -8962,14 +10151,19 @@
             <p:ph type="title"/>
           </p:nvPr>
         </p:nvSpPr>
-        <p:spPr/>
+        <p:spPr>
+          <a:xfrm>
+            <a:off x="457200" y="274638"/>
+            <a:ext cx="7620000" cy="944562"/>
+          </a:xfrm>
+        </p:spPr>
         <p:txBody>
           <a:bodyPr/>
           <a:lstStyle/>
           <a:p>
             <a:r>
               <a:rPr lang="en-US" sz="4000" dirty="0" smtClean="0"/>
-              <a:t>Functional Languages on the JVM</a:t>
+              <a:t>Partial Application &amp; Currying</a:t>
             </a:r>
             <a:endParaRPr lang="en-US" sz="4000" dirty="0"/>
           </a:p>
@@ -8985,7 +10179,12 @@
             <p:ph idx="1"/>
           </p:nvPr>
         </p:nvSpPr>
-        <p:spPr/>
+        <p:spPr>
+          <a:xfrm>
+            <a:off x="457200" y="1371600"/>
+            <a:ext cx="7620000" cy="5029200"/>
+          </a:xfrm>
+        </p:spPr>
         <p:txBody>
           <a:bodyPr/>
           <a:lstStyle/>
@@ -8997,7 +10196,7 @@
     </p:spTree>
     <p:extLst>
       <p:ext uri="{BB962C8B-B14F-4D97-AF65-F5344CB8AC3E}">
-        <p14:creationId xmlns:p14="http://schemas.microsoft.com/office/powerpoint/2010/main" val="1949244033"/>
+        <p14:creationId xmlns:p14="http://schemas.microsoft.com/office/powerpoint/2010/main" val="559379232"/>
       </p:ext>
     </p:extLst>
   </p:cSld>
@@ -9041,7 +10240,7 @@
           <a:p>
             <a:r>
               <a:rPr lang="en-US" dirty="0" smtClean="0"/>
-              <a:t>Related, Interesting Topics</a:t>
+              <a:t>Complexity</a:t>
             </a:r>
             <a:endParaRPr lang="en-US" dirty="0"/>
           </a:p>
@@ -9062,49 +10261,42 @@
           <a:bodyPr/>
           <a:lstStyle/>
           <a:p>
-            <a:endParaRPr lang="en-US" dirty="0" smtClean="0"/>
-          </a:p>
-          <a:p>
-            <a:pPr lvl="1"/>
-            <a:r>
-              <a:rPr lang="en-US" dirty="0" smtClean="0"/>
-              <a:t>Non-Von Neumann computer architectures</a:t>
-            </a:r>
-          </a:p>
-          <a:p>
-            <a:pPr lvl="1"/>
-            <a:r>
-              <a:rPr lang="en-US" dirty="0" smtClean="0"/>
-              <a:t>Lambda calculus</a:t>
-            </a:r>
-          </a:p>
-          <a:p>
-            <a:pPr lvl="1"/>
-            <a:r>
-              <a:rPr lang="en-US" dirty="0" smtClean="0"/>
-              <a:t>Applying functional thinking outside your program</a:t>
-            </a:r>
-          </a:p>
-          <a:p>
-            <a:pPr lvl="1"/>
-            <a:r>
-              <a:rPr lang="en-US" dirty="0" smtClean="0"/>
-              <a:t>Logic programming</a:t>
-            </a:r>
-          </a:p>
-          <a:p>
-            <a:pPr lvl="1"/>
-            <a:endParaRPr lang="en-US" dirty="0" smtClean="0"/>
-          </a:p>
-          <a:p>
-            <a:endParaRPr lang="en-US" dirty="0" smtClean="0"/>
+            <a:r>
+              <a:rPr lang="en-US" dirty="0" smtClean="0"/>
+              <a:t>Example: Shared state as complexity</a:t>
+            </a:r>
+          </a:p>
+          <a:p>
+            <a:r>
+              <a:rPr lang="en-US" dirty="0" smtClean="0"/>
+              <a:t>Example: Mutable state as complexity</a:t>
+            </a:r>
+          </a:p>
+          <a:p>
+            <a:r>
+              <a:rPr lang="en-US" dirty="0" smtClean="0"/>
+              <a:t>Example: Non-determinism as complexity</a:t>
+            </a:r>
+          </a:p>
+          <a:p>
+            <a:r>
+              <a:rPr lang="en-US" dirty="0" smtClean="0"/>
+              <a:t>Example: Side-effects as complexity</a:t>
+            </a:r>
+          </a:p>
+          <a:p>
+            <a:r>
+              <a:rPr lang="en-US" dirty="0" smtClean="0"/>
+              <a:t>Example: Sequencing as complexity</a:t>
+            </a:r>
+            <a:endParaRPr lang="en-US" dirty="0"/>
           </a:p>
         </p:txBody>
       </p:sp>
     </p:spTree>
     <p:extLst>
       <p:ext uri="{BB962C8B-B14F-4D97-AF65-F5344CB8AC3E}">
-        <p14:creationId xmlns:p14="http://schemas.microsoft.com/office/powerpoint/2010/main" val="4057990024"/>
+        <p14:creationId xmlns:p14="http://schemas.microsoft.com/office/powerpoint/2010/main" val="3233297951"/>
       </p:ext>
     </p:extLst>
   </p:cSld>
@@ -9147,6 +10339,351 @@
           <a:lstStyle/>
           <a:p>
             <a:r>
+              <a:rPr lang="en-US" sz="4000" dirty="0" smtClean="0"/>
+              <a:t>Functional Languages on the JVM</a:t>
+            </a:r>
+            <a:endParaRPr lang="en-US" sz="4000" dirty="0"/>
+          </a:p>
+        </p:txBody>
+      </p:sp>
+      <p:sp>
+        <p:nvSpPr>
+          <p:cNvPr id="3" name="Content Placeholder 2"/>
+          <p:cNvSpPr>
+            <a:spLocks noGrp="1"/>
+          </p:cNvSpPr>
+          <p:nvPr>
+            <p:ph idx="1"/>
+          </p:nvPr>
+        </p:nvSpPr>
+        <p:spPr/>
+        <p:txBody>
+          <a:bodyPr/>
+          <a:lstStyle/>
+          <a:p>
+            <a:endParaRPr lang="en-US" dirty="0"/>
+          </a:p>
+        </p:txBody>
+      </p:sp>
+    </p:spTree>
+    <p:extLst>
+      <p:ext uri="{BB962C8B-B14F-4D97-AF65-F5344CB8AC3E}">
+        <p14:creationId xmlns:p14="http://schemas.microsoft.com/office/powerpoint/2010/main" val="1949244033"/>
+      </p:ext>
+    </p:extLst>
+  </p:cSld>
+  <p:clrMapOvr>
+    <a:masterClrMapping/>
+  </p:clrMapOvr>
+</p:sld>
+</file>
+
+<file path=ppt/slides/slide33.xml><?xml version="1.0" encoding="utf-8"?>
+<p:sld xmlns:a="http://schemas.openxmlformats.org/drawingml/2006/main" xmlns:r="http://schemas.openxmlformats.org/officeDocument/2006/relationships" xmlns:p="http://schemas.openxmlformats.org/presentationml/2006/main">
+  <p:cSld>
+    <p:spTree>
+      <p:nvGrpSpPr>
+        <p:cNvPr id="1" name=""/>
+        <p:cNvGrpSpPr/>
+        <p:nvPr/>
+      </p:nvGrpSpPr>
+      <p:grpSpPr>
+        <a:xfrm>
+          <a:off x="0" y="0"/>
+          <a:ext cx="0" cy="0"/>
+          <a:chOff x="0" y="0"/>
+          <a:chExt cx="0" cy="0"/>
+        </a:xfrm>
+      </p:grpSpPr>
+      <p:sp>
+        <p:nvSpPr>
+          <p:cNvPr id="2" name="Title 1"/>
+          <p:cNvSpPr>
+            <a:spLocks noGrp="1"/>
+          </p:cNvSpPr>
+          <p:nvPr>
+            <p:ph type="title"/>
+          </p:nvPr>
+        </p:nvSpPr>
+        <p:spPr/>
+        <p:txBody>
+          <a:bodyPr/>
+          <a:lstStyle/>
+          <a:p>
+            <a:r>
+              <a:rPr lang="en-US" dirty="0" smtClean="0"/>
+              <a:t>What’s in Java 8</a:t>
+            </a:r>
+            <a:endParaRPr lang="en-US" dirty="0"/>
+          </a:p>
+        </p:txBody>
+      </p:sp>
+      <p:sp>
+        <p:nvSpPr>
+          <p:cNvPr id="3" name="Content Placeholder 2"/>
+          <p:cNvSpPr>
+            <a:spLocks noGrp="1"/>
+          </p:cNvSpPr>
+          <p:nvPr>
+            <p:ph idx="1"/>
+          </p:nvPr>
+        </p:nvSpPr>
+        <p:spPr/>
+        <p:txBody>
+          <a:bodyPr/>
+          <a:lstStyle/>
+          <a:p>
+            <a:endParaRPr lang="en-US"/>
+          </a:p>
+        </p:txBody>
+      </p:sp>
+    </p:spTree>
+    <p:extLst>
+      <p:ext uri="{BB962C8B-B14F-4D97-AF65-F5344CB8AC3E}">
+        <p14:creationId xmlns:p14="http://schemas.microsoft.com/office/powerpoint/2010/main" val="3713724773"/>
+      </p:ext>
+    </p:extLst>
+  </p:cSld>
+  <p:clrMapOvr>
+    <a:masterClrMapping/>
+  </p:clrMapOvr>
+</p:sld>
+</file>
+
+<file path=ppt/slides/slide34.xml><?xml version="1.0" encoding="utf-8"?>
+<p:sld xmlns:a="http://schemas.openxmlformats.org/drawingml/2006/main" xmlns:r="http://schemas.openxmlformats.org/officeDocument/2006/relationships" xmlns:p="http://schemas.openxmlformats.org/presentationml/2006/main">
+  <p:cSld>
+    <p:spTree>
+      <p:nvGrpSpPr>
+        <p:cNvPr id="1" name=""/>
+        <p:cNvGrpSpPr/>
+        <p:nvPr/>
+      </p:nvGrpSpPr>
+      <p:grpSpPr>
+        <a:xfrm>
+          <a:off x="0" y="0"/>
+          <a:ext cx="0" cy="0"/>
+          <a:chOff x="0" y="0"/>
+          <a:chExt cx="0" cy="0"/>
+        </a:xfrm>
+      </p:grpSpPr>
+      <p:sp>
+        <p:nvSpPr>
+          <p:cNvPr id="2" name="Title 1"/>
+          <p:cNvSpPr>
+            <a:spLocks noGrp="1"/>
+          </p:cNvSpPr>
+          <p:nvPr>
+            <p:ph type="title"/>
+          </p:nvPr>
+        </p:nvSpPr>
+        <p:spPr/>
+        <p:txBody>
+          <a:bodyPr/>
+          <a:lstStyle/>
+          <a:p>
+            <a:r>
+              <a:rPr lang="en-US" dirty="0" smtClean="0"/>
+              <a:t>Haskell</a:t>
+            </a:r>
+            <a:endParaRPr lang="en-US" dirty="0"/>
+          </a:p>
+        </p:txBody>
+      </p:sp>
+      <p:sp>
+        <p:nvSpPr>
+          <p:cNvPr id="3" name="Content Placeholder 2"/>
+          <p:cNvSpPr>
+            <a:spLocks noGrp="1"/>
+          </p:cNvSpPr>
+          <p:nvPr>
+            <p:ph idx="1"/>
+          </p:nvPr>
+        </p:nvSpPr>
+        <p:spPr/>
+        <p:txBody>
+          <a:bodyPr/>
+          <a:lstStyle/>
+          <a:p>
+            <a:r>
+              <a:rPr lang="en-US" dirty="0" smtClean="0"/>
+              <a:t>Info from language comparison</a:t>
+            </a:r>
+          </a:p>
+          <a:p>
+            <a:r>
+              <a:rPr lang="en-US" dirty="0" smtClean="0"/>
+              <a:t>Info on Haskell Curry</a:t>
+            </a:r>
+          </a:p>
+          <a:p>
+            <a:r>
+              <a:rPr lang="en-US" dirty="0" smtClean="0"/>
+              <a:t>Compare syntax to other examples</a:t>
+            </a:r>
+          </a:p>
+          <a:p>
+            <a:r>
+              <a:rPr lang="en-US" dirty="0" smtClean="0"/>
+              <a:t>Info on Curry-Howard isomorphism</a:t>
+            </a:r>
+            <a:endParaRPr lang="en-US" dirty="0"/>
+          </a:p>
+        </p:txBody>
+      </p:sp>
+    </p:spTree>
+    <p:extLst>
+      <p:ext uri="{BB962C8B-B14F-4D97-AF65-F5344CB8AC3E}">
+        <p14:creationId xmlns:p14="http://schemas.microsoft.com/office/powerpoint/2010/main" val="685334381"/>
+      </p:ext>
+    </p:extLst>
+  </p:cSld>
+  <p:clrMapOvr>
+    <a:masterClrMapping/>
+  </p:clrMapOvr>
+</p:sld>
+</file>
+
+<file path=ppt/slides/slide35.xml><?xml version="1.0" encoding="utf-8"?>
+<p:sld xmlns:a="http://schemas.openxmlformats.org/drawingml/2006/main" xmlns:r="http://schemas.openxmlformats.org/officeDocument/2006/relationships" xmlns:p="http://schemas.openxmlformats.org/presentationml/2006/main">
+  <p:cSld>
+    <p:spTree>
+      <p:nvGrpSpPr>
+        <p:cNvPr id="1" name=""/>
+        <p:cNvGrpSpPr/>
+        <p:nvPr/>
+      </p:nvGrpSpPr>
+      <p:grpSpPr>
+        <a:xfrm>
+          <a:off x="0" y="0"/>
+          <a:ext cx="0" cy="0"/>
+          <a:chOff x="0" y="0"/>
+          <a:chExt cx="0" cy="0"/>
+        </a:xfrm>
+      </p:grpSpPr>
+      <p:sp>
+        <p:nvSpPr>
+          <p:cNvPr id="2" name="Title 1"/>
+          <p:cNvSpPr>
+            <a:spLocks noGrp="1"/>
+          </p:cNvSpPr>
+          <p:nvPr>
+            <p:ph type="title"/>
+          </p:nvPr>
+        </p:nvSpPr>
+        <p:spPr/>
+        <p:txBody>
+          <a:bodyPr/>
+          <a:lstStyle/>
+          <a:p>
+            <a:r>
+              <a:rPr lang="en-US" dirty="0" smtClean="0"/>
+              <a:t>Related, Interesting Topics</a:t>
+            </a:r>
+            <a:endParaRPr lang="en-US" dirty="0"/>
+          </a:p>
+        </p:txBody>
+      </p:sp>
+      <p:sp>
+        <p:nvSpPr>
+          <p:cNvPr id="3" name="Content Placeholder 2"/>
+          <p:cNvSpPr>
+            <a:spLocks noGrp="1"/>
+          </p:cNvSpPr>
+          <p:nvPr>
+            <p:ph idx="1"/>
+          </p:nvPr>
+        </p:nvSpPr>
+        <p:spPr/>
+        <p:txBody>
+          <a:bodyPr/>
+          <a:lstStyle/>
+          <a:p>
+            <a:endParaRPr lang="en-US" dirty="0" smtClean="0"/>
+          </a:p>
+          <a:p>
+            <a:pPr lvl="1"/>
+            <a:r>
+              <a:rPr lang="en-US" dirty="0" smtClean="0"/>
+              <a:t>Non-Von Neumann computer architectures</a:t>
+            </a:r>
+          </a:p>
+          <a:p>
+            <a:pPr lvl="1"/>
+            <a:r>
+              <a:rPr lang="en-US" dirty="0" smtClean="0"/>
+              <a:t>Lambda calculus</a:t>
+            </a:r>
+          </a:p>
+          <a:p>
+            <a:pPr lvl="1"/>
+            <a:r>
+              <a:rPr lang="en-US" dirty="0" smtClean="0"/>
+              <a:t>Applying functional thinking outside your program</a:t>
+            </a:r>
+          </a:p>
+          <a:p>
+            <a:pPr lvl="1"/>
+            <a:r>
+              <a:rPr lang="en-US" dirty="0" smtClean="0"/>
+              <a:t>Logic programming</a:t>
+            </a:r>
+          </a:p>
+          <a:p>
+            <a:pPr lvl="1"/>
+            <a:endParaRPr lang="en-US" dirty="0" smtClean="0"/>
+          </a:p>
+          <a:p>
+            <a:endParaRPr lang="en-US" dirty="0" smtClean="0"/>
+          </a:p>
+        </p:txBody>
+      </p:sp>
+    </p:spTree>
+    <p:extLst>
+      <p:ext uri="{BB962C8B-B14F-4D97-AF65-F5344CB8AC3E}">
+        <p14:creationId xmlns:p14="http://schemas.microsoft.com/office/powerpoint/2010/main" val="4057990024"/>
+      </p:ext>
+    </p:extLst>
+  </p:cSld>
+  <p:clrMapOvr>
+    <a:masterClrMapping/>
+  </p:clrMapOvr>
+</p:sld>
+</file>
+
+<file path=ppt/slides/slide36.xml><?xml version="1.0" encoding="utf-8"?>
+<p:sld xmlns:a="http://schemas.openxmlformats.org/drawingml/2006/main" xmlns:r="http://schemas.openxmlformats.org/officeDocument/2006/relationships" xmlns:p="http://schemas.openxmlformats.org/presentationml/2006/main">
+  <p:cSld>
+    <p:spTree>
+      <p:nvGrpSpPr>
+        <p:cNvPr id="1" name=""/>
+        <p:cNvGrpSpPr/>
+        <p:nvPr/>
+      </p:nvGrpSpPr>
+      <p:grpSpPr>
+        <a:xfrm>
+          <a:off x="0" y="0"/>
+          <a:ext cx="0" cy="0"/>
+          <a:chOff x="0" y="0"/>
+          <a:chExt cx="0" cy="0"/>
+        </a:xfrm>
+      </p:grpSpPr>
+      <p:sp>
+        <p:nvSpPr>
+          <p:cNvPr id="2" name="Title 1"/>
+          <p:cNvSpPr>
+            <a:spLocks noGrp="1"/>
+          </p:cNvSpPr>
+          <p:nvPr>
+            <p:ph type="title"/>
+          </p:nvPr>
+        </p:nvSpPr>
+        <p:spPr/>
+        <p:txBody>
+          <a:bodyPr/>
+          <a:lstStyle/>
+          <a:p>
+            <a:r>
               <a:rPr lang="en-US" dirty="0" err="1" smtClean="0"/>
               <a:t>Scratchpage</a:t>
             </a:r>
@@ -9252,7 +10789,7 @@
 </p:sld>
 </file>
 
-<file path=ppt/slides/slide33.xml><?xml version="1.0" encoding="utf-8"?>
+<file path=ppt/slides/slide37.xml><?xml version="1.0" encoding="utf-8"?>
 <p:sld xmlns:a="http://schemas.openxmlformats.org/drawingml/2006/main" xmlns:r="http://schemas.openxmlformats.org/officeDocument/2006/relationships" xmlns:p="http://schemas.openxmlformats.org/presentationml/2006/main">
   <p:cSld>
     <p:spTree>

</xml_diff>

<commit_message>
Brian: Adding Haskell slides.
</commit_message>
<xml_diff>
--- a/FoundationsOfFunctionalProgramming.pptx
+++ b/FoundationsOfFunctionalProgramming.pptx
@@ -48,9 +48,11 @@
     <p:sldId id="278" r:id="rId42"/>
     <p:sldId id="300" r:id="rId43"/>
     <p:sldId id="290" r:id="rId44"/>
-    <p:sldId id="270" r:id="rId45"/>
-    <p:sldId id="258" r:id="rId46"/>
-    <p:sldId id="263" r:id="rId47"/>
+    <p:sldId id="303" r:id="rId45"/>
+    <p:sldId id="304" r:id="rId46"/>
+    <p:sldId id="270" r:id="rId47"/>
+    <p:sldId id="258" r:id="rId48"/>
+    <p:sldId id="263" r:id="rId49"/>
   </p:sldIdLst>
   <p:sldSz cx="9144000" cy="6858000" type="screen4x3"/>
   <p:notesSz cx="6858000" cy="9144000"/>
@@ -197,6 +199,8 @@
             <p14:sldId id="278"/>
             <p14:sldId id="300"/>
             <p14:sldId id="290"/>
+            <p14:sldId id="303"/>
+            <p14:sldId id="304"/>
             <p14:sldId id="270"/>
             <p14:sldId id="258"/>
             <p14:sldId id="263"/>
@@ -402,7 +406,7 @@
           <a:p>
             <a:fld id="{3CBAD435-14A8-46F2-8968-23B8E604A030}" type="datetimeFigureOut">
               <a:rPr lang="en-US" smtClean="0"/>
-              <a:t>05/01/2014</a:t>
+              <a:t>05/02/2014</a:t>
             </a:fld>
             <a:endParaRPr lang="en-US"/>
           </a:p>
@@ -567,7 +571,7 @@
           <a:p>
             <a:fld id="{3CBAD435-14A8-46F2-8968-23B8E604A030}" type="datetimeFigureOut">
               <a:rPr lang="en-US" smtClean="0"/>
-              <a:t>05/01/2014</a:t>
+              <a:t>05/02/2014</a:t>
             </a:fld>
             <a:endParaRPr lang="en-US"/>
           </a:p>
@@ -742,7 +746,7 @@
           <a:p>
             <a:fld id="{3CBAD435-14A8-46F2-8968-23B8E604A030}" type="datetimeFigureOut">
               <a:rPr lang="en-US" smtClean="0"/>
-              <a:t>05/01/2014</a:t>
+              <a:t>05/02/2014</a:t>
             </a:fld>
             <a:endParaRPr lang="en-US"/>
           </a:p>
@@ -907,7 +911,7 @@
           <a:p>
             <a:fld id="{3CBAD435-14A8-46F2-8968-23B8E604A030}" type="datetimeFigureOut">
               <a:rPr lang="en-US" smtClean="0"/>
-              <a:t>05/01/2014</a:t>
+              <a:t>05/02/2014</a:t>
             </a:fld>
             <a:endParaRPr lang="en-US"/>
           </a:p>
@@ -1148,7 +1152,7 @@
           <a:p>
             <a:fld id="{3CBAD435-14A8-46F2-8968-23B8E604A030}" type="datetimeFigureOut">
               <a:rPr lang="en-US" smtClean="0"/>
-              <a:t>05/01/2014</a:t>
+              <a:t>05/02/2014</a:t>
             </a:fld>
             <a:endParaRPr lang="en-US"/>
           </a:p>
@@ -1431,7 +1435,7 @@
           <a:p>
             <a:fld id="{3CBAD435-14A8-46F2-8968-23B8E604A030}" type="datetimeFigureOut">
               <a:rPr lang="en-US" smtClean="0"/>
-              <a:t>05/01/2014</a:t>
+              <a:t>05/02/2014</a:t>
             </a:fld>
             <a:endParaRPr lang="en-US"/>
           </a:p>
@@ -1860,7 +1864,7 @@
           <a:p>
             <a:fld id="{3CBAD435-14A8-46F2-8968-23B8E604A030}" type="datetimeFigureOut">
               <a:rPr lang="en-US" smtClean="0"/>
-              <a:t>05/01/2014</a:t>
+              <a:t>05/02/2014</a:t>
             </a:fld>
             <a:endParaRPr lang="en-US"/>
           </a:p>
@@ -1973,7 +1977,7 @@
           <a:p>
             <a:fld id="{3CBAD435-14A8-46F2-8968-23B8E604A030}" type="datetimeFigureOut">
               <a:rPr lang="en-US" smtClean="0"/>
-              <a:t>05/01/2014</a:t>
+              <a:t>05/02/2014</a:t>
             </a:fld>
             <a:endParaRPr lang="en-US"/>
           </a:p>
@@ -2063,7 +2067,7 @@
           <a:p>
             <a:fld id="{3CBAD435-14A8-46F2-8968-23B8E604A030}" type="datetimeFigureOut">
               <a:rPr lang="en-US" smtClean="0"/>
-              <a:t>05/01/2014</a:t>
+              <a:t>05/02/2014</a:t>
             </a:fld>
             <a:endParaRPr lang="en-US"/>
           </a:p>
@@ -2252,7 +2256,7 @@
           <a:p>
             <a:fld id="{3CBAD435-14A8-46F2-8968-23B8E604A030}" type="datetimeFigureOut">
               <a:rPr lang="en-US" smtClean="0"/>
-              <a:t>05/01/2014</a:t>
+              <a:t>05/02/2014</a:t>
             </a:fld>
             <a:endParaRPr lang="en-US"/>
           </a:p>
@@ -2570,7 +2574,7 @@
           <a:p>
             <a:fld id="{3CBAD435-14A8-46F2-8968-23B8E604A030}" type="datetimeFigureOut">
               <a:rPr lang="en-US" smtClean="0"/>
-              <a:t>05/01/2014</a:t>
+              <a:t>05/02/2014</a:t>
             </a:fld>
             <a:endParaRPr lang="en-US"/>
           </a:p>
@@ -2949,7 +2953,7 @@
           <a:p>
             <a:fld id="{3CBAD435-14A8-46F2-8968-23B8E604A030}" type="datetimeFigureOut">
               <a:rPr lang="en-US" smtClean="0"/>
-              <a:t>05/01/2014</a:t>
+              <a:t>05/02/2014</a:t>
             </a:fld>
             <a:endParaRPr lang="en-US"/>
           </a:p>
@@ -3458,7 +3462,6 @@
               <a:rPr lang="en-US" dirty="0" smtClean="0"/>
               <a:t>Composition</a:t>
             </a:r>
-            <a:endParaRPr lang="en-US" dirty="0" smtClean="0"/>
           </a:p>
           <a:p>
             <a:r>
@@ -6765,11 +6768,7 @@
           <a:p>
             <a:r>
               <a:rPr lang="en-US" dirty="0" smtClean="0"/>
-              <a:t>As computers get faster, the trend is towar</a:t>
-            </a:r>
-            <a:r>
-              <a:rPr lang="en-US" dirty="0" smtClean="0"/>
-              <a:t>d higher levels of abstraction</a:t>
+              <a:t>As computers get faster, the trend is toward higher levels of abstraction</a:t>
             </a:r>
           </a:p>
         </p:txBody>
@@ -7565,7 +7564,7 @@
         <p:spPr>
           <a:xfrm>
             <a:off x="609600" y="5328838"/>
-            <a:ext cx="7197436" cy="1077218"/>
+            <a:ext cx="7197436" cy="830997"/>
           </a:xfrm>
           <a:prstGeom prst="rect">
             <a:avLst/>
@@ -7605,33 +7604,19 @@
                 <a:latin typeface="Consolas" pitchFamily="49" charset="0"/>
                 <a:cs typeface="Consolas" pitchFamily="49" charset="0"/>
               </a:rPr>
-              <a:t>g :: String -&gt; String              </a:t>
+              <a:t>g </a:t>
             </a:r>
             <a:r>
               <a:rPr lang="en-US" sz="1600" dirty="0" smtClean="0">
                 <a:solidFill>
-                  <a:schemeClr val="accent5">
-                    <a:lumMod val="75000"/>
-                  </a:schemeClr>
-                </a:solidFill>
-                <a:latin typeface="Consolas" pitchFamily="49" charset="0"/>
-                <a:cs typeface="Consolas" pitchFamily="49" charset="0"/>
-              </a:rPr>
-              <a:t>-- function declaration</a:t>
-            </a:r>
-          </a:p>
-          <a:p>
-            <a:r>
-              <a:rPr lang="en-US" sz="1600" dirty="0" smtClean="0">
-                <a:solidFill>
-                  <a:schemeClr val="accent2">
-                    <a:lumMod val="50000"/>
-                  </a:schemeClr>
-                </a:solidFill>
-                <a:latin typeface="Consolas" pitchFamily="49" charset="0"/>
-                <a:cs typeface="Consolas" pitchFamily="49" charset="0"/>
-              </a:rPr>
-              <a:t>g name = “Hello “ ++ name ++ “!”   </a:t>
+                  <a:schemeClr val="accent2">
+                    <a:lumMod val="50000"/>
+                  </a:schemeClr>
+                </a:solidFill>
+                <a:latin typeface="Consolas" pitchFamily="49" charset="0"/>
+                <a:cs typeface="Consolas" pitchFamily="49" charset="0"/>
+              </a:rPr>
+              <a:t>name = “Hello “ ++ name ++ “!”   </a:t>
             </a:r>
             <a:r>
               <a:rPr lang="en-US" sz="1600" dirty="0" smtClean="0">
@@ -9328,15 +9313,7 @@
           <a:p>
             <a:r>
               <a:rPr lang="en-US" dirty="0" smtClean="0"/>
-              <a:t>Many OO patterns </a:t>
-            </a:r>
-            <a:r>
-              <a:rPr lang="en-US" dirty="0" smtClean="0"/>
-              <a:t>overlap with higher </a:t>
-            </a:r>
-            <a:r>
-              <a:rPr lang="en-US" dirty="0" smtClean="0"/>
-              <a:t>order functions</a:t>
+              <a:t>Many OO patterns overlap with higher order functions</a:t>
             </a:r>
           </a:p>
           <a:p>
@@ -9644,11 +9621,7 @@
           <a:p>
             <a:r>
               <a:rPr lang="en-US" sz="4000" dirty="0" smtClean="0"/>
-              <a:t>Anonymous </a:t>
-            </a:r>
-            <a:r>
-              <a:rPr lang="en-US" sz="4000" dirty="0" smtClean="0"/>
-              <a:t>Functions </a:t>
+              <a:t>Anonymous Functions </a:t>
             </a:r>
             <a:br>
               <a:rPr lang="en-US" sz="4000" dirty="0" smtClean="0"/>
@@ -9685,19 +9658,7 @@
           <a:p>
             <a:r>
               <a:rPr lang="en-US" dirty="0" smtClean="0"/>
-              <a:t>In </a:t>
-            </a:r>
-            <a:r>
-              <a:rPr lang="en-US" dirty="0" smtClean="0"/>
-              <a:t>most FP languages </a:t>
-            </a:r>
-            <a:r>
-              <a:rPr lang="en-US" dirty="0" smtClean="0"/>
-              <a:t>functions can be </a:t>
-            </a:r>
-            <a:r>
-              <a:rPr lang="en-US" dirty="0" smtClean="0"/>
-              <a:t>anonymous</a:t>
+              <a:t>In most FP languages functions can be anonymous</a:t>
             </a:r>
           </a:p>
           <a:p>
@@ -9705,7 +9666,6 @@
               <a:rPr lang="en-US" dirty="0" smtClean="0"/>
               <a:t>Can be defined and called without a name</a:t>
             </a:r>
-            <a:endParaRPr lang="en-US" dirty="0" smtClean="0"/>
           </a:p>
           <a:p>
             <a:endParaRPr lang="en-US" dirty="0"/>
@@ -10418,7 +10378,15 @@
             </a:r>
             <a:r>
               <a:rPr lang="en-US" dirty="0" smtClean="0"/>
-              <a:t> includes the scope in which it was defined</a:t>
+              <a:t> includes </a:t>
+            </a:r>
+            <a:r>
+              <a:rPr lang="en-US" dirty="0" smtClean="0"/>
+              <a:t>the scope </a:t>
+            </a:r>
+            <a:r>
+              <a:rPr lang="en-US" dirty="0" smtClean="0"/>
+              <a:t>in which it was defined</a:t>
             </a:r>
           </a:p>
           <a:p>
@@ -10497,41 +10465,8 @@
                 <a:latin typeface="Consolas" pitchFamily="49" charset="0"/>
                 <a:cs typeface="Consolas" pitchFamily="49" charset="0"/>
               </a:rPr>
-              <a:t> callWith3(Closure f) {</a:t>
-            </a:r>
-            <a:r>
-              <a:rPr lang="en-US" sz="1600" dirty="0" smtClean="0">
-                <a:solidFill>
-                  <a:schemeClr val="accent2">
-                    <a:lumMod val="50000"/>
-                  </a:schemeClr>
-                </a:solidFill>
-                <a:latin typeface="Consolas" pitchFamily="49" charset="0"/>
-                <a:cs typeface="Consolas" pitchFamily="49" charset="0"/>
-              </a:rPr>
-              <a:t>f(3)</a:t>
-            </a:r>
-            <a:r>
-              <a:rPr lang="en-US" sz="1600" dirty="0" smtClean="0">
-                <a:solidFill>
-                  <a:schemeClr val="accent2">
-                    <a:lumMod val="50000"/>
-                  </a:schemeClr>
-                </a:solidFill>
-                <a:latin typeface="Consolas" pitchFamily="49" charset="0"/>
-                <a:cs typeface="Consolas" pitchFamily="49" charset="0"/>
-              </a:rPr>
-              <a:t>}</a:t>
-            </a:r>
-            <a:endParaRPr lang="en-US" sz="1600" dirty="0" smtClean="0">
-              <a:solidFill>
-                <a:schemeClr val="accent2">
-                  <a:lumMod val="50000"/>
-                </a:schemeClr>
-              </a:solidFill>
-              <a:latin typeface="Consolas" pitchFamily="49" charset="0"/>
-              <a:cs typeface="Consolas" pitchFamily="49" charset="0"/>
-            </a:endParaRPr>
+              <a:t> callWith3(Closure f) {f(3)}</a:t>
+            </a:r>
           </a:p>
           <a:p>
             <a:endParaRPr lang="en-US" sz="1600" dirty="0" smtClean="0">
@@ -15034,7 +14969,7 @@
           </a:p>
           <a:p>
             <a:r>
-              <a:rPr lang="en-US" sz="1600" dirty="0" err="1" smtClean="0">
+              <a:rPr lang="en-US" sz="1600" b="1" dirty="0" err="1" smtClean="0">
                 <a:solidFill>
                   <a:schemeClr val="accent2">
                     <a:lumMod val="50000"/>
@@ -15046,6 +14981,56 @@
               <a:t>val</a:t>
             </a:r>
             <a:r>
+              <a:rPr lang="en-US" sz="1600" b="1" dirty="0" smtClean="0">
+                <a:solidFill>
+                  <a:schemeClr val="accent2">
+                    <a:lumMod val="50000"/>
+                  </a:schemeClr>
+                </a:solidFill>
+                <a:latin typeface="Consolas" pitchFamily="49" charset="0"/>
+                <a:cs typeface="Consolas" pitchFamily="49" charset="0"/>
+              </a:rPr>
+              <a:t> </a:t>
+            </a:r>
+            <a:r>
+              <a:rPr lang="en-US" sz="1600" b="1" dirty="0" err="1" smtClean="0">
+                <a:solidFill>
+                  <a:schemeClr val="accent2">
+                    <a:lumMod val="50000"/>
+                  </a:schemeClr>
+                </a:solidFill>
+                <a:latin typeface="Consolas" pitchFamily="49" charset="0"/>
+                <a:cs typeface="Consolas" pitchFamily="49" charset="0"/>
+              </a:rPr>
+              <a:t>shippingChargeAdjustment</a:t>
+            </a:r>
+            <a:r>
+              <a:rPr lang="en-US" sz="1600" b="1" dirty="0" smtClean="0">
+                <a:solidFill>
+                  <a:schemeClr val="accent2">
+                    <a:lumMod val="50000"/>
+                  </a:schemeClr>
+                </a:solidFill>
+                <a:latin typeface="Consolas" pitchFamily="49" charset="0"/>
+                <a:cs typeface="Consolas" pitchFamily="49" charset="0"/>
+              </a:rPr>
+              <a:t> = order match {</a:t>
+            </a:r>
+          </a:p>
+          <a:p>
+            <a:r>
+              <a:rPr lang="en-US" sz="1600" b="1" dirty="0" smtClean="0">
+                <a:solidFill>
+                  <a:schemeClr val="accent2">
+                    <a:lumMod val="50000"/>
+                  </a:schemeClr>
+                </a:solidFill>
+                <a:latin typeface="Consolas" pitchFamily="49" charset="0"/>
+                <a:cs typeface="Consolas" pitchFamily="49" charset="0"/>
+              </a:rPr>
+              <a:t>  </a:t>
+            </a:r>
+            <a:r>
               <a:rPr lang="en-US" sz="1600" dirty="0" smtClean="0">
                 <a:solidFill>
                   <a:schemeClr val="accent2">
@@ -15055,45 +15040,7 @@
                 <a:latin typeface="Consolas" pitchFamily="49" charset="0"/>
                 <a:cs typeface="Consolas" pitchFamily="49" charset="0"/>
               </a:rPr>
-              <a:t> </a:t>
-            </a:r>
-            <a:r>
-              <a:rPr lang="en-US" sz="1600" dirty="0" err="1" smtClean="0">
-                <a:solidFill>
-                  <a:schemeClr val="accent2">
-                    <a:lumMod val="50000"/>
-                  </a:schemeClr>
-                </a:solidFill>
-                <a:latin typeface="Consolas" pitchFamily="49" charset="0"/>
-                <a:cs typeface="Consolas" pitchFamily="49" charset="0"/>
-              </a:rPr>
-              <a:t>shippingChargeAdjustment</a:t>
-            </a:r>
-            <a:r>
-              <a:rPr lang="en-US" sz="1600" dirty="0" smtClean="0">
-                <a:solidFill>
-                  <a:schemeClr val="accent2">
-                    <a:lumMod val="50000"/>
-                  </a:schemeClr>
-                </a:solidFill>
-                <a:latin typeface="Consolas" pitchFamily="49" charset="0"/>
-                <a:cs typeface="Consolas" pitchFamily="49" charset="0"/>
-              </a:rPr>
-              <a:t> = order match {</a:t>
-            </a:r>
-          </a:p>
-          <a:p>
-            <a:r>
-              <a:rPr lang="en-US" sz="1600" dirty="0" smtClean="0">
-                <a:solidFill>
-                  <a:schemeClr val="accent2">
-                    <a:lumMod val="50000"/>
-                  </a:schemeClr>
-                </a:solidFill>
-                <a:latin typeface="Consolas" pitchFamily="49" charset="0"/>
-                <a:cs typeface="Consolas" pitchFamily="49" charset="0"/>
-              </a:rPr>
-              <a:t>  case </a:t>
+              <a:t>case </a:t>
             </a:r>
             <a:r>
               <a:rPr lang="en-US" sz="1600" dirty="0" err="1" smtClean="0">
@@ -15514,11 +15461,7 @@
           <a:p>
             <a:r>
               <a:rPr lang="en-US" sz="4000" dirty="0" smtClean="0"/>
-              <a:t>Partial </a:t>
-            </a:r>
-            <a:r>
-              <a:rPr lang="en-US" sz="4000" dirty="0" smtClean="0"/>
-              <a:t>Application</a:t>
+              <a:t>Partial Application</a:t>
             </a:r>
             <a:endParaRPr lang="en-US" sz="4000" dirty="0"/>
           </a:p>
@@ -15570,7 +15513,6 @@
               <a:rPr lang="en-US" dirty="0" smtClean="0"/>
               <a:t>This fixes those arguments, producing a new function</a:t>
             </a:r>
-            <a:endParaRPr lang="en-US" dirty="0" smtClean="0"/>
           </a:p>
         </p:txBody>
       </p:sp>
@@ -15890,15 +15832,6 @@
               </a:rPr>
               <a:t>// 8</a:t>
             </a:r>
-            <a:endParaRPr lang="en-US" sz="1600" dirty="0" smtClean="0">
-              <a:solidFill>
-                <a:schemeClr val="accent5">
-                  <a:lumMod val="75000"/>
-                </a:schemeClr>
-              </a:solidFill>
-              <a:latin typeface="Consolas" pitchFamily="49" charset="0"/>
-              <a:cs typeface="Consolas" pitchFamily="49" charset="0"/>
-            </a:endParaRPr>
           </a:p>
         </p:txBody>
       </p:sp>
@@ -16138,7 +16071,6 @@
               <a:rPr lang="en-US" dirty="0" smtClean="0"/>
               <a:t>Haskell is beautiful in this regard.  Any function may be partially applied with no special syntax</a:t>
             </a:r>
-            <a:endParaRPr lang="en-US" dirty="0" smtClean="0"/>
           </a:p>
         </p:txBody>
       </p:sp>
@@ -16150,8 +16082,8 @@
         </p:nvSpPr>
         <p:spPr>
           <a:xfrm>
-            <a:off x="577273" y="5414711"/>
-            <a:ext cx="7197436" cy="1077218"/>
+            <a:off x="577273" y="5569803"/>
+            <a:ext cx="7197436" cy="830997"/>
           </a:xfrm>
           <a:prstGeom prst="rect">
             <a:avLst/>
@@ -16182,90 +16114,6 @@
           <a:lstStyle/>
           <a:p>
             <a:r>
-              <a:rPr lang="en-US" sz="1600" dirty="0">
-                <a:solidFill>
-                  <a:schemeClr val="accent2">
-                    <a:lumMod val="50000"/>
-                  </a:schemeClr>
-                </a:solidFill>
-                <a:latin typeface="Consolas" pitchFamily="49" charset="0"/>
-                <a:cs typeface="Consolas" pitchFamily="49" charset="0"/>
-              </a:rPr>
-              <a:t>add :: </a:t>
-            </a:r>
-            <a:r>
-              <a:rPr lang="en-US" sz="1600" dirty="0" err="1">
-                <a:solidFill>
-                  <a:schemeClr val="accent2">
-                    <a:lumMod val="50000"/>
-                  </a:schemeClr>
-                </a:solidFill>
-                <a:latin typeface="Consolas" pitchFamily="49" charset="0"/>
-                <a:cs typeface="Consolas" pitchFamily="49" charset="0"/>
-              </a:rPr>
-              <a:t>Int</a:t>
-            </a:r>
-            <a:r>
-              <a:rPr lang="en-US" sz="1600" dirty="0">
-                <a:solidFill>
-                  <a:schemeClr val="accent2">
-                    <a:lumMod val="50000"/>
-                  </a:schemeClr>
-                </a:solidFill>
-                <a:latin typeface="Consolas" pitchFamily="49" charset="0"/>
-                <a:cs typeface="Consolas" pitchFamily="49" charset="0"/>
-              </a:rPr>
-              <a:t> -&gt; </a:t>
-            </a:r>
-            <a:r>
-              <a:rPr lang="en-US" sz="1600" dirty="0" err="1">
-                <a:solidFill>
-                  <a:schemeClr val="accent2">
-                    <a:lumMod val="50000"/>
-                  </a:schemeClr>
-                </a:solidFill>
-                <a:latin typeface="Consolas" pitchFamily="49" charset="0"/>
-                <a:cs typeface="Consolas" pitchFamily="49" charset="0"/>
-              </a:rPr>
-              <a:t>Int</a:t>
-            </a:r>
-            <a:r>
-              <a:rPr lang="en-US" sz="1600" dirty="0">
-                <a:solidFill>
-                  <a:schemeClr val="accent2">
-                    <a:lumMod val="50000"/>
-                  </a:schemeClr>
-                </a:solidFill>
-                <a:latin typeface="Consolas" pitchFamily="49" charset="0"/>
-                <a:cs typeface="Consolas" pitchFamily="49" charset="0"/>
-              </a:rPr>
-              <a:t> -&gt; </a:t>
-            </a:r>
-            <a:r>
-              <a:rPr lang="en-US" sz="1600" dirty="0" err="1">
-                <a:solidFill>
-                  <a:schemeClr val="accent2">
-                    <a:lumMod val="50000"/>
-                  </a:schemeClr>
-                </a:solidFill>
-                <a:latin typeface="Consolas" pitchFamily="49" charset="0"/>
-                <a:cs typeface="Consolas" pitchFamily="49" charset="0"/>
-              </a:rPr>
-              <a:t>Int</a:t>
-            </a:r>
-            <a:r>
-              <a:rPr lang="en-US" sz="1600" dirty="0">
-                <a:solidFill>
-                  <a:schemeClr val="accent2">
-                    <a:lumMod val="50000"/>
-                  </a:schemeClr>
-                </a:solidFill>
-                <a:latin typeface="Consolas" pitchFamily="49" charset="0"/>
-                <a:cs typeface="Consolas" pitchFamily="49" charset="0"/>
-              </a:rPr>
-              <a:t> </a:t>
-            </a:r>
-            <a:r>
               <a:rPr lang="en-US" sz="1600" dirty="0" smtClean="0">
                 <a:solidFill>
                   <a:schemeClr val="accent2">
@@ -16275,33 +16123,19 @@
                 <a:latin typeface="Consolas" pitchFamily="49" charset="0"/>
                 <a:cs typeface="Consolas" pitchFamily="49" charset="0"/>
               </a:rPr>
-              <a:t>            </a:t>
+              <a:t>add </a:t>
             </a:r>
             <a:r>
               <a:rPr lang="en-US" sz="1600" dirty="0" smtClean="0">
                 <a:solidFill>
-                  <a:schemeClr val="accent5">
-                    <a:lumMod val="75000"/>
-                  </a:schemeClr>
-                </a:solidFill>
-                <a:latin typeface="Consolas" pitchFamily="49" charset="0"/>
-                <a:cs typeface="Consolas" pitchFamily="49" charset="0"/>
-              </a:rPr>
-              <a:t>// Function declaration</a:t>
-            </a:r>
-          </a:p>
-          <a:p>
-            <a:r>
-              <a:rPr lang="en-US" sz="1600" dirty="0" smtClean="0">
-                <a:solidFill>
-                  <a:schemeClr val="accent2">
-                    <a:lumMod val="50000"/>
-                  </a:schemeClr>
-                </a:solidFill>
-                <a:latin typeface="Consolas" pitchFamily="49" charset="0"/>
-                <a:cs typeface="Consolas" pitchFamily="49" charset="0"/>
-              </a:rPr>
-              <a:t>add x y = x + y                      </a:t>
+                  <a:schemeClr val="accent2">
+                    <a:lumMod val="50000"/>
+                  </a:schemeClr>
+                </a:solidFill>
+                <a:latin typeface="Consolas" pitchFamily="49" charset="0"/>
+                <a:cs typeface="Consolas" pitchFamily="49" charset="0"/>
+              </a:rPr>
+              <a:t>x y = x + y                      </a:t>
             </a:r>
             <a:r>
               <a:rPr lang="en-US" sz="1600" dirty="0" smtClean="0">
@@ -16390,7 +16224,7 @@
         </p:nvSpPr>
         <p:spPr>
           <a:xfrm>
-            <a:off x="577273" y="5029200"/>
+            <a:off x="577273" y="5184292"/>
             <a:ext cx="7197436" cy="369332"/>
           </a:xfrm>
           <a:prstGeom prst="rect">
@@ -17399,34 +17233,211 @@
             <p:ph idx="1"/>
           </p:nvPr>
         </p:nvSpPr>
-        <p:spPr/>
-        <p:txBody>
-          <a:bodyPr/>
+        <p:spPr>
+          <a:xfrm>
+            <a:off x="457200" y="1600200"/>
+            <a:ext cx="5257800" cy="4800600"/>
+          </a:xfrm>
+        </p:spPr>
+        <p:txBody>
+          <a:bodyPr>
+            <a:normAutofit lnSpcReduction="10000"/>
+          </a:bodyPr>
           <a:lstStyle/>
           <a:p>
             <a:r>
               <a:rPr lang="en-US" dirty="0" smtClean="0"/>
-              <a:t>Info from language comparison</a:t>
-            </a:r>
-          </a:p>
-          <a:p>
-            <a:r>
-              <a:rPr lang="en-US" dirty="0" smtClean="0"/>
-              <a:t>Info on Haskell Curry</a:t>
-            </a:r>
-          </a:p>
-          <a:p>
-            <a:r>
-              <a:rPr lang="en-US" dirty="0" smtClean="0"/>
-              <a:t>Compare syntax to other examples</a:t>
-            </a:r>
-          </a:p>
-          <a:p>
-            <a:r>
-              <a:rPr lang="en-US" dirty="0" smtClean="0"/>
-              <a:t>Info on Curry-Howard isomorphism</a:t>
-            </a:r>
-            <a:endParaRPr lang="en-US" dirty="0"/>
+              <a:t>An purely-functional programming language</a:t>
+            </a:r>
+          </a:p>
+          <a:p>
+            <a:pPr lvl="1"/>
+            <a:r>
+              <a:rPr lang="en-US" dirty="0" smtClean="0"/>
+              <a:t>Introduced in 1987</a:t>
+            </a:r>
+          </a:p>
+          <a:p>
+            <a:pPr lvl="1"/>
+            <a:r>
+              <a:rPr lang="en-US" dirty="0" smtClean="0"/>
+              <a:t>All objects immutable</a:t>
+            </a:r>
+          </a:p>
+          <a:p>
+            <a:pPr lvl="1"/>
+            <a:r>
+              <a:rPr lang="en-US" dirty="0" smtClean="0"/>
+              <a:t>All functions pure</a:t>
+            </a:r>
+          </a:p>
+          <a:p>
+            <a:pPr lvl="2"/>
+            <a:r>
+              <a:rPr lang="en-US" dirty="0" smtClean="0"/>
+              <a:t>Models side effects (IO, etc.) as return values</a:t>
+            </a:r>
+          </a:p>
+          <a:p>
+            <a:r>
+              <a:rPr lang="en-US" dirty="0" smtClean="0"/>
+              <a:t>Almost the reference implementation of functional programming</a:t>
+            </a:r>
+          </a:p>
+          <a:p>
+            <a:r>
+              <a:rPr lang="en-US" dirty="0" smtClean="0"/>
+              <a:t>Very good way to learn functional programming fundamentals</a:t>
+            </a:r>
+          </a:p>
+          <a:p>
+            <a:r>
+              <a:rPr lang="en-US" dirty="0" smtClean="0"/>
+              <a:t>Often, ‘if it compiles, it works’</a:t>
+            </a:r>
+          </a:p>
+          <a:p>
+            <a:pPr marL="114300" indent="0">
+              <a:buNone/>
+            </a:pPr>
+            <a:endParaRPr lang="en-US" dirty="0" smtClean="0"/>
+          </a:p>
+          <a:p>
+            <a:pPr marL="114300" indent="0">
+              <a:buNone/>
+            </a:pPr>
+            <a:r>
+              <a:rPr lang="en-US" dirty="0"/>
+              <a:t>	</a:t>
+            </a:r>
+            <a:endParaRPr lang="en-US" dirty="0" smtClean="0"/>
+          </a:p>
+          <a:p>
+            <a:endParaRPr lang="en-US" dirty="0" smtClean="0"/>
+          </a:p>
+          <a:p>
+            <a:endParaRPr lang="en-US" dirty="0" smtClean="0"/>
+          </a:p>
+        </p:txBody>
+      </p:sp>
+      <p:pic>
+        <p:nvPicPr>
+          <p:cNvPr id="1026" name="Picture 2" descr="http://www.haskell.org/wikiupload/8/86/HaskellBCurry.jpg"/>
+          <p:cNvPicPr>
+            <a:picLocks noChangeAspect="1" noChangeArrowheads="1"/>
+          </p:cNvPicPr>
+          <p:nvPr/>
+        </p:nvPicPr>
+        <p:blipFill>
+          <a:blip r:embed="rId2">
+            <a:extLst>
+              <a:ext uri="{28A0092B-C50C-407E-A947-70E740481C1C}">
+                <a14:useLocalDpi xmlns:a14="http://schemas.microsoft.com/office/drawing/2010/main" val="0"/>
+              </a:ext>
+            </a:extLst>
+          </a:blip>
+          <a:srcRect/>
+          <a:stretch>
+            <a:fillRect/>
+          </a:stretch>
+        </p:blipFill>
+        <p:spPr bwMode="auto">
+          <a:xfrm>
+            <a:off x="5943600" y="1828800"/>
+            <a:ext cx="1921439" cy="2362199"/>
+          </a:xfrm>
+          <a:prstGeom prst="rect">
+            <a:avLst/>
+          </a:prstGeom>
+          <a:noFill/>
+          <a:ln w="50800">
+            <a:solidFill>
+              <a:schemeClr val="accent3">
+                <a:lumMod val="75000"/>
+              </a:schemeClr>
+            </a:solidFill>
+          </a:ln>
+          <a:effectLst>
+            <a:outerShdw blurRad="50800" dist="38100" dir="2700000" sx="101000" sy="101000" algn="tl" rotWithShape="0">
+              <a:prstClr val="black">
+                <a:alpha val="40000"/>
+              </a:prstClr>
+            </a:outerShdw>
+          </a:effectLst>
+          <a:extLst>
+            <a:ext uri="{909E8E84-426E-40DD-AFC4-6F175D3DCCD1}">
+              <a14:hiddenFill xmlns:a14="http://schemas.microsoft.com/office/drawing/2010/main">
+                <a:solidFill>
+                  <a:srgbClr val="FFFFFF"/>
+                </a:solidFill>
+              </a14:hiddenFill>
+            </a:ext>
+          </a:extLst>
+        </p:spPr>
+      </p:pic>
+      <p:sp>
+        <p:nvSpPr>
+          <p:cNvPr id="4" name="TextBox 3"/>
+          <p:cNvSpPr txBox="1"/>
+          <p:nvPr/>
+        </p:nvSpPr>
+        <p:spPr>
+          <a:xfrm>
+            <a:off x="5943600" y="4495800"/>
+            <a:ext cx="1921439" cy="1477328"/>
+          </a:xfrm>
+          <a:prstGeom prst="rect">
+            <a:avLst/>
+          </a:prstGeom>
+          <a:noFill/>
+        </p:spPr>
+        <p:txBody>
+          <a:bodyPr wrap="square" rtlCol="0">
+            <a:spAutoFit/>
+          </a:bodyPr>
+          <a:lstStyle/>
+          <a:p>
+            <a:r>
+              <a:rPr lang="en-US" dirty="0" smtClean="0">
+                <a:solidFill>
+                  <a:schemeClr val="accent2">
+                    <a:lumMod val="50000"/>
+                  </a:schemeClr>
+                </a:solidFill>
+              </a:rPr>
+              <a:t>Haskell Curry</a:t>
+            </a:r>
+          </a:p>
+          <a:p>
+            <a:r>
+              <a:rPr lang="en-US" dirty="0" smtClean="0">
+                <a:solidFill>
+                  <a:schemeClr val="accent2">
+                    <a:lumMod val="50000"/>
+                  </a:schemeClr>
+                </a:solidFill>
+              </a:rPr>
+              <a:t>1900 – 1982</a:t>
+            </a:r>
+          </a:p>
+          <a:p>
+            <a:r>
+              <a:rPr lang="en-US" dirty="0" smtClean="0">
+                <a:solidFill>
+                  <a:schemeClr val="accent2">
+                    <a:lumMod val="50000"/>
+                  </a:schemeClr>
+                </a:solidFill>
+              </a:rPr>
+              <a:t>American Mathematician and Logician</a:t>
+            </a:r>
+            <a:endParaRPr lang="en-US" dirty="0">
+              <a:solidFill>
+                <a:schemeClr val="accent2">
+                  <a:lumMod val="50000"/>
+                </a:schemeClr>
+              </a:solidFill>
+            </a:endParaRPr>
           </a:p>
         </p:txBody>
       </p:sp>
@@ -17477,7 +17488,7 @@
           <a:p>
             <a:r>
               <a:rPr lang="en-US" dirty="0" smtClean="0"/>
-              <a:t>Related, Interesting Topics</a:t>
+              <a:t>Haskell, cont.</a:t>
             </a:r>
             <a:endParaRPr lang="en-US" dirty="0"/>
           </a:p>
@@ -17485,62 +17496,866 @@
       </p:sp>
       <p:sp>
         <p:nvSpPr>
-          <p:cNvPr id="3" name="Content Placeholder 2"/>
-          <p:cNvSpPr>
-            <a:spLocks noGrp="1"/>
-          </p:cNvSpPr>
-          <p:nvPr>
-            <p:ph idx="1"/>
-          </p:nvPr>
-        </p:nvSpPr>
-        <p:spPr/>
-        <p:txBody>
-          <a:bodyPr/>
+          <p:cNvPr id="4" name="TextBox 3"/>
+          <p:cNvSpPr txBox="1"/>
+          <p:nvPr/>
+        </p:nvSpPr>
+        <p:spPr>
+          <a:xfrm>
+            <a:off x="609600" y="1870770"/>
+            <a:ext cx="7315200" cy="4278094"/>
+          </a:xfrm>
+          <a:prstGeom prst="rect">
+            <a:avLst/>
+          </a:prstGeom>
+          <a:solidFill>
+            <a:schemeClr val="accent1">
+              <a:lumMod val="20000"/>
+              <a:lumOff val="80000"/>
+            </a:schemeClr>
+          </a:solidFill>
+          <a:ln>
+            <a:solidFill>
+              <a:schemeClr val="tx1"/>
+            </a:solidFill>
+          </a:ln>
+          <a:effectLst>
+            <a:outerShdw blurRad="50800" dist="50800" dir="3240000" sx="101000" sy="101000" algn="ctr" rotWithShape="0">
+              <a:schemeClr val="accent1">
+                <a:lumMod val="75000"/>
+              </a:schemeClr>
+            </a:outerShdw>
+          </a:effectLst>
+        </p:spPr>
+        <p:txBody>
+          <a:bodyPr wrap="square" rtlCol="0">
+            <a:spAutoFit/>
+          </a:bodyPr>
           <a:lstStyle/>
           <a:p>
-            <a:endParaRPr lang="en-US" dirty="0" smtClean="0"/>
-          </a:p>
-          <a:p>
-            <a:pPr lvl="1"/>
-            <a:r>
-              <a:rPr lang="en-US" dirty="0" smtClean="0"/>
-              <a:t>Non-Von Neumann computer architectures</a:t>
-            </a:r>
-          </a:p>
-          <a:p>
-            <a:pPr lvl="1"/>
-            <a:r>
-              <a:rPr lang="en-US" dirty="0" smtClean="0"/>
-              <a:t>Lambda calculus</a:t>
-            </a:r>
-          </a:p>
-          <a:p>
-            <a:pPr lvl="1"/>
-            <a:r>
-              <a:rPr lang="en-US" dirty="0" smtClean="0"/>
-              <a:t>Applying functional thinking outside your program</a:t>
-            </a:r>
-          </a:p>
-          <a:p>
-            <a:pPr lvl="1"/>
-            <a:r>
-              <a:rPr lang="en-US" dirty="0" smtClean="0"/>
-              <a:t>Logic programming</a:t>
-            </a:r>
-          </a:p>
-          <a:p>
-            <a:pPr lvl="1"/>
-            <a:endParaRPr lang="en-US" dirty="0" smtClean="0"/>
-          </a:p>
-          <a:p>
-            <a:endParaRPr lang="en-US" dirty="0" smtClean="0"/>
+            <a:r>
+              <a:rPr lang="en-US" sz="1600" dirty="0" err="1" smtClean="0">
+                <a:solidFill>
+                  <a:schemeClr val="accent2">
+                    <a:lumMod val="50000"/>
+                  </a:schemeClr>
+                </a:solidFill>
+                <a:latin typeface="Consolas" pitchFamily="49" charset="0"/>
+                <a:cs typeface="Consolas" pitchFamily="49" charset="0"/>
+              </a:rPr>
+              <a:t>isBig</a:t>
+            </a:r>
+            <a:r>
+              <a:rPr lang="en-US" sz="1600" dirty="0" smtClean="0">
+                <a:solidFill>
+                  <a:schemeClr val="accent2">
+                    <a:lumMod val="50000"/>
+                  </a:schemeClr>
+                </a:solidFill>
+                <a:latin typeface="Consolas" pitchFamily="49" charset="0"/>
+                <a:cs typeface="Consolas" pitchFamily="49" charset="0"/>
+              </a:rPr>
+              <a:t> n = n &gt; 100       	</a:t>
+            </a:r>
+            <a:endParaRPr lang="en-US" sz="1600" dirty="0" smtClean="0">
+              <a:solidFill>
+                <a:schemeClr val="accent5">
+                  <a:lumMod val="75000"/>
+                </a:schemeClr>
+              </a:solidFill>
+              <a:latin typeface="Consolas" pitchFamily="49" charset="0"/>
+              <a:cs typeface="Consolas" pitchFamily="49" charset="0"/>
+            </a:endParaRPr>
+          </a:p>
+          <a:p>
+            <a:r>
+              <a:rPr lang="en-US" sz="1600" dirty="0" smtClean="0">
+                <a:solidFill>
+                  <a:schemeClr val="accent2">
+                    <a:lumMod val="50000"/>
+                  </a:schemeClr>
+                </a:solidFill>
+                <a:latin typeface="Consolas" pitchFamily="49" charset="0"/>
+                <a:cs typeface="Consolas" pitchFamily="49" charset="0"/>
+              </a:rPr>
+              <a:t>f = </a:t>
+            </a:r>
+            <a:r>
+              <a:rPr lang="en-US" sz="1600" dirty="0" err="1" smtClean="0">
+                <a:solidFill>
+                  <a:schemeClr val="accent2">
+                    <a:lumMod val="50000"/>
+                  </a:schemeClr>
+                </a:solidFill>
+                <a:latin typeface="Consolas" pitchFamily="49" charset="0"/>
+                <a:cs typeface="Consolas" pitchFamily="49" charset="0"/>
+              </a:rPr>
+              <a:t>isBig</a:t>
+            </a:r>
+            <a:r>
+              <a:rPr lang="en-US" sz="1600" dirty="0" smtClean="0">
+                <a:solidFill>
+                  <a:schemeClr val="accent2">
+                    <a:lumMod val="50000"/>
+                  </a:schemeClr>
+                </a:solidFill>
+                <a:latin typeface="Consolas" pitchFamily="49" charset="0"/>
+                <a:cs typeface="Consolas" pitchFamily="49" charset="0"/>
+              </a:rPr>
+              <a:t> 		     	</a:t>
+            </a:r>
+            <a:endParaRPr lang="en-US" sz="1600" dirty="0" smtClean="0">
+              <a:solidFill>
+                <a:schemeClr val="accent5">
+                  <a:lumMod val="75000"/>
+                </a:schemeClr>
+              </a:solidFill>
+              <a:latin typeface="Consolas" pitchFamily="49" charset="0"/>
+              <a:cs typeface="Consolas" pitchFamily="49" charset="0"/>
+            </a:endParaRPr>
+          </a:p>
+          <a:p>
+            <a:r>
+              <a:rPr lang="en-US" sz="1600" dirty="0" smtClean="0">
+                <a:solidFill>
+                  <a:schemeClr val="accent2">
+                    <a:lumMod val="50000"/>
+                  </a:schemeClr>
+                </a:solidFill>
+                <a:latin typeface="Consolas" pitchFamily="49" charset="0"/>
+                <a:cs typeface="Consolas" pitchFamily="49" charset="0"/>
+              </a:rPr>
+              <a:t>f(101)             	</a:t>
+            </a:r>
+            <a:r>
+              <a:rPr lang="en-US" sz="1600" dirty="0" smtClean="0">
+                <a:solidFill>
+                  <a:schemeClr val="accent5">
+                    <a:lumMod val="75000"/>
+                  </a:schemeClr>
+                </a:solidFill>
+                <a:latin typeface="Consolas" pitchFamily="49" charset="0"/>
+                <a:cs typeface="Consolas" pitchFamily="49" charset="0"/>
+              </a:rPr>
+              <a:t>-- First class functions		true</a:t>
+            </a:r>
+          </a:p>
+          <a:p>
+            <a:endParaRPr lang="en-US" sz="1600" dirty="0" smtClean="0">
+              <a:solidFill>
+                <a:schemeClr val="accent2">
+                  <a:lumMod val="50000"/>
+                </a:schemeClr>
+              </a:solidFill>
+              <a:latin typeface="Consolas" pitchFamily="49" charset="0"/>
+              <a:cs typeface="Consolas" pitchFamily="49" charset="0"/>
+            </a:endParaRPr>
+          </a:p>
+          <a:p>
+            <a:r>
+              <a:rPr lang="en-US" sz="1600" dirty="0">
+                <a:solidFill>
+                  <a:schemeClr val="accent2">
+                    <a:lumMod val="50000"/>
+                  </a:schemeClr>
+                </a:solidFill>
+                <a:latin typeface="Consolas" pitchFamily="49" charset="0"/>
+                <a:cs typeface="Consolas" pitchFamily="49" charset="0"/>
+              </a:rPr>
+              <a:t>	</a:t>
+            </a:r>
+            <a:r>
+              <a:rPr lang="en-US" sz="1600" dirty="0" smtClean="0">
+                <a:solidFill>
+                  <a:schemeClr val="accent2">
+                    <a:lumMod val="50000"/>
+                  </a:schemeClr>
+                </a:solidFill>
+                <a:latin typeface="Consolas" pitchFamily="49" charset="0"/>
+                <a:cs typeface="Consolas" pitchFamily="49" charset="0"/>
+              </a:rPr>
+              <a:t>		</a:t>
+            </a:r>
+            <a:r>
+              <a:rPr lang="en-US" sz="1600" dirty="0" smtClean="0">
+                <a:solidFill>
+                  <a:schemeClr val="accent5">
+                    <a:lumMod val="75000"/>
+                  </a:schemeClr>
+                </a:solidFill>
+                <a:latin typeface="Consolas" pitchFamily="49" charset="0"/>
+                <a:cs typeface="Consolas" pitchFamily="49" charset="0"/>
+              </a:rPr>
+              <a:t>--</a:t>
+            </a:r>
+            <a:r>
+              <a:rPr lang="en-US" sz="1600" dirty="0" smtClean="0">
+                <a:solidFill>
+                  <a:schemeClr val="accent2">
+                    <a:lumMod val="50000"/>
+                  </a:schemeClr>
+                </a:solidFill>
+                <a:latin typeface="Consolas" pitchFamily="49" charset="0"/>
+                <a:cs typeface="Consolas" pitchFamily="49" charset="0"/>
+              </a:rPr>
+              <a:t> </a:t>
+            </a:r>
+            <a:r>
+              <a:rPr lang="en-US" sz="1600" dirty="0" smtClean="0">
+                <a:solidFill>
+                  <a:schemeClr val="accent5">
+                    <a:lumMod val="75000"/>
+                  </a:schemeClr>
+                </a:solidFill>
+                <a:latin typeface="Consolas" pitchFamily="49" charset="0"/>
+                <a:cs typeface="Consolas" pitchFamily="49" charset="0"/>
+              </a:rPr>
+              <a:t>List comprehensions and</a:t>
+            </a:r>
+          </a:p>
+          <a:p>
+            <a:r>
+              <a:rPr lang="en-US" sz="1600" dirty="0" smtClean="0">
+                <a:solidFill>
+                  <a:schemeClr val="accent2">
+                    <a:lumMod val="50000"/>
+                  </a:schemeClr>
+                </a:solidFill>
+                <a:latin typeface="Consolas" pitchFamily="49" charset="0"/>
+                <a:cs typeface="Consolas" pitchFamily="49" charset="0"/>
+              </a:rPr>
+              <a:t>filter </a:t>
+            </a:r>
+            <a:r>
+              <a:rPr lang="en-US" sz="1600" dirty="0" err="1">
+                <a:solidFill>
+                  <a:schemeClr val="accent2">
+                    <a:lumMod val="50000"/>
+                  </a:schemeClr>
+                </a:solidFill>
+                <a:latin typeface="Consolas" pitchFamily="49" charset="0"/>
+                <a:cs typeface="Consolas" pitchFamily="49" charset="0"/>
+              </a:rPr>
+              <a:t>isBig</a:t>
+            </a:r>
+            <a:r>
+              <a:rPr lang="en-US" sz="1600" dirty="0">
+                <a:solidFill>
+                  <a:schemeClr val="accent2">
+                    <a:lumMod val="50000"/>
+                  </a:schemeClr>
+                </a:solidFill>
+                <a:latin typeface="Consolas" pitchFamily="49" charset="0"/>
+                <a:cs typeface="Consolas" pitchFamily="49" charset="0"/>
+              </a:rPr>
+              <a:t> [1, 3, 105</a:t>
+            </a:r>
+            <a:r>
+              <a:rPr lang="en-US" sz="1600" dirty="0" smtClean="0">
+                <a:solidFill>
+                  <a:schemeClr val="accent2">
+                    <a:lumMod val="50000"/>
+                  </a:schemeClr>
+                </a:solidFill>
+                <a:latin typeface="Consolas" pitchFamily="49" charset="0"/>
+                <a:cs typeface="Consolas" pitchFamily="49" charset="0"/>
+              </a:rPr>
+              <a:t>] </a:t>
+            </a:r>
+            <a:r>
+              <a:rPr lang="en-US" sz="1600" dirty="0" smtClean="0">
+                <a:solidFill>
+                  <a:schemeClr val="accent5">
+                    <a:lumMod val="75000"/>
+                  </a:schemeClr>
+                </a:solidFill>
+                <a:latin typeface="Consolas" pitchFamily="49" charset="0"/>
+                <a:cs typeface="Consolas" pitchFamily="49" charset="0"/>
+              </a:rPr>
+              <a:t>-- higher </a:t>
+            </a:r>
+            <a:r>
+              <a:rPr lang="en-US" sz="1600" dirty="0">
+                <a:solidFill>
+                  <a:schemeClr val="accent5">
+                    <a:lumMod val="75000"/>
+                  </a:schemeClr>
+                </a:solidFill>
+                <a:latin typeface="Consolas" pitchFamily="49" charset="0"/>
+                <a:cs typeface="Consolas" pitchFamily="49" charset="0"/>
+              </a:rPr>
+              <a:t>order functions </a:t>
+            </a:r>
+            <a:r>
+              <a:rPr lang="en-US" sz="1600" dirty="0" smtClean="0">
+                <a:solidFill>
+                  <a:schemeClr val="accent5">
+                    <a:lumMod val="75000"/>
+                  </a:schemeClr>
+                </a:solidFill>
+                <a:latin typeface="Consolas" pitchFamily="49" charset="0"/>
+                <a:cs typeface="Consolas" pitchFamily="49" charset="0"/>
+              </a:rPr>
+              <a:t>and	[105]</a:t>
+            </a:r>
+          </a:p>
+          <a:p>
+            <a:r>
+              <a:rPr lang="en-US" sz="1600" dirty="0" smtClean="0">
+                <a:solidFill>
+                  <a:schemeClr val="accent2">
+                    <a:lumMod val="50000"/>
+                  </a:schemeClr>
+                </a:solidFill>
+                <a:latin typeface="Consolas" pitchFamily="49" charset="0"/>
+                <a:cs typeface="Consolas" pitchFamily="49" charset="0"/>
+              </a:rPr>
+              <a:t>map (\n -&gt; n/2) [2, 4] 	</a:t>
+            </a:r>
+            <a:r>
+              <a:rPr lang="en-US" sz="1600" dirty="0" smtClean="0">
+                <a:solidFill>
+                  <a:schemeClr val="accent5">
+                    <a:lumMod val="75000"/>
+                  </a:schemeClr>
+                </a:solidFill>
+                <a:latin typeface="Consolas" pitchFamily="49" charset="0"/>
+                <a:cs typeface="Consolas" pitchFamily="49" charset="0"/>
+              </a:rPr>
+              <a:t>-- anonymous functions		[1, 2]</a:t>
+            </a:r>
+          </a:p>
+          <a:p>
+            <a:endParaRPr lang="en-US" sz="1600" dirty="0" smtClean="0">
+              <a:solidFill>
+                <a:schemeClr val="accent5">
+                  <a:lumMod val="75000"/>
+                </a:schemeClr>
+              </a:solidFill>
+              <a:latin typeface="Consolas" pitchFamily="49" charset="0"/>
+              <a:cs typeface="Consolas" pitchFamily="49" charset="0"/>
+            </a:endParaRPr>
+          </a:p>
+          <a:p>
+            <a:r>
+              <a:rPr lang="en-US" sz="1600" dirty="0">
+                <a:solidFill>
+                  <a:schemeClr val="accent2">
+                    <a:lumMod val="50000"/>
+                  </a:schemeClr>
+                </a:solidFill>
+                <a:latin typeface="Consolas" pitchFamily="49" charset="0"/>
+                <a:cs typeface="Consolas" pitchFamily="49" charset="0"/>
+              </a:rPr>
+              <a:t>take m </a:t>
+            </a:r>
+            <a:r>
+              <a:rPr lang="en-US" sz="1600" dirty="0" err="1">
+                <a:solidFill>
+                  <a:schemeClr val="accent2">
+                    <a:lumMod val="50000"/>
+                  </a:schemeClr>
+                </a:solidFill>
+                <a:latin typeface="Consolas" pitchFamily="49" charset="0"/>
+                <a:cs typeface="Consolas" pitchFamily="49" charset="0"/>
+              </a:rPr>
+              <a:t>ys</a:t>
+            </a:r>
+            <a:r>
+              <a:rPr lang="en-US" sz="1600" dirty="0">
+                <a:solidFill>
+                  <a:schemeClr val="accent2">
+                    <a:lumMod val="50000"/>
+                  </a:schemeClr>
+                </a:solidFill>
+                <a:latin typeface="Consolas" pitchFamily="49" charset="0"/>
+                <a:cs typeface="Consolas" pitchFamily="49" charset="0"/>
+              </a:rPr>
+              <a:t> </a:t>
+            </a:r>
+            <a:r>
+              <a:rPr lang="en-US" sz="1600" dirty="0" smtClean="0">
+                <a:solidFill>
+                  <a:schemeClr val="accent2">
+                    <a:lumMod val="50000"/>
+                  </a:schemeClr>
+                </a:solidFill>
+                <a:latin typeface="Consolas" pitchFamily="49" charset="0"/>
+                <a:cs typeface="Consolas" pitchFamily="49" charset="0"/>
+              </a:rPr>
+              <a:t>=</a:t>
+            </a:r>
+            <a:r>
+              <a:rPr lang="en-US" sz="1600" dirty="0">
+                <a:solidFill>
+                  <a:schemeClr val="accent2">
+                    <a:lumMod val="50000"/>
+                  </a:schemeClr>
+                </a:solidFill>
+                <a:latin typeface="Consolas" pitchFamily="49" charset="0"/>
+                <a:cs typeface="Consolas" pitchFamily="49" charset="0"/>
+              </a:rPr>
+              <a:t> case (</a:t>
+            </a:r>
+            <a:r>
+              <a:rPr lang="en-US" sz="1600" dirty="0" err="1">
+                <a:solidFill>
+                  <a:schemeClr val="accent2">
+                    <a:lumMod val="50000"/>
+                  </a:schemeClr>
+                </a:solidFill>
+                <a:latin typeface="Consolas" pitchFamily="49" charset="0"/>
+                <a:cs typeface="Consolas" pitchFamily="49" charset="0"/>
+              </a:rPr>
+              <a:t>m,ys</a:t>
+            </a:r>
+            <a:r>
+              <a:rPr lang="en-US" sz="1600" dirty="0">
+                <a:solidFill>
+                  <a:schemeClr val="accent2">
+                    <a:lumMod val="50000"/>
+                  </a:schemeClr>
+                </a:solidFill>
+                <a:latin typeface="Consolas" pitchFamily="49" charset="0"/>
+                <a:cs typeface="Consolas" pitchFamily="49" charset="0"/>
+              </a:rPr>
+              <a:t>) </a:t>
+            </a:r>
+            <a:r>
+              <a:rPr lang="en-US" sz="1600" dirty="0" smtClean="0">
+                <a:solidFill>
+                  <a:schemeClr val="accent2">
+                    <a:lumMod val="50000"/>
+                  </a:schemeClr>
+                </a:solidFill>
+                <a:latin typeface="Consolas" pitchFamily="49" charset="0"/>
+                <a:cs typeface="Consolas" pitchFamily="49" charset="0"/>
+              </a:rPr>
+              <a:t>of	</a:t>
+            </a:r>
+            <a:r>
+              <a:rPr lang="en-US" sz="1600" dirty="0" smtClean="0">
+                <a:solidFill>
+                  <a:schemeClr val="accent5">
+                    <a:lumMod val="75000"/>
+                  </a:schemeClr>
+                </a:solidFill>
+                <a:latin typeface="Consolas" pitchFamily="49" charset="0"/>
+                <a:cs typeface="Consolas" pitchFamily="49" charset="0"/>
+              </a:rPr>
+              <a:t>-- Pattern matching</a:t>
+            </a:r>
+            <a:r>
+              <a:rPr lang="en-US" sz="1600" dirty="0">
+                <a:solidFill>
+                  <a:schemeClr val="accent2">
+                    <a:lumMod val="50000"/>
+                  </a:schemeClr>
+                </a:solidFill>
+                <a:latin typeface="Consolas" pitchFamily="49" charset="0"/>
+                <a:cs typeface="Consolas" pitchFamily="49" charset="0"/>
+              </a:rPr>
+              <a:t/>
+            </a:r>
+            <a:br>
+              <a:rPr lang="en-US" sz="1600" dirty="0">
+                <a:solidFill>
+                  <a:schemeClr val="accent2">
+                    <a:lumMod val="50000"/>
+                  </a:schemeClr>
+                </a:solidFill>
+                <a:latin typeface="Consolas" pitchFamily="49" charset="0"/>
+                <a:cs typeface="Consolas" pitchFamily="49" charset="0"/>
+              </a:rPr>
+            </a:br>
+            <a:r>
+              <a:rPr lang="en-US" sz="1600" dirty="0">
+                <a:solidFill>
+                  <a:schemeClr val="accent2">
+                    <a:lumMod val="50000"/>
+                  </a:schemeClr>
+                </a:solidFill>
+                <a:latin typeface="Consolas" pitchFamily="49" charset="0"/>
+                <a:cs typeface="Consolas" pitchFamily="49" charset="0"/>
+              </a:rPr>
+              <a:t>            (0,_) </a:t>
+            </a:r>
+            <a:r>
+              <a:rPr lang="en-US" sz="1600" dirty="0" smtClean="0">
+                <a:solidFill>
+                  <a:schemeClr val="accent2">
+                    <a:lumMod val="50000"/>
+                  </a:schemeClr>
+                </a:solidFill>
+                <a:latin typeface="Consolas" pitchFamily="49" charset="0"/>
+                <a:cs typeface="Consolas" pitchFamily="49" charset="0"/>
+              </a:rPr>
+              <a:t>  </a:t>
+            </a:r>
+            <a:r>
+              <a:rPr lang="en-US" sz="1600" dirty="0">
+                <a:solidFill>
+                  <a:schemeClr val="accent2">
+                    <a:lumMod val="50000"/>
+                  </a:schemeClr>
+                </a:solidFill>
+                <a:latin typeface="Consolas" pitchFamily="49" charset="0"/>
+                <a:cs typeface="Consolas" pitchFamily="49" charset="0"/>
+              </a:rPr>
+              <a:t> -&gt;  []</a:t>
+            </a:r>
+            <a:r>
+              <a:rPr lang="en-US" sz="1600" dirty="0">
+                <a:solidFill>
+                  <a:schemeClr val="accent2">
+                    <a:lumMod val="50000"/>
+                  </a:schemeClr>
+                </a:solidFill>
+                <a:latin typeface="Consolas" pitchFamily="49" charset="0"/>
+                <a:cs typeface="Consolas" pitchFamily="49" charset="0"/>
+              </a:rPr>
+              <a:t/>
+            </a:r>
+            <a:br>
+              <a:rPr lang="en-US" sz="1600" dirty="0">
+                <a:solidFill>
+                  <a:schemeClr val="accent2">
+                    <a:lumMod val="50000"/>
+                  </a:schemeClr>
+                </a:solidFill>
+                <a:latin typeface="Consolas" pitchFamily="49" charset="0"/>
+                <a:cs typeface="Consolas" pitchFamily="49" charset="0"/>
+              </a:rPr>
+            </a:br>
+            <a:r>
+              <a:rPr lang="en-US" sz="1600" dirty="0">
+                <a:solidFill>
+                  <a:schemeClr val="accent2">
+                    <a:lumMod val="50000"/>
+                  </a:schemeClr>
+                </a:solidFill>
+                <a:latin typeface="Consolas" pitchFamily="49" charset="0"/>
+                <a:cs typeface="Consolas" pitchFamily="49" charset="0"/>
+              </a:rPr>
+              <a:t>            </a:t>
+            </a:r>
+            <a:r>
+              <a:rPr lang="en-US" sz="1600" dirty="0" smtClean="0">
+                <a:solidFill>
+                  <a:schemeClr val="accent2">
+                    <a:lumMod val="50000"/>
+                  </a:schemeClr>
+                </a:solidFill>
+                <a:latin typeface="Consolas" pitchFamily="49" charset="0"/>
+                <a:cs typeface="Consolas" pitchFamily="49" charset="0"/>
+              </a:rPr>
+              <a:t>(_,[])</a:t>
+            </a:r>
+            <a:r>
+              <a:rPr lang="en-US" sz="1600" dirty="0">
+                <a:solidFill>
+                  <a:schemeClr val="accent2">
+                    <a:lumMod val="50000"/>
+                  </a:schemeClr>
+                </a:solidFill>
+                <a:latin typeface="Consolas" pitchFamily="49" charset="0"/>
+                <a:cs typeface="Consolas" pitchFamily="49" charset="0"/>
+              </a:rPr>
+              <a:t>   -&gt;  []</a:t>
+            </a:r>
+            <a:r>
+              <a:rPr lang="en-US" sz="1600" dirty="0">
+                <a:solidFill>
+                  <a:schemeClr val="accent2">
+                    <a:lumMod val="50000"/>
+                  </a:schemeClr>
+                </a:solidFill>
+                <a:latin typeface="Consolas" pitchFamily="49" charset="0"/>
+                <a:cs typeface="Consolas" pitchFamily="49" charset="0"/>
+              </a:rPr>
+              <a:t/>
+            </a:r>
+            <a:br>
+              <a:rPr lang="en-US" sz="1600" dirty="0">
+                <a:solidFill>
+                  <a:schemeClr val="accent2">
+                    <a:lumMod val="50000"/>
+                  </a:schemeClr>
+                </a:solidFill>
+                <a:latin typeface="Consolas" pitchFamily="49" charset="0"/>
+                <a:cs typeface="Consolas" pitchFamily="49" charset="0"/>
+              </a:rPr>
+            </a:br>
+            <a:r>
+              <a:rPr lang="en-US" sz="1600" dirty="0">
+                <a:solidFill>
+                  <a:schemeClr val="accent2">
+                    <a:lumMod val="50000"/>
+                  </a:schemeClr>
+                </a:solidFill>
+                <a:latin typeface="Consolas" pitchFamily="49" charset="0"/>
+                <a:cs typeface="Consolas" pitchFamily="49" charset="0"/>
+              </a:rPr>
+              <a:t>            </a:t>
+            </a:r>
+            <a:r>
+              <a:rPr lang="en-US" sz="1600" dirty="0" smtClean="0">
+                <a:solidFill>
+                  <a:schemeClr val="accent2">
+                    <a:lumMod val="50000"/>
+                  </a:schemeClr>
+                </a:solidFill>
+                <a:latin typeface="Consolas" pitchFamily="49" charset="0"/>
+                <a:cs typeface="Consolas" pitchFamily="49" charset="0"/>
+              </a:rPr>
+              <a:t>(</a:t>
+            </a:r>
+            <a:r>
+              <a:rPr lang="en-US" sz="1600" dirty="0" err="1" smtClean="0">
+                <a:solidFill>
+                  <a:schemeClr val="accent2">
+                    <a:lumMod val="50000"/>
+                  </a:schemeClr>
+                </a:solidFill>
+                <a:latin typeface="Consolas" pitchFamily="49" charset="0"/>
+                <a:cs typeface="Consolas" pitchFamily="49" charset="0"/>
+              </a:rPr>
+              <a:t>n,x:xs</a:t>
+            </a:r>
+            <a:r>
+              <a:rPr lang="en-US" sz="1600" dirty="0">
+                <a:solidFill>
+                  <a:schemeClr val="accent2">
+                    <a:lumMod val="50000"/>
+                  </a:schemeClr>
+                </a:solidFill>
+                <a:latin typeface="Consolas" pitchFamily="49" charset="0"/>
+                <a:cs typeface="Consolas" pitchFamily="49" charset="0"/>
+              </a:rPr>
+              <a:t>) </a:t>
+            </a:r>
+            <a:r>
+              <a:rPr lang="en-US" sz="1600" dirty="0" smtClean="0">
+                <a:solidFill>
+                  <a:schemeClr val="accent2">
+                    <a:lumMod val="50000"/>
+                  </a:schemeClr>
+                </a:solidFill>
+                <a:latin typeface="Consolas" pitchFamily="49" charset="0"/>
+                <a:cs typeface="Consolas" pitchFamily="49" charset="0"/>
+              </a:rPr>
+              <a:t>-&gt;</a:t>
+            </a:r>
+            <a:r>
+              <a:rPr lang="en-US" sz="1600" dirty="0">
+                <a:solidFill>
+                  <a:schemeClr val="accent2">
+                    <a:lumMod val="50000"/>
+                  </a:schemeClr>
+                </a:solidFill>
+                <a:latin typeface="Consolas" pitchFamily="49" charset="0"/>
+                <a:cs typeface="Consolas" pitchFamily="49" charset="0"/>
+              </a:rPr>
+              <a:t>  x : take (n-1) </a:t>
+            </a:r>
+            <a:r>
+              <a:rPr lang="en-US" sz="1600" dirty="0" err="1" smtClean="0">
+                <a:solidFill>
+                  <a:schemeClr val="accent2">
+                    <a:lumMod val="50000"/>
+                  </a:schemeClr>
+                </a:solidFill>
+                <a:latin typeface="Consolas" pitchFamily="49" charset="0"/>
+                <a:cs typeface="Consolas" pitchFamily="49" charset="0"/>
+              </a:rPr>
+              <a:t>xs</a:t>
+            </a:r>
+            <a:endParaRPr lang="en-US" sz="1600" dirty="0" smtClean="0">
+              <a:solidFill>
+                <a:schemeClr val="accent2">
+                  <a:lumMod val="50000"/>
+                </a:schemeClr>
+              </a:solidFill>
+              <a:latin typeface="Consolas" pitchFamily="49" charset="0"/>
+              <a:cs typeface="Consolas" pitchFamily="49" charset="0"/>
+            </a:endParaRPr>
+          </a:p>
+          <a:p>
+            <a:endParaRPr lang="en-US" sz="1600" dirty="0">
+              <a:solidFill>
+                <a:schemeClr val="accent2">
+                  <a:lumMod val="50000"/>
+                </a:schemeClr>
+              </a:solidFill>
+              <a:latin typeface="Consolas" pitchFamily="49" charset="0"/>
+              <a:cs typeface="Consolas" pitchFamily="49" charset="0"/>
+            </a:endParaRPr>
+          </a:p>
+          <a:p>
+            <a:r>
+              <a:rPr lang="en-US" sz="1600" dirty="0" smtClean="0">
+                <a:solidFill>
+                  <a:schemeClr val="accent2">
+                    <a:lumMod val="50000"/>
+                  </a:schemeClr>
+                </a:solidFill>
+                <a:latin typeface="Consolas" pitchFamily="49" charset="0"/>
+                <a:cs typeface="Consolas" pitchFamily="49" charset="0"/>
+              </a:rPr>
+              <a:t>add x y = x + y                 	</a:t>
+            </a:r>
+            <a:r>
+              <a:rPr lang="en-US" sz="1600" dirty="0" smtClean="0">
+                <a:solidFill>
+                  <a:schemeClr val="accent5">
+                    <a:lumMod val="75000"/>
+                  </a:schemeClr>
+                </a:solidFill>
+                <a:latin typeface="Consolas" pitchFamily="49" charset="0"/>
+                <a:cs typeface="Consolas" pitchFamily="49" charset="0"/>
+              </a:rPr>
+              <a:t>-- All functions are curried</a:t>
+            </a:r>
+          </a:p>
+          <a:p>
+            <a:r>
+              <a:rPr lang="en-US" sz="1600" dirty="0" err="1" smtClean="0">
+                <a:solidFill>
+                  <a:schemeClr val="accent2">
+                    <a:lumMod val="50000"/>
+                  </a:schemeClr>
+                </a:solidFill>
+                <a:latin typeface="Consolas" pitchFamily="49" charset="0"/>
+                <a:cs typeface="Consolas" pitchFamily="49" charset="0"/>
+              </a:rPr>
+              <a:t>addFive</a:t>
+            </a:r>
+            <a:r>
+              <a:rPr lang="en-US" sz="1600" dirty="0" smtClean="0">
+                <a:solidFill>
+                  <a:schemeClr val="accent2">
+                    <a:lumMod val="50000"/>
+                  </a:schemeClr>
+                </a:solidFill>
+                <a:latin typeface="Consolas" pitchFamily="49" charset="0"/>
+                <a:cs typeface="Consolas" pitchFamily="49" charset="0"/>
+              </a:rPr>
+              <a:t> = add 5			</a:t>
+            </a:r>
+            <a:r>
+              <a:rPr lang="en-US" sz="1600" dirty="0" smtClean="0">
+                <a:solidFill>
+                  <a:schemeClr val="accent5">
+                    <a:lumMod val="75000"/>
+                  </a:schemeClr>
+                </a:solidFill>
+                <a:latin typeface="Consolas" pitchFamily="49" charset="0"/>
+                <a:cs typeface="Consolas" pitchFamily="49" charset="0"/>
+              </a:rPr>
+              <a:t>-- and can be partially applied</a:t>
+            </a:r>
+          </a:p>
+          <a:p>
+            <a:r>
+              <a:rPr lang="en-US" sz="1600" dirty="0" err="1" smtClean="0">
+                <a:solidFill>
+                  <a:schemeClr val="accent2">
+                    <a:lumMod val="50000"/>
+                  </a:schemeClr>
+                </a:solidFill>
+                <a:latin typeface="Consolas" pitchFamily="49" charset="0"/>
+                <a:cs typeface="Consolas" pitchFamily="49" charset="0"/>
+              </a:rPr>
+              <a:t>addFive</a:t>
+            </a:r>
+            <a:r>
+              <a:rPr lang="en-US" sz="1600" dirty="0" smtClean="0">
+                <a:solidFill>
+                  <a:schemeClr val="accent2">
+                    <a:lumMod val="50000"/>
+                  </a:schemeClr>
+                </a:solidFill>
+                <a:latin typeface="Consolas" pitchFamily="49" charset="0"/>
+                <a:cs typeface="Consolas" pitchFamily="49" charset="0"/>
+              </a:rPr>
+              <a:t> 3			</a:t>
+            </a:r>
+            <a:r>
+              <a:rPr lang="en-US" sz="1600" dirty="0" smtClean="0">
+                <a:solidFill>
+                  <a:schemeClr val="accent5">
+                    <a:lumMod val="75000"/>
+                  </a:schemeClr>
+                </a:solidFill>
+                <a:latin typeface="Consolas" pitchFamily="49" charset="0"/>
+                <a:cs typeface="Consolas" pitchFamily="49" charset="0"/>
+              </a:rPr>
+              <a:t>-- 8</a:t>
+            </a:r>
+          </a:p>
+          <a:p>
+            <a:endParaRPr lang="en-US" sz="1600" dirty="0" smtClean="0">
+              <a:solidFill>
+                <a:schemeClr val="accent5">
+                  <a:lumMod val="75000"/>
+                </a:schemeClr>
+              </a:solidFill>
+              <a:latin typeface="Consolas" pitchFamily="49" charset="0"/>
+              <a:cs typeface="Consolas" pitchFamily="49" charset="0"/>
+            </a:endParaRPr>
+          </a:p>
+        </p:txBody>
+      </p:sp>
+      <p:sp>
+        <p:nvSpPr>
+          <p:cNvPr id="5" name="TextBox 4"/>
+          <p:cNvSpPr txBox="1"/>
+          <p:nvPr/>
+        </p:nvSpPr>
+        <p:spPr>
+          <a:xfrm>
+            <a:off x="609600" y="1485259"/>
+            <a:ext cx="7315200" cy="369332"/>
+          </a:xfrm>
+          <a:prstGeom prst="rect">
+            <a:avLst/>
+          </a:prstGeom>
+          <a:solidFill>
+            <a:schemeClr val="accent2">
+              <a:lumMod val="50000"/>
+            </a:schemeClr>
+          </a:solidFill>
+        </p:spPr>
+        <p:txBody>
+          <a:bodyPr wrap="square" rtlCol="0">
+            <a:spAutoFit/>
+          </a:bodyPr>
+          <a:lstStyle/>
+          <a:p>
+            <a:r>
+              <a:rPr lang="en-US" dirty="0" smtClean="0">
+                <a:solidFill>
+                  <a:schemeClr val="bg1"/>
+                </a:solidFill>
+                <a:latin typeface="Consolas" pitchFamily="49" charset="0"/>
+                <a:cs typeface="Consolas" pitchFamily="49" charset="0"/>
+              </a:rPr>
+              <a:t>Haskell</a:t>
+            </a:r>
+            <a:endParaRPr lang="en-US" dirty="0">
+              <a:solidFill>
+                <a:schemeClr val="bg1"/>
+              </a:solidFill>
+              <a:latin typeface="Consolas" pitchFamily="49" charset="0"/>
+              <a:cs typeface="Consolas" pitchFamily="49" charset="0"/>
+            </a:endParaRPr>
           </a:p>
         </p:txBody>
       </p:sp>
     </p:spTree>
     <p:extLst>
       <p:ext uri="{BB962C8B-B14F-4D97-AF65-F5344CB8AC3E}">
-        <p14:creationId xmlns:p14="http://schemas.microsoft.com/office/powerpoint/2010/main" val="4057990024"/>
+        <p14:creationId xmlns:p14="http://schemas.microsoft.com/office/powerpoint/2010/main" val="3487295646"/>
       </p:ext>
     </p:extLst>
   </p:cSld>
@@ -17583,6 +18398,239 @@
           <a:lstStyle/>
           <a:p>
             <a:r>
+              <a:rPr lang="en-US" dirty="0" smtClean="0"/>
+              <a:t>Haskell, cont.</a:t>
+            </a:r>
+            <a:endParaRPr lang="en-US" dirty="0"/>
+          </a:p>
+        </p:txBody>
+      </p:sp>
+      <p:sp>
+        <p:nvSpPr>
+          <p:cNvPr id="3" name="Content Placeholder 2"/>
+          <p:cNvSpPr>
+            <a:spLocks noGrp="1"/>
+          </p:cNvSpPr>
+          <p:nvPr>
+            <p:ph idx="1"/>
+          </p:nvPr>
+        </p:nvSpPr>
+        <p:spPr/>
+        <p:txBody>
+          <a:bodyPr/>
+          <a:lstStyle/>
+          <a:p>
+            <a:r>
+              <a:rPr lang="en-US" dirty="0" smtClean="0"/>
+              <a:t>Great, free online IDE:   </a:t>
+            </a:r>
+            <a:r>
+              <a:rPr lang="en-US" dirty="0" smtClean="0">
+                <a:solidFill>
+                  <a:srgbClr val="0070C0"/>
+                </a:solidFill>
+              </a:rPr>
+              <a:t>fpcomplete.com</a:t>
+            </a:r>
+          </a:p>
+          <a:p>
+            <a:r>
+              <a:rPr lang="en-US" dirty="0" smtClean="0"/>
+              <a:t>Incredible free online book:   </a:t>
+            </a:r>
+            <a:r>
+              <a:rPr lang="en-US" dirty="0" smtClean="0">
+                <a:solidFill>
+                  <a:srgbClr val="0070C0"/>
+                </a:solidFill>
+              </a:rPr>
+              <a:t>learnyouahaskell.com</a:t>
+            </a:r>
+          </a:p>
+          <a:p>
+            <a:pPr lvl="1"/>
+            <a:r>
+              <a:rPr lang="en-US" dirty="0" smtClean="0"/>
+              <a:t>Strong introduction to FP concepts, including advanced ones</a:t>
+            </a:r>
+          </a:p>
+          <a:p>
+            <a:pPr lvl="1"/>
+            <a:r>
+              <a:rPr lang="en-US" dirty="0" smtClean="0"/>
+              <a:t>Even if learning </a:t>
+            </a:r>
+            <a:r>
+              <a:rPr lang="en-US" dirty="0" err="1" smtClean="0"/>
+              <a:t>Scala</a:t>
+            </a:r>
+            <a:r>
+              <a:rPr lang="en-US" dirty="0" smtClean="0"/>
+              <a:t>/Groovy/other, this is a great resource </a:t>
+            </a:r>
+          </a:p>
+          <a:p>
+            <a:endParaRPr lang="en-US" dirty="0">
+              <a:solidFill>
+                <a:srgbClr val="0070C0"/>
+              </a:solidFill>
+            </a:endParaRPr>
+          </a:p>
+        </p:txBody>
+      </p:sp>
+    </p:spTree>
+    <p:extLst>
+      <p:ext uri="{BB962C8B-B14F-4D97-AF65-F5344CB8AC3E}">
+        <p14:creationId xmlns:p14="http://schemas.microsoft.com/office/powerpoint/2010/main" val="2322966637"/>
+      </p:ext>
+    </p:extLst>
+  </p:cSld>
+  <p:clrMapOvr>
+    <a:masterClrMapping/>
+  </p:clrMapOvr>
+</p:sld>
+</file>
+
+<file path=ppt/slides/slide46.xml><?xml version="1.0" encoding="utf-8"?>
+<p:sld xmlns:a="http://schemas.openxmlformats.org/drawingml/2006/main" xmlns:r="http://schemas.openxmlformats.org/officeDocument/2006/relationships" xmlns:p="http://schemas.openxmlformats.org/presentationml/2006/main">
+  <p:cSld>
+    <p:spTree>
+      <p:nvGrpSpPr>
+        <p:cNvPr id="1" name=""/>
+        <p:cNvGrpSpPr/>
+        <p:nvPr/>
+      </p:nvGrpSpPr>
+      <p:grpSpPr>
+        <a:xfrm>
+          <a:off x="0" y="0"/>
+          <a:ext cx="0" cy="0"/>
+          <a:chOff x="0" y="0"/>
+          <a:chExt cx="0" cy="0"/>
+        </a:xfrm>
+      </p:grpSpPr>
+      <p:sp>
+        <p:nvSpPr>
+          <p:cNvPr id="2" name="Title 1"/>
+          <p:cNvSpPr>
+            <a:spLocks noGrp="1"/>
+          </p:cNvSpPr>
+          <p:nvPr>
+            <p:ph type="title"/>
+          </p:nvPr>
+        </p:nvSpPr>
+        <p:spPr/>
+        <p:txBody>
+          <a:bodyPr/>
+          <a:lstStyle/>
+          <a:p>
+            <a:r>
+              <a:rPr lang="en-US" dirty="0" smtClean="0"/>
+              <a:t>Related, Interesting Topics</a:t>
+            </a:r>
+            <a:endParaRPr lang="en-US" dirty="0"/>
+          </a:p>
+        </p:txBody>
+      </p:sp>
+      <p:sp>
+        <p:nvSpPr>
+          <p:cNvPr id="3" name="Content Placeholder 2"/>
+          <p:cNvSpPr>
+            <a:spLocks noGrp="1"/>
+          </p:cNvSpPr>
+          <p:nvPr>
+            <p:ph idx="1"/>
+          </p:nvPr>
+        </p:nvSpPr>
+        <p:spPr/>
+        <p:txBody>
+          <a:bodyPr/>
+          <a:lstStyle/>
+          <a:p>
+            <a:endParaRPr lang="en-US" dirty="0" smtClean="0"/>
+          </a:p>
+          <a:p>
+            <a:pPr lvl="1"/>
+            <a:r>
+              <a:rPr lang="en-US" dirty="0" smtClean="0"/>
+              <a:t>Non-Von Neumann computer architectures</a:t>
+            </a:r>
+          </a:p>
+          <a:p>
+            <a:pPr lvl="1"/>
+            <a:r>
+              <a:rPr lang="en-US" dirty="0" smtClean="0"/>
+              <a:t>Lambda calculus</a:t>
+            </a:r>
+          </a:p>
+          <a:p>
+            <a:pPr lvl="1"/>
+            <a:r>
+              <a:rPr lang="en-US" dirty="0" smtClean="0"/>
+              <a:t>Applying functional thinking outside your program</a:t>
+            </a:r>
+          </a:p>
+          <a:p>
+            <a:pPr lvl="1"/>
+            <a:r>
+              <a:rPr lang="en-US" dirty="0" smtClean="0"/>
+              <a:t>Logic programming</a:t>
+            </a:r>
+          </a:p>
+          <a:p>
+            <a:pPr lvl="1"/>
+            <a:endParaRPr lang="en-US" dirty="0" smtClean="0"/>
+          </a:p>
+          <a:p>
+            <a:endParaRPr lang="en-US" dirty="0" smtClean="0"/>
+          </a:p>
+        </p:txBody>
+      </p:sp>
+    </p:spTree>
+    <p:extLst>
+      <p:ext uri="{BB962C8B-B14F-4D97-AF65-F5344CB8AC3E}">
+        <p14:creationId xmlns:p14="http://schemas.microsoft.com/office/powerpoint/2010/main" val="4057990024"/>
+      </p:ext>
+    </p:extLst>
+  </p:cSld>
+  <p:clrMapOvr>
+    <a:masterClrMapping/>
+  </p:clrMapOvr>
+</p:sld>
+</file>
+
+<file path=ppt/slides/slide47.xml><?xml version="1.0" encoding="utf-8"?>
+<p:sld xmlns:a="http://schemas.openxmlformats.org/drawingml/2006/main" xmlns:r="http://schemas.openxmlformats.org/officeDocument/2006/relationships" xmlns:p="http://schemas.openxmlformats.org/presentationml/2006/main">
+  <p:cSld>
+    <p:spTree>
+      <p:nvGrpSpPr>
+        <p:cNvPr id="1" name=""/>
+        <p:cNvGrpSpPr/>
+        <p:nvPr/>
+      </p:nvGrpSpPr>
+      <p:grpSpPr>
+        <a:xfrm>
+          <a:off x="0" y="0"/>
+          <a:ext cx="0" cy="0"/>
+          <a:chOff x="0" y="0"/>
+          <a:chExt cx="0" cy="0"/>
+        </a:xfrm>
+      </p:grpSpPr>
+      <p:sp>
+        <p:nvSpPr>
+          <p:cNvPr id="2" name="Title 1"/>
+          <p:cNvSpPr>
+            <a:spLocks noGrp="1"/>
+          </p:cNvSpPr>
+          <p:nvPr>
+            <p:ph type="title"/>
+          </p:nvPr>
+        </p:nvSpPr>
+        <p:spPr/>
+        <p:txBody>
+          <a:bodyPr/>
+          <a:lstStyle/>
+          <a:p>
+            <a:r>
               <a:rPr lang="en-US" dirty="0" err="1" smtClean="0"/>
               <a:t>Scratchpage</a:t>
             </a:r>
@@ -17688,7 +18736,7 @@
 </p:sld>
 </file>
 
-<file path=ppt/slides/slide46.xml><?xml version="1.0" encoding="utf-8"?>
+<file path=ppt/slides/slide48.xml><?xml version="1.0" encoding="utf-8"?>
 <p:sld xmlns:a="http://schemas.openxmlformats.org/drawingml/2006/main" xmlns:r="http://schemas.openxmlformats.org/officeDocument/2006/relationships" xmlns:p="http://schemas.openxmlformats.org/presentationml/2006/main">
   <p:cSld>
     <p:spTree>
@@ -18109,11 +19157,7 @@
             <a:pPr lvl="1"/>
             <a:r>
               <a:rPr lang="en-US" dirty="0" smtClean="0"/>
-              <a:t>Instead </a:t>
-            </a:r>
-            <a:r>
-              <a:rPr lang="en-US" dirty="0" smtClean="0"/>
-              <a:t>of thinking about </a:t>
+              <a:t>Instead of thinking about </a:t>
             </a:r>
             <a:r>
               <a:rPr lang="en-US" i="1" dirty="0" smtClean="0"/>
@@ -18129,11 +19173,7 @@
             </a:r>
             <a:r>
               <a:rPr lang="en-US" dirty="0" smtClean="0"/>
-              <a:t>, </a:t>
-            </a:r>
-            <a:r>
-              <a:rPr lang="en-US" dirty="0" smtClean="0"/>
-              <a:t>we think about </a:t>
+              <a:t>, we think about </a:t>
             </a:r>
             <a:r>
               <a:rPr lang="en-US" i="1" dirty="0" smtClean="0"/>
@@ -18483,13 +19523,8 @@
             <a:pPr lvl="1"/>
             <a:r>
               <a:rPr lang="en-US" dirty="0" smtClean="0"/>
-              <a:t>Functions are simply </a:t>
-            </a:r>
-            <a:r>
-              <a:rPr lang="en-US" dirty="0" smtClean="0"/>
-              <a:t>expressions bound to names</a:t>
-            </a:r>
-            <a:endParaRPr lang="en-US" dirty="0" smtClean="0"/>
+              <a:t>Functions are simply expressions bound to names</a:t>
+            </a:r>
           </a:p>
           <a:p>
             <a:pPr lvl="1"/>
@@ -18536,17 +19571,8 @@
             <a:pPr lvl="1"/>
             <a:r>
               <a:rPr lang="en-US" dirty="0" smtClean="0"/>
-              <a:t>No mutable types, or </a:t>
-            </a:r>
-            <a:r>
-              <a:rPr lang="en-US" dirty="0" smtClean="0"/>
-              <a:t>mutable types tha</a:t>
-            </a:r>
-            <a:r>
-              <a:rPr lang="en-US" dirty="0" smtClean="0"/>
-              <a:t>t require very explicit decisions</a:t>
-            </a:r>
-            <a:endParaRPr lang="en-US" dirty="0" smtClean="0"/>
+              <a:t>No mutable types, or mutable types that require very explicit decisions</a:t>
+            </a:r>
           </a:p>
           <a:p>
             <a:pPr lvl="1"/>
@@ -18571,11 +19597,7 @@
           <a:p>
             <a:r>
               <a:rPr lang="en-US" dirty="0" smtClean="0"/>
-              <a:t>Some languages, e.g. Haskell, actually enforce these </a:t>
-            </a:r>
-            <a:r>
-              <a:rPr lang="en-US" dirty="0" smtClean="0"/>
-              <a:t>rules</a:t>
+              <a:t>Some languages, e.g. Haskell, actually enforce these rules</a:t>
             </a:r>
           </a:p>
           <a:p>
@@ -18583,7 +19605,6 @@
               <a:rPr lang="en-US" dirty="0" smtClean="0"/>
               <a:t>Maps more closely to mathematical concepts –emergent behavior</a:t>
             </a:r>
-            <a:endParaRPr lang="en-US" dirty="0" smtClean="0"/>
           </a:p>
         </p:txBody>
       </p:sp>

</xml_diff>

<commit_message>
Brian: Adding Java 8 examples and improving some others.
</commit_message>
<xml_diff>
--- a/FoundationsOfFunctionalProgramming.pptx
+++ b/FoundationsOfFunctionalProgramming.pptx
@@ -16739,7 +16739,15 @@
             </a:r>
             <a:r>
               <a:rPr lang="en-US" dirty="0" smtClean="0"/>
-              <a:t> in a 1977 paper: </a:t>
+              <a:t> in a 1977 </a:t>
+            </a:r>
+            <a:r>
+              <a:rPr lang="en-US" dirty="0" smtClean="0"/>
+              <a:t>Turing-award paper</a:t>
+            </a:r>
+            <a:r>
+              <a:rPr lang="en-US" dirty="0" smtClean="0"/>
+              <a:t>: </a:t>
             </a:r>
             <a:r>
               <a:rPr lang="en-US" i="1" dirty="0"/>
@@ -17241,7 +17249,7 @@
         </p:spPr>
         <p:txBody>
           <a:bodyPr>
-            <a:normAutofit lnSpcReduction="10000"/>
+            <a:normAutofit fontScale="92500"/>
           </a:bodyPr>
           <a:lstStyle/>
           <a:p>
@@ -17295,6 +17303,9 @@
               <a:rPr lang="en-US" dirty="0" smtClean="0"/>
               <a:t>Often, ‘if it compiles, it works’</a:t>
             </a:r>
+          </a:p>
+          <a:p>
+            <a:endParaRPr lang="en-US" dirty="0" smtClean="0"/>
           </a:p>
           <a:p>
             <a:pPr marL="114300" indent="0">
@@ -18434,6 +18445,19 @@
             </a:r>
           </a:p>
           <a:p>
+            <a:pPr lvl="1"/>
+            <a:r>
+              <a:rPr lang="en-US" dirty="0" smtClean="0">
+                <a:solidFill>
+                  <a:schemeClr val="tx2">
+                    <a:lumMod val="50000"/>
+                  </a:schemeClr>
+                </a:solidFill>
+              </a:rPr>
+              <a:t>Includes ‘School of Haskell’ tutorials</a:t>
+            </a:r>
+          </a:p>
+          <a:p>
             <a:r>
               <a:rPr lang="en-US" dirty="0" smtClean="0"/>
               <a:t>Incredible free online book:   </a:t>
@@ -18788,7 +18812,9 @@
         </p:nvSpPr>
         <p:spPr/>
         <p:txBody>
-          <a:bodyPr/>
+          <a:bodyPr>
+            <a:normAutofit/>
+          </a:bodyPr>
           <a:lstStyle/>
           <a:p>
             <a:pPr marL="571500" indent="-457200">
@@ -18796,25 +18822,33 @@
               <a:buAutoNum type="arabicPeriod"/>
             </a:pPr>
             <a:r>
-              <a:rPr lang="en-US" dirty="0" smtClean="0"/>
-              <a:t>“Can Programming be Liberated from its Von Neumann Style?” (1977 Turing award lecture by John Backus)</a:t>
+              <a:rPr lang="en-US" sz="1600" dirty="0" smtClean="0"/>
+              <a:t>“Can Programming be Liberated from its Von Neumann Style?” (1977 Turing award </a:t>
+            </a:r>
+            <a:r>
+              <a:rPr lang="en-US" sz="1600" dirty="0" smtClean="0"/>
+              <a:t>paper/lecture </a:t>
+            </a:r>
+            <a:r>
+              <a:rPr lang="en-US" sz="1600" dirty="0" smtClean="0"/>
+              <a:t>by John Backus)</a:t>
             </a:r>
           </a:p>
           <a:p>
             <a:pPr lvl="1"/>
             <a:r>
-              <a:rPr lang="en-US" dirty="0">
+              <a:rPr lang="en-US" sz="1400" dirty="0">
                 <a:hlinkClick r:id="rId2"/>
               </a:rPr>
               <a:t>http://</a:t>
             </a:r>
             <a:r>
-              <a:rPr lang="en-US" dirty="0" smtClean="0">
+              <a:rPr lang="en-US" sz="1400" dirty="0" smtClean="0">
                 <a:hlinkClick r:id="rId2"/>
               </a:rPr>
               <a:t>www.thocp.net/biographies/papers/backus_turingaward_lecture.pdf</a:t>
             </a:r>
-            <a:endParaRPr lang="en-US" dirty="0" smtClean="0"/>
+            <a:endParaRPr lang="en-US" sz="1400" dirty="0" smtClean="0"/>
           </a:p>
           <a:p>
             <a:pPr marL="571500" indent="-457200">
@@ -18822,7 +18856,7 @@
               <a:buAutoNum type="arabicPeriod"/>
             </a:pPr>
             <a:r>
-              <a:rPr lang="en-US" dirty="0" smtClean="0"/>
+              <a:rPr lang="en-US" sz="1600" dirty="0" smtClean="0"/>
               <a:t>“Functional Thinking” series by Neal Ford</a:t>
             </a:r>
           </a:p>
@@ -18832,31 +18866,19 @@
               <a:buAutoNum type="arabicPeriod"/>
             </a:pPr>
             <a:r>
-              <a:rPr lang="en-US" dirty="0" smtClean="0"/>
+              <a:rPr lang="en-US" sz="1600" dirty="0" smtClean="0"/>
               <a:t>“Referential Transparency” – Wikipedia</a:t>
             </a:r>
           </a:p>
           <a:p>
             <a:pPr lvl="1"/>
             <a:r>
-              <a:rPr lang="en-US" dirty="0" smtClean="0">
+              <a:rPr lang="en-US" sz="1400" dirty="0" smtClean="0">
                 <a:hlinkClick r:id="rId3"/>
               </a:rPr>
-              <a:t>http</a:t>
-            </a:r>
-            <a:r>
-              <a:rPr lang="en-US" dirty="0">
-                <a:hlinkClick r:id="rId3"/>
-              </a:rPr>
-              <a:t>://en.wikipedia.org/wiki/Referential_transparency_(computer_science</a:t>
-            </a:r>
-            <a:r>
-              <a:rPr lang="en-US" dirty="0" smtClean="0">
-                <a:hlinkClick r:id="rId3"/>
-              </a:rPr>
-              <a:t>)</a:t>
-            </a:r>
-            <a:endParaRPr lang="en-US" dirty="0" smtClean="0"/>
+              <a:t>http://en.wikipedia.org/wiki/Referential_transparency_(computer_science)</a:t>
+            </a:r>
+            <a:endParaRPr lang="en-US" sz="1400" dirty="0" smtClean="0"/>
           </a:p>
           <a:p>
             <a:pPr marL="571500" indent="-457200">
@@ -18864,13 +18886,61 @@
               <a:buAutoNum type="arabicPeriod"/>
             </a:pPr>
             <a:r>
-              <a:rPr lang="en-US" dirty="0" smtClean="0"/>
-              <a:t>Learn You a Haskell for Great Good!</a:t>
+              <a:rPr lang="en-US" sz="1600" dirty="0" smtClean="0"/>
+              <a:t>Learn </a:t>
+            </a:r>
+            <a:r>
+              <a:rPr lang="en-US" sz="1600" dirty="0" smtClean="0"/>
+              <a:t>You a Haskell for Great Good</a:t>
+            </a:r>
+            <a:r>
+              <a:rPr lang="en-US" sz="1600" dirty="0" smtClean="0"/>
+              <a:t>!</a:t>
             </a:r>
           </a:p>
           <a:p>
             <a:pPr lvl="1"/>
-            <a:endParaRPr lang="en-US" dirty="0"/>
+            <a:r>
+              <a:rPr lang="en-US" sz="1400" dirty="0" smtClean="0">
+                <a:hlinkClick r:id="rId4"/>
+              </a:rPr>
+              <a:t>http://learnyouahaskell.com</a:t>
+            </a:r>
+            <a:endParaRPr lang="en-US" sz="1400" dirty="0" smtClean="0"/>
+          </a:p>
+          <a:p>
+            <a:pPr marL="571500" indent="-457200">
+              <a:buFont typeface="+mj-lt"/>
+              <a:buAutoNum type="arabicPeriod"/>
+            </a:pPr>
+            <a:r>
+              <a:rPr lang="en-US" sz="1600" dirty="0" smtClean="0"/>
+              <a:t>Lambda FAQ (Java 8)</a:t>
+            </a:r>
+          </a:p>
+          <a:p>
+            <a:pPr lvl="1"/>
+            <a:r>
+              <a:rPr lang="en-US" sz="1400" dirty="0">
+                <a:hlinkClick r:id="rId5"/>
+              </a:rPr>
+              <a:t>http://</a:t>
+            </a:r>
+            <a:r>
+              <a:rPr lang="en-US" sz="1400" dirty="0" smtClean="0">
+                <a:hlinkClick r:id="rId5"/>
+              </a:rPr>
+              <a:t>www.lambdafaq.org</a:t>
+            </a:r>
+            <a:endParaRPr lang="en-US" sz="1400" dirty="0" smtClean="0"/>
+          </a:p>
+          <a:p>
+            <a:pPr lvl="1"/>
+            <a:endParaRPr lang="en-US" sz="1400" dirty="0" smtClean="0"/>
+          </a:p>
+          <a:p>
+            <a:pPr lvl="1"/>
+            <a:endParaRPr lang="en-US" sz="1400" dirty="0"/>
           </a:p>
         </p:txBody>
       </p:sp>

</xml_diff>

<commit_message>
Brian: More Java 8 stuff.
</commit_message>
<xml_diff>
--- a/FoundationsOfFunctionalProgramming.pptx
+++ b/FoundationsOfFunctionalProgramming.pptx
@@ -25,34 +25,33 @@
     <p:sldId id="259" r:id="rId19"/>
     <p:sldId id="285" r:id="rId20"/>
     <p:sldId id="277" r:id="rId21"/>
-    <p:sldId id="282" r:id="rId22"/>
-    <p:sldId id="280" r:id="rId23"/>
-    <p:sldId id="292" r:id="rId24"/>
-    <p:sldId id="291" r:id="rId25"/>
-    <p:sldId id="293" r:id="rId26"/>
-    <p:sldId id="289" r:id="rId27"/>
-    <p:sldId id="281" r:id="rId28"/>
-    <p:sldId id="294" r:id="rId29"/>
-    <p:sldId id="296" r:id="rId30"/>
-    <p:sldId id="297" r:id="rId31"/>
-    <p:sldId id="283" r:id="rId32"/>
-    <p:sldId id="302" r:id="rId33"/>
-    <p:sldId id="301" r:id="rId34"/>
-    <p:sldId id="287" r:id="rId35"/>
-    <p:sldId id="284" r:id="rId36"/>
-    <p:sldId id="286" r:id="rId37"/>
-    <p:sldId id="298" r:id="rId38"/>
-    <p:sldId id="299" r:id="rId39"/>
-    <p:sldId id="276" r:id="rId40"/>
-    <p:sldId id="279" r:id="rId41"/>
-    <p:sldId id="278" r:id="rId42"/>
-    <p:sldId id="300" r:id="rId43"/>
-    <p:sldId id="290" r:id="rId44"/>
-    <p:sldId id="303" r:id="rId45"/>
-    <p:sldId id="304" r:id="rId46"/>
-    <p:sldId id="270" r:id="rId47"/>
-    <p:sldId id="258" r:id="rId48"/>
-    <p:sldId id="263" r:id="rId49"/>
+    <p:sldId id="280" r:id="rId22"/>
+    <p:sldId id="292" r:id="rId23"/>
+    <p:sldId id="291" r:id="rId24"/>
+    <p:sldId id="293" r:id="rId25"/>
+    <p:sldId id="289" r:id="rId26"/>
+    <p:sldId id="281" r:id="rId27"/>
+    <p:sldId id="294" r:id="rId28"/>
+    <p:sldId id="296" r:id="rId29"/>
+    <p:sldId id="297" r:id="rId30"/>
+    <p:sldId id="283" r:id="rId31"/>
+    <p:sldId id="302" r:id="rId32"/>
+    <p:sldId id="301" r:id="rId33"/>
+    <p:sldId id="287" r:id="rId34"/>
+    <p:sldId id="284" r:id="rId35"/>
+    <p:sldId id="286" r:id="rId36"/>
+    <p:sldId id="298" r:id="rId37"/>
+    <p:sldId id="299" r:id="rId38"/>
+    <p:sldId id="276" r:id="rId39"/>
+    <p:sldId id="279" r:id="rId40"/>
+    <p:sldId id="278" r:id="rId41"/>
+    <p:sldId id="300" r:id="rId42"/>
+    <p:sldId id="290" r:id="rId43"/>
+    <p:sldId id="303" r:id="rId44"/>
+    <p:sldId id="304" r:id="rId45"/>
+    <p:sldId id="270" r:id="rId46"/>
+    <p:sldId id="258" r:id="rId47"/>
+    <p:sldId id="263" r:id="rId48"/>
   </p:sldIdLst>
   <p:sldSz cx="9144000" cy="6858000" type="screen4x3"/>
   <p:notesSz cx="6858000" cy="9144000"/>
@@ -176,7 +175,6 @@
             <p14:sldId id="259"/>
             <p14:sldId id="285"/>
             <p14:sldId id="277"/>
-            <p14:sldId id="282"/>
             <p14:sldId id="280"/>
             <p14:sldId id="292"/>
             <p14:sldId id="291"/>
@@ -7192,6 +7190,18 @@
           <a:lstStyle/>
           <a:p>
             <a:r>
+              <a:rPr lang="en-US" sz="1600" dirty="0" err="1" smtClean="0">
+                <a:solidFill>
+                  <a:schemeClr val="accent2">
+                    <a:lumMod val="50000"/>
+                  </a:schemeClr>
+                </a:solidFill>
+                <a:latin typeface="Consolas" pitchFamily="49" charset="0"/>
+                <a:cs typeface="Consolas" pitchFamily="49" charset="0"/>
+              </a:rPr>
+              <a:t>def</a:t>
+            </a:r>
+            <a:r>
               <a:rPr lang="en-US" sz="1600" dirty="0">
                 <a:solidFill>
                   <a:schemeClr val="accent2">
@@ -7201,7 +7211,31 @@
                 <a:latin typeface="Consolas" pitchFamily="49" charset="0"/>
                 <a:cs typeface="Consolas" pitchFamily="49" charset="0"/>
               </a:rPr>
-              <a:t>Closure </a:t>
+              <a:t> </a:t>
+            </a:r>
+            <a:r>
+              <a:rPr lang="en-US" sz="1600" dirty="0" err="1">
+                <a:solidFill>
+                  <a:schemeClr val="accent2">
+                    <a:lumMod val="50000"/>
+                  </a:schemeClr>
+                </a:solidFill>
+                <a:latin typeface="Consolas" pitchFamily="49" charset="0"/>
+                <a:cs typeface="Consolas" pitchFamily="49" charset="0"/>
+              </a:rPr>
+              <a:t>doubleIt</a:t>
+            </a:r>
+            <a:r>
+              <a:rPr lang="en-US" sz="1600" dirty="0">
+                <a:solidFill>
+                  <a:schemeClr val="accent2">
+                    <a:lumMod val="50000"/>
+                  </a:schemeClr>
+                </a:solidFill>
+                <a:latin typeface="Consolas" pitchFamily="49" charset="0"/>
+                <a:cs typeface="Consolas" pitchFamily="49" charset="0"/>
+              </a:rPr>
+              <a:t> = </a:t>
             </a:r>
             <a:r>
               <a:rPr lang="en-US" sz="1600" dirty="0" smtClean="0">
@@ -7213,8 +7247,67 @@
                 <a:latin typeface="Consolas" pitchFamily="49" charset="0"/>
                 <a:cs typeface="Consolas" pitchFamily="49" charset="0"/>
               </a:rPr>
-              <a:t>g </a:t>
-            </a:r>
+              <a:t>{</a:t>
+            </a:r>
+            <a:r>
+              <a:rPr lang="en-US" sz="1600" dirty="0" err="1" smtClean="0">
+                <a:solidFill>
+                  <a:schemeClr val="accent2">
+                    <a:lumMod val="50000"/>
+                  </a:schemeClr>
+                </a:solidFill>
+                <a:latin typeface="Consolas" pitchFamily="49" charset="0"/>
+                <a:cs typeface="Consolas" pitchFamily="49" charset="0"/>
+              </a:rPr>
+              <a:t>int</a:t>
+            </a:r>
+            <a:r>
+              <a:rPr lang="en-US" sz="1600" dirty="0" smtClean="0">
+                <a:solidFill>
+                  <a:schemeClr val="accent2">
+                    <a:lumMod val="50000"/>
+                  </a:schemeClr>
+                </a:solidFill>
+                <a:latin typeface="Consolas" pitchFamily="49" charset="0"/>
+                <a:cs typeface="Consolas" pitchFamily="49" charset="0"/>
+              </a:rPr>
+              <a:t> x </a:t>
+            </a:r>
+            <a:r>
+              <a:rPr lang="en-US" sz="1600" dirty="0" smtClean="0">
+                <a:solidFill>
+                  <a:schemeClr val="accent2">
+                    <a:lumMod val="50000"/>
+                  </a:schemeClr>
+                </a:solidFill>
+                <a:latin typeface="Consolas" pitchFamily="49" charset="0"/>
+                <a:cs typeface="Consolas" pitchFamily="49" charset="0"/>
+              </a:rPr>
+              <a:t>-&gt; </a:t>
+            </a:r>
+            <a:r>
+              <a:rPr lang="en-US" sz="1600" dirty="0" smtClean="0">
+                <a:solidFill>
+                  <a:schemeClr val="accent2">
+                    <a:lumMod val="50000"/>
+                  </a:schemeClr>
+                </a:solidFill>
+                <a:latin typeface="Consolas" pitchFamily="49" charset="0"/>
+                <a:cs typeface="Consolas" pitchFamily="49" charset="0"/>
+              </a:rPr>
+              <a:t>x * 2}</a:t>
+            </a:r>
+            <a:endParaRPr lang="en-US" sz="1600" dirty="0">
+              <a:solidFill>
+                <a:schemeClr val="accent2">
+                  <a:lumMod val="50000"/>
+                </a:schemeClr>
+              </a:solidFill>
+              <a:latin typeface="Consolas" pitchFamily="49" charset="0"/>
+              <a:cs typeface="Consolas" pitchFamily="49" charset="0"/>
+            </a:endParaRPr>
+          </a:p>
+          <a:p>
             <a:r>
               <a:rPr lang="en-US" sz="1600" dirty="0">
                 <a:solidFill>
@@ -7225,7 +7318,7 @@
                 <a:latin typeface="Consolas" pitchFamily="49" charset="0"/>
                 <a:cs typeface="Consolas" pitchFamily="49" charset="0"/>
               </a:rPr>
-              <a:t>= </a:t>
+              <a:t>assert </a:t>
             </a:r>
             <a:r>
               <a:rPr lang="en-US" sz="1600" dirty="0" smtClean="0">
@@ -7237,7 +7330,7 @@
                 <a:latin typeface="Consolas" pitchFamily="49" charset="0"/>
                 <a:cs typeface="Consolas" pitchFamily="49" charset="0"/>
               </a:rPr>
-              <a:t>{String name -&gt; "</a:t>
+              <a:t>4 </a:t>
             </a:r>
             <a:r>
               <a:rPr lang="en-US" sz="1600" dirty="0">
@@ -7249,21 +7342,19 @@
                 <a:latin typeface="Consolas" pitchFamily="49" charset="0"/>
                 <a:cs typeface="Consolas" pitchFamily="49" charset="0"/>
               </a:rPr>
-              <a:t>Hello " + name + "!"}</a:t>
-            </a:r>
-          </a:p>
-          <a:p>
-            <a:r>
-              <a:rPr lang="en-US" sz="1600" dirty="0">
-                <a:solidFill>
-                  <a:schemeClr val="accent2">
-                    <a:lumMod val="50000"/>
-                  </a:schemeClr>
-                </a:solidFill>
-                <a:latin typeface="Consolas" pitchFamily="49" charset="0"/>
-                <a:cs typeface="Consolas" pitchFamily="49" charset="0"/>
-              </a:rPr>
-              <a:t>assert </a:t>
+              <a:t>== </a:t>
+            </a:r>
+            <a:r>
+              <a:rPr lang="en-US" sz="1600" dirty="0" err="1" smtClean="0">
+                <a:solidFill>
+                  <a:schemeClr val="accent2">
+                    <a:lumMod val="50000"/>
+                  </a:schemeClr>
+                </a:solidFill>
+                <a:latin typeface="Consolas" pitchFamily="49" charset="0"/>
+                <a:cs typeface="Consolas" pitchFamily="49" charset="0"/>
+              </a:rPr>
+              <a:t>doubleIt</a:t>
             </a:r>
             <a:r>
               <a:rPr lang="en-US" sz="1600" dirty="0" smtClean="0">
@@ -7275,19 +7366,7 @@
                 <a:latin typeface="Consolas" pitchFamily="49" charset="0"/>
                 <a:cs typeface="Consolas" pitchFamily="49" charset="0"/>
               </a:rPr>
-              <a:t>g("</a:t>
-            </a:r>
-            <a:r>
-              <a:rPr lang="en-US" sz="1600" dirty="0">
-                <a:solidFill>
-                  <a:schemeClr val="accent2">
-                    <a:lumMod val="50000"/>
-                  </a:schemeClr>
-                </a:solidFill>
-                <a:latin typeface="Consolas" pitchFamily="49" charset="0"/>
-                <a:cs typeface="Consolas" pitchFamily="49" charset="0"/>
-              </a:rPr>
-              <a:t>you") == "Hello you</a:t>
+              <a:t>(</a:t>
             </a:r>
             <a:r>
               <a:rPr lang="en-US" sz="1600" dirty="0" smtClean="0">
@@ -7299,20 +7378,17 @@
                 <a:latin typeface="Consolas" pitchFamily="49" charset="0"/>
                 <a:cs typeface="Consolas" pitchFamily="49" charset="0"/>
               </a:rPr>
-              <a:t>!"  </a:t>
-            </a:r>
-            <a:r>
-              <a:rPr lang="en-US" sz="1600" dirty="0" smtClean="0">
-                <a:solidFill>
-                  <a:schemeClr val="accent5">
-                    <a:lumMod val="75000"/>
-                  </a:schemeClr>
-                </a:solidFill>
-                <a:latin typeface="Consolas" pitchFamily="49" charset="0"/>
-                <a:cs typeface="Consolas" pitchFamily="49" charset="0"/>
-              </a:rPr>
-              <a:t>//Called via ()</a:t>
-            </a:r>
+              <a:t>2)</a:t>
+            </a:r>
+            <a:endParaRPr lang="en-US" sz="1600" dirty="0" smtClean="0">
+              <a:solidFill>
+                <a:schemeClr val="accent5">
+                  <a:lumMod val="75000"/>
+                </a:schemeClr>
+              </a:solidFill>
+              <a:latin typeface="Consolas" pitchFamily="49" charset="0"/>
+              <a:cs typeface="Consolas" pitchFamily="49" charset="0"/>
+            </a:endParaRPr>
           </a:p>
         </p:txBody>
       </p:sp>
@@ -7426,6 +7502,30 @@
               <a:t> </a:t>
             </a:r>
             <a:r>
+              <a:rPr lang="en-US" sz="1600" dirty="0" err="1">
+                <a:solidFill>
+                  <a:schemeClr val="accent2">
+                    <a:lumMod val="50000"/>
+                  </a:schemeClr>
+                </a:solidFill>
+                <a:latin typeface="Consolas" pitchFamily="49" charset="0"/>
+                <a:cs typeface="Consolas" pitchFamily="49" charset="0"/>
+              </a:rPr>
+              <a:t>doubleIt</a:t>
+            </a:r>
+            <a:r>
+              <a:rPr lang="en-US" sz="1600" dirty="0">
+                <a:solidFill>
+                  <a:schemeClr val="accent2">
+                    <a:lumMod val="50000"/>
+                  </a:schemeClr>
+                </a:solidFill>
+                <a:latin typeface="Consolas" pitchFamily="49" charset="0"/>
+                <a:cs typeface="Consolas" pitchFamily="49" charset="0"/>
+              </a:rPr>
+              <a:t> = </a:t>
+            </a:r>
+            <a:r>
               <a:rPr lang="en-US" sz="1600" dirty="0" smtClean="0">
                 <a:solidFill>
                   <a:schemeClr val="accent2">
@@ -7435,7 +7535,31 @@
                 <a:latin typeface="Consolas" pitchFamily="49" charset="0"/>
                 <a:cs typeface="Consolas" pitchFamily="49" charset="0"/>
               </a:rPr>
-              <a:t>g </a:t>
+              <a:t>(x: </a:t>
+            </a:r>
+            <a:r>
+              <a:rPr lang="en-US" sz="1600" dirty="0" err="1" smtClean="0">
+                <a:solidFill>
+                  <a:schemeClr val="accent2">
+                    <a:lumMod val="50000"/>
+                  </a:schemeClr>
+                </a:solidFill>
+                <a:latin typeface="Consolas" pitchFamily="49" charset="0"/>
+                <a:cs typeface="Consolas" pitchFamily="49" charset="0"/>
+              </a:rPr>
+              <a:t>Int</a:t>
+            </a:r>
+            <a:r>
+              <a:rPr lang="en-US" sz="1600" dirty="0" smtClean="0">
+                <a:solidFill>
+                  <a:schemeClr val="accent2">
+                    <a:lumMod val="50000"/>
+                  </a:schemeClr>
+                </a:solidFill>
+                <a:latin typeface="Consolas" pitchFamily="49" charset="0"/>
+                <a:cs typeface="Consolas" pitchFamily="49" charset="0"/>
+              </a:rPr>
+              <a:t>) </a:t>
             </a:r>
             <a:r>
               <a:rPr lang="en-US" sz="1600" dirty="0">
@@ -7447,10 +7571,24 @@
                 <a:latin typeface="Consolas" pitchFamily="49" charset="0"/>
                 <a:cs typeface="Consolas" pitchFamily="49" charset="0"/>
               </a:rPr>
-              <a:t>= (name: String) =&gt; "Hello " + name + "!" </a:t>
-            </a:r>
-            <a:r>
-              <a:rPr lang="en-US" sz="1600" dirty="0" err="1">
+              <a:t>=&gt; </a:t>
+            </a:r>
+            <a:r>
+              <a:rPr lang="en-US" sz="1600" dirty="0" smtClean="0">
+                <a:solidFill>
+                  <a:schemeClr val="accent2">
+                    <a:lumMod val="50000"/>
+                  </a:schemeClr>
+                </a:solidFill>
+                <a:latin typeface="Consolas" pitchFamily="49" charset="0"/>
+                <a:cs typeface="Consolas" pitchFamily="49" charset="0"/>
+              </a:rPr>
+              <a:t>x * 2</a:t>
+            </a:r>
+          </a:p>
+          <a:p>
+            <a:r>
+              <a:rPr lang="en-US" sz="1600" dirty="0" err="1" smtClean="0">
                 <a:solidFill>
                   <a:schemeClr val="accent2">
                     <a:lumMod val="50000"/>
@@ -7462,6 +7600,18 @@
               <a:t>assertEquals</a:t>
             </a:r>
             <a:r>
+              <a:rPr lang="en-US" sz="1600" dirty="0" smtClean="0">
+                <a:solidFill>
+                  <a:schemeClr val="accent2">
+                    <a:lumMod val="50000"/>
+                  </a:schemeClr>
+                </a:solidFill>
+                <a:latin typeface="Consolas" pitchFamily="49" charset="0"/>
+                <a:cs typeface="Consolas" pitchFamily="49" charset="0"/>
+              </a:rPr>
+              <a:t>(4</a:t>
+            </a:r>
+            <a:r>
               <a:rPr lang="en-US" sz="1600" dirty="0">
                 <a:solidFill>
                   <a:schemeClr val="accent2">
@@ -7471,7 +7621,19 @@
                 <a:latin typeface="Consolas" pitchFamily="49" charset="0"/>
                 <a:cs typeface="Consolas" pitchFamily="49" charset="0"/>
               </a:rPr>
-              <a:t>("Hello you!", </a:t>
+              <a:t>, </a:t>
+            </a:r>
+            <a:r>
+              <a:rPr lang="en-US" sz="1600" dirty="0" err="1" smtClean="0">
+                <a:solidFill>
+                  <a:schemeClr val="accent2">
+                    <a:lumMod val="50000"/>
+                  </a:schemeClr>
+                </a:solidFill>
+                <a:latin typeface="Consolas" pitchFamily="49" charset="0"/>
+                <a:cs typeface="Consolas" pitchFamily="49" charset="0"/>
+              </a:rPr>
+              <a:t>doubleIt</a:t>
             </a:r>
             <a:r>
               <a:rPr lang="en-US" sz="1600" dirty="0" smtClean="0">
@@ -7483,19 +7645,19 @@
                 <a:latin typeface="Consolas" pitchFamily="49" charset="0"/>
                 <a:cs typeface="Consolas" pitchFamily="49" charset="0"/>
               </a:rPr>
-              <a:t>g("</a:t>
-            </a:r>
-            <a:r>
-              <a:rPr lang="en-US" sz="1600" dirty="0">
-                <a:solidFill>
-                  <a:schemeClr val="accent2">
-                    <a:lumMod val="50000"/>
-                  </a:schemeClr>
-                </a:solidFill>
-                <a:latin typeface="Consolas" pitchFamily="49" charset="0"/>
-                <a:cs typeface="Consolas" pitchFamily="49" charset="0"/>
-              </a:rPr>
-              <a:t>you"))</a:t>
+              <a:t>(</a:t>
+            </a:r>
+            <a:r>
+              <a:rPr lang="en-US" sz="1600" dirty="0" smtClean="0">
+                <a:solidFill>
+                  <a:schemeClr val="accent2">
+                    <a:lumMod val="50000"/>
+                  </a:schemeClr>
+                </a:solidFill>
+                <a:latin typeface="Consolas" pitchFamily="49" charset="0"/>
+                <a:cs typeface="Consolas" pitchFamily="49" charset="0"/>
+              </a:rPr>
+              <a:t>2))</a:t>
             </a:r>
             <a:endParaRPr lang="en-US" sz="1600" dirty="0" smtClean="0">
               <a:solidFill>
@@ -7564,7 +7726,7 @@
         <p:spPr>
           <a:xfrm>
             <a:off x="609600" y="5328838"/>
-            <a:ext cx="7197436" cy="830997"/>
+            <a:ext cx="7197436" cy="584775"/>
           </a:xfrm>
           <a:prstGeom prst="rect">
             <a:avLst/>
@@ -7604,7 +7766,19 @@
                 <a:latin typeface="Consolas" pitchFamily="49" charset="0"/>
                 <a:cs typeface="Consolas" pitchFamily="49" charset="0"/>
               </a:rPr>
-              <a:t>g </a:t>
+              <a:t>Function&lt;Integer, Integer&gt; </a:t>
+            </a:r>
+            <a:r>
+              <a:rPr lang="en-US" sz="1600" dirty="0" err="1" smtClean="0">
+                <a:solidFill>
+                  <a:schemeClr val="accent2">
+                    <a:lumMod val="50000"/>
+                  </a:schemeClr>
+                </a:solidFill>
+                <a:latin typeface="Consolas" pitchFamily="49" charset="0"/>
+                <a:cs typeface="Consolas" pitchFamily="49" charset="0"/>
+              </a:rPr>
+              <a:t>doubleIt</a:t>
             </a:r>
             <a:r>
               <a:rPr lang="en-US" sz="1600" dirty="0" smtClean="0">
@@ -7616,96 +7790,88 @@
                 <a:latin typeface="Consolas" pitchFamily="49" charset="0"/>
                 <a:cs typeface="Consolas" pitchFamily="49" charset="0"/>
               </a:rPr>
-              <a:t>name = “Hello “ ++ name ++ “!”   </a:t>
+              <a:t> </a:t>
+            </a:r>
+            <a:r>
+              <a:rPr lang="en-US" sz="1600" dirty="0">
+                <a:solidFill>
+                  <a:schemeClr val="accent2">
+                    <a:lumMod val="50000"/>
+                  </a:schemeClr>
+                </a:solidFill>
+                <a:latin typeface="Consolas" pitchFamily="49" charset="0"/>
+                <a:cs typeface="Consolas" pitchFamily="49" charset="0"/>
+              </a:rPr>
+              <a:t>= (x) -&gt; {return x * 2;};</a:t>
+            </a:r>
+            <a:endParaRPr lang="en-US" sz="1600" dirty="0" smtClean="0">
+              <a:solidFill>
+                <a:schemeClr val="accent5">
+                  <a:lumMod val="75000"/>
+                </a:schemeClr>
+              </a:solidFill>
+              <a:latin typeface="Consolas" pitchFamily="49" charset="0"/>
+              <a:cs typeface="Consolas" pitchFamily="49" charset="0"/>
+            </a:endParaRPr>
+          </a:p>
+          <a:p>
+            <a:r>
+              <a:rPr lang="en-US" sz="1600" dirty="0" err="1" smtClean="0">
+                <a:solidFill>
+                  <a:schemeClr val="accent2">
+                    <a:lumMod val="50000"/>
+                  </a:schemeClr>
+                </a:solidFill>
+                <a:latin typeface="Consolas" pitchFamily="49" charset="0"/>
+                <a:cs typeface="Consolas" pitchFamily="49" charset="0"/>
+              </a:rPr>
+              <a:t>assertEquals</a:t>
+            </a:r>
+            <a:r>
+              <a:rPr lang="en-US" sz="1600" dirty="0">
+                <a:solidFill>
+                  <a:schemeClr val="accent2">
+                    <a:lumMod val="50000"/>
+                  </a:schemeClr>
+                </a:solidFill>
+                <a:latin typeface="Consolas" pitchFamily="49" charset="0"/>
+                <a:cs typeface="Consolas" pitchFamily="49" charset="0"/>
+              </a:rPr>
+              <a:t>(4, </a:t>
+            </a:r>
+            <a:r>
+              <a:rPr lang="en-US" sz="1600" dirty="0" err="1" smtClean="0">
+                <a:solidFill>
+                  <a:schemeClr val="accent2">
+                    <a:lumMod val="50000"/>
+                  </a:schemeClr>
+                </a:solidFill>
+                <a:latin typeface="Consolas" pitchFamily="49" charset="0"/>
+                <a:cs typeface="Consolas" pitchFamily="49" charset="0"/>
+              </a:rPr>
+              <a:t>doubleIt.apply</a:t>
             </a:r>
             <a:r>
               <a:rPr lang="en-US" sz="1600" dirty="0" smtClean="0">
                 <a:solidFill>
-                  <a:schemeClr val="accent5">
-                    <a:lumMod val="75000"/>
-                  </a:schemeClr>
-                </a:solidFill>
-                <a:latin typeface="Consolas" pitchFamily="49" charset="0"/>
-                <a:cs typeface="Consolas" pitchFamily="49" charset="0"/>
-              </a:rPr>
-              <a:t>-- function body</a:t>
-            </a:r>
-          </a:p>
-          <a:p>
-            <a:r>
-              <a:rPr lang="en-US" sz="1600" dirty="0" smtClean="0">
-                <a:solidFill>
-                  <a:schemeClr val="accent2">
-                    <a:lumMod val="50000"/>
-                  </a:schemeClr>
-                </a:solidFill>
-                <a:latin typeface="Consolas" pitchFamily="49" charset="0"/>
-                <a:cs typeface="Consolas" pitchFamily="49" charset="0"/>
-              </a:rPr>
-              <a:t>g2 = g                             </a:t>
-            </a:r>
-            <a:r>
-              <a:rPr lang="en-US" sz="1600" dirty="0" smtClean="0">
-                <a:solidFill>
-                  <a:schemeClr val="accent5">
-                    <a:lumMod val="75000"/>
-                  </a:schemeClr>
-                </a:solidFill>
-                <a:latin typeface="Consolas" pitchFamily="49" charset="0"/>
-                <a:cs typeface="Consolas" pitchFamily="49" charset="0"/>
-              </a:rPr>
-              <a:t>-- assigned as value</a:t>
-            </a:r>
-          </a:p>
-          <a:p>
-            <a:r>
-              <a:rPr lang="en-US" sz="1600" dirty="0" err="1" smtClean="0">
-                <a:solidFill>
-                  <a:schemeClr val="accent2">
-                    <a:lumMod val="50000"/>
-                  </a:schemeClr>
-                </a:solidFill>
-                <a:latin typeface="Consolas" pitchFamily="49" charset="0"/>
-                <a:cs typeface="Consolas" pitchFamily="49" charset="0"/>
-              </a:rPr>
-              <a:t>TestCase</a:t>
-            </a:r>
-            <a:r>
-              <a:rPr lang="en-US" sz="1600" dirty="0" smtClean="0">
-                <a:solidFill>
-                  <a:schemeClr val="accent2">
-                    <a:lumMod val="50000"/>
-                  </a:schemeClr>
-                </a:solidFill>
-                <a:latin typeface="Consolas" pitchFamily="49" charset="0"/>
-                <a:cs typeface="Consolas" pitchFamily="49" charset="0"/>
-              </a:rPr>
-              <a:t>(</a:t>
-            </a:r>
-            <a:r>
-              <a:rPr lang="en-US" sz="1600" dirty="0" err="1" smtClean="0">
-                <a:solidFill>
-                  <a:schemeClr val="accent2">
-                    <a:lumMod val="50000"/>
-                  </a:schemeClr>
-                </a:solidFill>
-                <a:latin typeface="Consolas" pitchFamily="49" charset="0"/>
-                <a:cs typeface="Consolas" pitchFamily="49" charset="0"/>
-              </a:rPr>
-              <a:t>assertEqual</a:t>
-            </a:r>
-            <a:r>
-              <a:rPr lang="en-US" sz="1600" dirty="0" smtClean="0">
-                <a:solidFill>
-                  <a:schemeClr val="accent2">
-                    <a:lumMod val="50000"/>
-                  </a:schemeClr>
-                </a:solidFill>
-                <a:latin typeface="Consolas" pitchFamily="49" charset="0"/>
-                <a:cs typeface="Consolas" pitchFamily="49" charset="0"/>
-              </a:rPr>
-              <a:t> “Hello you!” (g2 name))</a:t>
-            </a:r>
+                  <a:schemeClr val="accent2">
+                    <a:lumMod val="50000"/>
+                  </a:schemeClr>
+                </a:solidFill>
+                <a:latin typeface="Consolas" pitchFamily="49" charset="0"/>
+                <a:cs typeface="Consolas" pitchFamily="49" charset="0"/>
+              </a:rPr>
+              <a:t>(2));      </a:t>
+            </a:r>
+            <a:endParaRPr lang="en-US" sz="1600" dirty="0" smtClean="0">
+              <a:solidFill>
+                <a:schemeClr val="accent2">
+                  <a:lumMod val="50000"/>
+                </a:schemeClr>
+              </a:solidFill>
+              <a:latin typeface="Consolas" pitchFamily="49" charset="0"/>
+              <a:cs typeface="Consolas" pitchFamily="49" charset="0"/>
+            </a:endParaRPr>
           </a:p>
         </p:txBody>
       </p:sp>
@@ -7743,7 +7909,7 @@
                 <a:latin typeface="Consolas" pitchFamily="49" charset="0"/>
                 <a:cs typeface="Consolas" pitchFamily="49" charset="0"/>
               </a:rPr>
-              <a:t>Haskell</a:t>
+              <a:t>Java 8</a:t>
             </a:r>
             <a:endParaRPr lang="en-US" dirty="0">
               <a:solidFill>
@@ -7802,90 +7968,6 @@
           <a:p>
             <a:r>
               <a:rPr lang="en-US" dirty="0" smtClean="0"/>
-              <a:t>First Class Functions, cont.</a:t>
-            </a:r>
-            <a:endParaRPr lang="en-US" dirty="0"/>
-          </a:p>
-        </p:txBody>
-      </p:sp>
-      <p:sp>
-        <p:nvSpPr>
-          <p:cNvPr id="3" name="Content Placeholder 2"/>
-          <p:cNvSpPr>
-            <a:spLocks noGrp="1"/>
-          </p:cNvSpPr>
-          <p:nvPr>
-            <p:ph idx="1"/>
-          </p:nvPr>
-        </p:nvSpPr>
-        <p:spPr/>
-        <p:txBody>
-          <a:bodyPr/>
-          <a:lstStyle/>
-          <a:p>
-            <a:r>
-              <a:rPr lang="en-US" b="1" dirty="0" smtClean="0">
-                <a:solidFill>
-                  <a:srgbClr val="FF0000"/>
-                </a:solidFill>
-              </a:rPr>
-              <a:t>Comments about how many FP concepts need special syntax in hybrid languages, whereas in Haskell they are the default and more concise</a:t>
-            </a:r>
-            <a:endParaRPr lang="en-US" b="1" dirty="0">
-              <a:solidFill>
-                <a:srgbClr val="FF0000"/>
-              </a:solidFill>
-            </a:endParaRPr>
-          </a:p>
-        </p:txBody>
-      </p:sp>
-    </p:spTree>
-    <p:extLst>
-      <p:ext uri="{BB962C8B-B14F-4D97-AF65-F5344CB8AC3E}">
-        <p14:creationId xmlns:p14="http://schemas.microsoft.com/office/powerpoint/2010/main" val="2342392140"/>
-      </p:ext>
-    </p:extLst>
-  </p:cSld>
-  <p:clrMapOvr>
-    <a:masterClrMapping/>
-  </p:clrMapOvr>
-</p:sld>
-</file>
-
-<file path=ppt/slides/slide22.xml><?xml version="1.0" encoding="utf-8"?>
-<p:sld xmlns:a="http://schemas.openxmlformats.org/drawingml/2006/main" xmlns:r="http://schemas.openxmlformats.org/officeDocument/2006/relationships" xmlns:p="http://schemas.openxmlformats.org/presentationml/2006/main">
-  <p:cSld>
-    <p:spTree>
-      <p:nvGrpSpPr>
-        <p:cNvPr id="1" name=""/>
-        <p:cNvGrpSpPr/>
-        <p:nvPr/>
-      </p:nvGrpSpPr>
-      <p:grpSpPr>
-        <a:xfrm>
-          <a:off x="0" y="0"/>
-          <a:ext cx="0" cy="0"/>
-          <a:chOff x="0" y="0"/>
-          <a:chExt cx="0" cy="0"/>
-        </a:xfrm>
-      </p:grpSpPr>
-      <p:sp>
-        <p:nvSpPr>
-          <p:cNvPr id="2" name="Title 1"/>
-          <p:cNvSpPr>
-            <a:spLocks noGrp="1"/>
-          </p:cNvSpPr>
-          <p:nvPr>
-            <p:ph type="title"/>
-          </p:nvPr>
-        </p:nvSpPr>
-        <p:spPr/>
-        <p:txBody>
-          <a:bodyPr/>
-          <a:lstStyle/>
-          <a:p>
-            <a:r>
-              <a:rPr lang="en-US" dirty="0" smtClean="0"/>
               <a:t>Higher Order Functions</a:t>
             </a:r>
             <a:endParaRPr lang="en-US" dirty="0"/>
@@ -8558,7 +8640,7 @@
 </p:sld>
 </file>
 
-<file path=ppt/slides/slide23.xml><?xml version="1.0" encoding="utf-8"?>
+<file path=ppt/slides/slide22.xml><?xml version="1.0" encoding="utf-8"?>
 <p:sld xmlns:a="http://schemas.openxmlformats.org/drawingml/2006/main" xmlns:r="http://schemas.openxmlformats.org/officeDocument/2006/relationships" xmlns:p="http://schemas.openxmlformats.org/presentationml/2006/main">
   <p:cSld>
     <p:spTree>
@@ -9240,6 +9322,353 @@
 </p:sld>
 </file>
 
+<file path=ppt/slides/slide23.xml><?xml version="1.0" encoding="utf-8"?>
+<p:sld xmlns:a="http://schemas.openxmlformats.org/drawingml/2006/main" xmlns:r="http://schemas.openxmlformats.org/officeDocument/2006/relationships" xmlns:p="http://schemas.openxmlformats.org/presentationml/2006/main">
+  <p:cSld>
+    <p:spTree>
+      <p:nvGrpSpPr>
+        <p:cNvPr id="1" name=""/>
+        <p:cNvGrpSpPr/>
+        <p:nvPr/>
+      </p:nvGrpSpPr>
+      <p:grpSpPr>
+        <a:xfrm>
+          <a:off x="0" y="0"/>
+          <a:ext cx="0" cy="0"/>
+          <a:chOff x="0" y="0"/>
+          <a:chExt cx="0" cy="0"/>
+        </a:xfrm>
+      </p:grpSpPr>
+      <p:sp>
+        <p:nvSpPr>
+          <p:cNvPr id="2" name="Title 1"/>
+          <p:cNvSpPr>
+            <a:spLocks noGrp="1"/>
+          </p:cNvSpPr>
+          <p:nvPr>
+            <p:ph type="title"/>
+          </p:nvPr>
+        </p:nvSpPr>
+        <p:spPr/>
+        <p:txBody>
+          <a:bodyPr/>
+          <a:lstStyle/>
+          <a:p>
+            <a:r>
+              <a:rPr lang="en-US" dirty="0" smtClean="0"/>
+              <a:t>Higher Order Functions, cont.</a:t>
+            </a:r>
+            <a:endParaRPr lang="en-US" dirty="0"/>
+          </a:p>
+        </p:txBody>
+      </p:sp>
+      <p:sp>
+        <p:nvSpPr>
+          <p:cNvPr id="3" name="Content Placeholder 2"/>
+          <p:cNvSpPr>
+            <a:spLocks noGrp="1"/>
+          </p:cNvSpPr>
+          <p:nvPr>
+            <p:ph idx="1"/>
+          </p:nvPr>
+        </p:nvSpPr>
+        <p:spPr/>
+        <p:txBody>
+          <a:bodyPr>
+            <a:normAutofit/>
+          </a:bodyPr>
+          <a:lstStyle/>
+          <a:p>
+            <a:r>
+              <a:rPr lang="en-US" dirty="0" smtClean="0"/>
+              <a:t>Goes </a:t>
+            </a:r>
+            <a:r>
+              <a:rPr lang="en-US" dirty="0"/>
+              <a:t>hand-in-hand with first-class </a:t>
+            </a:r>
+            <a:r>
+              <a:rPr lang="en-US" dirty="0" smtClean="0"/>
+              <a:t>functions</a:t>
+            </a:r>
+          </a:p>
+          <a:p>
+            <a:r>
+              <a:rPr lang="en-US" dirty="0" smtClean="0"/>
+              <a:t>Many OO patterns overlap with higher order functions</a:t>
+            </a:r>
+          </a:p>
+          <a:p>
+            <a:pPr lvl="1"/>
+            <a:r>
+              <a:rPr lang="en-US" dirty="0"/>
+              <a:t>Strategy</a:t>
+            </a:r>
+          </a:p>
+          <a:p>
+            <a:pPr lvl="1"/>
+            <a:r>
+              <a:rPr lang="en-US" dirty="0" smtClean="0"/>
+              <a:t>Visitor</a:t>
+            </a:r>
+          </a:p>
+          <a:p>
+            <a:pPr lvl="1"/>
+            <a:r>
+              <a:rPr lang="en-US" dirty="0" smtClean="0"/>
+              <a:t>Command</a:t>
+            </a:r>
+          </a:p>
+          <a:p>
+            <a:pPr lvl="1"/>
+            <a:r>
+              <a:rPr lang="en-US" dirty="0" smtClean="0"/>
+              <a:t>Anonymous inner classes</a:t>
+            </a:r>
+          </a:p>
+          <a:p>
+            <a:pPr lvl="1"/>
+            <a:r>
+              <a:rPr lang="en-US" dirty="0"/>
+              <a:t>Template </a:t>
+            </a:r>
+            <a:r>
+              <a:rPr lang="en-US" dirty="0" smtClean="0"/>
+              <a:t>method</a:t>
+            </a:r>
+          </a:p>
+          <a:p>
+            <a:pPr lvl="1"/>
+            <a:r>
+              <a:rPr lang="en-US" dirty="0" smtClean="0"/>
+              <a:t>Iterator</a:t>
+            </a:r>
+          </a:p>
+        </p:txBody>
+      </p:sp>
+      <p:sp>
+        <p:nvSpPr>
+          <p:cNvPr id="4" name="Content Placeholder 2"/>
+          <p:cNvSpPr txBox="1">
+            <a:spLocks/>
+          </p:cNvSpPr>
+          <p:nvPr/>
+        </p:nvSpPr>
+        <p:spPr>
+          <a:xfrm>
+            <a:off x="445655" y="5715000"/>
+            <a:ext cx="7620000" cy="762000"/>
+          </a:xfrm>
+          <a:prstGeom prst="rect">
+            <a:avLst/>
+          </a:prstGeom>
+        </p:spPr>
+        <p:txBody>
+          <a:bodyPr vert="horz" lIns="91440" tIns="45720" rIns="91440" bIns="45720" rtlCol="0">
+            <a:normAutofit/>
+          </a:bodyPr>
+          <a:lstStyle>
+            <a:lvl1pPr marL="342900" indent="-228600" algn="l" defTabSz="914400" rtl="0" eaLnBrk="1" latinLnBrk="0" hangingPunct="1">
+              <a:spcBef>
+                <a:spcPct val="20000"/>
+              </a:spcBef>
+              <a:buClr>
+                <a:schemeClr val="accent1"/>
+              </a:buClr>
+              <a:buFont typeface="Arial" pitchFamily="34" charset="0"/>
+              <a:buChar char="•"/>
+              <a:defRPr sz="2200" kern="1200">
+                <a:solidFill>
+                  <a:schemeClr val="tx1"/>
+                </a:solidFill>
+                <a:latin typeface="+mn-lt"/>
+                <a:ea typeface="+mn-ea"/>
+                <a:cs typeface="+mn-cs"/>
+              </a:defRPr>
+            </a:lvl1pPr>
+            <a:lvl2pPr marL="640080" indent="-228600" algn="l" defTabSz="914400" rtl="0" eaLnBrk="1" latinLnBrk="0" hangingPunct="1">
+              <a:spcBef>
+                <a:spcPct val="20000"/>
+              </a:spcBef>
+              <a:buClr>
+                <a:schemeClr val="accent2"/>
+              </a:buClr>
+              <a:buFont typeface="Arial" pitchFamily="34" charset="0"/>
+              <a:buChar char="•"/>
+              <a:defRPr sz="2000" kern="1200">
+                <a:solidFill>
+                  <a:schemeClr val="tx1"/>
+                </a:solidFill>
+                <a:latin typeface="+mn-lt"/>
+                <a:ea typeface="+mn-ea"/>
+                <a:cs typeface="+mn-cs"/>
+              </a:defRPr>
+            </a:lvl2pPr>
+            <a:lvl3pPr marL="1005840" indent="-228600" algn="l" defTabSz="914400" rtl="0" eaLnBrk="1" latinLnBrk="0" hangingPunct="1">
+              <a:spcBef>
+                <a:spcPct val="20000"/>
+              </a:spcBef>
+              <a:buClr>
+                <a:schemeClr val="accent3"/>
+              </a:buClr>
+              <a:buFont typeface="Arial" pitchFamily="34" charset="0"/>
+              <a:buChar char="•"/>
+              <a:defRPr sz="1800" kern="1200">
+                <a:solidFill>
+                  <a:schemeClr val="tx1"/>
+                </a:solidFill>
+                <a:latin typeface="+mn-lt"/>
+                <a:ea typeface="+mn-ea"/>
+                <a:cs typeface="+mn-cs"/>
+              </a:defRPr>
+            </a:lvl3pPr>
+            <a:lvl4pPr marL="1280160" indent="-228600" algn="l" defTabSz="914400" rtl="0" eaLnBrk="1" latinLnBrk="0" hangingPunct="1">
+              <a:spcBef>
+                <a:spcPct val="20000"/>
+              </a:spcBef>
+              <a:buClr>
+                <a:schemeClr val="accent4"/>
+              </a:buClr>
+              <a:buFont typeface="Arial" pitchFamily="34" charset="0"/>
+              <a:buChar char="•"/>
+              <a:defRPr sz="1600" kern="1200">
+                <a:solidFill>
+                  <a:schemeClr val="tx1"/>
+                </a:solidFill>
+                <a:latin typeface="+mn-lt"/>
+                <a:ea typeface="+mn-ea"/>
+                <a:cs typeface="+mn-cs"/>
+              </a:defRPr>
+            </a:lvl4pPr>
+            <a:lvl5pPr marL="1554480" indent="-228600" algn="l" defTabSz="914400" rtl="0" eaLnBrk="1" latinLnBrk="0" hangingPunct="1">
+              <a:spcBef>
+                <a:spcPct val="20000"/>
+              </a:spcBef>
+              <a:buClr>
+                <a:schemeClr val="accent5"/>
+              </a:buClr>
+              <a:buFont typeface="Arial" pitchFamily="34" charset="0"/>
+              <a:buChar char="•"/>
+              <a:defRPr sz="1400" kern="1200" baseline="0">
+                <a:solidFill>
+                  <a:schemeClr val="tx1"/>
+                </a:solidFill>
+                <a:latin typeface="+mn-lt"/>
+                <a:ea typeface="+mn-ea"/>
+                <a:cs typeface="+mn-cs"/>
+              </a:defRPr>
+            </a:lvl5pPr>
+            <a:lvl6pPr marL="1737360" indent="-182880" algn="l" defTabSz="914400" rtl="0" eaLnBrk="1" latinLnBrk="0" hangingPunct="1">
+              <a:spcBef>
+                <a:spcPct val="20000"/>
+              </a:spcBef>
+              <a:buClr>
+                <a:schemeClr val="accent1"/>
+              </a:buClr>
+              <a:buFont typeface="Arial" pitchFamily="34" charset="0"/>
+              <a:buChar char="•"/>
+              <a:defRPr sz="1400" kern="1200" baseline="0">
+                <a:solidFill>
+                  <a:schemeClr val="tx1"/>
+                </a:solidFill>
+                <a:latin typeface="+mn-lt"/>
+                <a:ea typeface="+mn-ea"/>
+                <a:cs typeface="+mn-cs"/>
+              </a:defRPr>
+            </a:lvl6pPr>
+            <a:lvl7pPr marL="1920240" indent="-182880" algn="l" defTabSz="914400" rtl="0" eaLnBrk="1" latinLnBrk="0" hangingPunct="1">
+              <a:spcBef>
+                <a:spcPct val="20000"/>
+              </a:spcBef>
+              <a:buClr>
+                <a:schemeClr val="accent2"/>
+              </a:buClr>
+              <a:buFont typeface="Arial" pitchFamily="34" charset="0"/>
+              <a:buChar char="•"/>
+              <a:defRPr sz="1400" kern="1200">
+                <a:solidFill>
+                  <a:schemeClr val="tx1"/>
+                </a:solidFill>
+                <a:latin typeface="+mn-lt"/>
+                <a:ea typeface="+mn-ea"/>
+                <a:cs typeface="+mn-cs"/>
+              </a:defRPr>
+            </a:lvl7pPr>
+            <a:lvl8pPr marL="2103120" indent="-182880" algn="l" defTabSz="914400" rtl="0" eaLnBrk="1" latinLnBrk="0" hangingPunct="1">
+              <a:spcBef>
+                <a:spcPct val="20000"/>
+              </a:spcBef>
+              <a:buClr>
+                <a:schemeClr val="accent3"/>
+              </a:buClr>
+              <a:buFont typeface="Arial" pitchFamily="34" charset="0"/>
+              <a:buChar char="•"/>
+              <a:defRPr sz="1400" kern="1200">
+                <a:solidFill>
+                  <a:schemeClr val="tx1"/>
+                </a:solidFill>
+                <a:latin typeface="+mn-lt"/>
+                <a:ea typeface="+mn-ea"/>
+                <a:cs typeface="+mn-cs"/>
+              </a:defRPr>
+            </a:lvl8pPr>
+            <a:lvl9pPr marL="2286000" indent="-182880" algn="l" defTabSz="914400" rtl="0" eaLnBrk="1" latinLnBrk="0" hangingPunct="1">
+              <a:spcBef>
+                <a:spcPct val="20000"/>
+              </a:spcBef>
+              <a:buClr>
+                <a:schemeClr val="accent4"/>
+              </a:buClr>
+              <a:buFont typeface="Arial" pitchFamily="34" charset="0"/>
+              <a:buChar char="•"/>
+              <a:defRPr sz="1400" kern="1200">
+                <a:solidFill>
+                  <a:schemeClr val="tx1"/>
+                </a:solidFill>
+                <a:latin typeface="+mn-lt"/>
+                <a:ea typeface="+mn-ea"/>
+                <a:cs typeface="+mn-cs"/>
+              </a:defRPr>
+            </a:lvl9pPr>
+          </a:lstStyle>
+          <a:p>
+            <a:pPr marL="114300" indent="0">
+              <a:buNone/>
+            </a:pPr>
+            <a:r>
+              <a:rPr lang="en-US" b="1" i="1" dirty="0" smtClean="0">
+                <a:solidFill>
+                  <a:schemeClr val="accent3">
+                    <a:lumMod val="50000"/>
+                  </a:schemeClr>
+                </a:solidFill>
+              </a:rPr>
+              <a:t>FP Big Idea ™:   </a:t>
+            </a:r>
+            <a:r>
+              <a:rPr lang="en-US" b="1" i="1" dirty="0" smtClean="0">
+                <a:solidFill>
+                  <a:srgbClr val="FF5050"/>
+                </a:solidFill>
+              </a:rPr>
+              <a:t>???</a:t>
+            </a:r>
+          </a:p>
+        </p:txBody>
+      </p:sp>
+    </p:spTree>
+    <p:extLst>
+      <p:ext uri="{BB962C8B-B14F-4D97-AF65-F5344CB8AC3E}">
+        <p14:creationId xmlns:p14="http://schemas.microsoft.com/office/powerpoint/2010/main" val="1188103287"/>
+      </p:ext>
+    </p:extLst>
+  </p:cSld>
+  <p:clrMapOvr>
+    <a:masterClrMapping/>
+  </p:clrMapOvr>
+</p:sld>
+</file>
+
 <file path=ppt/slides/slide24.xml><?xml version="1.0" encoding="utf-8"?>
 <p:sld xmlns:a="http://schemas.openxmlformats.org/drawingml/2006/main" xmlns:r="http://schemas.openxmlformats.org/officeDocument/2006/relationships" xmlns:p="http://schemas.openxmlformats.org/presentationml/2006/main">
   <p:cSld>
@@ -9273,10 +9702,17 @@
           <a:lstStyle/>
           <a:p>
             <a:r>
-              <a:rPr lang="en-US" dirty="0" smtClean="0"/>
-              <a:t>Higher Order Functions, cont.</a:t>
-            </a:r>
-            <a:endParaRPr lang="en-US" dirty="0"/>
+              <a:rPr lang="en-US" sz="4000" dirty="0" smtClean="0"/>
+              <a:t>Anonymous Functions </a:t>
+            </a:r>
+            <a:br>
+              <a:rPr lang="en-US" sz="4000" dirty="0" smtClean="0"/>
+            </a:br>
+            <a:r>
+              <a:rPr lang="en-US" sz="4000" dirty="0" smtClean="0"/>
+              <a:t>(Lambda Expressions)</a:t>
+            </a:r>
+            <a:endParaRPr lang="en-US" sz="4000" dirty="0"/>
           </a:p>
         </p:txBody>
       </p:sp>
@@ -9290,360 +9726,6 @@
             <p:ph idx="1"/>
           </p:nvPr>
         </p:nvSpPr>
-        <p:spPr/>
-        <p:txBody>
-          <a:bodyPr>
-            <a:normAutofit/>
-          </a:bodyPr>
-          <a:lstStyle/>
-          <a:p>
-            <a:r>
-              <a:rPr lang="en-US" dirty="0" smtClean="0"/>
-              <a:t>Goes </a:t>
-            </a:r>
-            <a:r>
-              <a:rPr lang="en-US" dirty="0"/>
-              <a:t>hand-in-hand with first-class </a:t>
-            </a:r>
-            <a:r>
-              <a:rPr lang="en-US" dirty="0" smtClean="0"/>
-              <a:t>functions</a:t>
-            </a:r>
-          </a:p>
-          <a:p>
-            <a:r>
-              <a:rPr lang="en-US" dirty="0" smtClean="0"/>
-              <a:t>Many OO patterns overlap with higher order functions</a:t>
-            </a:r>
-          </a:p>
-          <a:p>
-            <a:pPr lvl="1"/>
-            <a:r>
-              <a:rPr lang="en-US" dirty="0"/>
-              <a:t>Strategy</a:t>
-            </a:r>
-          </a:p>
-          <a:p>
-            <a:pPr lvl="1"/>
-            <a:r>
-              <a:rPr lang="en-US" dirty="0" smtClean="0"/>
-              <a:t>Visitor</a:t>
-            </a:r>
-          </a:p>
-          <a:p>
-            <a:pPr lvl="1"/>
-            <a:r>
-              <a:rPr lang="en-US" dirty="0" smtClean="0"/>
-              <a:t>Command</a:t>
-            </a:r>
-          </a:p>
-          <a:p>
-            <a:pPr lvl="1"/>
-            <a:r>
-              <a:rPr lang="en-US" dirty="0" smtClean="0"/>
-              <a:t>Anonymous inner classes</a:t>
-            </a:r>
-          </a:p>
-          <a:p>
-            <a:pPr lvl="1"/>
-            <a:r>
-              <a:rPr lang="en-US" dirty="0"/>
-              <a:t>Template </a:t>
-            </a:r>
-            <a:r>
-              <a:rPr lang="en-US" dirty="0" smtClean="0"/>
-              <a:t>method</a:t>
-            </a:r>
-          </a:p>
-          <a:p>
-            <a:pPr lvl="1"/>
-            <a:r>
-              <a:rPr lang="en-US" dirty="0" smtClean="0"/>
-              <a:t>Iterator</a:t>
-            </a:r>
-          </a:p>
-        </p:txBody>
-      </p:sp>
-      <p:sp>
-        <p:nvSpPr>
-          <p:cNvPr id="4" name="Content Placeholder 2"/>
-          <p:cNvSpPr txBox="1">
-            <a:spLocks/>
-          </p:cNvSpPr>
-          <p:nvPr/>
-        </p:nvSpPr>
-        <p:spPr>
-          <a:xfrm>
-            <a:off x="445655" y="5715000"/>
-            <a:ext cx="7620000" cy="762000"/>
-          </a:xfrm>
-          <a:prstGeom prst="rect">
-            <a:avLst/>
-          </a:prstGeom>
-        </p:spPr>
-        <p:txBody>
-          <a:bodyPr vert="horz" lIns="91440" tIns="45720" rIns="91440" bIns="45720" rtlCol="0">
-            <a:normAutofit/>
-          </a:bodyPr>
-          <a:lstStyle>
-            <a:lvl1pPr marL="342900" indent="-228600" algn="l" defTabSz="914400" rtl="0" eaLnBrk="1" latinLnBrk="0" hangingPunct="1">
-              <a:spcBef>
-                <a:spcPct val="20000"/>
-              </a:spcBef>
-              <a:buClr>
-                <a:schemeClr val="accent1"/>
-              </a:buClr>
-              <a:buFont typeface="Arial" pitchFamily="34" charset="0"/>
-              <a:buChar char="•"/>
-              <a:defRPr sz="2200" kern="1200">
-                <a:solidFill>
-                  <a:schemeClr val="tx1"/>
-                </a:solidFill>
-                <a:latin typeface="+mn-lt"/>
-                <a:ea typeface="+mn-ea"/>
-                <a:cs typeface="+mn-cs"/>
-              </a:defRPr>
-            </a:lvl1pPr>
-            <a:lvl2pPr marL="640080" indent="-228600" algn="l" defTabSz="914400" rtl="0" eaLnBrk="1" latinLnBrk="0" hangingPunct="1">
-              <a:spcBef>
-                <a:spcPct val="20000"/>
-              </a:spcBef>
-              <a:buClr>
-                <a:schemeClr val="accent2"/>
-              </a:buClr>
-              <a:buFont typeface="Arial" pitchFamily="34" charset="0"/>
-              <a:buChar char="•"/>
-              <a:defRPr sz="2000" kern="1200">
-                <a:solidFill>
-                  <a:schemeClr val="tx1"/>
-                </a:solidFill>
-                <a:latin typeface="+mn-lt"/>
-                <a:ea typeface="+mn-ea"/>
-                <a:cs typeface="+mn-cs"/>
-              </a:defRPr>
-            </a:lvl2pPr>
-            <a:lvl3pPr marL="1005840" indent="-228600" algn="l" defTabSz="914400" rtl="0" eaLnBrk="1" latinLnBrk="0" hangingPunct="1">
-              <a:spcBef>
-                <a:spcPct val="20000"/>
-              </a:spcBef>
-              <a:buClr>
-                <a:schemeClr val="accent3"/>
-              </a:buClr>
-              <a:buFont typeface="Arial" pitchFamily="34" charset="0"/>
-              <a:buChar char="•"/>
-              <a:defRPr sz="1800" kern="1200">
-                <a:solidFill>
-                  <a:schemeClr val="tx1"/>
-                </a:solidFill>
-                <a:latin typeface="+mn-lt"/>
-                <a:ea typeface="+mn-ea"/>
-                <a:cs typeface="+mn-cs"/>
-              </a:defRPr>
-            </a:lvl3pPr>
-            <a:lvl4pPr marL="1280160" indent="-228600" algn="l" defTabSz="914400" rtl="0" eaLnBrk="1" latinLnBrk="0" hangingPunct="1">
-              <a:spcBef>
-                <a:spcPct val="20000"/>
-              </a:spcBef>
-              <a:buClr>
-                <a:schemeClr val="accent4"/>
-              </a:buClr>
-              <a:buFont typeface="Arial" pitchFamily="34" charset="0"/>
-              <a:buChar char="•"/>
-              <a:defRPr sz="1600" kern="1200">
-                <a:solidFill>
-                  <a:schemeClr val="tx1"/>
-                </a:solidFill>
-                <a:latin typeface="+mn-lt"/>
-                <a:ea typeface="+mn-ea"/>
-                <a:cs typeface="+mn-cs"/>
-              </a:defRPr>
-            </a:lvl4pPr>
-            <a:lvl5pPr marL="1554480" indent="-228600" algn="l" defTabSz="914400" rtl="0" eaLnBrk="1" latinLnBrk="0" hangingPunct="1">
-              <a:spcBef>
-                <a:spcPct val="20000"/>
-              </a:spcBef>
-              <a:buClr>
-                <a:schemeClr val="accent5"/>
-              </a:buClr>
-              <a:buFont typeface="Arial" pitchFamily="34" charset="0"/>
-              <a:buChar char="•"/>
-              <a:defRPr sz="1400" kern="1200" baseline="0">
-                <a:solidFill>
-                  <a:schemeClr val="tx1"/>
-                </a:solidFill>
-                <a:latin typeface="+mn-lt"/>
-                <a:ea typeface="+mn-ea"/>
-                <a:cs typeface="+mn-cs"/>
-              </a:defRPr>
-            </a:lvl5pPr>
-            <a:lvl6pPr marL="1737360" indent="-182880" algn="l" defTabSz="914400" rtl="0" eaLnBrk="1" latinLnBrk="0" hangingPunct="1">
-              <a:spcBef>
-                <a:spcPct val="20000"/>
-              </a:spcBef>
-              <a:buClr>
-                <a:schemeClr val="accent1"/>
-              </a:buClr>
-              <a:buFont typeface="Arial" pitchFamily="34" charset="0"/>
-              <a:buChar char="•"/>
-              <a:defRPr sz="1400" kern="1200" baseline="0">
-                <a:solidFill>
-                  <a:schemeClr val="tx1"/>
-                </a:solidFill>
-                <a:latin typeface="+mn-lt"/>
-                <a:ea typeface="+mn-ea"/>
-                <a:cs typeface="+mn-cs"/>
-              </a:defRPr>
-            </a:lvl6pPr>
-            <a:lvl7pPr marL="1920240" indent="-182880" algn="l" defTabSz="914400" rtl="0" eaLnBrk="1" latinLnBrk="0" hangingPunct="1">
-              <a:spcBef>
-                <a:spcPct val="20000"/>
-              </a:spcBef>
-              <a:buClr>
-                <a:schemeClr val="accent2"/>
-              </a:buClr>
-              <a:buFont typeface="Arial" pitchFamily="34" charset="0"/>
-              <a:buChar char="•"/>
-              <a:defRPr sz="1400" kern="1200">
-                <a:solidFill>
-                  <a:schemeClr val="tx1"/>
-                </a:solidFill>
-                <a:latin typeface="+mn-lt"/>
-                <a:ea typeface="+mn-ea"/>
-                <a:cs typeface="+mn-cs"/>
-              </a:defRPr>
-            </a:lvl7pPr>
-            <a:lvl8pPr marL="2103120" indent="-182880" algn="l" defTabSz="914400" rtl="0" eaLnBrk="1" latinLnBrk="0" hangingPunct="1">
-              <a:spcBef>
-                <a:spcPct val="20000"/>
-              </a:spcBef>
-              <a:buClr>
-                <a:schemeClr val="accent3"/>
-              </a:buClr>
-              <a:buFont typeface="Arial" pitchFamily="34" charset="0"/>
-              <a:buChar char="•"/>
-              <a:defRPr sz="1400" kern="1200">
-                <a:solidFill>
-                  <a:schemeClr val="tx1"/>
-                </a:solidFill>
-                <a:latin typeface="+mn-lt"/>
-                <a:ea typeface="+mn-ea"/>
-                <a:cs typeface="+mn-cs"/>
-              </a:defRPr>
-            </a:lvl8pPr>
-            <a:lvl9pPr marL="2286000" indent="-182880" algn="l" defTabSz="914400" rtl="0" eaLnBrk="1" latinLnBrk="0" hangingPunct="1">
-              <a:spcBef>
-                <a:spcPct val="20000"/>
-              </a:spcBef>
-              <a:buClr>
-                <a:schemeClr val="accent4"/>
-              </a:buClr>
-              <a:buFont typeface="Arial" pitchFamily="34" charset="0"/>
-              <a:buChar char="•"/>
-              <a:defRPr sz="1400" kern="1200">
-                <a:solidFill>
-                  <a:schemeClr val="tx1"/>
-                </a:solidFill>
-                <a:latin typeface="+mn-lt"/>
-                <a:ea typeface="+mn-ea"/>
-                <a:cs typeface="+mn-cs"/>
-              </a:defRPr>
-            </a:lvl9pPr>
-          </a:lstStyle>
-          <a:p>
-            <a:pPr marL="114300" indent="0">
-              <a:buNone/>
-            </a:pPr>
-            <a:r>
-              <a:rPr lang="en-US" b="1" i="1" dirty="0" smtClean="0">
-                <a:solidFill>
-                  <a:schemeClr val="accent3">
-                    <a:lumMod val="50000"/>
-                  </a:schemeClr>
-                </a:solidFill>
-              </a:rPr>
-              <a:t>FP Big Idea ™:   </a:t>
-            </a:r>
-            <a:r>
-              <a:rPr lang="en-US" b="1" i="1" dirty="0" smtClean="0">
-                <a:solidFill>
-                  <a:srgbClr val="FF5050"/>
-                </a:solidFill>
-              </a:rPr>
-              <a:t>???</a:t>
-            </a:r>
-          </a:p>
-        </p:txBody>
-      </p:sp>
-    </p:spTree>
-    <p:extLst>
-      <p:ext uri="{BB962C8B-B14F-4D97-AF65-F5344CB8AC3E}">
-        <p14:creationId xmlns:p14="http://schemas.microsoft.com/office/powerpoint/2010/main" val="1188103287"/>
-      </p:ext>
-    </p:extLst>
-  </p:cSld>
-  <p:clrMapOvr>
-    <a:masterClrMapping/>
-  </p:clrMapOvr>
-</p:sld>
-</file>
-
-<file path=ppt/slides/slide25.xml><?xml version="1.0" encoding="utf-8"?>
-<p:sld xmlns:a="http://schemas.openxmlformats.org/drawingml/2006/main" xmlns:r="http://schemas.openxmlformats.org/officeDocument/2006/relationships" xmlns:p="http://schemas.openxmlformats.org/presentationml/2006/main">
-  <p:cSld>
-    <p:spTree>
-      <p:nvGrpSpPr>
-        <p:cNvPr id="1" name=""/>
-        <p:cNvGrpSpPr/>
-        <p:nvPr/>
-      </p:nvGrpSpPr>
-      <p:grpSpPr>
-        <a:xfrm>
-          <a:off x="0" y="0"/>
-          <a:ext cx="0" cy="0"/>
-          <a:chOff x="0" y="0"/>
-          <a:chExt cx="0" cy="0"/>
-        </a:xfrm>
-      </p:grpSpPr>
-      <p:sp>
-        <p:nvSpPr>
-          <p:cNvPr id="2" name="Title 1"/>
-          <p:cNvSpPr>
-            <a:spLocks noGrp="1"/>
-          </p:cNvSpPr>
-          <p:nvPr>
-            <p:ph type="title"/>
-          </p:nvPr>
-        </p:nvSpPr>
-        <p:spPr/>
-        <p:txBody>
-          <a:bodyPr/>
-          <a:lstStyle/>
-          <a:p>
-            <a:r>
-              <a:rPr lang="en-US" sz="4000" dirty="0" smtClean="0"/>
-              <a:t>Anonymous Functions </a:t>
-            </a:r>
-            <a:br>
-              <a:rPr lang="en-US" sz="4000" dirty="0" smtClean="0"/>
-            </a:br>
-            <a:r>
-              <a:rPr lang="en-US" sz="4000" dirty="0" smtClean="0"/>
-              <a:t>(Lambda Expressions)</a:t>
-            </a:r>
-            <a:endParaRPr lang="en-US" sz="4000" dirty="0"/>
-          </a:p>
-        </p:txBody>
-      </p:sp>
-      <p:sp>
-        <p:nvSpPr>
-          <p:cNvPr id="3" name="Content Placeholder 2"/>
-          <p:cNvSpPr>
-            <a:spLocks noGrp="1"/>
-          </p:cNvSpPr>
-          <p:nvPr>
-            <p:ph idx="1"/>
-          </p:nvPr>
-        </p:nvSpPr>
         <p:spPr>
           <a:xfrm>
             <a:off x="457200" y="1752600"/>
@@ -9664,7 +9746,11 @@
           <a:p>
             <a:r>
               <a:rPr lang="en-US" dirty="0" smtClean="0"/>
-              <a:t>Can be defined and called without a name</a:t>
+              <a:t>Can be defined </a:t>
+            </a:r>
+            <a:r>
+              <a:rPr lang="en-US" dirty="0" smtClean="0"/>
+              <a:t>and called without a name</a:t>
             </a:r>
           </a:p>
           <a:p>
@@ -10296,7 +10382,7 @@
 </p:sld>
 </file>
 
-<file path=ppt/slides/slide26.xml><?xml version="1.0" encoding="utf-8"?>
+<file path=ppt/slides/slide25.xml><?xml version="1.0" encoding="utf-8"?>
 <p:sld xmlns:a="http://schemas.openxmlformats.org/drawingml/2006/main" xmlns:r="http://schemas.openxmlformats.org/officeDocument/2006/relationships" xmlns:p="http://schemas.openxmlformats.org/presentationml/2006/main">
   <p:cSld>
     <p:spTree>
@@ -10935,7 +11021,7 @@
 </p:sld>
 </file>
 
-<file path=ppt/slides/slide27.xml><?xml version="1.0" encoding="utf-8"?>
+<file path=ppt/slides/slide26.xml><?xml version="1.0" encoding="utf-8"?>
 <p:sld xmlns:a="http://schemas.openxmlformats.org/drawingml/2006/main" xmlns:r="http://schemas.openxmlformats.org/officeDocument/2006/relationships" xmlns:p="http://schemas.openxmlformats.org/presentationml/2006/main">
   <p:cSld>
     <p:spTree>
@@ -11128,7 +11214,7 @@
 </p:sld>
 </file>
 
-<file path=ppt/slides/slide28.xml><?xml version="1.0" encoding="utf-8"?>
+<file path=ppt/slides/slide27.xml><?xml version="1.0" encoding="utf-8"?>
 <p:sld xmlns:a="http://schemas.openxmlformats.org/drawingml/2006/main" xmlns:r="http://schemas.openxmlformats.org/officeDocument/2006/relationships" xmlns:p="http://schemas.openxmlformats.org/presentationml/2006/main">
   <p:cSld>
     <p:spTree>
@@ -11929,7 +12015,7 @@
 </p:sld>
 </file>
 
-<file path=ppt/slides/slide29.xml><?xml version="1.0" encoding="utf-8"?>
+<file path=ppt/slides/slide28.xml><?xml version="1.0" encoding="utf-8"?>
 <p:sld xmlns:a="http://schemas.openxmlformats.org/drawingml/2006/main" xmlns:r="http://schemas.openxmlformats.org/officeDocument/2006/relationships" xmlns:p="http://schemas.openxmlformats.org/presentationml/2006/main">
   <p:cSld>
     <p:spTree>
@@ -12580,6 +12666,690 @@
     <p:extLst>
       <p:ext uri="{BB962C8B-B14F-4D97-AF65-F5344CB8AC3E}">
         <p14:creationId xmlns:p14="http://schemas.microsoft.com/office/powerpoint/2010/main" val="3151043697"/>
+      </p:ext>
+    </p:extLst>
+  </p:cSld>
+  <p:clrMapOvr>
+    <a:masterClrMapping/>
+  </p:clrMapOvr>
+</p:sld>
+</file>
+
+<file path=ppt/slides/slide29.xml><?xml version="1.0" encoding="utf-8"?>
+<p:sld xmlns:a="http://schemas.openxmlformats.org/drawingml/2006/main" xmlns:r="http://schemas.openxmlformats.org/officeDocument/2006/relationships" xmlns:p="http://schemas.openxmlformats.org/presentationml/2006/main">
+  <p:cSld>
+    <p:spTree>
+      <p:nvGrpSpPr>
+        <p:cNvPr id="1" name=""/>
+        <p:cNvGrpSpPr/>
+        <p:nvPr/>
+      </p:nvGrpSpPr>
+      <p:grpSpPr>
+        <a:xfrm>
+          <a:off x="0" y="0"/>
+          <a:ext cx="0" cy="0"/>
+          <a:chOff x="0" y="0"/>
+          <a:chExt cx="0" cy="0"/>
+        </a:xfrm>
+      </p:grpSpPr>
+      <p:sp>
+        <p:nvSpPr>
+          <p:cNvPr id="2" name="Title 1"/>
+          <p:cNvSpPr>
+            <a:spLocks noGrp="1"/>
+          </p:cNvSpPr>
+          <p:nvPr>
+            <p:ph type="title"/>
+          </p:nvPr>
+        </p:nvSpPr>
+        <p:spPr/>
+        <p:txBody>
+          <a:bodyPr/>
+          <a:lstStyle/>
+          <a:p>
+            <a:r>
+              <a:rPr lang="en-US" dirty="0" smtClean="0"/>
+              <a:t>List Comprehensions, cont.</a:t>
+            </a:r>
+            <a:endParaRPr lang="en-US" dirty="0"/>
+          </a:p>
+        </p:txBody>
+      </p:sp>
+      <p:sp>
+        <p:nvSpPr>
+          <p:cNvPr id="3" name="Content Placeholder 2"/>
+          <p:cNvSpPr>
+            <a:spLocks noGrp="1"/>
+          </p:cNvSpPr>
+          <p:nvPr>
+            <p:ph idx="1"/>
+          </p:nvPr>
+        </p:nvSpPr>
+        <p:spPr>
+          <a:xfrm>
+            <a:off x="457200" y="1600200"/>
+            <a:ext cx="7620000" cy="533400"/>
+          </a:xfrm>
+        </p:spPr>
+        <p:txBody>
+          <a:bodyPr/>
+          <a:lstStyle/>
+          <a:p>
+            <a:r>
+              <a:rPr lang="en-US" dirty="0" smtClean="0"/>
+              <a:t>Many other forms</a:t>
+            </a:r>
+            <a:endParaRPr lang="en-US" dirty="0"/>
+          </a:p>
+        </p:txBody>
+      </p:sp>
+      <p:sp>
+        <p:nvSpPr>
+          <p:cNvPr id="4" name="Content Placeholder 2"/>
+          <p:cNvSpPr txBox="1">
+            <a:spLocks/>
+          </p:cNvSpPr>
+          <p:nvPr/>
+        </p:nvSpPr>
+        <p:spPr>
+          <a:xfrm>
+            <a:off x="445655" y="5715000"/>
+            <a:ext cx="7620000" cy="762000"/>
+          </a:xfrm>
+          <a:prstGeom prst="rect">
+            <a:avLst/>
+          </a:prstGeom>
+        </p:spPr>
+        <p:txBody>
+          <a:bodyPr vert="horz" lIns="91440" tIns="45720" rIns="91440" bIns="45720" rtlCol="0">
+            <a:normAutofit/>
+          </a:bodyPr>
+          <a:lstStyle>
+            <a:lvl1pPr marL="342900" indent="-228600" algn="l" defTabSz="914400" rtl="0" eaLnBrk="1" latinLnBrk="0" hangingPunct="1">
+              <a:spcBef>
+                <a:spcPct val="20000"/>
+              </a:spcBef>
+              <a:buClr>
+                <a:schemeClr val="accent1"/>
+              </a:buClr>
+              <a:buFont typeface="Arial" pitchFamily="34" charset="0"/>
+              <a:buChar char="•"/>
+              <a:defRPr sz="2200" kern="1200">
+                <a:solidFill>
+                  <a:schemeClr val="tx1"/>
+                </a:solidFill>
+                <a:latin typeface="+mn-lt"/>
+                <a:ea typeface="+mn-ea"/>
+                <a:cs typeface="+mn-cs"/>
+              </a:defRPr>
+            </a:lvl1pPr>
+            <a:lvl2pPr marL="640080" indent="-228600" algn="l" defTabSz="914400" rtl="0" eaLnBrk="1" latinLnBrk="0" hangingPunct="1">
+              <a:spcBef>
+                <a:spcPct val="20000"/>
+              </a:spcBef>
+              <a:buClr>
+                <a:schemeClr val="accent2"/>
+              </a:buClr>
+              <a:buFont typeface="Arial" pitchFamily="34" charset="0"/>
+              <a:buChar char="•"/>
+              <a:defRPr sz="2000" kern="1200">
+                <a:solidFill>
+                  <a:schemeClr val="tx1"/>
+                </a:solidFill>
+                <a:latin typeface="+mn-lt"/>
+                <a:ea typeface="+mn-ea"/>
+                <a:cs typeface="+mn-cs"/>
+              </a:defRPr>
+            </a:lvl2pPr>
+            <a:lvl3pPr marL="1005840" indent="-228600" algn="l" defTabSz="914400" rtl="0" eaLnBrk="1" latinLnBrk="0" hangingPunct="1">
+              <a:spcBef>
+                <a:spcPct val="20000"/>
+              </a:spcBef>
+              <a:buClr>
+                <a:schemeClr val="accent3"/>
+              </a:buClr>
+              <a:buFont typeface="Arial" pitchFamily="34" charset="0"/>
+              <a:buChar char="•"/>
+              <a:defRPr sz="1800" kern="1200">
+                <a:solidFill>
+                  <a:schemeClr val="tx1"/>
+                </a:solidFill>
+                <a:latin typeface="+mn-lt"/>
+                <a:ea typeface="+mn-ea"/>
+                <a:cs typeface="+mn-cs"/>
+              </a:defRPr>
+            </a:lvl3pPr>
+            <a:lvl4pPr marL="1280160" indent="-228600" algn="l" defTabSz="914400" rtl="0" eaLnBrk="1" latinLnBrk="0" hangingPunct="1">
+              <a:spcBef>
+                <a:spcPct val="20000"/>
+              </a:spcBef>
+              <a:buClr>
+                <a:schemeClr val="accent4"/>
+              </a:buClr>
+              <a:buFont typeface="Arial" pitchFamily="34" charset="0"/>
+              <a:buChar char="•"/>
+              <a:defRPr sz="1600" kern="1200">
+                <a:solidFill>
+                  <a:schemeClr val="tx1"/>
+                </a:solidFill>
+                <a:latin typeface="+mn-lt"/>
+                <a:ea typeface="+mn-ea"/>
+                <a:cs typeface="+mn-cs"/>
+              </a:defRPr>
+            </a:lvl4pPr>
+            <a:lvl5pPr marL="1554480" indent="-228600" algn="l" defTabSz="914400" rtl="0" eaLnBrk="1" latinLnBrk="0" hangingPunct="1">
+              <a:spcBef>
+                <a:spcPct val="20000"/>
+              </a:spcBef>
+              <a:buClr>
+                <a:schemeClr val="accent5"/>
+              </a:buClr>
+              <a:buFont typeface="Arial" pitchFamily="34" charset="0"/>
+              <a:buChar char="•"/>
+              <a:defRPr sz="1400" kern="1200" baseline="0">
+                <a:solidFill>
+                  <a:schemeClr val="tx1"/>
+                </a:solidFill>
+                <a:latin typeface="+mn-lt"/>
+                <a:ea typeface="+mn-ea"/>
+                <a:cs typeface="+mn-cs"/>
+              </a:defRPr>
+            </a:lvl5pPr>
+            <a:lvl6pPr marL="1737360" indent="-182880" algn="l" defTabSz="914400" rtl="0" eaLnBrk="1" latinLnBrk="0" hangingPunct="1">
+              <a:spcBef>
+                <a:spcPct val="20000"/>
+              </a:spcBef>
+              <a:buClr>
+                <a:schemeClr val="accent1"/>
+              </a:buClr>
+              <a:buFont typeface="Arial" pitchFamily="34" charset="0"/>
+              <a:buChar char="•"/>
+              <a:defRPr sz="1400" kern="1200" baseline="0">
+                <a:solidFill>
+                  <a:schemeClr val="tx1"/>
+                </a:solidFill>
+                <a:latin typeface="+mn-lt"/>
+                <a:ea typeface="+mn-ea"/>
+                <a:cs typeface="+mn-cs"/>
+              </a:defRPr>
+            </a:lvl6pPr>
+            <a:lvl7pPr marL="1920240" indent="-182880" algn="l" defTabSz="914400" rtl="0" eaLnBrk="1" latinLnBrk="0" hangingPunct="1">
+              <a:spcBef>
+                <a:spcPct val="20000"/>
+              </a:spcBef>
+              <a:buClr>
+                <a:schemeClr val="accent2"/>
+              </a:buClr>
+              <a:buFont typeface="Arial" pitchFamily="34" charset="0"/>
+              <a:buChar char="•"/>
+              <a:defRPr sz="1400" kern="1200">
+                <a:solidFill>
+                  <a:schemeClr val="tx1"/>
+                </a:solidFill>
+                <a:latin typeface="+mn-lt"/>
+                <a:ea typeface="+mn-ea"/>
+                <a:cs typeface="+mn-cs"/>
+              </a:defRPr>
+            </a:lvl7pPr>
+            <a:lvl8pPr marL="2103120" indent="-182880" algn="l" defTabSz="914400" rtl="0" eaLnBrk="1" latinLnBrk="0" hangingPunct="1">
+              <a:spcBef>
+                <a:spcPct val="20000"/>
+              </a:spcBef>
+              <a:buClr>
+                <a:schemeClr val="accent3"/>
+              </a:buClr>
+              <a:buFont typeface="Arial" pitchFamily="34" charset="0"/>
+              <a:buChar char="•"/>
+              <a:defRPr sz="1400" kern="1200">
+                <a:solidFill>
+                  <a:schemeClr val="tx1"/>
+                </a:solidFill>
+                <a:latin typeface="+mn-lt"/>
+                <a:ea typeface="+mn-ea"/>
+                <a:cs typeface="+mn-cs"/>
+              </a:defRPr>
+            </a:lvl8pPr>
+            <a:lvl9pPr marL="2286000" indent="-182880" algn="l" defTabSz="914400" rtl="0" eaLnBrk="1" latinLnBrk="0" hangingPunct="1">
+              <a:spcBef>
+                <a:spcPct val="20000"/>
+              </a:spcBef>
+              <a:buClr>
+                <a:schemeClr val="accent4"/>
+              </a:buClr>
+              <a:buFont typeface="Arial" pitchFamily="34" charset="0"/>
+              <a:buChar char="•"/>
+              <a:defRPr sz="1400" kern="1200">
+                <a:solidFill>
+                  <a:schemeClr val="tx1"/>
+                </a:solidFill>
+                <a:latin typeface="+mn-lt"/>
+                <a:ea typeface="+mn-ea"/>
+                <a:cs typeface="+mn-cs"/>
+              </a:defRPr>
+            </a:lvl9pPr>
+          </a:lstStyle>
+          <a:p>
+            <a:pPr marL="114300" indent="0">
+              <a:buNone/>
+            </a:pPr>
+            <a:r>
+              <a:rPr lang="en-US" b="1" i="1" dirty="0" smtClean="0">
+                <a:solidFill>
+                  <a:schemeClr val="accent3">
+                    <a:lumMod val="50000"/>
+                  </a:schemeClr>
+                </a:solidFill>
+              </a:rPr>
+              <a:t>FP Big Idea ™:   </a:t>
+            </a:r>
+            <a:r>
+              <a:rPr lang="en-US" b="1" i="1" dirty="0" smtClean="0">
+                <a:solidFill>
+                  <a:srgbClr val="FF5050"/>
+                </a:solidFill>
+              </a:rPr>
+              <a:t>???</a:t>
+            </a:r>
+          </a:p>
+        </p:txBody>
+      </p:sp>
+      <p:graphicFrame>
+        <p:nvGraphicFramePr>
+          <p:cNvPr id="5" name="Table 4"/>
+          <p:cNvGraphicFramePr>
+            <a:graphicFrameLocks noGrp="1"/>
+          </p:cNvGraphicFramePr>
+          <p:nvPr>
+            <p:extLst>
+              <p:ext uri="{D42A27DB-BD31-4B8C-83A1-F6EECF244321}">
+                <p14:modId xmlns:p14="http://schemas.microsoft.com/office/powerpoint/2010/main" val="2232996446"/>
+              </p:ext>
+            </p:extLst>
+          </p:nvPr>
+        </p:nvGraphicFramePr>
+        <p:xfrm>
+          <a:off x="685800" y="2286000"/>
+          <a:ext cx="6781800" cy="1132840"/>
+        </p:xfrm>
+        <a:graphic>
+          <a:graphicData uri="http://schemas.openxmlformats.org/drawingml/2006/table">
+            <a:tbl>
+              <a:tblPr bandRow="1">
+                <a:tableStyleId>{5C22544A-7EE6-4342-B048-85BDC9FD1C3A}</a:tableStyleId>
+              </a:tblPr>
+              <a:tblGrid>
+                <a:gridCol w="2260600"/>
+                <a:gridCol w="2260600"/>
+                <a:gridCol w="2260600"/>
+              </a:tblGrid>
+              <a:tr h="391160">
+                <a:tc>
+                  <a:txBody>
+                    <a:bodyPr/>
+                    <a:lstStyle/>
+                    <a:p>
+                      <a:r>
+                        <a:rPr lang="en-US" dirty="0" smtClean="0"/>
+                        <a:t>grouping</a:t>
+                      </a:r>
+                      <a:endParaRPr lang="en-US" dirty="0"/>
+                    </a:p>
+                  </a:txBody>
+                  <a:tcPr/>
+                </a:tc>
+                <a:tc>
+                  <a:txBody>
+                    <a:bodyPr/>
+                    <a:lstStyle/>
+                    <a:p>
+                      <a:r>
+                        <a:rPr lang="en-US" dirty="0" smtClean="0"/>
+                        <a:t>partitioning</a:t>
+                      </a:r>
+                      <a:endParaRPr lang="en-US" dirty="0"/>
+                    </a:p>
+                  </a:txBody>
+                  <a:tcPr/>
+                </a:tc>
+                <a:tc>
+                  <a:txBody>
+                    <a:bodyPr/>
+                    <a:lstStyle/>
+                    <a:p>
+                      <a:r>
+                        <a:rPr lang="en-US" dirty="0" smtClean="0"/>
+                        <a:t>map + filter</a:t>
+                      </a:r>
+                      <a:endParaRPr lang="en-US" dirty="0"/>
+                    </a:p>
+                  </a:txBody>
+                  <a:tcPr/>
+                </a:tc>
+              </a:tr>
+              <a:tr h="370840">
+                <a:tc>
+                  <a:txBody>
+                    <a:bodyPr/>
+                    <a:lstStyle/>
+                    <a:p>
+                      <a:r>
+                        <a:rPr lang="en-US" dirty="0" smtClean="0"/>
+                        <a:t>removing duplicates</a:t>
+                      </a:r>
+                      <a:endParaRPr lang="en-US" dirty="0"/>
+                    </a:p>
+                  </a:txBody>
+                  <a:tcPr/>
+                </a:tc>
+                <a:tc>
+                  <a:txBody>
+                    <a:bodyPr/>
+                    <a:lstStyle/>
+                    <a:p>
+                      <a:r>
+                        <a:rPr lang="en-US" dirty="0" smtClean="0"/>
+                        <a:t>flattening nested lists</a:t>
+                      </a:r>
+                      <a:endParaRPr lang="en-US" dirty="0"/>
+                    </a:p>
+                  </a:txBody>
+                  <a:tcPr/>
+                </a:tc>
+                <a:tc>
+                  <a:txBody>
+                    <a:bodyPr/>
+                    <a:lstStyle/>
+                    <a:p>
+                      <a:r>
+                        <a:rPr lang="en-US" dirty="0" smtClean="0"/>
+                        <a:t>concatenating</a:t>
+                      </a:r>
+                      <a:endParaRPr lang="en-US" dirty="0"/>
+                    </a:p>
+                  </a:txBody>
+                  <a:tcPr/>
+                </a:tc>
+              </a:tr>
+              <a:tr h="370840">
+                <a:tc>
+                  <a:txBody>
+                    <a:bodyPr/>
+                    <a:lstStyle/>
+                    <a:p>
+                      <a:r>
+                        <a:rPr lang="en-US" dirty="0" smtClean="0"/>
+                        <a:t>set arithmetic</a:t>
+                      </a:r>
+                      <a:endParaRPr lang="en-US" dirty="0"/>
+                    </a:p>
+                  </a:txBody>
+                  <a:tcPr/>
+                </a:tc>
+                <a:tc>
+                  <a:txBody>
+                    <a:bodyPr/>
+                    <a:lstStyle/>
+                    <a:p>
+                      <a:r>
+                        <a:rPr lang="en-US" dirty="0" smtClean="0"/>
+                        <a:t>sorting</a:t>
+                      </a:r>
+                      <a:endParaRPr lang="en-US" dirty="0"/>
+                    </a:p>
+                  </a:txBody>
+                  <a:tcPr/>
+                </a:tc>
+                <a:tc>
+                  <a:txBody>
+                    <a:bodyPr/>
+                    <a:lstStyle/>
+                    <a:p>
+                      <a:r>
+                        <a:rPr lang="en-US" dirty="0" smtClean="0"/>
+                        <a:t>transposing</a:t>
+                      </a:r>
+                      <a:endParaRPr lang="en-US" dirty="0"/>
+                    </a:p>
+                  </a:txBody>
+                  <a:tcPr/>
+                </a:tc>
+              </a:tr>
+            </a:tbl>
+          </a:graphicData>
+        </a:graphic>
+      </p:graphicFrame>
+      <p:sp>
+        <p:nvSpPr>
+          <p:cNvPr id="6" name="Content Placeholder 2"/>
+          <p:cNvSpPr txBox="1">
+            <a:spLocks/>
+          </p:cNvSpPr>
+          <p:nvPr/>
+        </p:nvSpPr>
+        <p:spPr>
+          <a:xfrm>
+            <a:off x="445655" y="3733800"/>
+            <a:ext cx="7620000" cy="1752600"/>
+          </a:xfrm>
+          <a:prstGeom prst="rect">
+            <a:avLst/>
+          </a:prstGeom>
+        </p:spPr>
+        <p:txBody>
+          <a:bodyPr vert="horz" lIns="91440" tIns="45720" rIns="91440" bIns="45720" rtlCol="0">
+            <a:normAutofit/>
+          </a:bodyPr>
+          <a:lstStyle>
+            <a:lvl1pPr marL="342900" indent="-228600" algn="l" defTabSz="914400" rtl="0" eaLnBrk="1" latinLnBrk="0" hangingPunct="1">
+              <a:spcBef>
+                <a:spcPct val="20000"/>
+              </a:spcBef>
+              <a:buClr>
+                <a:schemeClr val="accent1"/>
+              </a:buClr>
+              <a:buFont typeface="Arial" pitchFamily="34" charset="0"/>
+              <a:buChar char="•"/>
+              <a:defRPr sz="2200" kern="1200">
+                <a:solidFill>
+                  <a:schemeClr val="tx1"/>
+                </a:solidFill>
+                <a:latin typeface="+mn-lt"/>
+                <a:ea typeface="+mn-ea"/>
+                <a:cs typeface="+mn-cs"/>
+              </a:defRPr>
+            </a:lvl1pPr>
+            <a:lvl2pPr marL="640080" indent="-228600" algn="l" defTabSz="914400" rtl="0" eaLnBrk="1" latinLnBrk="0" hangingPunct="1">
+              <a:spcBef>
+                <a:spcPct val="20000"/>
+              </a:spcBef>
+              <a:buClr>
+                <a:schemeClr val="accent2"/>
+              </a:buClr>
+              <a:buFont typeface="Arial" pitchFamily="34" charset="0"/>
+              <a:buChar char="•"/>
+              <a:defRPr sz="2000" kern="1200">
+                <a:solidFill>
+                  <a:schemeClr val="tx1"/>
+                </a:solidFill>
+                <a:latin typeface="+mn-lt"/>
+                <a:ea typeface="+mn-ea"/>
+                <a:cs typeface="+mn-cs"/>
+              </a:defRPr>
+            </a:lvl2pPr>
+            <a:lvl3pPr marL="1005840" indent="-228600" algn="l" defTabSz="914400" rtl="0" eaLnBrk="1" latinLnBrk="0" hangingPunct="1">
+              <a:spcBef>
+                <a:spcPct val="20000"/>
+              </a:spcBef>
+              <a:buClr>
+                <a:schemeClr val="accent3"/>
+              </a:buClr>
+              <a:buFont typeface="Arial" pitchFamily="34" charset="0"/>
+              <a:buChar char="•"/>
+              <a:defRPr sz="1800" kern="1200">
+                <a:solidFill>
+                  <a:schemeClr val="tx1"/>
+                </a:solidFill>
+                <a:latin typeface="+mn-lt"/>
+                <a:ea typeface="+mn-ea"/>
+                <a:cs typeface="+mn-cs"/>
+              </a:defRPr>
+            </a:lvl3pPr>
+            <a:lvl4pPr marL="1280160" indent="-228600" algn="l" defTabSz="914400" rtl="0" eaLnBrk="1" latinLnBrk="0" hangingPunct="1">
+              <a:spcBef>
+                <a:spcPct val="20000"/>
+              </a:spcBef>
+              <a:buClr>
+                <a:schemeClr val="accent4"/>
+              </a:buClr>
+              <a:buFont typeface="Arial" pitchFamily="34" charset="0"/>
+              <a:buChar char="•"/>
+              <a:defRPr sz="1600" kern="1200">
+                <a:solidFill>
+                  <a:schemeClr val="tx1"/>
+                </a:solidFill>
+                <a:latin typeface="+mn-lt"/>
+                <a:ea typeface="+mn-ea"/>
+                <a:cs typeface="+mn-cs"/>
+              </a:defRPr>
+            </a:lvl4pPr>
+            <a:lvl5pPr marL="1554480" indent="-228600" algn="l" defTabSz="914400" rtl="0" eaLnBrk="1" latinLnBrk="0" hangingPunct="1">
+              <a:spcBef>
+                <a:spcPct val="20000"/>
+              </a:spcBef>
+              <a:buClr>
+                <a:schemeClr val="accent5"/>
+              </a:buClr>
+              <a:buFont typeface="Arial" pitchFamily="34" charset="0"/>
+              <a:buChar char="•"/>
+              <a:defRPr sz="1400" kern="1200" baseline="0">
+                <a:solidFill>
+                  <a:schemeClr val="tx1"/>
+                </a:solidFill>
+                <a:latin typeface="+mn-lt"/>
+                <a:ea typeface="+mn-ea"/>
+                <a:cs typeface="+mn-cs"/>
+              </a:defRPr>
+            </a:lvl5pPr>
+            <a:lvl6pPr marL="1737360" indent="-182880" algn="l" defTabSz="914400" rtl="0" eaLnBrk="1" latinLnBrk="0" hangingPunct="1">
+              <a:spcBef>
+                <a:spcPct val="20000"/>
+              </a:spcBef>
+              <a:buClr>
+                <a:schemeClr val="accent1"/>
+              </a:buClr>
+              <a:buFont typeface="Arial" pitchFamily="34" charset="0"/>
+              <a:buChar char="•"/>
+              <a:defRPr sz="1400" kern="1200" baseline="0">
+                <a:solidFill>
+                  <a:schemeClr val="tx1"/>
+                </a:solidFill>
+                <a:latin typeface="+mn-lt"/>
+                <a:ea typeface="+mn-ea"/>
+                <a:cs typeface="+mn-cs"/>
+              </a:defRPr>
+            </a:lvl6pPr>
+            <a:lvl7pPr marL="1920240" indent="-182880" algn="l" defTabSz="914400" rtl="0" eaLnBrk="1" latinLnBrk="0" hangingPunct="1">
+              <a:spcBef>
+                <a:spcPct val="20000"/>
+              </a:spcBef>
+              <a:buClr>
+                <a:schemeClr val="accent2"/>
+              </a:buClr>
+              <a:buFont typeface="Arial" pitchFamily="34" charset="0"/>
+              <a:buChar char="•"/>
+              <a:defRPr sz="1400" kern="1200">
+                <a:solidFill>
+                  <a:schemeClr val="tx1"/>
+                </a:solidFill>
+                <a:latin typeface="+mn-lt"/>
+                <a:ea typeface="+mn-ea"/>
+                <a:cs typeface="+mn-cs"/>
+              </a:defRPr>
+            </a:lvl7pPr>
+            <a:lvl8pPr marL="2103120" indent="-182880" algn="l" defTabSz="914400" rtl="0" eaLnBrk="1" latinLnBrk="0" hangingPunct="1">
+              <a:spcBef>
+                <a:spcPct val="20000"/>
+              </a:spcBef>
+              <a:buClr>
+                <a:schemeClr val="accent3"/>
+              </a:buClr>
+              <a:buFont typeface="Arial" pitchFamily="34" charset="0"/>
+              <a:buChar char="•"/>
+              <a:defRPr sz="1400" kern="1200">
+                <a:solidFill>
+                  <a:schemeClr val="tx1"/>
+                </a:solidFill>
+                <a:latin typeface="+mn-lt"/>
+                <a:ea typeface="+mn-ea"/>
+                <a:cs typeface="+mn-cs"/>
+              </a:defRPr>
+            </a:lvl8pPr>
+            <a:lvl9pPr marL="2286000" indent="-182880" algn="l" defTabSz="914400" rtl="0" eaLnBrk="1" latinLnBrk="0" hangingPunct="1">
+              <a:spcBef>
+                <a:spcPct val="20000"/>
+              </a:spcBef>
+              <a:buClr>
+                <a:schemeClr val="accent4"/>
+              </a:buClr>
+              <a:buFont typeface="Arial" pitchFamily="34" charset="0"/>
+              <a:buChar char="•"/>
+              <a:defRPr sz="1400" kern="1200">
+                <a:solidFill>
+                  <a:schemeClr val="tx1"/>
+                </a:solidFill>
+                <a:latin typeface="+mn-lt"/>
+                <a:ea typeface="+mn-ea"/>
+                <a:cs typeface="+mn-cs"/>
+              </a:defRPr>
+            </a:lvl9pPr>
+          </a:lstStyle>
+          <a:p>
+            <a:r>
+              <a:rPr lang="en-US" dirty="0" smtClean="0"/>
+              <a:t>Can dramatically simplify code (</a:t>
+            </a:r>
+            <a:r>
+              <a:rPr lang="en-US" b="1" dirty="0" smtClean="0">
+                <a:solidFill>
+                  <a:srgbClr val="FF5050"/>
+                </a:solidFill>
+              </a:rPr>
+              <a:t>example</a:t>
+            </a:r>
+            <a:r>
+              <a:rPr lang="en-US" dirty="0" smtClean="0"/>
+              <a:t>)</a:t>
+            </a:r>
+          </a:p>
+          <a:p>
+            <a:r>
+              <a:rPr lang="en-US" b="1" dirty="0" err="1" smtClean="0">
+                <a:solidFill>
+                  <a:srgbClr val="FF5050"/>
+                </a:solidFill>
+              </a:rPr>
+              <a:t>Functors</a:t>
+            </a:r>
+            <a:r>
+              <a:rPr lang="en-US" b="1" dirty="0" smtClean="0">
+                <a:solidFill>
+                  <a:srgbClr val="FF5050"/>
+                </a:solidFill>
+              </a:rPr>
+              <a:t>?</a:t>
+            </a:r>
+            <a:endParaRPr lang="en-US" b="1" dirty="0">
+              <a:solidFill>
+                <a:srgbClr val="FF5050"/>
+              </a:solidFill>
+            </a:endParaRPr>
+          </a:p>
+        </p:txBody>
+      </p:sp>
+    </p:spTree>
+    <p:extLst>
+      <p:ext uri="{BB962C8B-B14F-4D97-AF65-F5344CB8AC3E}">
+        <p14:creationId xmlns:p14="http://schemas.microsoft.com/office/powerpoint/2010/main" val="3920199432"/>
       </p:ext>
     </p:extLst>
   </p:cSld>
@@ -12954,690 +13724,6 @@
           <a:p>
             <a:r>
               <a:rPr lang="en-US" dirty="0" smtClean="0"/>
-              <a:t>List Comprehensions, cont.</a:t>
-            </a:r>
-            <a:endParaRPr lang="en-US" dirty="0"/>
-          </a:p>
-        </p:txBody>
-      </p:sp>
-      <p:sp>
-        <p:nvSpPr>
-          <p:cNvPr id="3" name="Content Placeholder 2"/>
-          <p:cNvSpPr>
-            <a:spLocks noGrp="1"/>
-          </p:cNvSpPr>
-          <p:nvPr>
-            <p:ph idx="1"/>
-          </p:nvPr>
-        </p:nvSpPr>
-        <p:spPr>
-          <a:xfrm>
-            <a:off x="457200" y="1600200"/>
-            <a:ext cx="7620000" cy="533400"/>
-          </a:xfrm>
-        </p:spPr>
-        <p:txBody>
-          <a:bodyPr/>
-          <a:lstStyle/>
-          <a:p>
-            <a:r>
-              <a:rPr lang="en-US" dirty="0" smtClean="0"/>
-              <a:t>Many other forms</a:t>
-            </a:r>
-            <a:endParaRPr lang="en-US" dirty="0"/>
-          </a:p>
-        </p:txBody>
-      </p:sp>
-      <p:sp>
-        <p:nvSpPr>
-          <p:cNvPr id="4" name="Content Placeholder 2"/>
-          <p:cNvSpPr txBox="1">
-            <a:spLocks/>
-          </p:cNvSpPr>
-          <p:nvPr/>
-        </p:nvSpPr>
-        <p:spPr>
-          <a:xfrm>
-            <a:off x="445655" y="5715000"/>
-            <a:ext cx="7620000" cy="762000"/>
-          </a:xfrm>
-          <a:prstGeom prst="rect">
-            <a:avLst/>
-          </a:prstGeom>
-        </p:spPr>
-        <p:txBody>
-          <a:bodyPr vert="horz" lIns="91440" tIns="45720" rIns="91440" bIns="45720" rtlCol="0">
-            <a:normAutofit/>
-          </a:bodyPr>
-          <a:lstStyle>
-            <a:lvl1pPr marL="342900" indent="-228600" algn="l" defTabSz="914400" rtl="0" eaLnBrk="1" latinLnBrk="0" hangingPunct="1">
-              <a:spcBef>
-                <a:spcPct val="20000"/>
-              </a:spcBef>
-              <a:buClr>
-                <a:schemeClr val="accent1"/>
-              </a:buClr>
-              <a:buFont typeface="Arial" pitchFamily="34" charset="0"/>
-              <a:buChar char="•"/>
-              <a:defRPr sz="2200" kern="1200">
-                <a:solidFill>
-                  <a:schemeClr val="tx1"/>
-                </a:solidFill>
-                <a:latin typeface="+mn-lt"/>
-                <a:ea typeface="+mn-ea"/>
-                <a:cs typeface="+mn-cs"/>
-              </a:defRPr>
-            </a:lvl1pPr>
-            <a:lvl2pPr marL="640080" indent="-228600" algn="l" defTabSz="914400" rtl="0" eaLnBrk="1" latinLnBrk="0" hangingPunct="1">
-              <a:spcBef>
-                <a:spcPct val="20000"/>
-              </a:spcBef>
-              <a:buClr>
-                <a:schemeClr val="accent2"/>
-              </a:buClr>
-              <a:buFont typeface="Arial" pitchFamily="34" charset="0"/>
-              <a:buChar char="•"/>
-              <a:defRPr sz="2000" kern="1200">
-                <a:solidFill>
-                  <a:schemeClr val="tx1"/>
-                </a:solidFill>
-                <a:latin typeface="+mn-lt"/>
-                <a:ea typeface="+mn-ea"/>
-                <a:cs typeface="+mn-cs"/>
-              </a:defRPr>
-            </a:lvl2pPr>
-            <a:lvl3pPr marL="1005840" indent="-228600" algn="l" defTabSz="914400" rtl="0" eaLnBrk="1" latinLnBrk="0" hangingPunct="1">
-              <a:spcBef>
-                <a:spcPct val="20000"/>
-              </a:spcBef>
-              <a:buClr>
-                <a:schemeClr val="accent3"/>
-              </a:buClr>
-              <a:buFont typeface="Arial" pitchFamily="34" charset="0"/>
-              <a:buChar char="•"/>
-              <a:defRPr sz="1800" kern="1200">
-                <a:solidFill>
-                  <a:schemeClr val="tx1"/>
-                </a:solidFill>
-                <a:latin typeface="+mn-lt"/>
-                <a:ea typeface="+mn-ea"/>
-                <a:cs typeface="+mn-cs"/>
-              </a:defRPr>
-            </a:lvl3pPr>
-            <a:lvl4pPr marL="1280160" indent="-228600" algn="l" defTabSz="914400" rtl="0" eaLnBrk="1" latinLnBrk="0" hangingPunct="1">
-              <a:spcBef>
-                <a:spcPct val="20000"/>
-              </a:spcBef>
-              <a:buClr>
-                <a:schemeClr val="accent4"/>
-              </a:buClr>
-              <a:buFont typeface="Arial" pitchFamily="34" charset="0"/>
-              <a:buChar char="•"/>
-              <a:defRPr sz="1600" kern="1200">
-                <a:solidFill>
-                  <a:schemeClr val="tx1"/>
-                </a:solidFill>
-                <a:latin typeface="+mn-lt"/>
-                <a:ea typeface="+mn-ea"/>
-                <a:cs typeface="+mn-cs"/>
-              </a:defRPr>
-            </a:lvl4pPr>
-            <a:lvl5pPr marL="1554480" indent="-228600" algn="l" defTabSz="914400" rtl="0" eaLnBrk="1" latinLnBrk="0" hangingPunct="1">
-              <a:spcBef>
-                <a:spcPct val="20000"/>
-              </a:spcBef>
-              <a:buClr>
-                <a:schemeClr val="accent5"/>
-              </a:buClr>
-              <a:buFont typeface="Arial" pitchFamily="34" charset="0"/>
-              <a:buChar char="•"/>
-              <a:defRPr sz="1400" kern="1200" baseline="0">
-                <a:solidFill>
-                  <a:schemeClr val="tx1"/>
-                </a:solidFill>
-                <a:latin typeface="+mn-lt"/>
-                <a:ea typeface="+mn-ea"/>
-                <a:cs typeface="+mn-cs"/>
-              </a:defRPr>
-            </a:lvl5pPr>
-            <a:lvl6pPr marL="1737360" indent="-182880" algn="l" defTabSz="914400" rtl="0" eaLnBrk="1" latinLnBrk="0" hangingPunct="1">
-              <a:spcBef>
-                <a:spcPct val="20000"/>
-              </a:spcBef>
-              <a:buClr>
-                <a:schemeClr val="accent1"/>
-              </a:buClr>
-              <a:buFont typeface="Arial" pitchFamily="34" charset="0"/>
-              <a:buChar char="•"/>
-              <a:defRPr sz="1400" kern="1200" baseline="0">
-                <a:solidFill>
-                  <a:schemeClr val="tx1"/>
-                </a:solidFill>
-                <a:latin typeface="+mn-lt"/>
-                <a:ea typeface="+mn-ea"/>
-                <a:cs typeface="+mn-cs"/>
-              </a:defRPr>
-            </a:lvl6pPr>
-            <a:lvl7pPr marL="1920240" indent="-182880" algn="l" defTabSz="914400" rtl="0" eaLnBrk="1" latinLnBrk="0" hangingPunct="1">
-              <a:spcBef>
-                <a:spcPct val="20000"/>
-              </a:spcBef>
-              <a:buClr>
-                <a:schemeClr val="accent2"/>
-              </a:buClr>
-              <a:buFont typeface="Arial" pitchFamily="34" charset="0"/>
-              <a:buChar char="•"/>
-              <a:defRPr sz="1400" kern="1200">
-                <a:solidFill>
-                  <a:schemeClr val="tx1"/>
-                </a:solidFill>
-                <a:latin typeface="+mn-lt"/>
-                <a:ea typeface="+mn-ea"/>
-                <a:cs typeface="+mn-cs"/>
-              </a:defRPr>
-            </a:lvl7pPr>
-            <a:lvl8pPr marL="2103120" indent="-182880" algn="l" defTabSz="914400" rtl="0" eaLnBrk="1" latinLnBrk="0" hangingPunct="1">
-              <a:spcBef>
-                <a:spcPct val="20000"/>
-              </a:spcBef>
-              <a:buClr>
-                <a:schemeClr val="accent3"/>
-              </a:buClr>
-              <a:buFont typeface="Arial" pitchFamily="34" charset="0"/>
-              <a:buChar char="•"/>
-              <a:defRPr sz="1400" kern="1200">
-                <a:solidFill>
-                  <a:schemeClr val="tx1"/>
-                </a:solidFill>
-                <a:latin typeface="+mn-lt"/>
-                <a:ea typeface="+mn-ea"/>
-                <a:cs typeface="+mn-cs"/>
-              </a:defRPr>
-            </a:lvl8pPr>
-            <a:lvl9pPr marL="2286000" indent="-182880" algn="l" defTabSz="914400" rtl="0" eaLnBrk="1" latinLnBrk="0" hangingPunct="1">
-              <a:spcBef>
-                <a:spcPct val="20000"/>
-              </a:spcBef>
-              <a:buClr>
-                <a:schemeClr val="accent4"/>
-              </a:buClr>
-              <a:buFont typeface="Arial" pitchFamily="34" charset="0"/>
-              <a:buChar char="•"/>
-              <a:defRPr sz="1400" kern="1200">
-                <a:solidFill>
-                  <a:schemeClr val="tx1"/>
-                </a:solidFill>
-                <a:latin typeface="+mn-lt"/>
-                <a:ea typeface="+mn-ea"/>
-                <a:cs typeface="+mn-cs"/>
-              </a:defRPr>
-            </a:lvl9pPr>
-          </a:lstStyle>
-          <a:p>
-            <a:pPr marL="114300" indent="0">
-              <a:buNone/>
-            </a:pPr>
-            <a:r>
-              <a:rPr lang="en-US" b="1" i="1" dirty="0" smtClean="0">
-                <a:solidFill>
-                  <a:schemeClr val="accent3">
-                    <a:lumMod val="50000"/>
-                  </a:schemeClr>
-                </a:solidFill>
-              </a:rPr>
-              <a:t>FP Big Idea ™:   </a:t>
-            </a:r>
-            <a:r>
-              <a:rPr lang="en-US" b="1" i="1" dirty="0" smtClean="0">
-                <a:solidFill>
-                  <a:srgbClr val="FF5050"/>
-                </a:solidFill>
-              </a:rPr>
-              <a:t>???</a:t>
-            </a:r>
-          </a:p>
-        </p:txBody>
-      </p:sp>
-      <p:graphicFrame>
-        <p:nvGraphicFramePr>
-          <p:cNvPr id="5" name="Table 4"/>
-          <p:cNvGraphicFramePr>
-            <a:graphicFrameLocks noGrp="1"/>
-          </p:cNvGraphicFramePr>
-          <p:nvPr>
-            <p:extLst>
-              <p:ext uri="{D42A27DB-BD31-4B8C-83A1-F6EECF244321}">
-                <p14:modId xmlns:p14="http://schemas.microsoft.com/office/powerpoint/2010/main" val="2232996446"/>
-              </p:ext>
-            </p:extLst>
-          </p:nvPr>
-        </p:nvGraphicFramePr>
-        <p:xfrm>
-          <a:off x="685800" y="2286000"/>
-          <a:ext cx="6781800" cy="1132840"/>
-        </p:xfrm>
-        <a:graphic>
-          <a:graphicData uri="http://schemas.openxmlformats.org/drawingml/2006/table">
-            <a:tbl>
-              <a:tblPr bandRow="1">
-                <a:tableStyleId>{5C22544A-7EE6-4342-B048-85BDC9FD1C3A}</a:tableStyleId>
-              </a:tblPr>
-              <a:tblGrid>
-                <a:gridCol w="2260600"/>
-                <a:gridCol w="2260600"/>
-                <a:gridCol w="2260600"/>
-              </a:tblGrid>
-              <a:tr h="391160">
-                <a:tc>
-                  <a:txBody>
-                    <a:bodyPr/>
-                    <a:lstStyle/>
-                    <a:p>
-                      <a:r>
-                        <a:rPr lang="en-US" dirty="0" smtClean="0"/>
-                        <a:t>grouping</a:t>
-                      </a:r>
-                      <a:endParaRPr lang="en-US" dirty="0"/>
-                    </a:p>
-                  </a:txBody>
-                  <a:tcPr/>
-                </a:tc>
-                <a:tc>
-                  <a:txBody>
-                    <a:bodyPr/>
-                    <a:lstStyle/>
-                    <a:p>
-                      <a:r>
-                        <a:rPr lang="en-US" dirty="0" smtClean="0"/>
-                        <a:t>partitioning</a:t>
-                      </a:r>
-                      <a:endParaRPr lang="en-US" dirty="0"/>
-                    </a:p>
-                  </a:txBody>
-                  <a:tcPr/>
-                </a:tc>
-                <a:tc>
-                  <a:txBody>
-                    <a:bodyPr/>
-                    <a:lstStyle/>
-                    <a:p>
-                      <a:r>
-                        <a:rPr lang="en-US" dirty="0" smtClean="0"/>
-                        <a:t>map + filter</a:t>
-                      </a:r>
-                      <a:endParaRPr lang="en-US" dirty="0"/>
-                    </a:p>
-                  </a:txBody>
-                  <a:tcPr/>
-                </a:tc>
-              </a:tr>
-              <a:tr h="370840">
-                <a:tc>
-                  <a:txBody>
-                    <a:bodyPr/>
-                    <a:lstStyle/>
-                    <a:p>
-                      <a:r>
-                        <a:rPr lang="en-US" dirty="0" smtClean="0"/>
-                        <a:t>removing duplicates</a:t>
-                      </a:r>
-                      <a:endParaRPr lang="en-US" dirty="0"/>
-                    </a:p>
-                  </a:txBody>
-                  <a:tcPr/>
-                </a:tc>
-                <a:tc>
-                  <a:txBody>
-                    <a:bodyPr/>
-                    <a:lstStyle/>
-                    <a:p>
-                      <a:r>
-                        <a:rPr lang="en-US" dirty="0" smtClean="0"/>
-                        <a:t>flattening nested lists</a:t>
-                      </a:r>
-                      <a:endParaRPr lang="en-US" dirty="0"/>
-                    </a:p>
-                  </a:txBody>
-                  <a:tcPr/>
-                </a:tc>
-                <a:tc>
-                  <a:txBody>
-                    <a:bodyPr/>
-                    <a:lstStyle/>
-                    <a:p>
-                      <a:r>
-                        <a:rPr lang="en-US" dirty="0" smtClean="0"/>
-                        <a:t>concatenating</a:t>
-                      </a:r>
-                      <a:endParaRPr lang="en-US" dirty="0"/>
-                    </a:p>
-                  </a:txBody>
-                  <a:tcPr/>
-                </a:tc>
-              </a:tr>
-              <a:tr h="370840">
-                <a:tc>
-                  <a:txBody>
-                    <a:bodyPr/>
-                    <a:lstStyle/>
-                    <a:p>
-                      <a:r>
-                        <a:rPr lang="en-US" dirty="0" smtClean="0"/>
-                        <a:t>set arithmetic</a:t>
-                      </a:r>
-                      <a:endParaRPr lang="en-US" dirty="0"/>
-                    </a:p>
-                  </a:txBody>
-                  <a:tcPr/>
-                </a:tc>
-                <a:tc>
-                  <a:txBody>
-                    <a:bodyPr/>
-                    <a:lstStyle/>
-                    <a:p>
-                      <a:r>
-                        <a:rPr lang="en-US" dirty="0" smtClean="0"/>
-                        <a:t>sorting</a:t>
-                      </a:r>
-                      <a:endParaRPr lang="en-US" dirty="0"/>
-                    </a:p>
-                  </a:txBody>
-                  <a:tcPr/>
-                </a:tc>
-                <a:tc>
-                  <a:txBody>
-                    <a:bodyPr/>
-                    <a:lstStyle/>
-                    <a:p>
-                      <a:r>
-                        <a:rPr lang="en-US" dirty="0" smtClean="0"/>
-                        <a:t>transposing</a:t>
-                      </a:r>
-                      <a:endParaRPr lang="en-US" dirty="0"/>
-                    </a:p>
-                  </a:txBody>
-                  <a:tcPr/>
-                </a:tc>
-              </a:tr>
-            </a:tbl>
-          </a:graphicData>
-        </a:graphic>
-      </p:graphicFrame>
-      <p:sp>
-        <p:nvSpPr>
-          <p:cNvPr id="6" name="Content Placeholder 2"/>
-          <p:cNvSpPr txBox="1">
-            <a:spLocks/>
-          </p:cNvSpPr>
-          <p:nvPr/>
-        </p:nvSpPr>
-        <p:spPr>
-          <a:xfrm>
-            <a:off x="445655" y="3733800"/>
-            <a:ext cx="7620000" cy="1752600"/>
-          </a:xfrm>
-          <a:prstGeom prst="rect">
-            <a:avLst/>
-          </a:prstGeom>
-        </p:spPr>
-        <p:txBody>
-          <a:bodyPr vert="horz" lIns="91440" tIns="45720" rIns="91440" bIns="45720" rtlCol="0">
-            <a:normAutofit/>
-          </a:bodyPr>
-          <a:lstStyle>
-            <a:lvl1pPr marL="342900" indent="-228600" algn="l" defTabSz="914400" rtl="0" eaLnBrk="1" latinLnBrk="0" hangingPunct="1">
-              <a:spcBef>
-                <a:spcPct val="20000"/>
-              </a:spcBef>
-              <a:buClr>
-                <a:schemeClr val="accent1"/>
-              </a:buClr>
-              <a:buFont typeface="Arial" pitchFamily="34" charset="0"/>
-              <a:buChar char="•"/>
-              <a:defRPr sz="2200" kern="1200">
-                <a:solidFill>
-                  <a:schemeClr val="tx1"/>
-                </a:solidFill>
-                <a:latin typeface="+mn-lt"/>
-                <a:ea typeface="+mn-ea"/>
-                <a:cs typeface="+mn-cs"/>
-              </a:defRPr>
-            </a:lvl1pPr>
-            <a:lvl2pPr marL="640080" indent="-228600" algn="l" defTabSz="914400" rtl="0" eaLnBrk="1" latinLnBrk="0" hangingPunct="1">
-              <a:spcBef>
-                <a:spcPct val="20000"/>
-              </a:spcBef>
-              <a:buClr>
-                <a:schemeClr val="accent2"/>
-              </a:buClr>
-              <a:buFont typeface="Arial" pitchFamily="34" charset="0"/>
-              <a:buChar char="•"/>
-              <a:defRPr sz="2000" kern="1200">
-                <a:solidFill>
-                  <a:schemeClr val="tx1"/>
-                </a:solidFill>
-                <a:latin typeface="+mn-lt"/>
-                <a:ea typeface="+mn-ea"/>
-                <a:cs typeface="+mn-cs"/>
-              </a:defRPr>
-            </a:lvl2pPr>
-            <a:lvl3pPr marL="1005840" indent="-228600" algn="l" defTabSz="914400" rtl="0" eaLnBrk="1" latinLnBrk="0" hangingPunct="1">
-              <a:spcBef>
-                <a:spcPct val="20000"/>
-              </a:spcBef>
-              <a:buClr>
-                <a:schemeClr val="accent3"/>
-              </a:buClr>
-              <a:buFont typeface="Arial" pitchFamily="34" charset="0"/>
-              <a:buChar char="•"/>
-              <a:defRPr sz="1800" kern="1200">
-                <a:solidFill>
-                  <a:schemeClr val="tx1"/>
-                </a:solidFill>
-                <a:latin typeface="+mn-lt"/>
-                <a:ea typeface="+mn-ea"/>
-                <a:cs typeface="+mn-cs"/>
-              </a:defRPr>
-            </a:lvl3pPr>
-            <a:lvl4pPr marL="1280160" indent="-228600" algn="l" defTabSz="914400" rtl="0" eaLnBrk="1" latinLnBrk="0" hangingPunct="1">
-              <a:spcBef>
-                <a:spcPct val="20000"/>
-              </a:spcBef>
-              <a:buClr>
-                <a:schemeClr val="accent4"/>
-              </a:buClr>
-              <a:buFont typeface="Arial" pitchFamily="34" charset="0"/>
-              <a:buChar char="•"/>
-              <a:defRPr sz="1600" kern="1200">
-                <a:solidFill>
-                  <a:schemeClr val="tx1"/>
-                </a:solidFill>
-                <a:latin typeface="+mn-lt"/>
-                <a:ea typeface="+mn-ea"/>
-                <a:cs typeface="+mn-cs"/>
-              </a:defRPr>
-            </a:lvl4pPr>
-            <a:lvl5pPr marL="1554480" indent="-228600" algn="l" defTabSz="914400" rtl="0" eaLnBrk="1" latinLnBrk="0" hangingPunct="1">
-              <a:spcBef>
-                <a:spcPct val="20000"/>
-              </a:spcBef>
-              <a:buClr>
-                <a:schemeClr val="accent5"/>
-              </a:buClr>
-              <a:buFont typeface="Arial" pitchFamily="34" charset="0"/>
-              <a:buChar char="•"/>
-              <a:defRPr sz="1400" kern="1200" baseline="0">
-                <a:solidFill>
-                  <a:schemeClr val="tx1"/>
-                </a:solidFill>
-                <a:latin typeface="+mn-lt"/>
-                <a:ea typeface="+mn-ea"/>
-                <a:cs typeface="+mn-cs"/>
-              </a:defRPr>
-            </a:lvl5pPr>
-            <a:lvl6pPr marL="1737360" indent="-182880" algn="l" defTabSz="914400" rtl="0" eaLnBrk="1" latinLnBrk="0" hangingPunct="1">
-              <a:spcBef>
-                <a:spcPct val="20000"/>
-              </a:spcBef>
-              <a:buClr>
-                <a:schemeClr val="accent1"/>
-              </a:buClr>
-              <a:buFont typeface="Arial" pitchFamily="34" charset="0"/>
-              <a:buChar char="•"/>
-              <a:defRPr sz="1400" kern="1200" baseline="0">
-                <a:solidFill>
-                  <a:schemeClr val="tx1"/>
-                </a:solidFill>
-                <a:latin typeface="+mn-lt"/>
-                <a:ea typeface="+mn-ea"/>
-                <a:cs typeface="+mn-cs"/>
-              </a:defRPr>
-            </a:lvl6pPr>
-            <a:lvl7pPr marL="1920240" indent="-182880" algn="l" defTabSz="914400" rtl="0" eaLnBrk="1" latinLnBrk="0" hangingPunct="1">
-              <a:spcBef>
-                <a:spcPct val="20000"/>
-              </a:spcBef>
-              <a:buClr>
-                <a:schemeClr val="accent2"/>
-              </a:buClr>
-              <a:buFont typeface="Arial" pitchFamily="34" charset="0"/>
-              <a:buChar char="•"/>
-              <a:defRPr sz="1400" kern="1200">
-                <a:solidFill>
-                  <a:schemeClr val="tx1"/>
-                </a:solidFill>
-                <a:latin typeface="+mn-lt"/>
-                <a:ea typeface="+mn-ea"/>
-                <a:cs typeface="+mn-cs"/>
-              </a:defRPr>
-            </a:lvl7pPr>
-            <a:lvl8pPr marL="2103120" indent="-182880" algn="l" defTabSz="914400" rtl="0" eaLnBrk="1" latinLnBrk="0" hangingPunct="1">
-              <a:spcBef>
-                <a:spcPct val="20000"/>
-              </a:spcBef>
-              <a:buClr>
-                <a:schemeClr val="accent3"/>
-              </a:buClr>
-              <a:buFont typeface="Arial" pitchFamily="34" charset="0"/>
-              <a:buChar char="•"/>
-              <a:defRPr sz="1400" kern="1200">
-                <a:solidFill>
-                  <a:schemeClr val="tx1"/>
-                </a:solidFill>
-                <a:latin typeface="+mn-lt"/>
-                <a:ea typeface="+mn-ea"/>
-                <a:cs typeface="+mn-cs"/>
-              </a:defRPr>
-            </a:lvl8pPr>
-            <a:lvl9pPr marL="2286000" indent="-182880" algn="l" defTabSz="914400" rtl="0" eaLnBrk="1" latinLnBrk="0" hangingPunct="1">
-              <a:spcBef>
-                <a:spcPct val="20000"/>
-              </a:spcBef>
-              <a:buClr>
-                <a:schemeClr val="accent4"/>
-              </a:buClr>
-              <a:buFont typeface="Arial" pitchFamily="34" charset="0"/>
-              <a:buChar char="•"/>
-              <a:defRPr sz="1400" kern="1200">
-                <a:solidFill>
-                  <a:schemeClr val="tx1"/>
-                </a:solidFill>
-                <a:latin typeface="+mn-lt"/>
-                <a:ea typeface="+mn-ea"/>
-                <a:cs typeface="+mn-cs"/>
-              </a:defRPr>
-            </a:lvl9pPr>
-          </a:lstStyle>
-          <a:p>
-            <a:r>
-              <a:rPr lang="en-US" dirty="0" smtClean="0"/>
-              <a:t>Can dramatically simplify code (</a:t>
-            </a:r>
-            <a:r>
-              <a:rPr lang="en-US" b="1" dirty="0" smtClean="0">
-                <a:solidFill>
-                  <a:srgbClr val="FF5050"/>
-                </a:solidFill>
-              </a:rPr>
-              <a:t>example</a:t>
-            </a:r>
-            <a:r>
-              <a:rPr lang="en-US" dirty="0" smtClean="0"/>
-              <a:t>)</a:t>
-            </a:r>
-          </a:p>
-          <a:p>
-            <a:r>
-              <a:rPr lang="en-US" b="1" dirty="0" err="1" smtClean="0">
-                <a:solidFill>
-                  <a:srgbClr val="FF5050"/>
-                </a:solidFill>
-              </a:rPr>
-              <a:t>Functors</a:t>
-            </a:r>
-            <a:r>
-              <a:rPr lang="en-US" b="1" dirty="0" smtClean="0">
-                <a:solidFill>
-                  <a:srgbClr val="FF5050"/>
-                </a:solidFill>
-              </a:rPr>
-              <a:t>?</a:t>
-            </a:r>
-            <a:endParaRPr lang="en-US" b="1" dirty="0">
-              <a:solidFill>
-                <a:srgbClr val="FF5050"/>
-              </a:solidFill>
-            </a:endParaRPr>
-          </a:p>
-        </p:txBody>
-      </p:sp>
-    </p:spTree>
-    <p:extLst>
-      <p:ext uri="{BB962C8B-B14F-4D97-AF65-F5344CB8AC3E}">
-        <p14:creationId xmlns:p14="http://schemas.microsoft.com/office/powerpoint/2010/main" val="3920199432"/>
-      </p:ext>
-    </p:extLst>
-  </p:cSld>
-  <p:clrMapOvr>
-    <a:masterClrMapping/>
-  </p:clrMapOvr>
-</p:sld>
-</file>
-
-<file path=ppt/slides/slide31.xml><?xml version="1.0" encoding="utf-8"?>
-<p:sld xmlns:a="http://schemas.openxmlformats.org/drawingml/2006/main" xmlns:r="http://schemas.openxmlformats.org/officeDocument/2006/relationships" xmlns:p="http://schemas.openxmlformats.org/presentationml/2006/main">
-  <p:cSld>
-    <p:spTree>
-      <p:nvGrpSpPr>
-        <p:cNvPr id="1" name=""/>
-        <p:cNvGrpSpPr/>
-        <p:nvPr/>
-      </p:nvGrpSpPr>
-      <p:grpSpPr>
-        <a:xfrm>
-          <a:off x="0" y="0"/>
-          <a:ext cx="0" cy="0"/>
-          <a:chOff x="0" y="0"/>
-          <a:chExt cx="0" cy="0"/>
-        </a:xfrm>
-      </p:grpSpPr>
-      <p:sp>
-        <p:nvSpPr>
-          <p:cNvPr id="2" name="Title 1"/>
-          <p:cNvSpPr>
-            <a:spLocks noGrp="1"/>
-          </p:cNvSpPr>
-          <p:nvPr>
-            <p:ph type="title"/>
-          </p:nvPr>
-        </p:nvSpPr>
-        <p:spPr/>
-        <p:txBody>
-          <a:bodyPr/>
-          <a:lstStyle/>
-          <a:p>
-            <a:r>
-              <a:rPr lang="en-US" dirty="0" smtClean="0"/>
               <a:t>Pattern Matching</a:t>
             </a:r>
             <a:endParaRPr lang="en-US" dirty="0"/>
@@ -14616,7 +14702,7 @@
 </p:sld>
 </file>
 
-<file path=ppt/slides/slide32.xml><?xml version="1.0" encoding="utf-8"?>
+<file path=ppt/slides/slide31.xml><?xml version="1.0" encoding="utf-8"?>
 <p:sld xmlns:a="http://schemas.openxmlformats.org/drawingml/2006/main" xmlns:r="http://schemas.openxmlformats.org/officeDocument/2006/relationships" xmlns:p="http://schemas.openxmlformats.org/presentationml/2006/main">
   <p:cSld>
     <p:spTree>
@@ -15301,7 +15387,7 @@
 </p:sld>
 </file>
 
-<file path=ppt/slides/slide33.xml><?xml version="1.0" encoding="utf-8"?>
+<file path=ppt/slides/slide32.xml><?xml version="1.0" encoding="utf-8"?>
 <p:sld xmlns:a="http://schemas.openxmlformats.org/drawingml/2006/main" xmlns:r="http://schemas.openxmlformats.org/officeDocument/2006/relationships" xmlns:p="http://schemas.openxmlformats.org/presentationml/2006/main">
   <p:cSld>
     <p:spTree>
@@ -15422,7 +15508,7 @@
 </p:sld>
 </file>
 
-<file path=ppt/slides/slide34.xml><?xml version="1.0" encoding="utf-8"?>
+<file path=ppt/slides/slide33.xml><?xml version="1.0" encoding="utf-8"?>
 <p:sld xmlns:a="http://schemas.openxmlformats.org/drawingml/2006/main" xmlns:r="http://schemas.openxmlformats.org/officeDocument/2006/relationships" xmlns:p="http://schemas.openxmlformats.org/presentationml/2006/main">
   <p:cSld>
     <p:spTree>
@@ -16275,6 +16361,78 @@
 </p:sld>
 </file>
 
+<file path=ppt/slides/slide34.xml><?xml version="1.0" encoding="utf-8"?>
+<p:sld xmlns:a="http://schemas.openxmlformats.org/drawingml/2006/main" xmlns:r="http://schemas.openxmlformats.org/officeDocument/2006/relationships" xmlns:p="http://schemas.openxmlformats.org/presentationml/2006/main">
+  <p:cSld>
+    <p:spTree>
+      <p:nvGrpSpPr>
+        <p:cNvPr id="1" name=""/>
+        <p:cNvGrpSpPr/>
+        <p:nvPr/>
+      </p:nvGrpSpPr>
+      <p:grpSpPr>
+        <a:xfrm>
+          <a:off x="0" y="0"/>
+          <a:ext cx="0" cy="0"/>
+          <a:chOff x="0" y="0"/>
+          <a:chExt cx="0" cy="0"/>
+        </a:xfrm>
+      </p:grpSpPr>
+      <p:sp>
+        <p:nvSpPr>
+          <p:cNvPr id="2" name="Title 1"/>
+          <p:cNvSpPr>
+            <a:spLocks noGrp="1"/>
+          </p:cNvSpPr>
+          <p:nvPr>
+            <p:ph type="title"/>
+          </p:nvPr>
+        </p:nvSpPr>
+        <p:spPr/>
+        <p:txBody>
+          <a:bodyPr/>
+          <a:lstStyle/>
+          <a:p>
+            <a:r>
+              <a:rPr lang="en-US" dirty="0" smtClean="0"/>
+              <a:t>Lazy Evaluation</a:t>
+            </a:r>
+            <a:endParaRPr lang="en-US" dirty="0"/>
+          </a:p>
+        </p:txBody>
+      </p:sp>
+      <p:sp>
+        <p:nvSpPr>
+          <p:cNvPr id="3" name="Content Placeholder 2"/>
+          <p:cNvSpPr>
+            <a:spLocks noGrp="1"/>
+          </p:cNvSpPr>
+          <p:nvPr>
+            <p:ph idx="1"/>
+          </p:nvPr>
+        </p:nvSpPr>
+        <p:spPr/>
+        <p:txBody>
+          <a:bodyPr/>
+          <a:lstStyle/>
+          <a:p>
+            <a:endParaRPr lang="en-US"/>
+          </a:p>
+        </p:txBody>
+      </p:sp>
+    </p:spTree>
+    <p:extLst>
+      <p:ext uri="{BB962C8B-B14F-4D97-AF65-F5344CB8AC3E}">
+        <p14:creationId xmlns:p14="http://schemas.microsoft.com/office/powerpoint/2010/main" val="1094933596"/>
+      </p:ext>
+    </p:extLst>
+  </p:cSld>
+  <p:clrMapOvr>
+    <a:masterClrMapping/>
+  </p:clrMapOvr>
+</p:sld>
+</file>
+
 <file path=ppt/slides/slide35.xml><?xml version="1.0" encoding="utf-8"?>
 <p:sld xmlns:a="http://schemas.openxmlformats.org/drawingml/2006/main" xmlns:r="http://schemas.openxmlformats.org/officeDocument/2006/relationships" xmlns:p="http://schemas.openxmlformats.org/presentationml/2006/main">
   <p:cSld>
@@ -16309,7 +16467,7 @@
           <a:p>
             <a:r>
               <a:rPr lang="en-US" dirty="0" smtClean="0"/>
-              <a:t>Lazy Evaluation</a:t>
+              <a:t>Composition</a:t>
             </a:r>
             <a:endParaRPr lang="en-US" dirty="0"/>
           </a:p>
@@ -16337,7 +16495,7 @@
     </p:spTree>
     <p:extLst>
       <p:ext uri="{BB962C8B-B14F-4D97-AF65-F5344CB8AC3E}">
-        <p14:creationId xmlns:p14="http://schemas.microsoft.com/office/powerpoint/2010/main" val="1094933596"/>
+        <p14:creationId xmlns:p14="http://schemas.microsoft.com/office/powerpoint/2010/main" val="4258554683"/>
       </p:ext>
     </p:extLst>
   </p:cSld>
@@ -16381,7 +16539,7 @@
           <a:p>
             <a:r>
               <a:rPr lang="en-US" dirty="0" smtClean="0"/>
-              <a:t>Composition</a:t>
+              <a:t>Good Candidates for FP</a:t>
             </a:r>
             <a:endParaRPr lang="en-US" dirty="0"/>
           </a:p>
@@ -16409,7 +16567,7 @@
     </p:spTree>
     <p:extLst>
       <p:ext uri="{BB962C8B-B14F-4D97-AF65-F5344CB8AC3E}">
-        <p14:creationId xmlns:p14="http://schemas.microsoft.com/office/powerpoint/2010/main" val="4258554683"/>
+        <p14:creationId xmlns:p14="http://schemas.microsoft.com/office/powerpoint/2010/main" val="3322209738"/>
       </p:ext>
     </p:extLst>
   </p:cSld>
@@ -16453,7 +16611,7 @@
           <a:p>
             <a:r>
               <a:rPr lang="en-US" dirty="0" smtClean="0"/>
-              <a:t>Good Candidates for FP</a:t>
+              <a:t>Thinking in Functions</a:t>
             </a:r>
             <a:endParaRPr lang="en-US" dirty="0"/>
           </a:p>
@@ -16481,7 +16639,7 @@
     </p:spTree>
     <p:extLst>
       <p:ext uri="{BB962C8B-B14F-4D97-AF65-F5344CB8AC3E}">
-        <p14:creationId xmlns:p14="http://schemas.microsoft.com/office/powerpoint/2010/main" val="3322209738"/>
+        <p14:creationId xmlns:p14="http://schemas.microsoft.com/office/powerpoint/2010/main" val="3933695059"/>
       </p:ext>
     </p:extLst>
   </p:cSld>
@@ -16525,7 +16683,7 @@
           <a:p>
             <a:r>
               <a:rPr lang="en-US" dirty="0" smtClean="0"/>
-              <a:t>Thinking in Functions</a:t>
+              <a:t>Complexity</a:t>
             </a:r>
             <a:endParaRPr lang="en-US" dirty="0"/>
           </a:p>
@@ -16546,14 +16704,42 @@
           <a:bodyPr/>
           <a:lstStyle/>
           <a:p>
-            <a:endParaRPr lang="en-US"/>
+            <a:r>
+              <a:rPr lang="en-US" dirty="0" smtClean="0"/>
+              <a:t>Example: Shared state as complexity</a:t>
+            </a:r>
+          </a:p>
+          <a:p>
+            <a:r>
+              <a:rPr lang="en-US" dirty="0" smtClean="0"/>
+              <a:t>Example: Mutable state as complexity</a:t>
+            </a:r>
+          </a:p>
+          <a:p>
+            <a:r>
+              <a:rPr lang="en-US" dirty="0" smtClean="0"/>
+              <a:t>Example: Non-determinism as complexity</a:t>
+            </a:r>
+          </a:p>
+          <a:p>
+            <a:r>
+              <a:rPr lang="en-US" dirty="0" smtClean="0"/>
+              <a:t>Example: Side-effects as complexity</a:t>
+            </a:r>
+          </a:p>
+          <a:p>
+            <a:r>
+              <a:rPr lang="en-US" dirty="0" smtClean="0"/>
+              <a:t>Example: Sequencing as complexity</a:t>
+            </a:r>
+            <a:endParaRPr lang="en-US" dirty="0"/>
           </a:p>
         </p:txBody>
       </p:sp>
     </p:spTree>
     <p:extLst>
       <p:ext uri="{BB962C8B-B14F-4D97-AF65-F5344CB8AC3E}">
-        <p14:creationId xmlns:p14="http://schemas.microsoft.com/office/powerpoint/2010/main" val="3933695059"/>
+        <p14:creationId xmlns:p14="http://schemas.microsoft.com/office/powerpoint/2010/main" val="3233297951"/>
       </p:ext>
     </p:extLst>
   </p:cSld>
@@ -16596,10 +16782,10 @@
           <a:lstStyle/>
           <a:p>
             <a:r>
-              <a:rPr lang="en-US" dirty="0" smtClean="0"/>
-              <a:t>Complexity</a:t>
-            </a:r>
-            <a:endParaRPr lang="en-US" dirty="0"/>
+              <a:rPr lang="en-US" sz="4000" dirty="0" smtClean="0"/>
+              <a:t>Functional Languages on the JVM</a:t>
+            </a:r>
+            <a:endParaRPr lang="en-US" sz="4000" dirty="0"/>
           </a:p>
         </p:txBody>
       </p:sp>
@@ -16618,34 +16804,6 @@
           <a:bodyPr/>
           <a:lstStyle/>
           <a:p>
-            <a:r>
-              <a:rPr lang="en-US" dirty="0" smtClean="0"/>
-              <a:t>Example: Shared state as complexity</a:t>
-            </a:r>
-          </a:p>
-          <a:p>
-            <a:r>
-              <a:rPr lang="en-US" dirty="0" smtClean="0"/>
-              <a:t>Example: Mutable state as complexity</a:t>
-            </a:r>
-          </a:p>
-          <a:p>
-            <a:r>
-              <a:rPr lang="en-US" dirty="0" smtClean="0"/>
-              <a:t>Example: Non-determinism as complexity</a:t>
-            </a:r>
-          </a:p>
-          <a:p>
-            <a:r>
-              <a:rPr lang="en-US" dirty="0" smtClean="0"/>
-              <a:t>Example: Side-effects as complexity</a:t>
-            </a:r>
-          </a:p>
-          <a:p>
-            <a:r>
-              <a:rPr lang="en-US" dirty="0" smtClean="0"/>
-              <a:t>Example: Sequencing as complexity</a:t>
-            </a:r>
             <a:endParaRPr lang="en-US" dirty="0"/>
           </a:p>
         </p:txBody>
@@ -16653,7 +16811,7 @@
     </p:spTree>
     <p:extLst>
       <p:ext uri="{BB962C8B-B14F-4D97-AF65-F5344CB8AC3E}">
-        <p14:creationId xmlns:p14="http://schemas.microsoft.com/office/powerpoint/2010/main" val="3233297951"/>
+        <p14:creationId xmlns:p14="http://schemas.microsoft.com/office/powerpoint/2010/main" val="1949244033"/>
       </p:ext>
     </p:extLst>
   </p:cSld>
@@ -16950,10 +17108,17 @@
           <a:lstStyle/>
           <a:p>
             <a:r>
-              <a:rPr lang="en-US" sz="4000" dirty="0" smtClean="0"/>
-              <a:t>Functional Languages on the JVM</a:t>
-            </a:r>
-            <a:endParaRPr lang="en-US" sz="4000" dirty="0"/>
+              <a:rPr lang="en-US" dirty="0" smtClean="0"/>
+              <a:t>Functional Programming in</a:t>
+            </a:r>
+            <a:br>
+              <a:rPr lang="en-US" dirty="0" smtClean="0"/>
+            </a:br>
+            <a:r>
+              <a:rPr lang="en-US" dirty="0" smtClean="0"/>
+              <a:t>Java 8</a:t>
+            </a:r>
+            <a:endParaRPr lang="en-US" dirty="0"/>
           </a:p>
         </p:txBody>
       </p:sp>
@@ -16967,11 +17132,95 @@
             <p:ph idx="1"/>
           </p:nvPr>
         </p:nvSpPr>
-        <p:spPr/>
+        <p:spPr>
+          <a:xfrm>
+            <a:off x="457200" y="1828800"/>
+            <a:ext cx="7620000" cy="4572000"/>
+          </a:xfrm>
+        </p:spPr>
         <p:txBody>
           <a:bodyPr/>
           <a:lstStyle/>
           <a:p>
+            <a:r>
+              <a:rPr lang="en-US" dirty="0" smtClean="0"/>
+              <a:t>Lambda expressions supported through </a:t>
+            </a:r>
+            <a:r>
+              <a:rPr lang="en-US" i="1" dirty="0" smtClean="0"/>
+              <a:t>functional interfaces</a:t>
+            </a:r>
+          </a:p>
+          <a:p>
+            <a:pPr lvl="1"/>
+            <a:r>
+              <a:rPr lang="en-US" dirty="0" smtClean="0"/>
+              <a:t>An interface with one abstract method, e.g. </a:t>
+            </a:r>
+            <a:r>
+              <a:rPr lang="en-US" i="1" dirty="0" smtClean="0"/>
+              <a:t>Runnable</a:t>
+            </a:r>
+            <a:r>
+              <a:rPr lang="en-US" dirty="0" smtClean="0"/>
+              <a:t> or </a:t>
+            </a:r>
+            <a:r>
+              <a:rPr lang="en-US" i="1" dirty="0" smtClean="0"/>
+              <a:t>Comparator</a:t>
+            </a:r>
+          </a:p>
+          <a:p>
+            <a:r>
+              <a:rPr lang="en-US" dirty="0" smtClean="0"/>
+              <a:t>lambdas are instances of an Object subtypes</a:t>
+            </a:r>
+          </a:p>
+          <a:p>
+            <a:pPr lvl="1"/>
+            <a:r>
+              <a:rPr lang="en-US" dirty="0" smtClean="0"/>
+              <a:t>Not necessarily well-behaved objects</a:t>
+            </a:r>
+          </a:p>
+          <a:p>
+            <a:r>
+              <a:rPr lang="en-US" dirty="0" smtClean="0"/>
+              <a:t>Are type compatible with functional interfaces if the signatures match</a:t>
+            </a:r>
+            <a:endParaRPr lang="en-US" dirty="0" smtClean="0"/>
+          </a:p>
+          <a:p>
+            <a:r>
+              <a:rPr lang="en-US" i="1" dirty="0" smtClean="0"/>
+              <a:t>Method references</a:t>
+            </a:r>
+            <a:r>
+              <a:rPr lang="en-US" dirty="0" smtClean="0"/>
+              <a:t> capture existing methods as lambdas</a:t>
+            </a:r>
+          </a:p>
+          <a:p>
+            <a:r>
+              <a:rPr lang="en-US" dirty="0" smtClean="0"/>
+              <a:t>Not </a:t>
+            </a:r>
+            <a:r>
+              <a:rPr lang="en-US" i="1" dirty="0" smtClean="0"/>
+              <a:t>pure</a:t>
+            </a:r>
+            <a:r>
+              <a:rPr lang="en-US" dirty="0" smtClean="0"/>
+              <a:t> functions – can be done with </a:t>
+            </a:r>
+            <a:r>
+              <a:rPr lang="en-US" i="1" dirty="0" smtClean="0"/>
+              <a:t>void </a:t>
+            </a:r>
+            <a:r>
+              <a:rPr lang="en-US" dirty="0" smtClean="0"/>
+              <a:t>methods, and with side effects</a:t>
+            </a:r>
             <a:endParaRPr lang="en-US" dirty="0"/>
           </a:p>
         </p:txBody>
@@ -16979,7 +17228,7 @@
     </p:spTree>
     <p:extLst>
       <p:ext uri="{BB962C8B-B14F-4D97-AF65-F5344CB8AC3E}">
-        <p14:creationId xmlns:p14="http://schemas.microsoft.com/office/powerpoint/2010/main" val="1949244033"/>
+        <p14:creationId xmlns:p14="http://schemas.microsoft.com/office/powerpoint/2010/main" val="3713724773"/>
       </p:ext>
     </p:extLst>
   </p:cSld>
@@ -17022,78 +17271,6 @@
           <a:lstStyle/>
           <a:p>
             <a:r>
-              <a:rPr lang="en-US" dirty="0" smtClean="0"/>
-              <a:t>What’s in Java 8</a:t>
-            </a:r>
-            <a:endParaRPr lang="en-US" dirty="0"/>
-          </a:p>
-        </p:txBody>
-      </p:sp>
-      <p:sp>
-        <p:nvSpPr>
-          <p:cNvPr id="3" name="Content Placeholder 2"/>
-          <p:cNvSpPr>
-            <a:spLocks noGrp="1"/>
-          </p:cNvSpPr>
-          <p:nvPr>
-            <p:ph idx="1"/>
-          </p:nvPr>
-        </p:nvSpPr>
-        <p:spPr/>
-        <p:txBody>
-          <a:bodyPr/>
-          <a:lstStyle/>
-          <a:p>
-            <a:endParaRPr lang="en-US"/>
-          </a:p>
-        </p:txBody>
-      </p:sp>
-    </p:spTree>
-    <p:extLst>
-      <p:ext uri="{BB962C8B-B14F-4D97-AF65-F5344CB8AC3E}">
-        <p14:creationId xmlns:p14="http://schemas.microsoft.com/office/powerpoint/2010/main" val="3713724773"/>
-      </p:ext>
-    </p:extLst>
-  </p:cSld>
-  <p:clrMapOvr>
-    <a:masterClrMapping/>
-  </p:clrMapOvr>
-</p:sld>
-</file>
-
-<file path=ppt/slides/slide42.xml><?xml version="1.0" encoding="utf-8"?>
-<p:sld xmlns:a="http://schemas.openxmlformats.org/drawingml/2006/main" xmlns:r="http://schemas.openxmlformats.org/officeDocument/2006/relationships" xmlns:p="http://schemas.openxmlformats.org/presentationml/2006/main">
-  <p:cSld>
-    <p:spTree>
-      <p:nvGrpSpPr>
-        <p:cNvPr id="1" name=""/>
-        <p:cNvGrpSpPr/>
-        <p:nvPr/>
-      </p:nvGrpSpPr>
-      <p:grpSpPr>
-        <a:xfrm>
-          <a:off x="0" y="0"/>
-          <a:ext cx="0" cy="0"/>
-          <a:chOff x="0" y="0"/>
-          <a:chExt cx="0" cy="0"/>
-        </a:xfrm>
-      </p:grpSpPr>
-      <p:sp>
-        <p:nvSpPr>
-          <p:cNvPr id="2" name="Title 1"/>
-          <p:cNvSpPr>
-            <a:spLocks noGrp="1"/>
-          </p:cNvSpPr>
-          <p:nvPr>
-            <p:ph type="title"/>
-          </p:nvPr>
-        </p:nvSpPr>
-        <p:spPr/>
-        <p:txBody>
-          <a:bodyPr/>
-          <a:lstStyle/>
-          <a:p>
-            <a:r>
               <a:rPr lang="en-US" sz="4000" dirty="0" smtClean="0"/>
               <a:t>Applying Functional Concepts in Non-Functional Languages</a:t>
             </a:r>
@@ -17191,7 +17368,7 @@
 </p:sld>
 </file>
 
-<file path=ppt/slides/slide43.xml><?xml version="1.0" encoding="utf-8"?>
+<file path=ppt/slides/slide42.xml><?xml version="1.0" encoding="utf-8"?>
 <p:sld xmlns:a="http://schemas.openxmlformats.org/drawingml/2006/main" xmlns:r="http://schemas.openxmlformats.org/officeDocument/2006/relationships" xmlns:p="http://schemas.openxmlformats.org/presentationml/2006/main">
   <p:cSld>
     <p:spTree>
@@ -17465,7 +17642,7 @@
 </p:sld>
 </file>
 
-<file path=ppt/slides/slide44.xml><?xml version="1.0" encoding="utf-8"?>
+<file path=ppt/slides/slide43.xml><?xml version="1.0" encoding="utf-8"?>
 <p:sld xmlns:a="http://schemas.openxmlformats.org/drawingml/2006/main" xmlns:r="http://schemas.openxmlformats.org/officeDocument/2006/relationships" xmlns:p="http://schemas.openxmlformats.org/presentationml/2006/main">
   <p:cSld>
     <p:spTree>
@@ -18376,6 +18553,145 @@
 </p:sld>
 </file>
 
+<file path=ppt/slides/slide44.xml><?xml version="1.0" encoding="utf-8"?>
+<p:sld xmlns:a="http://schemas.openxmlformats.org/drawingml/2006/main" xmlns:r="http://schemas.openxmlformats.org/officeDocument/2006/relationships" xmlns:p="http://schemas.openxmlformats.org/presentationml/2006/main">
+  <p:cSld>
+    <p:spTree>
+      <p:nvGrpSpPr>
+        <p:cNvPr id="1" name=""/>
+        <p:cNvGrpSpPr/>
+        <p:nvPr/>
+      </p:nvGrpSpPr>
+      <p:grpSpPr>
+        <a:xfrm>
+          <a:off x="0" y="0"/>
+          <a:ext cx="0" cy="0"/>
+          <a:chOff x="0" y="0"/>
+          <a:chExt cx="0" cy="0"/>
+        </a:xfrm>
+      </p:grpSpPr>
+      <p:sp>
+        <p:nvSpPr>
+          <p:cNvPr id="2" name="Title 1"/>
+          <p:cNvSpPr>
+            <a:spLocks noGrp="1"/>
+          </p:cNvSpPr>
+          <p:nvPr>
+            <p:ph type="title"/>
+          </p:nvPr>
+        </p:nvSpPr>
+        <p:spPr/>
+        <p:txBody>
+          <a:bodyPr/>
+          <a:lstStyle/>
+          <a:p>
+            <a:r>
+              <a:rPr lang="en-US" dirty="0" smtClean="0"/>
+              <a:t>Haskell, cont.</a:t>
+            </a:r>
+            <a:endParaRPr lang="en-US" dirty="0"/>
+          </a:p>
+        </p:txBody>
+      </p:sp>
+      <p:sp>
+        <p:nvSpPr>
+          <p:cNvPr id="3" name="Content Placeholder 2"/>
+          <p:cNvSpPr>
+            <a:spLocks noGrp="1"/>
+          </p:cNvSpPr>
+          <p:nvPr>
+            <p:ph idx="1"/>
+          </p:nvPr>
+        </p:nvSpPr>
+        <p:spPr/>
+        <p:txBody>
+          <a:bodyPr/>
+          <a:lstStyle/>
+          <a:p>
+            <a:r>
+              <a:rPr lang="en-US" dirty="0" smtClean="0"/>
+              <a:t>Great, free online IDE:   </a:t>
+            </a:r>
+            <a:r>
+              <a:rPr lang="en-US" dirty="0" smtClean="0">
+                <a:solidFill>
+                  <a:srgbClr val="0070C0"/>
+                </a:solidFill>
+              </a:rPr>
+              <a:t>fpcomplete.com</a:t>
+            </a:r>
+          </a:p>
+          <a:p>
+            <a:pPr lvl="1"/>
+            <a:r>
+              <a:rPr lang="en-US" dirty="0" smtClean="0">
+                <a:solidFill>
+                  <a:schemeClr val="tx2">
+                    <a:lumMod val="50000"/>
+                  </a:schemeClr>
+                </a:solidFill>
+              </a:rPr>
+              <a:t>Includes ‘School of Haskell’ tutorials</a:t>
+            </a:r>
+          </a:p>
+          <a:p>
+            <a:r>
+              <a:rPr lang="en-US" dirty="0" smtClean="0"/>
+              <a:t>Incredible free online book:   </a:t>
+            </a:r>
+            <a:r>
+              <a:rPr lang="en-US" dirty="0" smtClean="0">
+                <a:solidFill>
+                  <a:srgbClr val="0070C0"/>
+                </a:solidFill>
+              </a:rPr>
+              <a:t>learnyouahaskell.com</a:t>
+            </a:r>
+          </a:p>
+          <a:p>
+            <a:pPr lvl="1"/>
+            <a:r>
+              <a:rPr lang="en-US" dirty="0" smtClean="0"/>
+              <a:t>Strong introduction to FP concepts, including advanced ones</a:t>
+            </a:r>
+          </a:p>
+          <a:p>
+            <a:pPr lvl="1"/>
+            <a:r>
+              <a:rPr lang="en-US" dirty="0" smtClean="0"/>
+              <a:t>Even if learning </a:t>
+            </a:r>
+            <a:r>
+              <a:rPr lang="en-US" dirty="0" err="1" smtClean="0"/>
+              <a:t>Scala</a:t>
+            </a:r>
+            <a:r>
+              <a:rPr lang="en-US" dirty="0" smtClean="0"/>
+              <a:t>/Groovy/other, this is a great resource </a:t>
+            </a:r>
+          </a:p>
+          <a:p>
+            <a:endParaRPr lang="en-US" dirty="0">
+              <a:solidFill>
+                <a:srgbClr val="0070C0"/>
+              </a:solidFill>
+            </a:endParaRPr>
+          </a:p>
+        </p:txBody>
+      </p:sp>
+    </p:spTree>
+    <p:extLst>
+      <p:ext uri="{BB962C8B-B14F-4D97-AF65-F5344CB8AC3E}">
+        <p14:creationId xmlns:p14="http://schemas.microsoft.com/office/powerpoint/2010/main" val="2322966637"/>
+      </p:ext>
+    </p:extLst>
+  </p:cSld>
+  <p:clrMapOvr>
+    <a:masterClrMapping/>
+  </p:clrMapOvr>
+</p:sld>
+</file>
+
 <file path=ppt/slides/slide45.xml><?xml version="1.0" encoding="utf-8"?>
 <p:sld xmlns:a="http://schemas.openxmlformats.org/drawingml/2006/main" xmlns:r="http://schemas.openxmlformats.org/officeDocument/2006/relationships" xmlns:p="http://schemas.openxmlformats.org/presentationml/2006/main">
   <p:cSld>
@@ -18410,7 +18726,7 @@
           <a:p>
             <a:r>
               <a:rPr lang="en-US" dirty="0" smtClean="0"/>
-              <a:t>Haskell, cont.</a:t>
+              <a:t>Related, Interesting Topics</a:t>
             </a:r>
             <a:endParaRPr lang="en-US" dirty="0"/>
           </a:p>
@@ -18431,81 +18747,49 @@
           <a:bodyPr/>
           <a:lstStyle/>
           <a:p>
-            <a:r>
-              <a:rPr lang="en-US" dirty="0" smtClean="0"/>
-              <a:t>Great, free online IDE:   </a:t>
-            </a:r>
-            <a:r>
-              <a:rPr lang="en-US" dirty="0" smtClean="0">
-                <a:solidFill>
-                  <a:srgbClr val="0070C0"/>
-                </a:solidFill>
-              </a:rPr>
-              <a:t>fpcomplete.com</a:t>
-            </a:r>
+            <a:endParaRPr lang="en-US" dirty="0" smtClean="0"/>
           </a:p>
           <a:p>
             <a:pPr lvl="1"/>
             <a:r>
-              <a:rPr lang="en-US" dirty="0" smtClean="0">
-                <a:solidFill>
-                  <a:schemeClr val="tx2">
-                    <a:lumMod val="50000"/>
-                  </a:schemeClr>
-                </a:solidFill>
-              </a:rPr>
-              <a:t>Includes ‘School of Haskell’ tutorials</a:t>
-            </a:r>
-          </a:p>
-          <a:p>
-            <a:r>
-              <a:rPr lang="en-US" dirty="0" smtClean="0"/>
-              <a:t>Incredible free online book:   </a:t>
-            </a:r>
-            <a:r>
-              <a:rPr lang="en-US" dirty="0" smtClean="0">
-                <a:solidFill>
-                  <a:srgbClr val="0070C0"/>
-                </a:solidFill>
-              </a:rPr>
-              <a:t>learnyouahaskell.com</a:t>
+              <a:rPr lang="en-US" dirty="0" smtClean="0"/>
+              <a:t>Non-Von Neumann computer architectures</a:t>
             </a:r>
           </a:p>
           <a:p>
             <a:pPr lvl="1"/>
             <a:r>
               <a:rPr lang="en-US" dirty="0" smtClean="0"/>
-              <a:t>Strong introduction to FP concepts, including advanced ones</a:t>
+              <a:t>Lambda calculus</a:t>
             </a:r>
           </a:p>
           <a:p>
             <a:pPr lvl="1"/>
             <a:r>
               <a:rPr lang="en-US" dirty="0" smtClean="0"/>
-              <a:t>Even if learning </a:t>
-            </a:r>
-            <a:r>
-              <a:rPr lang="en-US" dirty="0" err="1" smtClean="0"/>
-              <a:t>Scala</a:t>
-            </a:r>
-            <a:r>
-              <a:rPr lang="en-US" dirty="0" smtClean="0"/>
-              <a:t>/Groovy/other, this is a great resource </a:t>
-            </a:r>
-          </a:p>
-          <a:p>
-            <a:endParaRPr lang="en-US" dirty="0">
-              <a:solidFill>
-                <a:srgbClr val="0070C0"/>
-              </a:solidFill>
-            </a:endParaRPr>
+              <a:t>Applying functional thinking outside your program</a:t>
+            </a:r>
+          </a:p>
+          <a:p>
+            <a:pPr lvl="1"/>
+            <a:r>
+              <a:rPr lang="en-US" dirty="0" smtClean="0"/>
+              <a:t>Logic programming</a:t>
+            </a:r>
+          </a:p>
+          <a:p>
+            <a:pPr lvl="1"/>
+            <a:endParaRPr lang="en-US" dirty="0" smtClean="0"/>
+          </a:p>
+          <a:p>
+            <a:endParaRPr lang="en-US" dirty="0" smtClean="0"/>
           </a:p>
         </p:txBody>
       </p:sp>
     </p:spTree>
     <p:extLst>
       <p:ext uri="{BB962C8B-B14F-4D97-AF65-F5344CB8AC3E}">
-        <p14:creationId xmlns:p14="http://schemas.microsoft.com/office/powerpoint/2010/main" val="2322966637"/>
+        <p14:creationId xmlns:p14="http://schemas.microsoft.com/office/powerpoint/2010/main" val="4057990024"/>
       </p:ext>
     </p:extLst>
   </p:cSld>
@@ -18548,113 +18832,6 @@
           <a:lstStyle/>
           <a:p>
             <a:r>
-              <a:rPr lang="en-US" dirty="0" smtClean="0"/>
-              <a:t>Related, Interesting Topics</a:t>
-            </a:r>
-            <a:endParaRPr lang="en-US" dirty="0"/>
-          </a:p>
-        </p:txBody>
-      </p:sp>
-      <p:sp>
-        <p:nvSpPr>
-          <p:cNvPr id="3" name="Content Placeholder 2"/>
-          <p:cNvSpPr>
-            <a:spLocks noGrp="1"/>
-          </p:cNvSpPr>
-          <p:nvPr>
-            <p:ph idx="1"/>
-          </p:nvPr>
-        </p:nvSpPr>
-        <p:spPr/>
-        <p:txBody>
-          <a:bodyPr/>
-          <a:lstStyle/>
-          <a:p>
-            <a:endParaRPr lang="en-US" dirty="0" smtClean="0"/>
-          </a:p>
-          <a:p>
-            <a:pPr lvl="1"/>
-            <a:r>
-              <a:rPr lang="en-US" dirty="0" smtClean="0"/>
-              <a:t>Non-Von Neumann computer architectures</a:t>
-            </a:r>
-          </a:p>
-          <a:p>
-            <a:pPr lvl="1"/>
-            <a:r>
-              <a:rPr lang="en-US" dirty="0" smtClean="0"/>
-              <a:t>Lambda calculus</a:t>
-            </a:r>
-          </a:p>
-          <a:p>
-            <a:pPr lvl="1"/>
-            <a:r>
-              <a:rPr lang="en-US" dirty="0" smtClean="0"/>
-              <a:t>Applying functional thinking outside your program</a:t>
-            </a:r>
-          </a:p>
-          <a:p>
-            <a:pPr lvl="1"/>
-            <a:r>
-              <a:rPr lang="en-US" dirty="0" smtClean="0"/>
-              <a:t>Logic programming</a:t>
-            </a:r>
-          </a:p>
-          <a:p>
-            <a:pPr lvl="1"/>
-            <a:endParaRPr lang="en-US" dirty="0" smtClean="0"/>
-          </a:p>
-          <a:p>
-            <a:endParaRPr lang="en-US" dirty="0" smtClean="0"/>
-          </a:p>
-        </p:txBody>
-      </p:sp>
-    </p:spTree>
-    <p:extLst>
-      <p:ext uri="{BB962C8B-B14F-4D97-AF65-F5344CB8AC3E}">
-        <p14:creationId xmlns:p14="http://schemas.microsoft.com/office/powerpoint/2010/main" val="4057990024"/>
-      </p:ext>
-    </p:extLst>
-  </p:cSld>
-  <p:clrMapOvr>
-    <a:masterClrMapping/>
-  </p:clrMapOvr>
-</p:sld>
-</file>
-
-<file path=ppt/slides/slide47.xml><?xml version="1.0" encoding="utf-8"?>
-<p:sld xmlns:a="http://schemas.openxmlformats.org/drawingml/2006/main" xmlns:r="http://schemas.openxmlformats.org/officeDocument/2006/relationships" xmlns:p="http://schemas.openxmlformats.org/presentationml/2006/main">
-  <p:cSld>
-    <p:spTree>
-      <p:nvGrpSpPr>
-        <p:cNvPr id="1" name=""/>
-        <p:cNvGrpSpPr/>
-        <p:nvPr/>
-      </p:nvGrpSpPr>
-      <p:grpSpPr>
-        <a:xfrm>
-          <a:off x="0" y="0"/>
-          <a:ext cx="0" cy="0"/>
-          <a:chOff x="0" y="0"/>
-          <a:chExt cx="0" cy="0"/>
-        </a:xfrm>
-      </p:grpSpPr>
-      <p:sp>
-        <p:nvSpPr>
-          <p:cNvPr id="2" name="Title 1"/>
-          <p:cNvSpPr>
-            <a:spLocks noGrp="1"/>
-          </p:cNvSpPr>
-          <p:nvPr>
-            <p:ph type="title"/>
-          </p:nvPr>
-        </p:nvSpPr>
-        <p:spPr/>
-        <p:txBody>
-          <a:bodyPr/>
-          <a:lstStyle/>
-          <a:p>
-            <a:r>
               <a:rPr lang="en-US" dirty="0" err="1" smtClean="0"/>
               <a:t>Scratchpage</a:t>
             </a:r>
@@ -18760,7 +18937,7 @@
 </p:sld>
 </file>
 
-<file path=ppt/slides/slide48.xml><?xml version="1.0" encoding="utf-8"?>
+<file path=ppt/slides/slide47.xml><?xml version="1.0" encoding="utf-8"?>
 <p:sld xmlns:a="http://schemas.openxmlformats.org/drawingml/2006/main" xmlns:r="http://schemas.openxmlformats.org/officeDocument/2006/relationships" xmlns:p="http://schemas.openxmlformats.org/presentationml/2006/main">
   <p:cSld>
     <p:spTree>

</xml_diff>

<commit_message>
Brian: List comprehension examples for Java 8.
</commit_message>
<xml_diff>
--- a/FoundationsOfFunctionalProgramming.pptx
+++ b/FoundationsOfFunctionalProgramming.pptx
@@ -45,13 +45,14 @@
     <p:sldId id="276" r:id="rId39"/>
     <p:sldId id="279" r:id="rId40"/>
     <p:sldId id="278" r:id="rId41"/>
-    <p:sldId id="300" r:id="rId42"/>
-    <p:sldId id="290" r:id="rId43"/>
-    <p:sldId id="303" r:id="rId44"/>
-    <p:sldId id="304" r:id="rId45"/>
-    <p:sldId id="270" r:id="rId46"/>
-    <p:sldId id="258" r:id="rId47"/>
-    <p:sldId id="263" r:id="rId48"/>
+    <p:sldId id="305" r:id="rId42"/>
+    <p:sldId id="300" r:id="rId43"/>
+    <p:sldId id="290" r:id="rId44"/>
+    <p:sldId id="303" r:id="rId45"/>
+    <p:sldId id="304" r:id="rId46"/>
+    <p:sldId id="270" r:id="rId47"/>
+    <p:sldId id="258" r:id="rId48"/>
+    <p:sldId id="263" r:id="rId49"/>
   </p:sldIdLst>
   <p:sldSz cx="9144000" cy="6858000" type="screen4x3"/>
   <p:notesSz cx="6858000" cy="9144000"/>
@@ -195,6 +196,7 @@
             <p14:sldId id="276"/>
             <p14:sldId id="279"/>
             <p14:sldId id="278"/>
+            <p14:sldId id="305"/>
             <p14:sldId id="300"/>
             <p14:sldId id="290"/>
             <p14:sldId id="303"/>
@@ -17109,14 +17111,23 @@
           <a:p>
             <a:r>
               <a:rPr lang="en-US" dirty="0" smtClean="0"/>
-              <a:t>Functional Programming in</a:t>
-            </a:r>
-            <a:br>
-              <a:rPr lang="en-US" dirty="0" smtClean="0"/>
-            </a:br>
-            <a:r>
-              <a:rPr lang="en-US" dirty="0" smtClean="0"/>
-              <a:t>Java 8</a:t>
+              <a:t>Java 8 Support for </a:t>
+            </a:r>
+            <a:r>
+              <a:rPr lang="en-US" dirty="0" err="1" smtClean="0"/>
+              <a:t>Func</a:t>
+            </a:r>
+            <a:r>
+              <a:rPr lang="en-US" dirty="0" smtClean="0"/>
+              <a:t>. </a:t>
+            </a:r>
+            <a:r>
+              <a:rPr lang="en-US" dirty="0" err="1" smtClean="0"/>
+              <a:t>Prog</a:t>
+            </a:r>
+            <a:r>
+              <a:rPr lang="en-US" dirty="0" smtClean="0"/>
+              <a:t>.</a:t>
             </a:r>
             <a:endParaRPr lang="en-US" dirty="0"/>
           </a:p>
@@ -17271,6 +17282,436 @@
           <a:lstStyle/>
           <a:p>
             <a:r>
+              <a:rPr lang="en-US" dirty="0" smtClean="0"/>
+              <a:t>Java 8, cont.</a:t>
+            </a:r>
+            <a:endParaRPr lang="en-US" dirty="0"/>
+          </a:p>
+        </p:txBody>
+      </p:sp>
+      <p:sp>
+        <p:nvSpPr>
+          <p:cNvPr id="3" name="Content Placeholder 2"/>
+          <p:cNvSpPr>
+            <a:spLocks noGrp="1"/>
+          </p:cNvSpPr>
+          <p:nvPr>
+            <p:ph idx="1"/>
+          </p:nvPr>
+        </p:nvSpPr>
+        <p:spPr>
+          <a:xfrm>
+            <a:off x="457200" y="1600200"/>
+            <a:ext cx="7620000" cy="2209800"/>
+          </a:xfrm>
+        </p:spPr>
+        <p:txBody>
+          <a:bodyPr>
+            <a:normAutofit/>
+          </a:bodyPr>
+          <a:lstStyle/>
+          <a:p>
+            <a:r>
+              <a:rPr lang="en-US" dirty="0" smtClean="0"/>
+              <a:t>List comprehensions supported via </a:t>
+            </a:r>
+            <a:r>
+              <a:rPr lang="en-US" i="1" dirty="0" smtClean="0"/>
+              <a:t>streams</a:t>
+            </a:r>
+          </a:p>
+          <a:p>
+            <a:pPr lvl="1"/>
+            <a:r>
+              <a:rPr lang="en-US" dirty="0" smtClean="0"/>
+              <a:t>Sequences which may or may not be finite</a:t>
+            </a:r>
+          </a:p>
+          <a:p>
+            <a:r>
+              <a:rPr lang="en-US" dirty="0" smtClean="0"/>
+              <a:t>Functional interfaces define the </a:t>
+            </a:r>
+            <a:r>
+              <a:rPr lang="en-US" i="1" dirty="0" smtClean="0"/>
+              <a:t>type</a:t>
+            </a:r>
+            <a:r>
+              <a:rPr lang="en-US" dirty="0" smtClean="0"/>
+              <a:t> of higher order function accepted </a:t>
+            </a:r>
+          </a:p>
+          <a:p>
+            <a:r>
+              <a:rPr lang="en-US" dirty="0"/>
+              <a:t>Operations defined as intermediate (lazy) and terminal (eager)</a:t>
+            </a:r>
+            <a:endParaRPr lang="en-US" i="1" dirty="0"/>
+          </a:p>
+          <a:p>
+            <a:endParaRPr lang="en-US" dirty="0" smtClean="0"/>
+          </a:p>
+          <a:p>
+            <a:pPr marL="114300" indent="0">
+              <a:buNone/>
+            </a:pPr>
+            <a:endParaRPr lang="en-US" dirty="0"/>
+          </a:p>
+          <a:p>
+            <a:pPr marL="114300" indent="0">
+              <a:buNone/>
+            </a:pPr>
+            <a:endParaRPr lang="en-US" dirty="0"/>
+          </a:p>
+        </p:txBody>
+      </p:sp>
+      <p:graphicFrame>
+        <p:nvGraphicFramePr>
+          <p:cNvPr id="4" name="Table 3"/>
+          <p:cNvGraphicFramePr>
+            <a:graphicFrameLocks noGrp="1"/>
+          </p:cNvGraphicFramePr>
+          <p:nvPr>
+            <p:extLst>
+              <p:ext uri="{D42A27DB-BD31-4B8C-83A1-F6EECF244321}">
+                <p14:modId xmlns:p14="http://schemas.microsoft.com/office/powerpoint/2010/main" val="3189471324"/>
+              </p:ext>
+            </p:extLst>
+          </p:nvPr>
+        </p:nvGraphicFramePr>
+        <p:xfrm>
+          <a:off x="990600" y="3733800"/>
+          <a:ext cx="6096000" cy="2468880"/>
+        </p:xfrm>
+        <a:graphic>
+          <a:graphicData uri="http://schemas.openxmlformats.org/drawingml/2006/table">
+            <a:tbl>
+              <a:tblPr firstRow="1" bandRow="1">
+                <a:tableStyleId>{5C22544A-7EE6-4342-B048-85BDC9FD1C3A}</a:tableStyleId>
+              </a:tblPr>
+              <a:tblGrid>
+                <a:gridCol w="1706880"/>
+                <a:gridCol w="2194560"/>
+                <a:gridCol w="2194560"/>
+              </a:tblGrid>
+              <a:tr h="503199">
+                <a:tc>
+                  <a:txBody>
+                    <a:bodyPr/>
+                    <a:lstStyle/>
+                    <a:p>
+                      <a:r>
+                        <a:rPr lang="en-US" dirty="0" smtClean="0"/>
+                        <a:t>Operation / example</a:t>
+                      </a:r>
+                      <a:endParaRPr lang="en-US" dirty="0"/>
+                    </a:p>
+                  </a:txBody>
+                  <a:tcPr/>
+                </a:tc>
+                <a:tc>
+                  <a:txBody>
+                    <a:bodyPr/>
+                    <a:lstStyle/>
+                    <a:p>
+                      <a:r>
+                        <a:rPr lang="en-US" dirty="0" smtClean="0"/>
+                        <a:t>Functional Interface / method</a:t>
+                      </a:r>
+                      <a:endParaRPr lang="en-US" dirty="0"/>
+                    </a:p>
+                  </a:txBody>
+                  <a:tcPr/>
+                </a:tc>
+                <a:tc>
+                  <a:txBody>
+                    <a:bodyPr/>
+                    <a:lstStyle/>
+                    <a:p>
+                      <a:r>
+                        <a:rPr lang="en-US" dirty="0" smtClean="0"/>
+                        <a:t>Evaluation</a:t>
+                      </a:r>
+                      <a:r>
+                        <a:rPr lang="en-US" baseline="0" dirty="0" smtClean="0"/>
+                        <a:t> style</a:t>
+                      </a:r>
+                      <a:endParaRPr lang="en-US" dirty="0"/>
+                    </a:p>
+                  </a:txBody>
+                  <a:tcPr/>
+                </a:tc>
+              </a:tr>
+              <a:tr h="291536">
+                <a:tc>
+                  <a:txBody>
+                    <a:bodyPr/>
+                    <a:lstStyle/>
+                    <a:p>
+                      <a:r>
+                        <a:rPr lang="en-US" dirty="0" smtClean="0"/>
+                        <a:t>filter</a:t>
+                      </a:r>
+                      <a:endParaRPr lang="en-US" dirty="0"/>
+                    </a:p>
+                  </a:txBody>
+                  <a:tcPr/>
+                </a:tc>
+                <a:tc>
+                  <a:txBody>
+                    <a:bodyPr/>
+                    <a:lstStyle/>
+                    <a:p>
+                      <a:r>
+                        <a:rPr lang="en-US" dirty="0" err="1" smtClean="0"/>
+                        <a:t>Predicate.test</a:t>
+                      </a:r>
+                      <a:endParaRPr lang="en-US" dirty="0"/>
+                    </a:p>
+                  </a:txBody>
+                  <a:tcPr/>
+                </a:tc>
+                <a:tc>
+                  <a:txBody>
+                    <a:bodyPr/>
+                    <a:lstStyle/>
+                    <a:p>
+                      <a:r>
+                        <a:rPr lang="en-US" dirty="0" smtClean="0"/>
+                        <a:t>lazy</a:t>
+                      </a:r>
+                      <a:endParaRPr lang="en-US" dirty="0"/>
+                    </a:p>
+                  </a:txBody>
+                  <a:tcPr/>
+                </a:tc>
+              </a:tr>
+              <a:tr h="291536">
+                <a:tc>
+                  <a:txBody>
+                    <a:bodyPr/>
+                    <a:lstStyle/>
+                    <a:p>
+                      <a:r>
+                        <a:rPr lang="en-US" dirty="0" smtClean="0"/>
+                        <a:t>map</a:t>
+                      </a:r>
+                      <a:endParaRPr lang="en-US" dirty="0"/>
+                    </a:p>
+                  </a:txBody>
+                  <a:tcPr/>
+                </a:tc>
+                <a:tc>
+                  <a:txBody>
+                    <a:bodyPr/>
+                    <a:lstStyle/>
+                    <a:p>
+                      <a:r>
+                        <a:rPr lang="en-US" dirty="0" err="1" smtClean="0"/>
+                        <a:t>Function.apply</a:t>
+                      </a:r>
+                      <a:endParaRPr lang="en-US" dirty="0"/>
+                    </a:p>
+                  </a:txBody>
+                  <a:tcPr/>
+                </a:tc>
+                <a:tc>
+                  <a:txBody>
+                    <a:bodyPr/>
+                    <a:lstStyle/>
+                    <a:p>
+                      <a:r>
+                        <a:rPr lang="en-US" dirty="0" smtClean="0"/>
+                        <a:t>lazy</a:t>
+                      </a:r>
+                      <a:endParaRPr lang="en-US" dirty="0"/>
+                    </a:p>
+                  </a:txBody>
+                  <a:tcPr/>
+                </a:tc>
+              </a:tr>
+              <a:tr h="291536">
+                <a:tc>
+                  <a:txBody>
+                    <a:bodyPr/>
+                    <a:lstStyle/>
+                    <a:p>
+                      <a:r>
+                        <a:rPr lang="en-US" dirty="0" smtClean="0"/>
+                        <a:t>sorted</a:t>
+                      </a:r>
+                      <a:endParaRPr lang="en-US" dirty="0"/>
+                    </a:p>
+                  </a:txBody>
+                  <a:tcPr/>
+                </a:tc>
+                <a:tc>
+                  <a:txBody>
+                    <a:bodyPr/>
+                    <a:lstStyle/>
+                    <a:p>
+                      <a:r>
+                        <a:rPr lang="en-US" dirty="0" err="1" smtClean="0"/>
+                        <a:t>Comparator.compare</a:t>
+                      </a:r>
+                      <a:endParaRPr lang="en-US" dirty="0"/>
+                    </a:p>
+                  </a:txBody>
+                  <a:tcPr/>
+                </a:tc>
+                <a:tc>
+                  <a:txBody>
+                    <a:bodyPr/>
+                    <a:lstStyle/>
+                    <a:p>
+                      <a:r>
+                        <a:rPr lang="en-US" dirty="0" smtClean="0"/>
+                        <a:t>lazy</a:t>
+                      </a:r>
+                      <a:endParaRPr lang="en-US" dirty="0"/>
+                    </a:p>
+                  </a:txBody>
+                  <a:tcPr/>
+                </a:tc>
+              </a:tr>
+              <a:tr h="291536">
+                <a:tc>
+                  <a:txBody>
+                    <a:bodyPr/>
+                    <a:lstStyle/>
+                    <a:p>
+                      <a:r>
+                        <a:rPr lang="en-US" dirty="0" smtClean="0"/>
+                        <a:t>reduce (fold)</a:t>
+                      </a:r>
+                      <a:endParaRPr lang="en-US" dirty="0"/>
+                    </a:p>
+                  </a:txBody>
+                  <a:tcPr/>
+                </a:tc>
+                <a:tc>
+                  <a:txBody>
+                    <a:bodyPr/>
+                    <a:lstStyle/>
+                    <a:p>
+                      <a:r>
+                        <a:rPr lang="en-US" dirty="0" err="1" smtClean="0"/>
+                        <a:t>BiFunction.apply</a:t>
+                      </a:r>
+                      <a:endParaRPr lang="en-US" dirty="0"/>
+                    </a:p>
+                  </a:txBody>
+                  <a:tcPr/>
+                </a:tc>
+                <a:tc>
+                  <a:txBody>
+                    <a:bodyPr/>
+                    <a:lstStyle/>
+                    <a:p>
+                      <a:r>
+                        <a:rPr lang="en-US" dirty="0" smtClean="0"/>
+                        <a:t>eager</a:t>
+                      </a:r>
+                      <a:endParaRPr lang="en-US" dirty="0"/>
+                    </a:p>
+                  </a:txBody>
+                  <a:tcPr/>
+                </a:tc>
+              </a:tr>
+              <a:tr h="291536">
+                <a:tc>
+                  <a:txBody>
+                    <a:bodyPr/>
+                    <a:lstStyle/>
+                    <a:p>
+                      <a:r>
+                        <a:rPr lang="en-US" dirty="0" err="1" smtClean="0"/>
+                        <a:t>forEach</a:t>
+                      </a:r>
+                      <a:endParaRPr lang="en-US" dirty="0"/>
+                    </a:p>
+                  </a:txBody>
+                  <a:tcPr/>
+                </a:tc>
+                <a:tc>
+                  <a:txBody>
+                    <a:bodyPr/>
+                    <a:lstStyle/>
+                    <a:p>
+                      <a:r>
+                        <a:rPr lang="en-US" dirty="0" err="1" smtClean="0"/>
+                        <a:t>Consumer.accept</a:t>
+                      </a:r>
+                      <a:endParaRPr lang="en-US" dirty="0"/>
+                    </a:p>
+                  </a:txBody>
+                  <a:tcPr/>
+                </a:tc>
+                <a:tc>
+                  <a:txBody>
+                    <a:bodyPr/>
+                    <a:lstStyle/>
+                    <a:p>
+                      <a:r>
+                        <a:rPr lang="en-US" dirty="0" smtClean="0"/>
+                        <a:t>eager</a:t>
+                      </a:r>
+                      <a:endParaRPr lang="en-US" dirty="0"/>
+                    </a:p>
+                  </a:txBody>
+                  <a:tcPr/>
+                </a:tc>
+              </a:tr>
+            </a:tbl>
+          </a:graphicData>
+        </a:graphic>
+      </p:graphicFrame>
+    </p:spTree>
+    <p:extLst>
+      <p:ext uri="{BB962C8B-B14F-4D97-AF65-F5344CB8AC3E}">
+        <p14:creationId xmlns:p14="http://schemas.microsoft.com/office/powerpoint/2010/main" val="3821771328"/>
+      </p:ext>
+    </p:extLst>
+  </p:cSld>
+  <p:clrMapOvr>
+    <a:masterClrMapping/>
+  </p:clrMapOvr>
+</p:sld>
+</file>
+
+<file path=ppt/slides/slide42.xml><?xml version="1.0" encoding="utf-8"?>
+<p:sld xmlns:a="http://schemas.openxmlformats.org/drawingml/2006/main" xmlns:r="http://schemas.openxmlformats.org/officeDocument/2006/relationships" xmlns:p="http://schemas.openxmlformats.org/presentationml/2006/main">
+  <p:cSld>
+    <p:spTree>
+      <p:nvGrpSpPr>
+        <p:cNvPr id="1" name=""/>
+        <p:cNvGrpSpPr/>
+        <p:nvPr/>
+      </p:nvGrpSpPr>
+      <p:grpSpPr>
+        <a:xfrm>
+          <a:off x="0" y="0"/>
+          <a:ext cx="0" cy="0"/>
+          <a:chOff x="0" y="0"/>
+          <a:chExt cx="0" cy="0"/>
+        </a:xfrm>
+      </p:grpSpPr>
+      <p:sp>
+        <p:nvSpPr>
+          <p:cNvPr id="2" name="Title 1"/>
+          <p:cNvSpPr>
+            <a:spLocks noGrp="1"/>
+          </p:cNvSpPr>
+          <p:nvPr>
+            <p:ph type="title"/>
+          </p:nvPr>
+        </p:nvSpPr>
+        <p:spPr/>
+        <p:txBody>
+          <a:bodyPr/>
+          <a:lstStyle/>
+          <a:p>
+            <a:r>
               <a:rPr lang="en-US" sz="4000" dirty="0" smtClean="0"/>
               <a:t>Applying Functional Concepts in Non-Functional Languages</a:t>
             </a:r>
@@ -17368,7 +17809,7 @@
 </p:sld>
 </file>
 
-<file path=ppt/slides/slide42.xml><?xml version="1.0" encoding="utf-8"?>
+<file path=ppt/slides/slide43.xml><?xml version="1.0" encoding="utf-8"?>
 <p:sld xmlns:a="http://schemas.openxmlformats.org/drawingml/2006/main" xmlns:r="http://schemas.openxmlformats.org/officeDocument/2006/relationships" xmlns:p="http://schemas.openxmlformats.org/presentationml/2006/main">
   <p:cSld>
     <p:spTree>
@@ -17642,7 +18083,7 @@
 </p:sld>
 </file>
 
-<file path=ppt/slides/slide43.xml><?xml version="1.0" encoding="utf-8"?>
+<file path=ppt/slides/slide44.xml><?xml version="1.0" encoding="utf-8"?>
 <p:sld xmlns:a="http://schemas.openxmlformats.org/drawingml/2006/main" xmlns:r="http://schemas.openxmlformats.org/officeDocument/2006/relationships" xmlns:p="http://schemas.openxmlformats.org/presentationml/2006/main">
   <p:cSld>
     <p:spTree>
@@ -18553,145 +18994,6 @@
 </p:sld>
 </file>
 
-<file path=ppt/slides/slide44.xml><?xml version="1.0" encoding="utf-8"?>
-<p:sld xmlns:a="http://schemas.openxmlformats.org/drawingml/2006/main" xmlns:r="http://schemas.openxmlformats.org/officeDocument/2006/relationships" xmlns:p="http://schemas.openxmlformats.org/presentationml/2006/main">
-  <p:cSld>
-    <p:spTree>
-      <p:nvGrpSpPr>
-        <p:cNvPr id="1" name=""/>
-        <p:cNvGrpSpPr/>
-        <p:nvPr/>
-      </p:nvGrpSpPr>
-      <p:grpSpPr>
-        <a:xfrm>
-          <a:off x="0" y="0"/>
-          <a:ext cx="0" cy="0"/>
-          <a:chOff x="0" y="0"/>
-          <a:chExt cx="0" cy="0"/>
-        </a:xfrm>
-      </p:grpSpPr>
-      <p:sp>
-        <p:nvSpPr>
-          <p:cNvPr id="2" name="Title 1"/>
-          <p:cNvSpPr>
-            <a:spLocks noGrp="1"/>
-          </p:cNvSpPr>
-          <p:nvPr>
-            <p:ph type="title"/>
-          </p:nvPr>
-        </p:nvSpPr>
-        <p:spPr/>
-        <p:txBody>
-          <a:bodyPr/>
-          <a:lstStyle/>
-          <a:p>
-            <a:r>
-              <a:rPr lang="en-US" dirty="0" smtClean="0"/>
-              <a:t>Haskell, cont.</a:t>
-            </a:r>
-            <a:endParaRPr lang="en-US" dirty="0"/>
-          </a:p>
-        </p:txBody>
-      </p:sp>
-      <p:sp>
-        <p:nvSpPr>
-          <p:cNvPr id="3" name="Content Placeholder 2"/>
-          <p:cNvSpPr>
-            <a:spLocks noGrp="1"/>
-          </p:cNvSpPr>
-          <p:nvPr>
-            <p:ph idx="1"/>
-          </p:nvPr>
-        </p:nvSpPr>
-        <p:spPr/>
-        <p:txBody>
-          <a:bodyPr/>
-          <a:lstStyle/>
-          <a:p>
-            <a:r>
-              <a:rPr lang="en-US" dirty="0" smtClean="0"/>
-              <a:t>Great, free online IDE:   </a:t>
-            </a:r>
-            <a:r>
-              <a:rPr lang="en-US" dirty="0" smtClean="0">
-                <a:solidFill>
-                  <a:srgbClr val="0070C0"/>
-                </a:solidFill>
-              </a:rPr>
-              <a:t>fpcomplete.com</a:t>
-            </a:r>
-          </a:p>
-          <a:p>
-            <a:pPr lvl="1"/>
-            <a:r>
-              <a:rPr lang="en-US" dirty="0" smtClean="0">
-                <a:solidFill>
-                  <a:schemeClr val="tx2">
-                    <a:lumMod val="50000"/>
-                  </a:schemeClr>
-                </a:solidFill>
-              </a:rPr>
-              <a:t>Includes ‘School of Haskell’ tutorials</a:t>
-            </a:r>
-          </a:p>
-          <a:p>
-            <a:r>
-              <a:rPr lang="en-US" dirty="0" smtClean="0"/>
-              <a:t>Incredible free online book:   </a:t>
-            </a:r>
-            <a:r>
-              <a:rPr lang="en-US" dirty="0" smtClean="0">
-                <a:solidFill>
-                  <a:srgbClr val="0070C0"/>
-                </a:solidFill>
-              </a:rPr>
-              <a:t>learnyouahaskell.com</a:t>
-            </a:r>
-          </a:p>
-          <a:p>
-            <a:pPr lvl="1"/>
-            <a:r>
-              <a:rPr lang="en-US" dirty="0" smtClean="0"/>
-              <a:t>Strong introduction to FP concepts, including advanced ones</a:t>
-            </a:r>
-          </a:p>
-          <a:p>
-            <a:pPr lvl="1"/>
-            <a:r>
-              <a:rPr lang="en-US" dirty="0" smtClean="0"/>
-              <a:t>Even if learning </a:t>
-            </a:r>
-            <a:r>
-              <a:rPr lang="en-US" dirty="0" err="1" smtClean="0"/>
-              <a:t>Scala</a:t>
-            </a:r>
-            <a:r>
-              <a:rPr lang="en-US" dirty="0" smtClean="0"/>
-              <a:t>/Groovy/other, this is a great resource </a:t>
-            </a:r>
-          </a:p>
-          <a:p>
-            <a:endParaRPr lang="en-US" dirty="0">
-              <a:solidFill>
-                <a:srgbClr val="0070C0"/>
-              </a:solidFill>
-            </a:endParaRPr>
-          </a:p>
-        </p:txBody>
-      </p:sp>
-    </p:spTree>
-    <p:extLst>
-      <p:ext uri="{BB962C8B-B14F-4D97-AF65-F5344CB8AC3E}">
-        <p14:creationId xmlns:p14="http://schemas.microsoft.com/office/powerpoint/2010/main" val="2322966637"/>
-      </p:ext>
-    </p:extLst>
-  </p:cSld>
-  <p:clrMapOvr>
-    <a:masterClrMapping/>
-  </p:clrMapOvr>
-</p:sld>
-</file>
-
 <file path=ppt/slides/slide45.xml><?xml version="1.0" encoding="utf-8"?>
 <p:sld xmlns:a="http://schemas.openxmlformats.org/drawingml/2006/main" xmlns:r="http://schemas.openxmlformats.org/officeDocument/2006/relationships" xmlns:p="http://schemas.openxmlformats.org/presentationml/2006/main">
   <p:cSld>
@@ -18726,7 +19028,7 @@
           <a:p>
             <a:r>
               <a:rPr lang="en-US" dirty="0" smtClean="0"/>
-              <a:t>Related, Interesting Topics</a:t>
+              <a:t>Haskell, cont.</a:t>
             </a:r>
             <a:endParaRPr lang="en-US" dirty="0"/>
           </a:p>
@@ -18747,49 +19049,81 @@
           <a:bodyPr/>
           <a:lstStyle/>
           <a:p>
-            <a:endParaRPr lang="en-US" dirty="0" smtClean="0"/>
+            <a:r>
+              <a:rPr lang="en-US" dirty="0" smtClean="0"/>
+              <a:t>Great, free online IDE:   </a:t>
+            </a:r>
+            <a:r>
+              <a:rPr lang="en-US" dirty="0" smtClean="0">
+                <a:solidFill>
+                  <a:srgbClr val="0070C0"/>
+                </a:solidFill>
+              </a:rPr>
+              <a:t>fpcomplete.com</a:t>
+            </a:r>
           </a:p>
           <a:p>
             <a:pPr lvl="1"/>
             <a:r>
-              <a:rPr lang="en-US" dirty="0" smtClean="0"/>
-              <a:t>Non-Von Neumann computer architectures</a:t>
+              <a:rPr lang="en-US" dirty="0" smtClean="0">
+                <a:solidFill>
+                  <a:schemeClr val="tx2">
+                    <a:lumMod val="50000"/>
+                  </a:schemeClr>
+                </a:solidFill>
+              </a:rPr>
+              <a:t>Includes ‘School of Haskell’ tutorials</a:t>
+            </a:r>
+          </a:p>
+          <a:p>
+            <a:r>
+              <a:rPr lang="en-US" dirty="0" smtClean="0"/>
+              <a:t>Incredible free online book:   </a:t>
+            </a:r>
+            <a:r>
+              <a:rPr lang="en-US" dirty="0" smtClean="0">
+                <a:solidFill>
+                  <a:srgbClr val="0070C0"/>
+                </a:solidFill>
+              </a:rPr>
+              <a:t>learnyouahaskell.com</a:t>
             </a:r>
           </a:p>
           <a:p>
             <a:pPr lvl="1"/>
             <a:r>
               <a:rPr lang="en-US" dirty="0" smtClean="0"/>
-              <a:t>Lambda calculus</a:t>
+              <a:t>Strong introduction to FP concepts, including advanced ones</a:t>
             </a:r>
           </a:p>
           <a:p>
             <a:pPr lvl="1"/>
             <a:r>
               <a:rPr lang="en-US" dirty="0" smtClean="0"/>
-              <a:t>Applying functional thinking outside your program</a:t>
-            </a:r>
-          </a:p>
-          <a:p>
-            <a:pPr lvl="1"/>
-            <a:r>
-              <a:rPr lang="en-US" dirty="0" smtClean="0"/>
-              <a:t>Logic programming</a:t>
-            </a:r>
-          </a:p>
-          <a:p>
-            <a:pPr lvl="1"/>
-            <a:endParaRPr lang="en-US" dirty="0" smtClean="0"/>
-          </a:p>
-          <a:p>
-            <a:endParaRPr lang="en-US" dirty="0" smtClean="0"/>
+              <a:t>Even if learning </a:t>
+            </a:r>
+            <a:r>
+              <a:rPr lang="en-US" dirty="0" err="1" smtClean="0"/>
+              <a:t>Scala</a:t>
+            </a:r>
+            <a:r>
+              <a:rPr lang="en-US" dirty="0" smtClean="0"/>
+              <a:t>/Groovy/other, this is a great resource </a:t>
+            </a:r>
+          </a:p>
+          <a:p>
+            <a:endParaRPr lang="en-US" dirty="0">
+              <a:solidFill>
+                <a:srgbClr val="0070C0"/>
+              </a:solidFill>
+            </a:endParaRPr>
           </a:p>
         </p:txBody>
       </p:sp>
     </p:spTree>
     <p:extLst>
       <p:ext uri="{BB962C8B-B14F-4D97-AF65-F5344CB8AC3E}">
-        <p14:creationId xmlns:p14="http://schemas.microsoft.com/office/powerpoint/2010/main" val="4057990024"/>
+        <p14:creationId xmlns:p14="http://schemas.microsoft.com/office/powerpoint/2010/main" val="2322966637"/>
       </p:ext>
     </p:extLst>
   </p:cSld>
@@ -18832,6 +19166,113 @@
           <a:lstStyle/>
           <a:p>
             <a:r>
+              <a:rPr lang="en-US" dirty="0" smtClean="0"/>
+              <a:t>Related, Interesting Topics</a:t>
+            </a:r>
+            <a:endParaRPr lang="en-US" dirty="0"/>
+          </a:p>
+        </p:txBody>
+      </p:sp>
+      <p:sp>
+        <p:nvSpPr>
+          <p:cNvPr id="3" name="Content Placeholder 2"/>
+          <p:cNvSpPr>
+            <a:spLocks noGrp="1"/>
+          </p:cNvSpPr>
+          <p:nvPr>
+            <p:ph idx="1"/>
+          </p:nvPr>
+        </p:nvSpPr>
+        <p:spPr/>
+        <p:txBody>
+          <a:bodyPr/>
+          <a:lstStyle/>
+          <a:p>
+            <a:endParaRPr lang="en-US" dirty="0" smtClean="0"/>
+          </a:p>
+          <a:p>
+            <a:pPr lvl="1"/>
+            <a:r>
+              <a:rPr lang="en-US" dirty="0" smtClean="0"/>
+              <a:t>Non-Von Neumann computer architectures</a:t>
+            </a:r>
+          </a:p>
+          <a:p>
+            <a:pPr lvl="1"/>
+            <a:r>
+              <a:rPr lang="en-US" dirty="0" smtClean="0"/>
+              <a:t>Lambda calculus</a:t>
+            </a:r>
+          </a:p>
+          <a:p>
+            <a:pPr lvl="1"/>
+            <a:r>
+              <a:rPr lang="en-US" dirty="0" smtClean="0"/>
+              <a:t>Applying functional thinking outside your program</a:t>
+            </a:r>
+          </a:p>
+          <a:p>
+            <a:pPr lvl="1"/>
+            <a:r>
+              <a:rPr lang="en-US" dirty="0" smtClean="0"/>
+              <a:t>Logic programming</a:t>
+            </a:r>
+          </a:p>
+          <a:p>
+            <a:pPr lvl="1"/>
+            <a:endParaRPr lang="en-US" dirty="0" smtClean="0"/>
+          </a:p>
+          <a:p>
+            <a:endParaRPr lang="en-US" dirty="0" smtClean="0"/>
+          </a:p>
+        </p:txBody>
+      </p:sp>
+    </p:spTree>
+    <p:extLst>
+      <p:ext uri="{BB962C8B-B14F-4D97-AF65-F5344CB8AC3E}">
+        <p14:creationId xmlns:p14="http://schemas.microsoft.com/office/powerpoint/2010/main" val="4057990024"/>
+      </p:ext>
+    </p:extLst>
+  </p:cSld>
+  <p:clrMapOvr>
+    <a:masterClrMapping/>
+  </p:clrMapOvr>
+</p:sld>
+</file>
+
+<file path=ppt/slides/slide47.xml><?xml version="1.0" encoding="utf-8"?>
+<p:sld xmlns:a="http://schemas.openxmlformats.org/drawingml/2006/main" xmlns:r="http://schemas.openxmlformats.org/officeDocument/2006/relationships" xmlns:p="http://schemas.openxmlformats.org/presentationml/2006/main">
+  <p:cSld>
+    <p:spTree>
+      <p:nvGrpSpPr>
+        <p:cNvPr id="1" name=""/>
+        <p:cNvGrpSpPr/>
+        <p:nvPr/>
+      </p:nvGrpSpPr>
+      <p:grpSpPr>
+        <a:xfrm>
+          <a:off x="0" y="0"/>
+          <a:ext cx="0" cy="0"/>
+          <a:chOff x="0" y="0"/>
+          <a:chExt cx="0" cy="0"/>
+        </a:xfrm>
+      </p:grpSpPr>
+      <p:sp>
+        <p:nvSpPr>
+          <p:cNvPr id="2" name="Title 1"/>
+          <p:cNvSpPr>
+            <a:spLocks noGrp="1"/>
+          </p:cNvSpPr>
+          <p:nvPr>
+            <p:ph type="title"/>
+          </p:nvPr>
+        </p:nvSpPr>
+        <p:spPr/>
+        <p:txBody>
+          <a:bodyPr/>
+          <a:lstStyle/>
+          <a:p>
+            <a:r>
               <a:rPr lang="en-US" dirty="0" err="1" smtClean="0"/>
               <a:t>Scratchpage</a:t>
             </a:r>
@@ -18937,7 +19378,7 @@
 </p:sld>
 </file>
 
-<file path=ppt/slides/slide47.xml><?xml version="1.0" encoding="utf-8"?>
+<file path=ppt/slides/slide48.xml><?xml version="1.0" encoding="utf-8"?>
 <p:sld xmlns:a="http://schemas.openxmlformats.org/drawingml/2006/main" xmlns:r="http://schemas.openxmlformats.org/officeDocument/2006/relationships" xmlns:p="http://schemas.openxmlformats.org/presentationml/2006/main">
   <p:cSld>
     <p:spTree>

</xml_diff>

<commit_message>
Brian: Changes to slides and notes.
</commit_message>
<xml_diff>
--- a/FoundationsOfFunctionalProgramming.pptx
+++ b/FoundationsOfFunctionalProgramming.pptx
@@ -53,7 +53,7 @@
     <p:sldId id="310" r:id="rId47"/>
   </p:sldIdLst>
   <p:sldSz cx="9144000" cy="6858000" type="screen4x3"/>
-  <p:notesSz cx="6858000" cy="9144000"/>
+  <p:notesSz cx="7315200" cy="9601200"/>
   <p:defaultTextStyle>
     <a:defPPr>
       <a:defRPr lang="en-US"/>
@@ -3556,7 +3556,7 @@
           <a:p>
             <a:r>
               <a:rPr lang="en-US" dirty="0" smtClean="0"/>
-              <a:t>Can nearly </a:t>
+              <a:t>Can write nearly </a:t>
             </a:r>
             <a:r>
               <a:rPr lang="en-US" dirty="0" smtClean="0"/>
@@ -3885,7 +3885,6 @@
               <a:rPr lang="en-US" sz="2000" dirty="0" smtClean="0"/>
               <a:t>(return) a value</a:t>
             </a:r>
-            <a:endParaRPr lang="en-US" sz="2000" dirty="0" smtClean="0"/>
           </a:p>
           <a:p>
             <a:r>
@@ -3896,11 +3895,15 @@
           <a:p>
             <a:r>
               <a:rPr lang="en-US" sz="2000" dirty="0" smtClean="0"/>
-              <a:t>Can be </a:t>
+              <a:t>Can </a:t>
             </a:r>
             <a:r>
               <a:rPr lang="en-US" sz="2000" dirty="0" smtClean="0"/>
-              <a:t>used a </a:t>
+              <a:t>be </a:t>
+            </a:r>
+            <a:r>
+              <a:rPr lang="en-US" sz="2000" dirty="0" smtClean="0"/>
+              <a:t>used where </a:t>
             </a:r>
             <a:r>
               <a:rPr lang="en-US" sz="2000" dirty="0" smtClean="0"/>
@@ -3908,12 +3911,15 @@
             </a:r>
             <a:r>
               <a:rPr lang="en-US" sz="2000" dirty="0" smtClean="0"/>
-              <a:t>same </a:t>
-            </a:r>
+              <a:t>same type is expected</a:t>
+            </a:r>
+          </a:p>
+          <a:p>
             <a:r>
               <a:rPr lang="en-US" sz="2000" dirty="0" smtClean="0"/>
-              <a:t>type</a:t>
-            </a:r>
+              <a:t>Can be composed into more complex expressions</a:t>
+            </a:r>
+            <a:endParaRPr lang="en-US" sz="2000" dirty="0" smtClean="0"/>
           </a:p>
           <a:p>
             <a:pPr marL="114300" indent="0">
@@ -3950,12 +3956,88 @@
             <a:pPr marL="114300" indent="0">
               <a:buNone/>
             </a:pPr>
+            <a:r>
+              <a:rPr lang="en-US" sz="2000" dirty="0" smtClean="0">
+                <a:solidFill>
+                  <a:schemeClr val="accent4">
+                    <a:lumMod val="75000"/>
+                  </a:schemeClr>
+                </a:solidFill>
+                <a:cs typeface="Consolas" pitchFamily="49" charset="0"/>
+              </a:rPr>
+              <a:t>1 </a:t>
+            </a:r>
+            <a:r>
+              <a:rPr lang="en-US" sz="2000" dirty="0" smtClean="0">
+                <a:solidFill>
+                  <a:schemeClr val="accent4">
+                    <a:lumMod val="75000"/>
+                  </a:schemeClr>
+                </a:solidFill>
+                <a:cs typeface="Consolas" pitchFamily="49" charset="0"/>
+              </a:rPr>
+              <a:t>+ 2  </a:t>
+            </a:r>
+            <a:r>
+              <a:rPr lang="en-US" sz="2000" dirty="0" smtClean="0">
+                <a:solidFill>
+                  <a:schemeClr val="accent4">
+                    <a:lumMod val="75000"/>
+                  </a:schemeClr>
+                </a:solidFill>
+                <a:cs typeface="Consolas" pitchFamily="49" charset="0"/>
+              </a:rPr>
+              <a:t>       </a:t>
+            </a:r>
+            <a:r>
+              <a:rPr lang="en-US" sz="2000" dirty="0" smtClean="0">
+                <a:solidFill>
+                  <a:schemeClr val="accent6"/>
+                </a:solidFill>
+                <a:cs typeface="Consolas" pitchFamily="49" charset="0"/>
+              </a:rPr>
+              <a:t>// </a:t>
+            </a:r>
+            <a:r>
+              <a:rPr lang="en-US" sz="2000" dirty="0" smtClean="0">
+                <a:solidFill>
+                  <a:schemeClr val="accent6"/>
+                </a:solidFill>
+                <a:cs typeface="Consolas" pitchFamily="49" charset="0"/>
+              </a:rPr>
+              <a:t>of type </a:t>
+            </a:r>
+            <a:r>
+              <a:rPr lang="en-US" sz="2000" dirty="0" err="1" smtClean="0">
+                <a:solidFill>
+                  <a:schemeClr val="accent6"/>
+                </a:solidFill>
+                <a:cs typeface="Consolas" pitchFamily="49" charset="0"/>
+              </a:rPr>
+              <a:t>int</a:t>
+            </a:r>
             <a:endParaRPr lang="en-US" sz="2000" dirty="0" smtClean="0">
               <a:solidFill>
-                <a:schemeClr val="accent2"/>
+                <a:schemeClr val="accent6"/>
               </a:solidFill>
               <a:cs typeface="Consolas" pitchFamily="49" charset="0"/>
             </a:endParaRPr>
+          </a:p>
+          <a:p>
+            <a:pPr marL="114300" indent="0">
+              <a:buNone/>
+            </a:pPr>
+            <a:r>
+              <a:rPr lang="en-US" sz="2000" dirty="0" smtClean="0">
+                <a:solidFill>
+                  <a:schemeClr val="accent4">
+                    <a:lumMod val="75000"/>
+                  </a:schemeClr>
+                </a:solidFill>
+                <a:cs typeface="Consolas" pitchFamily="49" charset="0"/>
+              </a:rPr>
+              <a:t>1 + x + foo(1)</a:t>
+            </a:r>
           </a:p>
           <a:p>
             <a:pPr marL="114300" indent="0">
@@ -3981,10 +4063,10 @@
                 </a:solidFill>
                 <a:cs typeface="Consolas" pitchFamily="49" charset="0"/>
               </a:rPr>
-              <a:t>1 </a:t>
-            </a:r>
-            <a:r>
-              <a:rPr lang="en-US" sz="2000" dirty="0" smtClean="0">
+              <a:t>bar(</a:t>
+            </a:r>
+            <a:r>
+              <a:rPr lang="en-US" sz="2000" dirty="0" err="1" smtClean="0">
                 <a:solidFill>
                   <a:schemeClr val="accent4">
                     <a:lumMod val="75000"/>
@@ -3992,7 +4074,7 @@
                 </a:solidFill>
                 <a:cs typeface="Consolas" pitchFamily="49" charset="0"/>
               </a:rPr>
-              <a:t>+ 2  </a:t>
+              <a:t>int</a:t>
             </a:r>
             <a:r>
               <a:rPr lang="en-US" sz="2000" dirty="0" smtClean="0">
@@ -4003,41 +4085,30 @@
                 </a:solidFill>
                 <a:cs typeface="Consolas" pitchFamily="49" charset="0"/>
               </a:rPr>
-              <a:t>       </a:t>
+              <a:t> x, </a:t>
+            </a:r>
+            <a:r>
+              <a:rPr lang="en-US" sz="2000" dirty="0" err="1" smtClean="0">
+                <a:solidFill>
+                  <a:schemeClr val="accent4">
+                    <a:lumMod val="75000"/>
+                  </a:schemeClr>
+                </a:solidFill>
+                <a:cs typeface="Consolas" pitchFamily="49" charset="0"/>
+              </a:rPr>
+              <a:t>int</a:t>
             </a:r>
             <a:r>
               <a:rPr lang="en-US" sz="2000" dirty="0" smtClean="0">
                 <a:solidFill>
-                  <a:schemeClr val="accent6"/>
-                </a:solidFill>
-                <a:cs typeface="Consolas" pitchFamily="49" charset="0"/>
-              </a:rPr>
-              <a:t>// </a:t>
-            </a:r>
-            <a:r>
-              <a:rPr lang="en-US" sz="2000" dirty="0" smtClean="0">
-                <a:solidFill>
-                  <a:schemeClr val="accent6"/>
-                </a:solidFill>
-                <a:cs typeface="Consolas" pitchFamily="49" charset="0"/>
-              </a:rPr>
-              <a:t>of type </a:t>
-            </a:r>
-            <a:r>
-              <a:rPr lang="en-US" sz="2000" dirty="0" err="1" smtClean="0">
-                <a:solidFill>
-                  <a:schemeClr val="accent6"/>
-                </a:solidFill>
-                <a:cs typeface="Consolas" pitchFamily="49" charset="0"/>
-              </a:rPr>
-              <a:t>int</a:t>
-            </a:r>
-            <a:endParaRPr lang="en-US" sz="2000" dirty="0" smtClean="0">
-              <a:solidFill>
-                <a:schemeClr val="accent6"/>
-              </a:solidFill>
-              <a:cs typeface="Consolas" pitchFamily="49" charset="0"/>
-            </a:endParaRPr>
+                  <a:schemeClr val="accent4">
+                    <a:lumMod val="75000"/>
+                  </a:schemeClr>
+                </a:solidFill>
+                <a:cs typeface="Consolas" pitchFamily="49" charset="0"/>
+              </a:rPr>
+              <a:t> y)</a:t>
+            </a:r>
           </a:p>
           <a:p>
             <a:pPr marL="114300" indent="0">
@@ -4052,24 +4123,8 @@
                 </a:solidFill>
                 <a:cs typeface="Consolas" pitchFamily="49" charset="0"/>
               </a:rPr>
-              <a:t>1 + x + foo(1)</a:t>
-            </a:r>
-          </a:p>
-          <a:p>
-            <a:pPr marL="114300" indent="0">
-              <a:buNone/>
-            </a:pPr>
-            <a:endParaRPr lang="en-US" sz="2000" dirty="0">
-              <a:solidFill>
-                <a:schemeClr val="accent2"/>
-              </a:solidFill>
-              <a:cs typeface="Consolas" pitchFamily="49" charset="0"/>
-            </a:endParaRPr>
-          </a:p>
-          <a:p>
-            <a:pPr marL="114300" indent="0">
-              <a:buNone/>
-            </a:pPr>
+              <a:t>bar(3</a:t>
+            </a:r>
             <a:r>
               <a:rPr lang="en-US" sz="2000" dirty="0" smtClean="0">
                 <a:solidFill>
@@ -4079,7 +4134,7 @@
                 </a:solidFill>
                 <a:cs typeface="Consolas" pitchFamily="49" charset="0"/>
               </a:rPr>
-              <a:t>bar(3, </a:t>
+              <a:t>, </a:t>
             </a:r>
             <a:r>
               <a:rPr lang="en-US" sz="2000" b="1" dirty="0" smtClean="0">
@@ -4114,9 +4169,21 @@
             <a:pPr marL="114300" indent="0">
               <a:buNone/>
             </a:pPr>
+            <a:r>
+              <a:rPr lang="en-US" sz="2000" dirty="0" smtClean="0">
+                <a:solidFill>
+                  <a:schemeClr val="accent4">
+                    <a:lumMod val="75000"/>
+                  </a:schemeClr>
+                </a:solidFill>
+              </a:rPr>
+              <a:t>f(g(), h(1, “a”), j())</a:t>
+            </a:r>
             <a:endParaRPr lang="en-US" sz="2000" dirty="0" smtClean="0">
               <a:solidFill>
-                <a:schemeClr val="accent2"/>
+                <a:schemeClr val="accent4">
+                  <a:lumMod val="75000"/>
+                </a:schemeClr>
               </a:solidFill>
             </a:endParaRPr>
           </a:p>
@@ -5848,7 +5915,11 @@
           <a:p>
             <a:r>
               <a:rPr lang="en-US" dirty="0" smtClean="0"/>
-              <a:t>Allows deconstruction of objects</a:t>
+              <a:t>Allows deconstruction </a:t>
+            </a:r>
+            <a:r>
+              <a:rPr lang="en-US" smtClean="0"/>
+              <a:t>of objects</a:t>
             </a:r>
             <a:endParaRPr lang="en-US" dirty="0"/>
           </a:p>
@@ -20472,8 +20543,20 @@
             <a:pPr lvl="1"/>
             <a:r>
               <a:rPr lang="en-US" dirty="0"/>
-              <a:t>Computations are mathematical functions</a:t>
-            </a:r>
+              <a:t>Computations are mathematical </a:t>
+            </a:r>
+            <a:r>
+              <a:rPr lang="en-US" dirty="0" smtClean="0"/>
+              <a:t>functions</a:t>
+            </a:r>
+          </a:p>
+          <a:p>
+            <a:pPr lvl="1"/>
+            <a:r>
+              <a:rPr lang="en-US" dirty="0" smtClean="0"/>
+              <a:t>Everything is an expression (no statements)</a:t>
+            </a:r>
+            <a:endParaRPr lang="en-US" dirty="0"/>
           </a:p>
           <a:p>
             <a:pPr lvl="1"/>

</xml_diff>

<commit_message>
Brian: Added structural pattern matching example
</commit_message>
<xml_diff>
--- a/FoundationsOfFunctionalProgramming.pptx
+++ b/FoundationsOfFunctionalProgramming.pptx
@@ -402,7 +402,7 @@
           <a:p>
             <a:fld id="{3CBAD435-14A8-46F2-8968-23B8E604A030}" type="datetimeFigureOut">
               <a:rPr lang="en-US" smtClean="0"/>
-              <a:t>05/04/2014</a:t>
+              <a:t>05/05/2014</a:t>
             </a:fld>
             <a:endParaRPr lang="en-US"/>
           </a:p>
@@ -567,7 +567,7 @@
           <a:p>
             <a:fld id="{3CBAD435-14A8-46F2-8968-23B8E604A030}" type="datetimeFigureOut">
               <a:rPr lang="en-US" smtClean="0"/>
-              <a:t>05/04/2014</a:t>
+              <a:t>05/05/2014</a:t>
             </a:fld>
             <a:endParaRPr lang="en-US"/>
           </a:p>
@@ -742,7 +742,7 @@
           <a:p>
             <a:fld id="{3CBAD435-14A8-46F2-8968-23B8E604A030}" type="datetimeFigureOut">
               <a:rPr lang="en-US" smtClean="0"/>
-              <a:t>05/04/2014</a:t>
+              <a:t>05/05/2014</a:t>
             </a:fld>
             <a:endParaRPr lang="en-US"/>
           </a:p>
@@ -907,7 +907,7 @@
           <a:p>
             <a:fld id="{3CBAD435-14A8-46F2-8968-23B8E604A030}" type="datetimeFigureOut">
               <a:rPr lang="en-US" smtClean="0"/>
-              <a:t>05/04/2014</a:t>
+              <a:t>05/05/2014</a:t>
             </a:fld>
             <a:endParaRPr lang="en-US"/>
           </a:p>
@@ -1148,7 +1148,7 @@
           <a:p>
             <a:fld id="{3CBAD435-14A8-46F2-8968-23B8E604A030}" type="datetimeFigureOut">
               <a:rPr lang="en-US" smtClean="0"/>
-              <a:t>05/04/2014</a:t>
+              <a:t>05/05/2014</a:t>
             </a:fld>
             <a:endParaRPr lang="en-US"/>
           </a:p>
@@ -1431,7 +1431,7 @@
           <a:p>
             <a:fld id="{3CBAD435-14A8-46F2-8968-23B8E604A030}" type="datetimeFigureOut">
               <a:rPr lang="en-US" smtClean="0"/>
-              <a:t>05/04/2014</a:t>
+              <a:t>05/05/2014</a:t>
             </a:fld>
             <a:endParaRPr lang="en-US"/>
           </a:p>
@@ -1860,7 +1860,7 @@
           <a:p>
             <a:fld id="{3CBAD435-14A8-46F2-8968-23B8E604A030}" type="datetimeFigureOut">
               <a:rPr lang="en-US" smtClean="0"/>
-              <a:t>05/04/2014</a:t>
+              <a:t>05/05/2014</a:t>
             </a:fld>
             <a:endParaRPr lang="en-US"/>
           </a:p>
@@ -1973,7 +1973,7 @@
           <a:p>
             <a:fld id="{3CBAD435-14A8-46F2-8968-23B8E604A030}" type="datetimeFigureOut">
               <a:rPr lang="en-US" smtClean="0"/>
-              <a:t>05/04/2014</a:t>
+              <a:t>05/05/2014</a:t>
             </a:fld>
             <a:endParaRPr lang="en-US"/>
           </a:p>
@@ -2063,7 +2063,7 @@
           <a:p>
             <a:fld id="{3CBAD435-14A8-46F2-8968-23B8E604A030}" type="datetimeFigureOut">
               <a:rPr lang="en-US" smtClean="0"/>
-              <a:t>05/04/2014</a:t>
+              <a:t>05/05/2014</a:t>
             </a:fld>
             <a:endParaRPr lang="en-US"/>
           </a:p>
@@ -2252,7 +2252,7 @@
           <a:p>
             <a:fld id="{3CBAD435-14A8-46F2-8968-23B8E604A030}" type="datetimeFigureOut">
               <a:rPr lang="en-US" smtClean="0"/>
-              <a:t>05/04/2014</a:t>
+              <a:t>05/05/2014</a:t>
             </a:fld>
             <a:endParaRPr lang="en-US"/>
           </a:p>
@@ -2570,7 +2570,7 @@
           <a:p>
             <a:fld id="{3CBAD435-14A8-46F2-8968-23B8E604A030}" type="datetimeFigureOut">
               <a:rPr lang="en-US" smtClean="0"/>
-              <a:t>05/04/2014</a:t>
+              <a:t>05/05/2014</a:t>
             </a:fld>
             <a:endParaRPr lang="en-US"/>
           </a:p>
@@ -2949,7 +2949,7 @@
           <a:p>
             <a:fld id="{3CBAD435-14A8-46F2-8968-23B8E604A030}" type="datetimeFigureOut">
               <a:rPr lang="en-US" smtClean="0"/>
-              <a:t>05/04/2014</a:t>
+              <a:t>05/05/2014</a:t>
             </a:fld>
             <a:endParaRPr lang="en-US"/>
           </a:p>
@@ -3556,11 +3556,7 @@
           <a:p>
             <a:r>
               <a:rPr lang="en-US" dirty="0" smtClean="0"/>
-              <a:t>Can write nearly </a:t>
-            </a:r>
-            <a:r>
-              <a:rPr lang="en-US" dirty="0" smtClean="0"/>
-              <a:t>pure functional code in any of these languages</a:t>
+              <a:t>Can write nearly pure functional code in any of these languages</a:t>
             </a:r>
           </a:p>
           <a:p>
@@ -3684,7 +3680,6 @@
               <a:rPr lang="en-US" dirty="0" smtClean="0"/>
               <a:t>Expressions:</a:t>
             </a:r>
-            <a:endParaRPr lang="en-US" dirty="0" smtClean="0"/>
           </a:p>
           <a:p>
             <a:endParaRPr lang="en-US" dirty="0"/>
@@ -3879,11 +3874,7 @@
           <a:p>
             <a:r>
               <a:rPr lang="en-US" sz="2000" dirty="0" smtClean="0"/>
-              <a:t>Express </a:t>
-            </a:r>
-            <a:r>
-              <a:rPr lang="en-US" sz="2000" dirty="0" smtClean="0"/>
-              <a:t>(return) a value</a:t>
+              <a:t>Express (return) a value</a:t>
             </a:r>
           </a:p>
           <a:p>
@@ -3895,23 +3886,7 @@
           <a:p>
             <a:r>
               <a:rPr lang="en-US" sz="2000" dirty="0" smtClean="0"/>
-              <a:t>Can </a:t>
-            </a:r>
-            <a:r>
-              <a:rPr lang="en-US" sz="2000" dirty="0" smtClean="0"/>
-              <a:t>be </a:t>
-            </a:r>
-            <a:r>
-              <a:rPr lang="en-US" sz="2000" dirty="0" smtClean="0"/>
-              <a:t>used where </a:t>
-            </a:r>
-            <a:r>
-              <a:rPr lang="en-US" sz="2000" dirty="0" smtClean="0"/>
-              <a:t>a value of the </a:t>
-            </a:r>
-            <a:r>
-              <a:rPr lang="en-US" sz="2000" dirty="0" smtClean="0"/>
-              <a:t>same type is expected</a:t>
+              <a:t>Can be used where a value of the same type is expected</a:t>
             </a:r>
           </a:p>
           <a:p>
@@ -3919,7 +3894,6 @@
               <a:rPr lang="en-US" sz="2000" dirty="0" smtClean="0"/>
               <a:t>Can be composed into more complex expressions</a:t>
             </a:r>
-            <a:endParaRPr lang="en-US" sz="2000" dirty="0" smtClean="0"/>
           </a:p>
           <a:p>
             <a:pPr marL="114300" indent="0">
@@ -3965,47 +3939,16 @@
                 </a:solidFill>
                 <a:cs typeface="Consolas" pitchFamily="49" charset="0"/>
               </a:rPr>
-              <a:t>1 </a:t>
+              <a:t>1 + 2         </a:t>
             </a:r>
             <a:r>
               <a:rPr lang="en-US" sz="2000" dirty="0" smtClean="0">
                 <a:solidFill>
-                  <a:schemeClr val="accent4">
-                    <a:lumMod val="75000"/>
-                  </a:schemeClr>
-                </a:solidFill>
-                <a:cs typeface="Consolas" pitchFamily="49" charset="0"/>
-              </a:rPr>
-              <a:t>+ 2  </a:t>
-            </a:r>
-            <a:r>
-              <a:rPr lang="en-US" sz="2000" dirty="0" smtClean="0">
-                <a:solidFill>
-                  <a:schemeClr val="accent4">
-                    <a:lumMod val="75000"/>
-                  </a:schemeClr>
-                </a:solidFill>
-                <a:cs typeface="Consolas" pitchFamily="49" charset="0"/>
-              </a:rPr>
-              <a:t>       </a:t>
-            </a:r>
-            <a:r>
-              <a:rPr lang="en-US" sz="2000" dirty="0" smtClean="0">
-                <a:solidFill>
                   <a:schemeClr val="accent6"/>
                 </a:solidFill>
                 <a:cs typeface="Consolas" pitchFamily="49" charset="0"/>
               </a:rPr>
-              <a:t>// </a:t>
-            </a:r>
-            <a:r>
-              <a:rPr lang="en-US" sz="2000" dirty="0" smtClean="0">
-                <a:solidFill>
-                  <a:schemeClr val="accent6"/>
-                </a:solidFill>
-                <a:cs typeface="Consolas" pitchFamily="49" charset="0"/>
-              </a:rPr>
-              <a:t>of type </a:t>
+              <a:t>// of type </a:t>
             </a:r>
             <a:r>
               <a:rPr lang="en-US" sz="2000" dirty="0" err="1" smtClean="0">
@@ -4123,18 +4066,7 @@
                 </a:solidFill>
                 <a:cs typeface="Consolas" pitchFamily="49" charset="0"/>
               </a:rPr>
-              <a:t>bar(3</a:t>
-            </a:r>
-            <a:r>
-              <a:rPr lang="en-US" sz="2000" dirty="0" smtClean="0">
-                <a:solidFill>
-                  <a:schemeClr val="accent4">
-                    <a:lumMod val="75000"/>
-                  </a:schemeClr>
-                </a:solidFill>
-                <a:cs typeface="Consolas" pitchFamily="49" charset="0"/>
-              </a:rPr>
-              <a:t>, </a:t>
+              <a:t>bar(3, </a:t>
             </a:r>
             <a:r>
               <a:rPr lang="en-US" sz="2000" b="1" dirty="0" smtClean="0">
@@ -4179,13 +4111,6 @@
               </a:rPr>
               <a:t>f(g(), h(1, “a”), j())</a:t>
             </a:r>
-            <a:endParaRPr lang="en-US" sz="2000" dirty="0" smtClean="0">
-              <a:solidFill>
-                <a:schemeClr val="accent4">
-                  <a:lumMod val="75000"/>
-                </a:schemeClr>
-              </a:solidFill>
-            </a:endParaRPr>
           </a:p>
           <a:p>
             <a:pPr marL="114300" indent="0">
@@ -4466,11 +4391,7 @@
           <a:p>
             <a:r>
               <a:rPr lang="en-US" sz="2000" dirty="0" smtClean="0"/>
-              <a:t>Typically change some global state of the program or </a:t>
-            </a:r>
-            <a:r>
-              <a:rPr lang="en-US" sz="2000" dirty="0" smtClean="0"/>
-              <a:t>the system</a:t>
+              <a:t>Typically change some global state of the program or the system</a:t>
             </a:r>
           </a:p>
           <a:p>
@@ -4478,7 +4399,6 @@
               <a:rPr lang="en-US" sz="2000" dirty="0" smtClean="0"/>
               <a:t>Cannot be substituted for values</a:t>
             </a:r>
-            <a:endParaRPr lang="en-US" sz="2000" dirty="0" smtClean="0"/>
           </a:p>
           <a:p>
             <a:pPr marL="114300" indent="0">
@@ -4546,18 +4466,7 @@
                 </a:solidFill>
                 <a:cs typeface="Consolas" pitchFamily="49" charset="0"/>
               </a:rPr>
-              <a:t>return </a:t>
-            </a:r>
-            <a:r>
-              <a:rPr lang="en-US" sz="2000" dirty="0" smtClean="0">
-                <a:solidFill>
-                  <a:schemeClr val="accent4">
-                    <a:lumMod val="75000"/>
-                  </a:schemeClr>
-                </a:solidFill>
-                <a:cs typeface="Consolas" pitchFamily="49" charset="0"/>
-              </a:rPr>
-              <a:t>(</a:t>
+              <a:t>return (</a:t>
             </a:r>
             <a:r>
               <a:rPr lang="en-US" sz="2000" dirty="0" err="1" smtClean="0">
@@ -5585,25 +5494,8 @@
           <a:p>
             <a:r>
               <a:rPr lang="en-US" dirty="0" smtClean="0"/>
-              <a:t>Cannot safely replace occurrences </a:t>
-            </a:r>
-            <a:r>
-              <a:rPr lang="en-US" dirty="0" smtClean="0"/>
-              <a:t>of an expression </a:t>
-            </a:r>
-            <a:r>
-              <a:rPr lang="en-US" dirty="0" smtClean="0"/>
-              <a:t>if its </a:t>
-            </a:r>
-            <a:r>
-              <a:rPr lang="en-US" dirty="0" smtClean="0"/>
-              <a:t>computation has </a:t>
-            </a:r>
-            <a:r>
-              <a:rPr lang="en-US" dirty="0" smtClean="0"/>
-              <a:t>side effects or hidden inputs</a:t>
-            </a:r>
-            <a:endParaRPr lang="en-US" dirty="0" smtClean="0"/>
+              <a:t>Cannot safely replace occurrences of an expression if its computation has side effects or hidden inputs</a:t>
+            </a:r>
           </a:p>
           <a:p>
             <a:endParaRPr lang="en-US" dirty="0" smtClean="0"/>
@@ -5702,7 +5594,6 @@
               <a:rPr lang="en-US" i="1" dirty="0" smtClean="0"/>
               <a:t>idempotent</a:t>
             </a:r>
-            <a:endParaRPr lang="en-US" i="1" dirty="0" smtClean="0"/>
           </a:p>
           <a:p>
             <a:r>
@@ -5742,7 +5633,6 @@
               <a:rPr lang="en-US" dirty="0" smtClean="0"/>
               <a:t>Parallelization</a:t>
             </a:r>
-            <a:endParaRPr lang="en-US" dirty="0" smtClean="0"/>
           </a:p>
           <a:p>
             <a:pPr lvl="1"/>
@@ -5765,7 +5655,6 @@
               <a:rPr lang="en-US" dirty="0" smtClean="0"/>
               <a:t>)</a:t>
             </a:r>
-            <a:endParaRPr lang="en-US" dirty="0" smtClean="0"/>
           </a:p>
           <a:p>
             <a:r>
@@ -5860,21 +5749,13 @@
             <a:pPr lvl="1"/>
             <a:r>
               <a:rPr lang="en-US" dirty="0" smtClean="0"/>
-              <a:t>Instead, new values are </a:t>
-            </a:r>
-            <a:r>
-              <a:rPr lang="en-US" dirty="0" smtClean="0"/>
-              <a:t>created</a:t>
-            </a:r>
-          </a:p>
-          <a:p>
-            <a:r>
-              <a:rPr lang="en-US" dirty="0" smtClean="0"/>
-              <a:t>Required </a:t>
-            </a:r>
-            <a:r>
-              <a:rPr lang="en-US" dirty="0" smtClean="0"/>
-              <a:t>for referential transparency – mutable types make </a:t>
+              <a:t>Instead, new values are created</a:t>
+            </a:r>
+          </a:p>
+          <a:p>
+            <a:r>
+              <a:rPr lang="en-US" dirty="0" smtClean="0"/>
+              <a:t>Required for referential transparency – mutable types make </a:t>
             </a:r>
             <a:r>
               <a:rPr lang="en-US" dirty="0"/>
@@ -5895,7 +5776,6 @@
               <a:rPr lang="en-US" dirty="0" smtClean="0"/>
               <a:t>Impossible / very hard to rule out side effects</a:t>
             </a:r>
-            <a:endParaRPr lang="en-US" dirty="0" smtClean="0"/>
           </a:p>
           <a:p>
             <a:pPr lvl="1"/>
@@ -6194,32 +6074,14 @@
           <a:p>
             <a:r>
               <a:rPr lang="en-US" dirty="0" smtClean="0"/>
-              <a:t>Some problems go </a:t>
-            </a:r>
-            <a:r>
-              <a:rPr lang="en-US" dirty="0" smtClean="0"/>
-              <a:t>away </a:t>
-            </a:r>
-            <a:r>
-              <a:rPr lang="en-US" dirty="0" smtClean="0"/>
-              <a:t>entirely if values (objects) are immutable</a:t>
-            </a:r>
-            <a:endParaRPr lang="en-US" dirty="0" smtClean="0"/>
-          </a:p>
-          <a:p>
-            <a:r>
-              <a:rPr lang="en-US" dirty="0" smtClean="0"/>
-              <a:t>A </a:t>
-            </a:r>
-            <a:r>
-              <a:rPr lang="en-US" dirty="0" smtClean="0"/>
-              <a:t>good strategy is to push mutability to the boundary of a </a:t>
-            </a:r>
-            <a:r>
-              <a:rPr lang="en-US" dirty="0" smtClean="0"/>
-              <a:t>module</a:t>
-            </a:r>
-            <a:endParaRPr lang="en-US" dirty="0" smtClean="0"/>
+              <a:t>Some problems go away entirely if values (objects) are immutable</a:t>
+            </a:r>
+          </a:p>
+          <a:p>
+            <a:r>
+              <a:rPr lang="en-US" dirty="0" smtClean="0"/>
+              <a:t>A good strategy is to push mutability to the boundary of a module</a:t>
+            </a:r>
           </a:p>
           <a:p>
             <a:pPr lvl="1"/>
@@ -6232,27 +6094,7 @@
             <a:pPr lvl="1"/>
             <a:r>
               <a:rPr lang="en-US" dirty="0" smtClean="0"/>
-              <a:t>Allows advantages </a:t>
-            </a:r>
-            <a:r>
-              <a:rPr lang="en-US" dirty="0" smtClean="0"/>
-              <a:t>of </a:t>
-            </a:r>
-            <a:r>
-              <a:rPr lang="en-US" dirty="0" smtClean="0"/>
-              <a:t>pure </a:t>
-            </a:r>
-            <a:r>
-              <a:rPr lang="en-US" dirty="0" smtClean="0"/>
-              <a:t>FP within </a:t>
-            </a:r>
-            <a:r>
-              <a:rPr lang="en-US" dirty="0" smtClean="0"/>
-              <a:t>the </a:t>
-            </a:r>
-            <a:r>
-              <a:rPr lang="en-US" dirty="0" smtClean="0"/>
-              <a:t>module</a:t>
+              <a:t>Allows advantages of pure FP within the module</a:t>
             </a:r>
           </a:p>
           <a:p>
@@ -6261,7 +6103,6 @@
               <a:rPr lang="en-US" dirty="0" smtClean="0"/>
               <a:t>Good for integrating with legacy code, non-FP libraries and frameworks</a:t>
             </a:r>
-            <a:endParaRPr lang="en-US" dirty="0" smtClean="0"/>
           </a:p>
         </p:txBody>
       </p:sp>
@@ -6581,11 +6422,7 @@
           <a:p>
             <a:r>
               <a:rPr lang="en-US" dirty="0" smtClean="0"/>
-              <a:t>Easier </a:t>
-            </a:r>
-            <a:r>
-              <a:rPr lang="en-US" dirty="0" smtClean="0"/>
-              <a:t>to reason about </a:t>
+              <a:t>Easier to reason about </a:t>
             </a:r>
             <a:r>
               <a:rPr lang="en-US" i="1" dirty="0" smtClean="0"/>
@@ -6593,15 +6430,7 @@
             </a:r>
             <a:r>
               <a:rPr lang="en-US" dirty="0" smtClean="0"/>
-              <a:t>, </a:t>
-            </a:r>
-            <a:r>
-              <a:rPr lang="en-US" dirty="0" smtClean="0"/>
-              <a:t>perhaps harder </a:t>
-            </a:r>
-            <a:r>
-              <a:rPr lang="en-US" dirty="0" smtClean="0"/>
-              <a:t>to reason about </a:t>
+              <a:t>, perhaps harder to reason about </a:t>
             </a:r>
             <a:r>
               <a:rPr lang="en-US" i="1" dirty="0" smtClean="0"/>
@@ -6612,13 +6441,8 @@
             <a:pPr lvl="1"/>
             <a:r>
               <a:rPr lang="en-US" dirty="0" smtClean="0"/>
-              <a:t>SQL is an example – the DB plans the </a:t>
-            </a:r>
-            <a:r>
-              <a:rPr lang="en-US" dirty="0" smtClean="0"/>
-              <a:t>execution</a:t>
-            </a:r>
-            <a:endParaRPr lang="en-US" dirty="0" smtClean="0"/>
+              <a:t>SQL is an example – the DB plans the execution</a:t>
+            </a:r>
           </a:p>
         </p:txBody>
       </p:sp>
@@ -6692,15 +6516,7 @@
           <a:p>
             <a:r>
               <a:rPr lang="en-US" dirty="0" smtClean="0"/>
-              <a:t>Functions </a:t>
-            </a:r>
-            <a:r>
-              <a:rPr lang="en-US" dirty="0" smtClean="0"/>
-              <a:t>can be treated as </a:t>
-            </a:r>
-            <a:r>
-              <a:rPr lang="en-US" dirty="0" smtClean="0"/>
-              <a:t>values</a:t>
+              <a:t>Functions can be treated as values</a:t>
             </a:r>
           </a:p>
           <a:p>
@@ -6833,19 +6649,7 @@
                 <a:latin typeface="Consolas" pitchFamily="49" charset="0"/>
                 <a:cs typeface="Consolas" pitchFamily="49" charset="0"/>
               </a:rPr>
-              <a:t> x -&gt; x * 2</a:t>
-            </a:r>
-            <a:r>
-              <a:rPr lang="en-US" sz="1600" dirty="0" smtClean="0">
-                <a:solidFill>
-                  <a:schemeClr val="accent2">
-                    <a:lumMod val="50000"/>
-                  </a:schemeClr>
-                </a:solidFill>
-                <a:latin typeface="Consolas" pitchFamily="49" charset="0"/>
-                <a:cs typeface="Consolas" pitchFamily="49" charset="0"/>
-              </a:rPr>
-              <a:t>}</a:t>
+              <a:t> x -&gt; x * 2}</a:t>
             </a:r>
             <a:endParaRPr lang="en-US" sz="1600" dirty="0">
               <a:solidFill>
@@ -7050,29 +6854,8 @@
                 <a:latin typeface="Consolas" pitchFamily="49" charset="0"/>
                 <a:cs typeface="Consolas" pitchFamily="49" charset="0"/>
               </a:rPr>
-              <a:t>x * </a:t>
-            </a:r>
-            <a:r>
-              <a:rPr lang="en-US" sz="1600" dirty="0" smtClean="0">
-                <a:solidFill>
-                  <a:schemeClr val="accent2">
-                    <a:lumMod val="50000"/>
-                  </a:schemeClr>
-                </a:solidFill>
-                <a:latin typeface="Consolas" pitchFamily="49" charset="0"/>
-                <a:cs typeface="Consolas" pitchFamily="49" charset="0"/>
-              </a:rPr>
-              <a:t>2</a:t>
-            </a:r>
-            <a:endParaRPr lang="en-US" sz="1600" dirty="0" smtClean="0">
-              <a:solidFill>
-                <a:schemeClr val="accent2">
-                  <a:lumMod val="50000"/>
-                </a:schemeClr>
-              </a:solidFill>
-              <a:latin typeface="Consolas" pitchFamily="49" charset="0"/>
-              <a:cs typeface="Consolas" pitchFamily="49" charset="0"/>
-            </a:endParaRPr>
+              <a:t>x * 2</a:t>
+            </a:r>
           </a:p>
         </p:txBody>
       </p:sp>
@@ -7221,15 +7004,6 @@
               </a:rPr>
               <a:t>;};      </a:t>
             </a:r>
-            <a:endParaRPr lang="en-US" sz="1600" dirty="0" smtClean="0">
-              <a:solidFill>
-                <a:schemeClr val="accent2">
-                  <a:lumMod val="50000"/>
-                </a:schemeClr>
-              </a:solidFill>
-              <a:latin typeface="Consolas" pitchFamily="49" charset="0"/>
-              <a:cs typeface="Consolas" pitchFamily="49" charset="0"/>
-            </a:endParaRPr>
           </a:p>
         </p:txBody>
       </p:sp>
@@ -7356,13 +7130,8 @@
           <a:p>
             <a:r>
               <a:rPr lang="en-US" dirty="0" smtClean="0"/>
-              <a:t>A look </a:t>
-            </a:r>
-            <a:r>
-              <a:rPr lang="en-US" dirty="0" smtClean="0"/>
-              <a:t>into functional programming’s origins</a:t>
-            </a:r>
-            <a:endParaRPr lang="en-US" dirty="0" smtClean="0"/>
+              <a:t>A look into functional programming’s origins</a:t>
+            </a:r>
           </a:p>
           <a:p>
             <a:r>
@@ -7373,25 +7142,13 @@
           <a:p>
             <a:r>
               <a:rPr lang="en-US" dirty="0" smtClean="0"/>
-              <a:t>An idea of which problems </a:t>
-            </a:r>
-            <a:r>
-              <a:rPr lang="en-US" dirty="0" smtClean="0"/>
-              <a:t>are good candidates for FP</a:t>
-            </a:r>
-          </a:p>
-          <a:p>
-            <a:r>
-              <a:rPr lang="en-US" dirty="0" smtClean="0"/>
-              <a:t>Curiosity </a:t>
-            </a:r>
-            <a:r>
-              <a:rPr lang="en-US" dirty="0" smtClean="0"/>
-              <a:t>about some </a:t>
-            </a:r>
-            <a:r>
-              <a:rPr lang="en-US" dirty="0" smtClean="0"/>
-              <a:t>ideas which underpin FP</a:t>
+              <a:t>An idea of which problems are good candidates for FP</a:t>
+            </a:r>
+          </a:p>
+          <a:p>
+            <a:r>
+              <a:rPr lang="en-US" dirty="0" smtClean="0"/>
+              <a:t>Curiosity about some ideas which underpin FP</a:t>
             </a:r>
           </a:p>
           <a:p>
@@ -7399,7 +7156,6 @@
               <a:rPr lang="en-US" dirty="0" smtClean="0"/>
               <a:t>A pragmatic plan for introducing FP</a:t>
             </a:r>
-            <a:endParaRPr lang="en-US" dirty="0" smtClean="0"/>
           </a:p>
           <a:p>
             <a:endParaRPr lang="en-US" dirty="0" smtClean="0"/>
@@ -8095,7 +7851,6 @@
               <a:rPr lang="en-US" dirty="0" smtClean="0"/>
               <a:t>Can be returned</a:t>
             </a:r>
-            <a:endParaRPr lang="en-US" dirty="0" smtClean="0"/>
           </a:p>
           <a:p>
             <a:endParaRPr lang="en-US" dirty="0"/>
@@ -9493,7 +9248,6 @@
               <a:rPr lang="en-US" dirty="0" smtClean="0"/>
               <a:t>Valuable in processing collections (as we will see…)</a:t>
             </a:r>
-            <a:endParaRPr lang="en-US" dirty="0" smtClean="0"/>
           </a:p>
           <a:p>
             <a:r>
@@ -9746,27 +9500,7 @@
                   </a:schemeClr>
                 </a:solidFill>
               </a:rPr>
-              <a:t>FP Big Idea ™:   </a:t>
-            </a:r>
-            <a:r>
-              <a:rPr lang="en-US" b="1" i="1" dirty="0" smtClean="0">
-                <a:solidFill>
-                  <a:schemeClr val="accent3">
-                    <a:lumMod val="50000"/>
-                  </a:schemeClr>
-                </a:solidFill>
-              </a:rPr>
-              <a:t>Simplicity through unification:  statements vs. expressions, functions vs</a:t>
-            </a:r>
-            <a:r>
-              <a:rPr lang="en-US" b="1" i="1" dirty="0" smtClean="0">
-                <a:solidFill>
-                  <a:schemeClr val="accent3">
-                    <a:lumMod val="50000"/>
-                  </a:schemeClr>
-                </a:solidFill>
-              </a:rPr>
-              <a:t>. values</a:t>
+              <a:t>FP Big Idea ™:   Simplicity through unification:  statements vs. expressions, functions vs. values</a:t>
             </a:r>
             <a:endParaRPr lang="en-US" b="1" i="1" dirty="0" smtClean="0">
               <a:solidFill>
@@ -9860,19 +9594,7 @@
           <a:p>
             <a:r>
               <a:rPr lang="en-US" dirty="0" smtClean="0"/>
-              <a:t>Functions </a:t>
-            </a:r>
-            <a:r>
-              <a:rPr lang="en-US" dirty="0" smtClean="0"/>
-              <a:t>can be </a:t>
-            </a:r>
-            <a:r>
-              <a:rPr lang="en-US" dirty="0" smtClean="0"/>
-              <a:t>defined </a:t>
-            </a:r>
-            <a:r>
-              <a:rPr lang="en-US" dirty="0" smtClean="0"/>
-              <a:t>and called without a name</a:t>
+              <a:t>Functions can be defined and called without a name</a:t>
             </a:r>
           </a:p>
           <a:p>
@@ -10455,11 +10177,7 @@
           <a:p>
             <a:r>
               <a:rPr lang="en-US" dirty="0" smtClean="0"/>
-              <a:t>Often </a:t>
-            </a:r>
-            <a:r>
-              <a:rPr lang="en-US" dirty="0" smtClean="0"/>
-              <a:t>used for ad-hoc, simple computations, which don’t deserve a name</a:t>
+              <a:t>Often used for ad-hoc, simple computations, which don’t deserve a name</a:t>
             </a:r>
           </a:p>
           <a:p>
@@ -10558,11 +10276,7 @@
           <a:p>
             <a:r>
               <a:rPr lang="en-US" dirty="0" smtClean="0"/>
-              <a:t>Lambdas </a:t>
-            </a:r>
-            <a:r>
-              <a:rPr lang="en-US" dirty="0" smtClean="0"/>
-              <a:t>are often (lexical) </a:t>
+              <a:t>Lambdas are often (lexical) </a:t>
             </a:r>
             <a:r>
               <a:rPr lang="en-US" i="1" dirty="0" smtClean="0"/>
@@ -10578,11 +10292,7 @@
           <a:p>
             <a:r>
               <a:rPr lang="en-US" dirty="0" smtClean="0"/>
-              <a:t>Technically</a:t>
-            </a:r>
-            <a:r>
-              <a:rPr lang="en-US" dirty="0" smtClean="0"/>
-              <a:t>, anonymous functions don’t have to be closures</a:t>
+              <a:t>Technically, anonymous functions don’t have to be closures</a:t>
             </a:r>
           </a:p>
           <a:p>
@@ -10655,20 +10365,10 @@
                 <a:latin typeface="Consolas" pitchFamily="49" charset="0"/>
                 <a:cs typeface="Consolas" pitchFamily="49" charset="0"/>
               </a:rPr>
-              <a:t> callWith3(Closure f) </a:t>
-            </a:r>
-            <a:r>
-              <a:rPr lang="en-US" sz="1600" dirty="0" smtClean="0">
-                <a:solidFill>
-                  <a:schemeClr val="accent2">
-                    <a:lumMod val="50000"/>
-                  </a:schemeClr>
-                </a:solidFill>
-                <a:latin typeface="Consolas" pitchFamily="49" charset="0"/>
-                <a:cs typeface="Consolas" pitchFamily="49" charset="0"/>
-              </a:rPr>
-              <a:t>{f(3)}</a:t>
-            </a:r>
+              <a:t> callWith3(Closure f) {f(3)}</a:t>
+            </a:r>
+          </a:p>
+          <a:p>
             <a:endParaRPr lang="en-US" sz="1600" dirty="0" smtClean="0">
               <a:solidFill>
                 <a:schemeClr val="accent2">
@@ -10680,17 +10380,6 @@
             </a:endParaRPr>
           </a:p>
           <a:p>
-            <a:endParaRPr lang="en-US" sz="1600" dirty="0" smtClean="0">
-              <a:solidFill>
-                <a:schemeClr val="accent2">
-                  <a:lumMod val="50000"/>
-                </a:schemeClr>
-              </a:solidFill>
-              <a:latin typeface="Consolas" pitchFamily="49" charset="0"/>
-              <a:cs typeface="Consolas" pitchFamily="49" charset="0"/>
-            </a:endParaRPr>
-          </a:p>
-          <a:p>
             <a:r>
               <a:rPr lang="en-US" sz="1600" dirty="0" err="1" smtClean="0">
                 <a:solidFill>
@@ -10739,15 +10428,6 @@
               </a:rPr>
               <a:t>() {</a:t>
             </a:r>
-            <a:endParaRPr lang="en-US" sz="1600" dirty="0" smtClean="0">
-              <a:solidFill>
-                <a:schemeClr val="accent2">
-                  <a:lumMod val="50000"/>
-                </a:schemeClr>
-              </a:solidFill>
-              <a:latin typeface="Consolas" pitchFamily="49" charset="0"/>
-              <a:cs typeface="Consolas" pitchFamily="49" charset="0"/>
-            </a:endParaRPr>
           </a:p>
           <a:p>
             <a:r>
@@ -10784,19 +10464,7 @@
                 <a:latin typeface="Consolas" pitchFamily="49" charset="0"/>
                 <a:cs typeface="Consolas" pitchFamily="49" charset="0"/>
               </a:rPr>
-              <a:t> </a:t>
-            </a:r>
-            <a:r>
-              <a:rPr lang="en-US" sz="1600" dirty="0" smtClean="0">
-                <a:solidFill>
-                  <a:schemeClr val="accent2">
-                    <a:lumMod val="50000"/>
-                  </a:schemeClr>
-                </a:solidFill>
-                <a:latin typeface="Consolas" pitchFamily="49" charset="0"/>
-                <a:cs typeface="Consolas" pitchFamily="49" charset="0"/>
-              </a:rPr>
-              <a:t>x = 5</a:t>
+              <a:t> x = 5</a:t>
             </a:r>
           </a:p>
           <a:p>
@@ -10846,55 +10514,7 @@
                 <a:latin typeface="Consolas" pitchFamily="49" charset="0"/>
                 <a:cs typeface="Consolas" pitchFamily="49" charset="0"/>
               </a:rPr>
-              <a:t>// </a:t>
-            </a:r>
-            <a:r>
-              <a:rPr lang="en-US" sz="1600" dirty="0" smtClean="0">
-                <a:solidFill>
-                  <a:schemeClr val="accent5">
-                    <a:lumMod val="75000"/>
-                  </a:schemeClr>
-                </a:solidFill>
-                <a:latin typeface="Consolas" pitchFamily="49" charset="0"/>
-                <a:cs typeface="Consolas" pitchFamily="49" charset="0"/>
-              </a:rPr>
-              <a:t>8, because x </a:t>
-            </a:r>
-            <a:r>
-              <a:rPr lang="en-US" sz="1600" dirty="0" smtClean="0">
-                <a:solidFill>
-                  <a:schemeClr val="accent5">
-                    <a:lumMod val="75000"/>
-                  </a:schemeClr>
-                </a:solidFill>
-                <a:latin typeface="Consolas" pitchFamily="49" charset="0"/>
-                <a:cs typeface="Consolas" pitchFamily="49" charset="0"/>
-              </a:rPr>
-              <a:t>was bound </a:t>
-            </a:r>
-            <a:r>
-              <a:rPr lang="en-US" sz="1600" dirty="0" smtClean="0">
-                <a:solidFill>
-                  <a:schemeClr val="accent5">
-                    <a:lumMod val="75000"/>
-                  </a:schemeClr>
-                </a:solidFill>
-                <a:latin typeface="Consolas" pitchFamily="49" charset="0"/>
-                <a:cs typeface="Consolas" pitchFamily="49" charset="0"/>
-              </a:rPr>
-              <a:t>to </a:t>
-            </a:r>
-            <a:r>
-              <a:rPr lang="en-US" sz="1600" dirty="0" smtClean="0">
-                <a:solidFill>
-                  <a:schemeClr val="accent5">
-                    <a:lumMod val="75000"/>
-                  </a:schemeClr>
-                </a:solidFill>
-                <a:latin typeface="Consolas" pitchFamily="49" charset="0"/>
-                <a:cs typeface="Consolas" pitchFamily="49" charset="0"/>
-              </a:rPr>
-              <a:t>5</a:t>
+              <a:t>// 8, because x was bound to 5</a:t>
             </a:r>
           </a:p>
           <a:p>
@@ -11224,11 +10844,7 @@
           <a:p>
             <a:r>
               <a:rPr lang="en-US" dirty="0" smtClean="0"/>
-              <a:t>List </a:t>
-            </a:r>
-            <a:r>
-              <a:rPr lang="en-US" dirty="0" smtClean="0"/>
-              <a:t>Comprehensions</a:t>
+              <a:t>List Comprehensions</a:t>
             </a:r>
             <a:endParaRPr lang="en-US" dirty="0"/>
           </a:p>
@@ -11449,15 +11065,7 @@
           <a:p>
             <a:r>
               <a:rPr lang="en-US" dirty="0" smtClean="0"/>
-              <a:t>Filter </a:t>
-            </a:r>
-            <a:r>
-              <a:rPr lang="en-US" dirty="0" smtClean="0"/>
-              <a:t>selects items </a:t>
-            </a:r>
-            <a:r>
-              <a:rPr lang="en-US" dirty="0" smtClean="0"/>
-              <a:t>by a predicate function</a:t>
+              <a:t>Filter selects items by a predicate function</a:t>
             </a:r>
             <a:endParaRPr lang="en-US" dirty="0">
               <a:solidFill>
@@ -12258,15 +11866,7 @@
           <a:p>
             <a:r>
               <a:rPr lang="en-US" dirty="0" smtClean="0"/>
-              <a:t>Reduces a list </a:t>
-            </a:r>
-            <a:r>
-              <a:rPr lang="en-US" dirty="0" smtClean="0"/>
-              <a:t>to </a:t>
-            </a:r>
-            <a:r>
-              <a:rPr lang="en-US" dirty="0" smtClean="0"/>
-              <a:t>a single item</a:t>
+              <a:t>Reduces a list to a single item</a:t>
             </a:r>
           </a:p>
           <a:p>
@@ -12926,11 +12526,7 @@
           <a:p>
             <a:r>
               <a:rPr lang="en-US" dirty="0" smtClean="0"/>
-              <a:t>Many </a:t>
-            </a:r>
-            <a:r>
-              <a:rPr lang="en-US" dirty="0" smtClean="0"/>
-              <a:t>others</a:t>
+              <a:t>Many others</a:t>
             </a:r>
             <a:endParaRPr lang="en-US" dirty="0"/>
           </a:p>
@@ -13133,25 +12729,8 @@
                   </a:schemeClr>
                 </a:solidFill>
               </a:rPr>
-              <a:t>FP Big Idea ™:   </a:t>
-            </a:r>
-            <a:r>
-              <a:rPr lang="en-US" b="1" i="1" dirty="0" smtClean="0">
-                <a:solidFill>
-                  <a:schemeClr val="accent3">
-                    <a:lumMod val="50000"/>
-                  </a:schemeClr>
-                </a:solidFill>
-              </a:rPr>
-              <a:t>Expressing what we want, not the steps to do it</a:t>
-            </a:r>
-            <a:endParaRPr lang="en-US" b="1" i="1" dirty="0" smtClean="0">
-              <a:solidFill>
-                <a:schemeClr val="accent3">
-                  <a:lumMod val="50000"/>
-                </a:schemeClr>
-              </a:solidFill>
-            </a:endParaRPr>
+              <a:t>FP Big Idea ™:   Expressing what we want, not the steps to do it</a:t>
+            </a:r>
           </a:p>
         </p:txBody>
       </p:sp>
@@ -13508,11 +13087,7 @@
           <a:p>
             <a:r>
               <a:rPr lang="en-US" dirty="0" smtClean="0"/>
-              <a:t>Can dramatically simplify </a:t>
-            </a:r>
-            <a:r>
-              <a:rPr lang="en-US" dirty="0" smtClean="0"/>
-              <a:t>code</a:t>
+              <a:t>Can dramatically simplify code</a:t>
             </a:r>
             <a:endParaRPr lang="en-US" b="1" dirty="0">
               <a:solidFill>
@@ -13605,11 +13180,7 @@
           <a:p>
             <a:r>
               <a:rPr lang="en-US" dirty="0" smtClean="0"/>
-              <a:t>In simple case, similar </a:t>
-            </a:r>
-            <a:r>
-              <a:rPr lang="en-US" dirty="0" smtClean="0"/>
-              <a:t>to </a:t>
+              <a:t>In simple case, similar to </a:t>
             </a:r>
             <a:r>
               <a:rPr lang="en-US" b="1" dirty="0" smtClean="0"/>
@@ -14747,15 +14318,7 @@
           <a:p>
             <a:r>
               <a:rPr lang="en-US" dirty="0" smtClean="0"/>
-              <a:t>More </a:t>
-            </a:r>
-            <a:r>
-              <a:rPr lang="en-US" dirty="0" smtClean="0"/>
-              <a:t>powerful </a:t>
-            </a:r>
-            <a:r>
-              <a:rPr lang="en-US" dirty="0" smtClean="0"/>
-              <a:t>with immutable types (</a:t>
+              <a:t>More powerful with immutable types (</a:t>
             </a:r>
             <a:r>
               <a:rPr lang="en-US" dirty="0" err="1" smtClean="0"/>
@@ -15400,45 +14963,12 @@
           <a:p>
             <a:r>
               <a:rPr lang="en-US" dirty="0" smtClean="0"/>
-              <a:t>Pattern Matching, cont.</a:t>
-            </a:r>
-            <a:endParaRPr lang="en-US" dirty="0"/>
-          </a:p>
-        </p:txBody>
-      </p:sp>
-      <p:sp>
-        <p:nvSpPr>
-          <p:cNvPr id="3" name="Content Placeholder 2"/>
-          <p:cNvSpPr>
-            <a:spLocks noGrp="1"/>
-          </p:cNvSpPr>
-          <p:nvPr>
-            <p:ph idx="1"/>
-          </p:nvPr>
-        </p:nvSpPr>
-        <p:spPr>
-          <a:xfrm>
-            <a:off x="457200" y="1600200"/>
-            <a:ext cx="7620000" cy="609600"/>
-          </a:xfrm>
-        </p:spPr>
-        <p:txBody>
-          <a:bodyPr/>
-          <a:lstStyle/>
-          <a:p>
-            <a:pPr marL="114300" indent="0">
-              <a:buNone/>
-            </a:pPr>
-            <a:r>
-              <a:rPr lang="en-US" dirty="0" smtClean="0"/>
-              <a:t>Kinds of patterns</a:t>
-            </a:r>
-          </a:p>
-          <a:p>
-            <a:endParaRPr lang="en-US" dirty="0" smtClean="0"/>
-          </a:p>
-          <a:p>
-            <a:pPr lvl="1"/>
+              <a:t>Pattern </a:t>
+            </a:r>
+            <a:r>
+              <a:rPr lang="en-US" dirty="0" smtClean="0"/>
+              <a:t>Matching Examples</a:t>
+            </a:r>
             <a:endParaRPr lang="en-US" dirty="0"/>
           </a:p>
         </p:txBody>
@@ -15452,14 +14982,14 @@
           <p:nvPr>
             <p:extLst>
               <p:ext uri="{D42A27DB-BD31-4B8C-83A1-F6EECF244321}">
-                <p14:modId xmlns:p14="http://schemas.microsoft.com/office/powerpoint/2010/main" val="1251527128"/>
+                <p14:modId xmlns:p14="http://schemas.microsoft.com/office/powerpoint/2010/main" val="3789506341"/>
               </p:ext>
             </p:extLst>
           </p:nvPr>
         </p:nvGraphicFramePr>
         <p:xfrm>
-          <a:off x="685800" y="2286000"/>
-          <a:ext cx="7086600" cy="4114800"/>
+          <a:off x="685800" y="1524000"/>
+          <a:ext cx="7086600" cy="4754880"/>
         </p:xfrm>
         <a:graphic>
           <a:graphicData uri="http://schemas.openxmlformats.org/drawingml/2006/table">
@@ -15793,6 +15323,52 @@
                   <a:tcPr/>
                 </a:tc>
               </a:tr>
+              <a:tr h="605683">
+                <a:tc>
+                  <a:txBody>
+                    <a:bodyPr/>
+                    <a:lstStyle/>
+                    <a:p>
+                      <a:r>
+                        <a:rPr lang="en-US" dirty="0" smtClean="0"/>
+                        <a:t>By structural types</a:t>
+                      </a:r>
+                      <a:endParaRPr lang="en-US" dirty="0"/>
+                    </a:p>
+                  </a:txBody>
+                  <a:tcPr/>
+                </a:tc>
+                <a:tc>
+                  <a:txBody>
+                    <a:bodyPr/>
+                    <a:lstStyle/>
+                    <a:p>
+                      <a:r>
+                        <a:rPr lang="en-US" dirty="0" smtClean="0"/>
+                        <a:t>case c: {</a:t>
+                      </a:r>
+                      <a:r>
+                        <a:rPr lang="en-US" dirty="0" err="1" smtClean="0"/>
+                        <a:t>def</a:t>
+                      </a:r>
+                      <a:r>
+                        <a:rPr lang="en-US" dirty="0" smtClean="0"/>
+                        <a:t> quack: String} =&gt; </a:t>
+                      </a:r>
+                      <a:r>
+                        <a:rPr lang="en-US" dirty="0" err="1" smtClean="0"/>
+                        <a:t>c.quack</a:t>
+                      </a:r>
+                      <a:r>
+                        <a:rPr lang="en-US" dirty="0" smtClean="0"/>
+                        <a:t>()</a:t>
+                      </a:r>
+                      <a:endParaRPr lang="en-US" dirty="0"/>
+                    </a:p>
+                  </a:txBody>
+                  <a:tcPr/>
+                </a:tc>
+              </a:tr>
               <a:tr h="350912">
                 <a:tc>
                   <a:txBody>
@@ -16879,11 +16455,7 @@
           <a:p>
             <a:r>
               <a:rPr lang="en-US" dirty="0" smtClean="0"/>
-              <a:t>Allows </a:t>
-            </a:r>
-            <a:r>
-              <a:rPr lang="en-US" dirty="0" smtClean="0"/>
-              <a:t>us to think about </a:t>
+              <a:t>Allows us to think about </a:t>
             </a:r>
             <a:r>
               <a:rPr lang="en-US" i="1" dirty="0" smtClean="0"/>
@@ -16897,11 +16469,7 @@
           <a:p>
             <a:r>
               <a:rPr lang="en-US" dirty="0" smtClean="0"/>
-              <a:t>Gives </a:t>
-            </a:r>
-            <a:r>
-              <a:rPr lang="en-US" dirty="0" smtClean="0"/>
-              <a:t>us a way to write programs composed of subprograms</a:t>
+              <a:t>Gives us a way to write programs composed of subprograms</a:t>
             </a:r>
           </a:p>
           <a:p>
@@ -17522,15 +17090,7 @@
           <a:p>
             <a:r>
               <a:rPr lang="en-US" dirty="0" smtClean="0"/>
-              <a:t>List comprehensions </a:t>
-            </a:r>
-            <a:r>
-              <a:rPr lang="en-US" dirty="0" smtClean="0"/>
-              <a:t>/ operations supported </a:t>
-            </a:r>
-            <a:r>
-              <a:rPr lang="en-US" dirty="0" smtClean="0"/>
-              <a:t>via </a:t>
+              <a:t>List comprehensions / operations supported via </a:t>
             </a:r>
             <a:r>
               <a:rPr lang="en-US" i="1" dirty="0" smtClean="0"/>
@@ -17960,68 +17520,22 @@
           <a:p>
             <a:r>
               <a:rPr lang="en-US" dirty="0" smtClean="0"/>
-              <a:t>Most popular programming languages </a:t>
-            </a:r>
-            <a:r>
-              <a:rPr lang="en-US" dirty="0" smtClean="0"/>
-              <a:t>are loose representations of </a:t>
-            </a:r>
-            <a:r>
-              <a:rPr lang="en-US" dirty="0" smtClean="0"/>
-              <a:t>the </a:t>
-            </a:r>
-            <a:r>
-              <a:rPr lang="en-US" dirty="0" smtClean="0"/>
-              <a:t>computer </a:t>
-            </a:r>
-            <a:r>
-              <a:rPr lang="en-US" dirty="0" smtClean="0"/>
-              <a:t>architecture</a:t>
+              <a:t>Most popular programming languages are loose representations of the computer architecture</a:t>
             </a:r>
           </a:p>
           <a:p>
             <a:pPr lvl="1"/>
             <a:r>
               <a:rPr lang="en-US" dirty="0" smtClean="0"/>
-              <a:t>Includes </a:t>
-            </a:r>
-            <a:r>
-              <a:rPr lang="en-US" dirty="0" smtClean="0"/>
-              <a:t>imperative </a:t>
-            </a:r>
-            <a:r>
-              <a:rPr lang="en-US" dirty="0" smtClean="0"/>
-              <a:t>languages such as C, C++, Java, </a:t>
-            </a:r>
-            <a:r>
-              <a:rPr lang="en-US" dirty="0" smtClean="0"/>
-              <a:t>etc.</a:t>
-            </a:r>
-            <a:endParaRPr lang="en-US" dirty="0" smtClean="0"/>
+              <a:t>Includes imperative languages such as C, C++, Java, etc.</a:t>
+            </a:r>
           </a:p>
           <a:p>
             <a:pPr lvl="1"/>
             <a:r>
               <a:rPr lang="en-US" dirty="0" smtClean="0"/>
-              <a:t>Building </a:t>
-            </a:r>
-            <a:r>
-              <a:rPr lang="en-US" dirty="0" smtClean="0"/>
-              <a:t>blocks represent </a:t>
-            </a:r>
-            <a:r>
-              <a:rPr lang="en-US" dirty="0" smtClean="0"/>
-              <a:t>CPU </a:t>
-            </a:r>
-            <a:r>
-              <a:rPr lang="en-US" dirty="0" smtClean="0"/>
-              <a:t>and </a:t>
-            </a:r>
-            <a:r>
-              <a:rPr lang="en-US" dirty="0" smtClean="0"/>
-              <a:t>memory activities</a:t>
-            </a:r>
-            <a:endParaRPr lang="en-US" dirty="0" smtClean="0"/>
+              <a:t>Building blocks represent CPU and memory activities</a:t>
+            </a:r>
           </a:p>
           <a:p>
             <a:pPr lvl="2"/>
@@ -18248,11 +17762,7 @@
                     <a:p>
                       <a:r>
                         <a:rPr lang="en-US" dirty="0" smtClean="0"/>
-                        <a:t>fetching and </a:t>
-                      </a:r>
-                      <a:r>
-                        <a:rPr lang="en-US" dirty="0" smtClean="0"/>
-                        <a:t>arithmetic instructions</a:t>
+                        <a:t>fetching and arithmetic instructions</a:t>
                       </a:r>
                       <a:endParaRPr lang="en-US" dirty="0"/>
                     </a:p>
@@ -19622,11 +19132,7 @@
           <a:p>
             <a:r>
               <a:rPr lang="en-US" dirty="0" smtClean="0"/>
-              <a:t>Great</a:t>
-            </a:r>
-            <a:r>
-              <a:rPr lang="en-US" dirty="0" smtClean="0"/>
-              <a:t>, free online IDE:   </a:t>
+              <a:t>Great, free online IDE:   </a:t>
             </a:r>
             <a:r>
               <a:rPr lang="en-US" dirty="0" smtClean="0">
@@ -19765,11 +19271,7 @@
           <a:p>
             <a:r>
               <a:rPr lang="en-US" dirty="0" smtClean="0"/>
-              <a:t>Non-Von </a:t>
-            </a:r>
-            <a:r>
-              <a:rPr lang="en-US" dirty="0" smtClean="0"/>
-              <a:t>Neumann computer architectures</a:t>
+              <a:t>Non-Von Neumann computer architectures</a:t>
             </a:r>
           </a:p>
           <a:p>
@@ -19901,11 +19403,7 @@
             </a:pPr>
             <a:r>
               <a:rPr lang="en-US" sz="1600" dirty="0" smtClean="0"/>
-              <a:t>“Functional Thinking” series by Neal </a:t>
-            </a:r>
-            <a:r>
-              <a:rPr lang="en-US" sz="1600" dirty="0" smtClean="0"/>
-              <a:t>Ford</a:t>
+              <a:t>“Functional Thinking” series by Neal Ford</a:t>
             </a:r>
           </a:p>
           <a:p>
@@ -19951,11 +19449,7 @@
             </a:pPr>
             <a:r>
               <a:rPr lang="en-US" sz="1600" dirty="0" smtClean="0"/>
-              <a:t>Learn You a Haskell for Great Good</a:t>
-            </a:r>
-            <a:r>
-              <a:rPr lang="en-US" sz="1600" dirty="0" smtClean="0"/>
-              <a:t>! (</a:t>
+              <a:t>Learn You a Haskell for Great Good! (</a:t>
             </a:r>
             <a:r>
               <a:rPr lang="en-US" sz="1600" dirty="0" err="1"/>
@@ -19973,7 +19467,6 @@
               <a:rPr lang="en-US" sz="1600" dirty="0" smtClean="0"/>
               <a:t>)</a:t>
             </a:r>
-            <a:endParaRPr lang="en-US" sz="1600" dirty="0" smtClean="0"/>
           </a:p>
           <a:p>
             <a:pPr lvl="1"/>
@@ -19992,15 +19485,7 @@
             </a:pPr>
             <a:r>
               <a:rPr lang="en-US" sz="1600" dirty="0" smtClean="0"/>
-              <a:t>Java 8 Lambda </a:t>
-            </a:r>
-            <a:r>
-              <a:rPr lang="en-US" sz="1600" dirty="0" smtClean="0"/>
-              <a:t>FAQ </a:t>
-            </a:r>
-            <a:r>
-              <a:rPr lang="en-US" sz="1600" dirty="0" smtClean="0"/>
-              <a:t>(</a:t>
+              <a:t>Java 8 Lambda FAQ (</a:t>
             </a:r>
             <a:r>
               <a:rPr lang="en-US" sz="1600" dirty="0" err="1" smtClean="0"/>
@@ -20018,7 +19503,6 @@
               <a:rPr lang="en-US" sz="1600" dirty="0" smtClean="0"/>
               <a:t>)</a:t>
             </a:r>
-            <a:endParaRPr lang="en-US" sz="1600" dirty="0" smtClean="0"/>
           </a:p>
           <a:p>
             <a:pPr lvl="1"/>
@@ -20234,19 +19718,7 @@
           <a:p>
             <a:r>
               <a:rPr lang="en-US" dirty="0" smtClean="0"/>
-              <a:t>So </a:t>
-            </a:r>
-            <a:r>
-              <a:rPr lang="en-US" dirty="0" smtClean="0"/>
-              <a:t>designated </a:t>
-            </a:r>
-            <a:r>
-              <a:rPr lang="en-US" dirty="0" smtClean="0"/>
-              <a:t>in 1977 </a:t>
-            </a:r>
-            <a:r>
-              <a:rPr lang="en-US" dirty="0" smtClean="0"/>
-              <a:t>Turing-award paper: </a:t>
+              <a:t>So designated in 1977 Turing-award paper: </a:t>
             </a:r>
             <a:r>
               <a:rPr lang="en-US" i="1" dirty="0"/>
@@ -20603,7 +20075,6 @@
               <a:rPr lang="en-US" dirty="0" smtClean="0"/>
               <a:t>program simplification/reduction</a:t>
             </a:r>
-            <a:endParaRPr lang="en-US" dirty="0" smtClean="0"/>
           </a:p>
         </p:txBody>
       </p:sp>

</xml_diff>

<commit_message>
Brian: Added java OrderProcessor code.
</commit_message>
<xml_diff>
--- a/FoundationsOfFunctionalProgramming.pptx
+++ b/FoundationsOfFunctionalProgramming.pptx
@@ -3335,6 +3335,13 @@
   <p:clrMapOvr>
     <a:masterClrMapping/>
   </p:clrMapOvr>
+  <p:timing>
+    <p:tnLst>
+      <p:par>
+        <p:cTn id="1" dur="indefinite" restart="never" nodeType="tmRoot"/>
+      </p:par>
+    </p:tnLst>
+  </p:timing>
 </p:sld>
 </file>
 
@@ -3604,11 +3611,7 @@
           <a:p>
             <a:r>
               <a:rPr lang="en-US" dirty="0" smtClean="0"/>
-              <a:t>Or, you can simply leverage certain features as </a:t>
-            </a:r>
-            <a:r>
-              <a:rPr lang="en-US" dirty="0" smtClean="0"/>
-              <a:t>beneficial</a:t>
+              <a:t>Or, you can simply leverage certain features as beneficial</a:t>
             </a:r>
           </a:p>
           <a:p>
@@ -3828,11 +3831,7 @@
             </a:pPr>
             <a:r>
               <a:rPr lang="en-US" dirty="0" smtClean="0"/>
-              <a:t>Expressions</a:t>
-            </a:r>
-            <a:r>
-              <a:rPr lang="en-US" dirty="0" smtClean="0"/>
-              <a:t>:</a:t>
+              <a:t>Expressions:</a:t>
             </a:r>
           </a:p>
           <a:p>
@@ -6673,11 +6672,7 @@
           <a:p>
             <a:r>
               <a:rPr lang="en-US" dirty="0" smtClean="0"/>
-              <a:t>Pragmatic ideas for introducing </a:t>
-            </a:r>
-            <a:r>
-              <a:rPr lang="en-US" dirty="0" smtClean="0"/>
-              <a:t>FP</a:t>
+              <a:t>Pragmatic ideas for introducing FP</a:t>
             </a:r>
           </a:p>
           <a:p>
@@ -7299,6 +7294,398 @@
   <p:clrMapOvr>
     <a:masterClrMapping/>
   </p:clrMapOvr>
+  <p:timing>
+    <p:tnLst>
+      <p:par>
+        <p:cTn id="1" dur="indefinite" restart="never" nodeType="tmRoot">
+          <p:childTnLst>
+            <p:seq concurrent="1" nextAc="seek">
+              <p:cTn id="2" dur="indefinite" nodeType="mainSeq">
+                <p:childTnLst>
+                  <p:par>
+                    <p:cTn id="3" fill="hold">
+                      <p:stCondLst>
+                        <p:cond delay="indefinite"/>
+                      </p:stCondLst>
+                      <p:childTnLst>
+                        <p:par>
+                          <p:cTn id="4" fill="hold">
+                            <p:stCondLst>
+                              <p:cond delay="0"/>
+                            </p:stCondLst>
+                            <p:childTnLst>
+                              <p:par>
+                                <p:cTn id="5" presetID="10" presetClass="entr" presetSubtype="0" fill="hold" grpId="0" nodeType="clickEffect">
+                                  <p:stCondLst>
+                                    <p:cond delay="0"/>
+                                  </p:stCondLst>
+                                  <p:childTnLst>
+                                    <p:set>
+                                      <p:cBhvr>
+                                        <p:cTn id="6" dur="1" fill="hold">
+                                          <p:stCondLst>
+                                            <p:cond delay="0"/>
+                                          </p:stCondLst>
+                                        </p:cTn>
+                                        <p:tgtEl>
+                                          <p:spTgt spid="3">
+                                            <p:txEl>
+                                              <p:pRg st="0" end="0"/>
+                                            </p:txEl>
+                                          </p:spTgt>
+                                        </p:tgtEl>
+                                        <p:attrNameLst>
+                                          <p:attrName>style.visibility</p:attrName>
+                                        </p:attrNameLst>
+                                      </p:cBhvr>
+                                      <p:to>
+                                        <p:strVal val="visible"/>
+                                      </p:to>
+                                    </p:set>
+                                    <p:animEffect transition="in" filter="fade">
+                                      <p:cBhvr>
+                                        <p:cTn id="7" dur="500"/>
+                                        <p:tgtEl>
+                                          <p:spTgt spid="3">
+                                            <p:txEl>
+                                              <p:pRg st="0" end="0"/>
+                                            </p:txEl>
+                                          </p:spTgt>
+                                        </p:tgtEl>
+                                      </p:cBhvr>
+                                    </p:animEffect>
+                                  </p:childTnLst>
+                                </p:cTn>
+                              </p:par>
+                            </p:childTnLst>
+                          </p:cTn>
+                        </p:par>
+                      </p:childTnLst>
+                    </p:cTn>
+                  </p:par>
+                  <p:par>
+                    <p:cTn id="8" fill="hold">
+                      <p:stCondLst>
+                        <p:cond delay="indefinite"/>
+                      </p:stCondLst>
+                      <p:childTnLst>
+                        <p:par>
+                          <p:cTn id="9" fill="hold">
+                            <p:stCondLst>
+                              <p:cond delay="0"/>
+                            </p:stCondLst>
+                            <p:childTnLst>
+                              <p:par>
+                                <p:cTn id="10" presetID="10" presetClass="entr" presetSubtype="0" fill="hold" grpId="0" nodeType="clickEffect">
+                                  <p:stCondLst>
+                                    <p:cond delay="0"/>
+                                  </p:stCondLst>
+                                  <p:childTnLst>
+                                    <p:set>
+                                      <p:cBhvr>
+                                        <p:cTn id="11" dur="1" fill="hold">
+                                          <p:stCondLst>
+                                            <p:cond delay="0"/>
+                                          </p:stCondLst>
+                                        </p:cTn>
+                                        <p:tgtEl>
+                                          <p:spTgt spid="3">
+                                            <p:txEl>
+                                              <p:pRg st="1" end="1"/>
+                                            </p:txEl>
+                                          </p:spTgt>
+                                        </p:tgtEl>
+                                        <p:attrNameLst>
+                                          <p:attrName>style.visibility</p:attrName>
+                                        </p:attrNameLst>
+                                      </p:cBhvr>
+                                      <p:to>
+                                        <p:strVal val="visible"/>
+                                      </p:to>
+                                    </p:set>
+                                    <p:animEffect transition="in" filter="fade">
+                                      <p:cBhvr>
+                                        <p:cTn id="12" dur="500"/>
+                                        <p:tgtEl>
+                                          <p:spTgt spid="3">
+                                            <p:txEl>
+                                              <p:pRg st="1" end="1"/>
+                                            </p:txEl>
+                                          </p:spTgt>
+                                        </p:tgtEl>
+                                      </p:cBhvr>
+                                    </p:animEffect>
+                                  </p:childTnLst>
+                                </p:cTn>
+                              </p:par>
+                            </p:childTnLst>
+                          </p:cTn>
+                        </p:par>
+                      </p:childTnLst>
+                    </p:cTn>
+                  </p:par>
+                  <p:par>
+                    <p:cTn id="13" fill="hold">
+                      <p:stCondLst>
+                        <p:cond delay="indefinite"/>
+                      </p:stCondLst>
+                      <p:childTnLst>
+                        <p:par>
+                          <p:cTn id="14" fill="hold">
+                            <p:stCondLst>
+                              <p:cond delay="0"/>
+                            </p:stCondLst>
+                            <p:childTnLst>
+                              <p:par>
+                                <p:cTn id="15" presetID="10" presetClass="entr" presetSubtype="0" fill="hold" grpId="0" nodeType="clickEffect">
+                                  <p:stCondLst>
+                                    <p:cond delay="0"/>
+                                  </p:stCondLst>
+                                  <p:childTnLst>
+                                    <p:set>
+                                      <p:cBhvr>
+                                        <p:cTn id="16" dur="1" fill="hold">
+                                          <p:stCondLst>
+                                            <p:cond delay="0"/>
+                                          </p:stCondLst>
+                                        </p:cTn>
+                                        <p:tgtEl>
+                                          <p:spTgt spid="3">
+                                            <p:txEl>
+                                              <p:pRg st="2" end="2"/>
+                                            </p:txEl>
+                                          </p:spTgt>
+                                        </p:tgtEl>
+                                        <p:attrNameLst>
+                                          <p:attrName>style.visibility</p:attrName>
+                                        </p:attrNameLst>
+                                      </p:cBhvr>
+                                      <p:to>
+                                        <p:strVal val="visible"/>
+                                      </p:to>
+                                    </p:set>
+                                    <p:animEffect transition="in" filter="fade">
+                                      <p:cBhvr>
+                                        <p:cTn id="17" dur="500"/>
+                                        <p:tgtEl>
+                                          <p:spTgt spid="3">
+                                            <p:txEl>
+                                              <p:pRg st="2" end="2"/>
+                                            </p:txEl>
+                                          </p:spTgt>
+                                        </p:tgtEl>
+                                      </p:cBhvr>
+                                    </p:animEffect>
+                                  </p:childTnLst>
+                                </p:cTn>
+                              </p:par>
+                            </p:childTnLst>
+                          </p:cTn>
+                        </p:par>
+                      </p:childTnLst>
+                    </p:cTn>
+                  </p:par>
+                  <p:par>
+                    <p:cTn id="18" fill="hold">
+                      <p:stCondLst>
+                        <p:cond delay="indefinite"/>
+                      </p:stCondLst>
+                      <p:childTnLst>
+                        <p:par>
+                          <p:cTn id="19" fill="hold">
+                            <p:stCondLst>
+                              <p:cond delay="0"/>
+                            </p:stCondLst>
+                            <p:childTnLst>
+                              <p:par>
+                                <p:cTn id="20" presetID="10" presetClass="entr" presetSubtype="0" fill="hold" grpId="0" nodeType="clickEffect">
+                                  <p:stCondLst>
+                                    <p:cond delay="0"/>
+                                  </p:stCondLst>
+                                  <p:childTnLst>
+                                    <p:set>
+                                      <p:cBhvr>
+                                        <p:cTn id="21" dur="1" fill="hold">
+                                          <p:stCondLst>
+                                            <p:cond delay="0"/>
+                                          </p:stCondLst>
+                                        </p:cTn>
+                                        <p:tgtEl>
+                                          <p:spTgt spid="3">
+                                            <p:txEl>
+                                              <p:pRg st="3" end="3"/>
+                                            </p:txEl>
+                                          </p:spTgt>
+                                        </p:tgtEl>
+                                        <p:attrNameLst>
+                                          <p:attrName>style.visibility</p:attrName>
+                                        </p:attrNameLst>
+                                      </p:cBhvr>
+                                      <p:to>
+                                        <p:strVal val="visible"/>
+                                      </p:to>
+                                    </p:set>
+                                    <p:animEffect transition="in" filter="fade">
+                                      <p:cBhvr>
+                                        <p:cTn id="22" dur="500"/>
+                                        <p:tgtEl>
+                                          <p:spTgt spid="3">
+                                            <p:txEl>
+                                              <p:pRg st="3" end="3"/>
+                                            </p:txEl>
+                                          </p:spTgt>
+                                        </p:tgtEl>
+                                      </p:cBhvr>
+                                    </p:animEffect>
+                                  </p:childTnLst>
+                                </p:cTn>
+                              </p:par>
+                            </p:childTnLst>
+                          </p:cTn>
+                        </p:par>
+                      </p:childTnLst>
+                    </p:cTn>
+                  </p:par>
+                  <p:par>
+                    <p:cTn id="23" fill="hold">
+                      <p:stCondLst>
+                        <p:cond delay="indefinite"/>
+                      </p:stCondLst>
+                      <p:childTnLst>
+                        <p:par>
+                          <p:cTn id="24" fill="hold">
+                            <p:stCondLst>
+                              <p:cond delay="0"/>
+                            </p:stCondLst>
+                            <p:childTnLst>
+                              <p:par>
+                                <p:cTn id="25" presetID="10" presetClass="entr" presetSubtype="0" fill="hold" grpId="0" nodeType="clickEffect">
+                                  <p:stCondLst>
+                                    <p:cond delay="0"/>
+                                  </p:stCondLst>
+                                  <p:childTnLst>
+                                    <p:set>
+                                      <p:cBhvr>
+                                        <p:cTn id="26" dur="1" fill="hold">
+                                          <p:stCondLst>
+                                            <p:cond delay="0"/>
+                                          </p:stCondLst>
+                                        </p:cTn>
+                                        <p:tgtEl>
+                                          <p:spTgt spid="3">
+                                            <p:txEl>
+                                              <p:pRg st="4" end="4"/>
+                                            </p:txEl>
+                                          </p:spTgt>
+                                        </p:tgtEl>
+                                        <p:attrNameLst>
+                                          <p:attrName>style.visibility</p:attrName>
+                                        </p:attrNameLst>
+                                      </p:cBhvr>
+                                      <p:to>
+                                        <p:strVal val="visible"/>
+                                      </p:to>
+                                    </p:set>
+                                    <p:animEffect transition="in" filter="fade">
+                                      <p:cBhvr>
+                                        <p:cTn id="27" dur="500"/>
+                                        <p:tgtEl>
+                                          <p:spTgt spid="3">
+                                            <p:txEl>
+                                              <p:pRg st="4" end="4"/>
+                                            </p:txEl>
+                                          </p:spTgt>
+                                        </p:tgtEl>
+                                      </p:cBhvr>
+                                    </p:animEffect>
+                                  </p:childTnLst>
+                                </p:cTn>
+                              </p:par>
+                            </p:childTnLst>
+                          </p:cTn>
+                        </p:par>
+                      </p:childTnLst>
+                    </p:cTn>
+                  </p:par>
+                  <p:par>
+                    <p:cTn id="28" fill="hold">
+                      <p:stCondLst>
+                        <p:cond delay="indefinite"/>
+                      </p:stCondLst>
+                      <p:childTnLst>
+                        <p:par>
+                          <p:cTn id="29" fill="hold">
+                            <p:stCondLst>
+                              <p:cond delay="0"/>
+                            </p:stCondLst>
+                            <p:childTnLst>
+                              <p:par>
+                                <p:cTn id="30" presetID="10" presetClass="entr" presetSubtype="0" fill="hold" grpId="0" nodeType="clickEffect">
+                                  <p:stCondLst>
+                                    <p:cond delay="0"/>
+                                  </p:stCondLst>
+                                  <p:childTnLst>
+                                    <p:set>
+                                      <p:cBhvr>
+                                        <p:cTn id="31" dur="1" fill="hold">
+                                          <p:stCondLst>
+                                            <p:cond delay="0"/>
+                                          </p:stCondLst>
+                                        </p:cTn>
+                                        <p:tgtEl>
+                                          <p:spTgt spid="6"/>
+                                        </p:tgtEl>
+                                        <p:attrNameLst>
+                                          <p:attrName>style.visibility</p:attrName>
+                                        </p:attrNameLst>
+                                      </p:cBhvr>
+                                      <p:to>
+                                        <p:strVal val="visible"/>
+                                      </p:to>
+                                    </p:set>
+                                    <p:animEffect transition="in" filter="fade">
+                                      <p:cBhvr>
+                                        <p:cTn id="32" dur="500"/>
+                                        <p:tgtEl>
+                                          <p:spTgt spid="6"/>
+                                        </p:tgtEl>
+                                      </p:cBhvr>
+                                    </p:animEffect>
+                                  </p:childTnLst>
+                                </p:cTn>
+                              </p:par>
+                            </p:childTnLst>
+                          </p:cTn>
+                        </p:par>
+                      </p:childTnLst>
+                    </p:cTn>
+                  </p:par>
+                </p:childTnLst>
+              </p:cTn>
+              <p:prevCondLst>
+                <p:cond evt="onPrev" delay="0">
+                  <p:tgtEl>
+                    <p:sldTgt/>
+                  </p:tgtEl>
+                </p:cond>
+              </p:prevCondLst>
+              <p:nextCondLst>
+                <p:cond evt="onNext" delay="0">
+                  <p:tgtEl>
+                    <p:sldTgt/>
+                  </p:tgtEl>
+                </p:cond>
+              </p:nextCondLst>
+            </p:seq>
+          </p:childTnLst>
+        </p:cTn>
+      </p:par>
+    </p:tnLst>
+    <p:bldLst>
+      <p:bldP spid="3" grpId="0" build="p"/>
+      <p:bldP spid="6" grpId="0"/>
+    </p:bldLst>
+  </p:timing>
 </p:sld>
 </file>
 
@@ -7979,11 +8366,7 @@
           <a:p>
             <a:r>
               <a:rPr lang="en-US" dirty="0" smtClean="0"/>
-              <a:t>Can </a:t>
-            </a:r>
-            <a:r>
-              <a:rPr lang="en-US" dirty="0" smtClean="0"/>
-              <a:t>be passed as parameters</a:t>
+              <a:t>Can be passed as parameters</a:t>
             </a:r>
           </a:p>
           <a:p>
@@ -9372,11 +9755,7 @@
           <a:p>
             <a:r>
               <a:rPr lang="en-US" dirty="0" smtClean="0"/>
-              <a:t>Valuable </a:t>
-            </a:r>
-            <a:r>
-              <a:rPr lang="en-US" dirty="0" smtClean="0"/>
-              <a:t>in processing collections (as we will see…)</a:t>
+              <a:t>Valuable in processing collections (as we will see…)</a:t>
             </a:r>
           </a:p>
           <a:p>
@@ -9873,19 +10252,7 @@
                 <a:latin typeface="Consolas" pitchFamily="49" charset="0"/>
                 <a:cs typeface="Consolas" pitchFamily="49" charset="0"/>
               </a:rPr>
-              <a:t>// </a:t>
-            </a:r>
-            <a:r>
-              <a:rPr lang="en-US" sz="1600" dirty="0" smtClean="0">
-                <a:solidFill>
-                  <a:schemeClr val="accent5">
-                    <a:lumMod val="75000"/>
-                  </a:schemeClr>
-                </a:solidFill>
-                <a:latin typeface="Consolas" pitchFamily="49" charset="0"/>
-                <a:cs typeface="Consolas" pitchFamily="49" charset="0"/>
-              </a:rPr>
-              <a:t>Alternate syntax</a:t>
+              <a:t>// Alternate syntax</a:t>
             </a:r>
             <a:endParaRPr lang="en-US" sz="1600" dirty="0">
               <a:solidFill>
@@ -10089,29 +10456,8 @@
                 <a:latin typeface="Consolas" pitchFamily="49" charset="0"/>
                 <a:cs typeface="Consolas" pitchFamily="49" charset="0"/>
               </a:rPr>
-              <a:t>// </a:t>
-            </a:r>
-            <a:r>
-              <a:rPr lang="en-US" sz="1600" dirty="0" smtClean="0">
-                <a:solidFill>
-                  <a:schemeClr val="accent5">
-                    <a:lumMod val="75000"/>
-                  </a:schemeClr>
-                </a:solidFill>
-                <a:latin typeface="Consolas" pitchFamily="49" charset="0"/>
-                <a:cs typeface="Consolas" pitchFamily="49" charset="0"/>
-              </a:rPr>
-              <a:t>Alternate syntax</a:t>
-            </a:r>
-            <a:endParaRPr lang="en-US" sz="1600" dirty="0" smtClean="0">
-              <a:solidFill>
-                <a:schemeClr val="accent5">
-                  <a:lumMod val="75000"/>
-                </a:schemeClr>
-              </a:solidFill>
-              <a:latin typeface="Consolas" pitchFamily="49" charset="0"/>
-              <a:cs typeface="Consolas" pitchFamily="49" charset="0"/>
-            </a:endParaRPr>
+              <a:t>// Alternate syntax</a:t>
+            </a:r>
           </a:p>
         </p:txBody>
       </p:sp>
@@ -13413,6 +13759,13 @@
   <p:clrMapOvr>
     <a:masterClrMapping/>
   </p:clrMapOvr>
+  <p:timing>
+    <p:tnLst>
+      <p:par>
+        <p:cTn id="1" dur="indefinite" restart="never" nodeType="tmRoot"/>
+      </p:par>
+    </p:tnLst>
+  </p:timing>
 </p:sld>
 </file>
 
@@ -17716,6 +18069,329 @@
   <p:clrMapOvr>
     <a:masterClrMapping/>
   </p:clrMapOvr>
+  <p:timing>
+    <p:tnLst>
+      <p:par>
+        <p:cTn id="1" dur="indefinite" restart="never" nodeType="tmRoot">
+          <p:childTnLst>
+            <p:seq concurrent="1" nextAc="seek">
+              <p:cTn id="2" dur="indefinite" nodeType="mainSeq">
+                <p:childTnLst>
+                  <p:par>
+                    <p:cTn id="3" fill="hold">
+                      <p:stCondLst>
+                        <p:cond delay="indefinite"/>
+                      </p:stCondLst>
+                      <p:childTnLst>
+                        <p:par>
+                          <p:cTn id="4" fill="hold">
+                            <p:stCondLst>
+                              <p:cond delay="0"/>
+                            </p:stCondLst>
+                            <p:childTnLst>
+                              <p:par>
+                                <p:cTn id="5" presetID="10" presetClass="entr" presetSubtype="0" fill="hold" grpId="0" nodeType="clickEffect">
+                                  <p:stCondLst>
+                                    <p:cond delay="0"/>
+                                  </p:stCondLst>
+                                  <p:childTnLst>
+                                    <p:set>
+                                      <p:cBhvr>
+                                        <p:cTn id="6" dur="1" fill="hold">
+                                          <p:stCondLst>
+                                            <p:cond delay="0"/>
+                                          </p:stCondLst>
+                                        </p:cTn>
+                                        <p:tgtEl>
+                                          <p:spTgt spid="3">
+                                            <p:txEl>
+                                              <p:pRg st="0" end="0"/>
+                                            </p:txEl>
+                                          </p:spTgt>
+                                        </p:tgtEl>
+                                        <p:attrNameLst>
+                                          <p:attrName>style.visibility</p:attrName>
+                                        </p:attrNameLst>
+                                      </p:cBhvr>
+                                      <p:to>
+                                        <p:strVal val="visible"/>
+                                      </p:to>
+                                    </p:set>
+                                    <p:animEffect transition="in" filter="fade">
+                                      <p:cBhvr>
+                                        <p:cTn id="7" dur="500"/>
+                                        <p:tgtEl>
+                                          <p:spTgt spid="3">
+                                            <p:txEl>
+                                              <p:pRg st="0" end="0"/>
+                                            </p:txEl>
+                                          </p:spTgt>
+                                        </p:tgtEl>
+                                      </p:cBhvr>
+                                    </p:animEffect>
+                                  </p:childTnLst>
+                                </p:cTn>
+                              </p:par>
+                            </p:childTnLst>
+                          </p:cTn>
+                        </p:par>
+                      </p:childTnLst>
+                    </p:cTn>
+                  </p:par>
+                  <p:par>
+                    <p:cTn id="8" fill="hold">
+                      <p:stCondLst>
+                        <p:cond delay="indefinite"/>
+                      </p:stCondLst>
+                      <p:childTnLst>
+                        <p:par>
+                          <p:cTn id="9" fill="hold">
+                            <p:stCondLst>
+                              <p:cond delay="0"/>
+                            </p:stCondLst>
+                            <p:childTnLst>
+                              <p:par>
+                                <p:cTn id="10" presetID="10" presetClass="entr" presetSubtype="0" fill="hold" grpId="0" nodeType="clickEffect">
+                                  <p:stCondLst>
+                                    <p:cond delay="0"/>
+                                  </p:stCondLst>
+                                  <p:childTnLst>
+                                    <p:set>
+                                      <p:cBhvr>
+                                        <p:cTn id="11" dur="1" fill="hold">
+                                          <p:stCondLst>
+                                            <p:cond delay="0"/>
+                                          </p:stCondLst>
+                                        </p:cTn>
+                                        <p:tgtEl>
+                                          <p:spTgt spid="3">
+                                            <p:txEl>
+                                              <p:pRg st="1" end="1"/>
+                                            </p:txEl>
+                                          </p:spTgt>
+                                        </p:tgtEl>
+                                        <p:attrNameLst>
+                                          <p:attrName>style.visibility</p:attrName>
+                                        </p:attrNameLst>
+                                      </p:cBhvr>
+                                      <p:to>
+                                        <p:strVal val="visible"/>
+                                      </p:to>
+                                    </p:set>
+                                    <p:animEffect transition="in" filter="fade">
+                                      <p:cBhvr>
+                                        <p:cTn id="12" dur="500"/>
+                                        <p:tgtEl>
+                                          <p:spTgt spid="3">
+                                            <p:txEl>
+                                              <p:pRg st="1" end="1"/>
+                                            </p:txEl>
+                                          </p:spTgt>
+                                        </p:tgtEl>
+                                      </p:cBhvr>
+                                    </p:animEffect>
+                                  </p:childTnLst>
+                                </p:cTn>
+                              </p:par>
+                            </p:childTnLst>
+                          </p:cTn>
+                        </p:par>
+                      </p:childTnLst>
+                    </p:cTn>
+                  </p:par>
+                  <p:par>
+                    <p:cTn id="13" fill="hold">
+                      <p:stCondLst>
+                        <p:cond delay="indefinite"/>
+                      </p:stCondLst>
+                      <p:childTnLst>
+                        <p:par>
+                          <p:cTn id="14" fill="hold">
+                            <p:stCondLst>
+                              <p:cond delay="0"/>
+                            </p:stCondLst>
+                            <p:childTnLst>
+                              <p:par>
+                                <p:cTn id="15" presetID="10" presetClass="entr" presetSubtype="0" fill="hold" grpId="0" nodeType="clickEffect">
+                                  <p:stCondLst>
+                                    <p:cond delay="0"/>
+                                  </p:stCondLst>
+                                  <p:childTnLst>
+                                    <p:set>
+                                      <p:cBhvr>
+                                        <p:cTn id="16" dur="1" fill="hold">
+                                          <p:stCondLst>
+                                            <p:cond delay="0"/>
+                                          </p:stCondLst>
+                                        </p:cTn>
+                                        <p:tgtEl>
+                                          <p:spTgt spid="3">
+                                            <p:txEl>
+                                              <p:pRg st="2" end="2"/>
+                                            </p:txEl>
+                                          </p:spTgt>
+                                        </p:tgtEl>
+                                        <p:attrNameLst>
+                                          <p:attrName>style.visibility</p:attrName>
+                                        </p:attrNameLst>
+                                      </p:cBhvr>
+                                      <p:to>
+                                        <p:strVal val="visible"/>
+                                      </p:to>
+                                    </p:set>
+                                    <p:animEffect transition="in" filter="fade">
+                                      <p:cBhvr>
+                                        <p:cTn id="17" dur="500"/>
+                                        <p:tgtEl>
+                                          <p:spTgt spid="3">
+                                            <p:txEl>
+                                              <p:pRg st="2" end="2"/>
+                                            </p:txEl>
+                                          </p:spTgt>
+                                        </p:tgtEl>
+                                      </p:cBhvr>
+                                    </p:animEffect>
+                                  </p:childTnLst>
+                                </p:cTn>
+                              </p:par>
+                            </p:childTnLst>
+                          </p:cTn>
+                        </p:par>
+                      </p:childTnLst>
+                    </p:cTn>
+                  </p:par>
+                  <p:par>
+                    <p:cTn id="18" fill="hold">
+                      <p:stCondLst>
+                        <p:cond delay="indefinite"/>
+                      </p:stCondLst>
+                      <p:childTnLst>
+                        <p:par>
+                          <p:cTn id="19" fill="hold">
+                            <p:stCondLst>
+                              <p:cond delay="0"/>
+                            </p:stCondLst>
+                            <p:childTnLst>
+                              <p:par>
+                                <p:cTn id="20" presetID="10" presetClass="entr" presetSubtype="0" fill="hold" nodeType="clickEffect">
+                                  <p:stCondLst>
+                                    <p:cond delay="0"/>
+                                  </p:stCondLst>
+                                  <p:childTnLst>
+                                    <p:set>
+                                      <p:cBhvr>
+                                        <p:cTn id="21" dur="1" fill="hold">
+                                          <p:stCondLst>
+                                            <p:cond delay="0"/>
+                                          </p:stCondLst>
+                                        </p:cTn>
+                                        <p:tgtEl>
+                                          <p:spTgt spid="5"/>
+                                        </p:tgtEl>
+                                        <p:attrNameLst>
+                                          <p:attrName>style.visibility</p:attrName>
+                                        </p:attrNameLst>
+                                      </p:cBhvr>
+                                      <p:to>
+                                        <p:strVal val="visible"/>
+                                      </p:to>
+                                    </p:set>
+                                    <p:animEffect transition="in" filter="fade">
+                                      <p:cBhvr>
+                                        <p:cTn id="22" dur="500"/>
+                                        <p:tgtEl>
+                                          <p:spTgt spid="5"/>
+                                        </p:tgtEl>
+                                      </p:cBhvr>
+                                    </p:animEffect>
+                                  </p:childTnLst>
+                                </p:cTn>
+                              </p:par>
+                            </p:childTnLst>
+                          </p:cTn>
+                        </p:par>
+                      </p:childTnLst>
+                    </p:cTn>
+                  </p:par>
+                  <p:par>
+                    <p:cTn id="23" fill="hold">
+                      <p:stCondLst>
+                        <p:cond delay="indefinite"/>
+                      </p:stCondLst>
+                      <p:childTnLst>
+                        <p:par>
+                          <p:cTn id="24" fill="hold">
+                            <p:stCondLst>
+                              <p:cond delay="0"/>
+                            </p:stCondLst>
+                            <p:childTnLst>
+                              <p:par>
+                                <p:cTn id="25" presetID="10" presetClass="entr" presetSubtype="0" fill="hold" grpId="0" nodeType="clickEffect">
+                                  <p:stCondLst>
+                                    <p:cond delay="0"/>
+                                  </p:stCondLst>
+                                  <p:childTnLst>
+                                    <p:set>
+                                      <p:cBhvr>
+                                        <p:cTn id="26" dur="1" fill="hold">
+                                          <p:stCondLst>
+                                            <p:cond delay="0"/>
+                                          </p:stCondLst>
+                                        </p:cTn>
+                                        <p:tgtEl>
+                                          <p:spTgt spid="6"/>
+                                        </p:tgtEl>
+                                        <p:attrNameLst>
+                                          <p:attrName>style.visibility</p:attrName>
+                                        </p:attrNameLst>
+                                      </p:cBhvr>
+                                      <p:to>
+                                        <p:strVal val="visible"/>
+                                      </p:to>
+                                    </p:set>
+                                    <p:animEffect transition="in" filter="fade">
+                                      <p:cBhvr>
+                                        <p:cTn id="27" dur="500"/>
+                                        <p:tgtEl>
+                                          <p:spTgt spid="6"/>
+                                        </p:tgtEl>
+                                      </p:cBhvr>
+                                    </p:animEffect>
+                                  </p:childTnLst>
+                                </p:cTn>
+                              </p:par>
+                            </p:childTnLst>
+                          </p:cTn>
+                        </p:par>
+                      </p:childTnLst>
+                    </p:cTn>
+                  </p:par>
+                </p:childTnLst>
+              </p:cTn>
+              <p:prevCondLst>
+                <p:cond evt="onPrev" delay="0">
+                  <p:tgtEl>
+                    <p:sldTgt/>
+                  </p:tgtEl>
+                </p:cond>
+              </p:prevCondLst>
+              <p:nextCondLst>
+                <p:cond evt="onNext" delay="0">
+                  <p:tgtEl>
+                    <p:sldTgt/>
+                  </p:tgtEl>
+                </p:cond>
+              </p:nextCondLst>
+            </p:seq>
+          </p:childTnLst>
+        </p:cTn>
+      </p:par>
+    </p:tnLst>
+    <p:bldLst>
+      <p:bldP spid="3" grpId="0" uiExpand="1" build="p"/>
+      <p:bldP spid="6" grpId="0"/>
+    </p:bldLst>
+  </p:timing>
 </p:sld>
 </file>
 
@@ -20308,6 +20984,524 @@
   <p:clrMapOvr>
     <a:masterClrMapping/>
   </p:clrMapOvr>
+  <p:timing>
+    <p:tnLst>
+      <p:par>
+        <p:cTn id="1" dur="indefinite" restart="never" nodeType="tmRoot">
+          <p:childTnLst>
+            <p:seq concurrent="1" nextAc="seek">
+              <p:cTn id="2" dur="indefinite" nodeType="mainSeq">
+                <p:childTnLst>
+                  <p:par>
+                    <p:cTn id="3" fill="hold">
+                      <p:stCondLst>
+                        <p:cond delay="indefinite"/>
+                      </p:stCondLst>
+                      <p:childTnLst>
+                        <p:par>
+                          <p:cTn id="4" fill="hold">
+                            <p:stCondLst>
+                              <p:cond delay="0"/>
+                            </p:stCondLst>
+                            <p:childTnLst>
+                              <p:par>
+                                <p:cTn id="5" presetID="10" presetClass="entr" presetSubtype="0" fill="hold" nodeType="clickEffect">
+                                  <p:stCondLst>
+                                    <p:cond delay="0"/>
+                                  </p:stCondLst>
+                                  <p:childTnLst>
+                                    <p:set>
+                                      <p:cBhvr>
+                                        <p:cTn id="6" dur="1" fill="hold">
+                                          <p:stCondLst>
+                                            <p:cond delay="0"/>
+                                          </p:stCondLst>
+                                        </p:cTn>
+                                        <p:tgtEl>
+                                          <p:spTgt spid="3">
+                                            <p:txEl>
+                                              <p:pRg st="0" end="0"/>
+                                            </p:txEl>
+                                          </p:spTgt>
+                                        </p:tgtEl>
+                                        <p:attrNameLst>
+                                          <p:attrName>style.visibility</p:attrName>
+                                        </p:attrNameLst>
+                                      </p:cBhvr>
+                                      <p:to>
+                                        <p:strVal val="visible"/>
+                                      </p:to>
+                                    </p:set>
+                                    <p:animEffect transition="in" filter="fade">
+                                      <p:cBhvr>
+                                        <p:cTn id="7" dur="500"/>
+                                        <p:tgtEl>
+                                          <p:spTgt spid="3">
+                                            <p:txEl>
+                                              <p:pRg st="0" end="0"/>
+                                            </p:txEl>
+                                          </p:spTgt>
+                                        </p:tgtEl>
+                                      </p:cBhvr>
+                                    </p:animEffect>
+                                  </p:childTnLst>
+                                </p:cTn>
+                              </p:par>
+                            </p:childTnLst>
+                          </p:cTn>
+                        </p:par>
+                      </p:childTnLst>
+                    </p:cTn>
+                  </p:par>
+                  <p:par>
+                    <p:cTn id="8" fill="hold">
+                      <p:stCondLst>
+                        <p:cond delay="indefinite"/>
+                      </p:stCondLst>
+                      <p:childTnLst>
+                        <p:par>
+                          <p:cTn id="9" fill="hold">
+                            <p:stCondLst>
+                              <p:cond delay="0"/>
+                            </p:stCondLst>
+                            <p:childTnLst>
+                              <p:par>
+                                <p:cTn id="10" presetID="10" presetClass="entr" presetSubtype="0" fill="hold" nodeType="clickEffect">
+                                  <p:stCondLst>
+                                    <p:cond delay="0"/>
+                                  </p:stCondLst>
+                                  <p:childTnLst>
+                                    <p:set>
+                                      <p:cBhvr>
+                                        <p:cTn id="11" dur="1" fill="hold">
+                                          <p:stCondLst>
+                                            <p:cond delay="0"/>
+                                          </p:stCondLst>
+                                        </p:cTn>
+                                        <p:tgtEl>
+                                          <p:spTgt spid="3">
+                                            <p:txEl>
+                                              <p:pRg st="1" end="1"/>
+                                            </p:txEl>
+                                          </p:spTgt>
+                                        </p:tgtEl>
+                                        <p:attrNameLst>
+                                          <p:attrName>style.visibility</p:attrName>
+                                        </p:attrNameLst>
+                                      </p:cBhvr>
+                                      <p:to>
+                                        <p:strVal val="visible"/>
+                                      </p:to>
+                                    </p:set>
+                                    <p:animEffect transition="in" filter="fade">
+                                      <p:cBhvr>
+                                        <p:cTn id="12" dur="500"/>
+                                        <p:tgtEl>
+                                          <p:spTgt spid="3">
+                                            <p:txEl>
+                                              <p:pRg st="1" end="1"/>
+                                            </p:txEl>
+                                          </p:spTgt>
+                                        </p:tgtEl>
+                                      </p:cBhvr>
+                                    </p:animEffect>
+                                  </p:childTnLst>
+                                </p:cTn>
+                              </p:par>
+                            </p:childTnLst>
+                          </p:cTn>
+                        </p:par>
+                      </p:childTnLst>
+                    </p:cTn>
+                  </p:par>
+                  <p:par>
+                    <p:cTn id="13" fill="hold">
+                      <p:stCondLst>
+                        <p:cond delay="indefinite"/>
+                      </p:stCondLst>
+                      <p:childTnLst>
+                        <p:par>
+                          <p:cTn id="14" fill="hold">
+                            <p:stCondLst>
+                              <p:cond delay="0"/>
+                            </p:stCondLst>
+                            <p:childTnLst>
+                              <p:par>
+                                <p:cTn id="15" presetID="10" presetClass="entr" presetSubtype="0" fill="hold" nodeType="clickEffect">
+                                  <p:stCondLst>
+                                    <p:cond delay="0"/>
+                                  </p:stCondLst>
+                                  <p:childTnLst>
+                                    <p:set>
+                                      <p:cBhvr>
+                                        <p:cTn id="16" dur="1" fill="hold">
+                                          <p:stCondLst>
+                                            <p:cond delay="0"/>
+                                          </p:stCondLst>
+                                        </p:cTn>
+                                        <p:tgtEl>
+                                          <p:spTgt spid="3">
+                                            <p:txEl>
+                                              <p:pRg st="2" end="2"/>
+                                            </p:txEl>
+                                          </p:spTgt>
+                                        </p:tgtEl>
+                                        <p:attrNameLst>
+                                          <p:attrName>style.visibility</p:attrName>
+                                        </p:attrNameLst>
+                                      </p:cBhvr>
+                                      <p:to>
+                                        <p:strVal val="visible"/>
+                                      </p:to>
+                                    </p:set>
+                                    <p:animEffect transition="in" filter="fade">
+                                      <p:cBhvr>
+                                        <p:cTn id="17" dur="500"/>
+                                        <p:tgtEl>
+                                          <p:spTgt spid="3">
+                                            <p:txEl>
+                                              <p:pRg st="2" end="2"/>
+                                            </p:txEl>
+                                          </p:spTgt>
+                                        </p:tgtEl>
+                                      </p:cBhvr>
+                                    </p:animEffect>
+                                  </p:childTnLst>
+                                </p:cTn>
+                              </p:par>
+                            </p:childTnLst>
+                          </p:cTn>
+                        </p:par>
+                      </p:childTnLst>
+                    </p:cTn>
+                  </p:par>
+                  <p:par>
+                    <p:cTn id="18" fill="hold">
+                      <p:stCondLst>
+                        <p:cond delay="indefinite"/>
+                      </p:stCondLst>
+                      <p:childTnLst>
+                        <p:par>
+                          <p:cTn id="19" fill="hold">
+                            <p:stCondLst>
+                              <p:cond delay="0"/>
+                            </p:stCondLst>
+                            <p:childTnLst>
+                              <p:par>
+                                <p:cTn id="20" presetID="10" presetClass="entr" presetSubtype="0" fill="hold" nodeType="clickEffect">
+                                  <p:stCondLst>
+                                    <p:cond delay="0"/>
+                                  </p:stCondLst>
+                                  <p:childTnLst>
+                                    <p:set>
+                                      <p:cBhvr>
+                                        <p:cTn id="21" dur="1" fill="hold">
+                                          <p:stCondLst>
+                                            <p:cond delay="0"/>
+                                          </p:stCondLst>
+                                        </p:cTn>
+                                        <p:tgtEl>
+                                          <p:spTgt spid="3">
+                                            <p:txEl>
+                                              <p:pRg st="3" end="3"/>
+                                            </p:txEl>
+                                          </p:spTgt>
+                                        </p:tgtEl>
+                                        <p:attrNameLst>
+                                          <p:attrName>style.visibility</p:attrName>
+                                        </p:attrNameLst>
+                                      </p:cBhvr>
+                                      <p:to>
+                                        <p:strVal val="visible"/>
+                                      </p:to>
+                                    </p:set>
+                                    <p:animEffect transition="in" filter="fade">
+                                      <p:cBhvr>
+                                        <p:cTn id="22" dur="500"/>
+                                        <p:tgtEl>
+                                          <p:spTgt spid="3">
+                                            <p:txEl>
+                                              <p:pRg st="3" end="3"/>
+                                            </p:txEl>
+                                          </p:spTgt>
+                                        </p:tgtEl>
+                                      </p:cBhvr>
+                                    </p:animEffect>
+                                  </p:childTnLst>
+                                </p:cTn>
+                              </p:par>
+                            </p:childTnLst>
+                          </p:cTn>
+                        </p:par>
+                      </p:childTnLst>
+                    </p:cTn>
+                  </p:par>
+                  <p:par>
+                    <p:cTn id="23" fill="hold">
+                      <p:stCondLst>
+                        <p:cond delay="indefinite"/>
+                      </p:stCondLst>
+                      <p:childTnLst>
+                        <p:par>
+                          <p:cTn id="24" fill="hold">
+                            <p:stCondLst>
+                              <p:cond delay="0"/>
+                            </p:stCondLst>
+                            <p:childTnLst>
+                              <p:par>
+                                <p:cTn id="25" presetID="10" presetClass="entr" presetSubtype="0" fill="hold" nodeType="clickEffect">
+                                  <p:stCondLst>
+                                    <p:cond delay="0"/>
+                                  </p:stCondLst>
+                                  <p:childTnLst>
+                                    <p:set>
+                                      <p:cBhvr>
+                                        <p:cTn id="26" dur="1" fill="hold">
+                                          <p:stCondLst>
+                                            <p:cond delay="0"/>
+                                          </p:stCondLst>
+                                        </p:cTn>
+                                        <p:tgtEl>
+                                          <p:spTgt spid="3">
+                                            <p:txEl>
+                                              <p:pRg st="4" end="4"/>
+                                            </p:txEl>
+                                          </p:spTgt>
+                                        </p:tgtEl>
+                                        <p:attrNameLst>
+                                          <p:attrName>style.visibility</p:attrName>
+                                        </p:attrNameLst>
+                                      </p:cBhvr>
+                                      <p:to>
+                                        <p:strVal val="visible"/>
+                                      </p:to>
+                                    </p:set>
+                                    <p:animEffect transition="in" filter="fade">
+                                      <p:cBhvr>
+                                        <p:cTn id="27" dur="500"/>
+                                        <p:tgtEl>
+                                          <p:spTgt spid="3">
+                                            <p:txEl>
+                                              <p:pRg st="4" end="4"/>
+                                            </p:txEl>
+                                          </p:spTgt>
+                                        </p:tgtEl>
+                                      </p:cBhvr>
+                                    </p:animEffect>
+                                  </p:childTnLst>
+                                </p:cTn>
+                              </p:par>
+                            </p:childTnLst>
+                          </p:cTn>
+                        </p:par>
+                      </p:childTnLst>
+                    </p:cTn>
+                  </p:par>
+                  <p:par>
+                    <p:cTn id="28" fill="hold">
+                      <p:stCondLst>
+                        <p:cond delay="indefinite"/>
+                      </p:stCondLst>
+                      <p:childTnLst>
+                        <p:par>
+                          <p:cTn id="29" fill="hold">
+                            <p:stCondLst>
+                              <p:cond delay="0"/>
+                            </p:stCondLst>
+                            <p:childTnLst>
+                              <p:par>
+                                <p:cTn id="30" presetID="10" presetClass="entr" presetSubtype="0" fill="hold" nodeType="clickEffect">
+                                  <p:stCondLst>
+                                    <p:cond delay="0"/>
+                                  </p:stCondLst>
+                                  <p:childTnLst>
+                                    <p:set>
+                                      <p:cBhvr>
+                                        <p:cTn id="31" dur="1" fill="hold">
+                                          <p:stCondLst>
+                                            <p:cond delay="0"/>
+                                          </p:stCondLst>
+                                        </p:cTn>
+                                        <p:tgtEl>
+                                          <p:spTgt spid="3">
+                                            <p:txEl>
+                                              <p:pRg st="5" end="5"/>
+                                            </p:txEl>
+                                          </p:spTgt>
+                                        </p:tgtEl>
+                                        <p:attrNameLst>
+                                          <p:attrName>style.visibility</p:attrName>
+                                        </p:attrNameLst>
+                                      </p:cBhvr>
+                                      <p:to>
+                                        <p:strVal val="visible"/>
+                                      </p:to>
+                                    </p:set>
+                                    <p:animEffect transition="in" filter="fade">
+                                      <p:cBhvr>
+                                        <p:cTn id="32" dur="500"/>
+                                        <p:tgtEl>
+                                          <p:spTgt spid="3">
+                                            <p:txEl>
+                                              <p:pRg st="5" end="5"/>
+                                            </p:txEl>
+                                          </p:spTgt>
+                                        </p:tgtEl>
+                                      </p:cBhvr>
+                                    </p:animEffect>
+                                  </p:childTnLst>
+                                </p:cTn>
+                              </p:par>
+                            </p:childTnLst>
+                          </p:cTn>
+                        </p:par>
+                      </p:childTnLst>
+                    </p:cTn>
+                  </p:par>
+                  <p:par>
+                    <p:cTn id="33" fill="hold">
+                      <p:stCondLst>
+                        <p:cond delay="indefinite"/>
+                      </p:stCondLst>
+                      <p:childTnLst>
+                        <p:par>
+                          <p:cTn id="34" fill="hold">
+                            <p:stCondLst>
+                              <p:cond delay="0"/>
+                            </p:stCondLst>
+                            <p:childTnLst>
+                              <p:par>
+                                <p:cTn id="35" presetID="10" presetClass="entr" presetSubtype="0" fill="hold" nodeType="clickEffect">
+                                  <p:stCondLst>
+                                    <p:cond delay="0"/>
+                                  </p:stCondLst>
+                                  <p:childTnLst>
+                                    <p:set>
+                                      <p:cBhvr>
+                                        <p:cTn id="36" dur="1" fill="hold">
+                                          <p:stCondLst>
+                                            <p:cond delay="0"/>
+                                          </p:stCondLst>
+                                        </p:cTn>
+                                        <p:tgtEl>
+                                          <p:spTgt spid="3">
+                                            <p:txEl>
+                                              <p:pRg st="6" end="6"/>
+                                            </p:txEl>
+                                          </p:spTgt>
+                                        </p:tgtEl>
+                                        <p:attrNameLst>
+                                          <p:attrName>style.visibility</p:attrName>
+                                        </p:attrNameLst>
+                                      </p:cBhvr>
+                                      <p:to>
+                                        <p:strVal val="visible"/>
+                                      </p:to>
+                                    </p:set>
+                                    <p:animEffect transition="in" filter="fade">
+                                      <p:cBhvr>
+                                        <p:cTn id="37" dur="500"/>
+                                        <p:tgtEl>
+                                          <p:spTgt spid="3">
+                                            <p:txEl>
+                                              <p:pRg st="6" end="6"/>
+                                            </p:txEl>
+                                          </p:spTgt>
+                                        </p:tgtEl>
+                                      </p:cBhvr>
+                                    </p:animEffect>
+                                  </p:childTnLst>
+                                </p:cTn>
+                              </p:par>
+                            </p:childTnLst>
+                          </p:cTn>
+                        </p:par>
+                      </p:childTnLst>
+                    </p:cTn>
+                  </p:par>
+                  <p:par>
+                    <p:cTn id="38" fill="hold">
+                      <p:stCondLst>
+                        <p:cond delay="indefinite"/>
+                      </p:stCondLst>
+                      <p:childTnLst>
+                        <p:par>
+                          <p:cTn id="39" fill="hold">
+                            <p:stCondLst>
+                              <p:cond delay="0"/>
+                            </p:stCondLst>
+                            <p:childTnLst>
+                              <p:par>
+                                <p:cTn id="40" presetID="10" presetClass="entr" presetSubtype="0" fill="hold" nodeType="clickEffect">
+                                  <p:stCondLst>
+                                    <p:cond delay="0"/>
+                                  </p:stCondLst>
+                                  <p:childTnLst>
+                                    <p:set>
+                                      <p:cBhvr>
+                                        <p:cTn id="41" dur="1" fill="hold">
+                                          <p:stCondLst>
+                                            <p:cond delay="0"/>
+                                          </p:stCondLst>
+                                        </p:cTn>
+                                        <p:tgtEl>
+                                          <p:spTgt spid="3">
+                                            <p:txEl>
+                                              <p:pRg st="7" end="7"/>
+                                            </p:txEl>
+                                          </p:spTgt>
+                                        </p:tgtEl>
+                                        <p:attrNameLst>
+                                          <p:attrName>style.visibility</p:attrName>
+                                        </p:attrNameLst>
+                                      </p:cBhvr>
+                                      <p:to>
+                                        <p:strVal val="visible"/>
+                                      </p:to>
+                                    </p:set>
+                                    <p:animEffect transition="in" filter="fade">
+                                      <p:cBhvr>
+                                        <p:cTn id="42" dur="500"/>
+                                        <p:tgtEl>
+                                          <p:spTgt spid="3">
+                                            <p:txEl>
+                                              <p:pRg st="7" end="7"/>
+                                            </p:txEl>
+                                          </p:spTgt>
+                                        </p:tgtEl>
+                                      </p:cBhvr>
+                                    </p:animEffect>
+                                  </p:childTnLst>
+                                </p:cTn>
+                              </p:par>
+                            </p:childTnLst>
+                          </p:cTn>
+                        </p:par>
+                      </p:childTnLst>
+                    </p:cTn>
+                  </p:par>
+                </p:childTnLst>
+              </p:cTn>
+              <p:prevCondLst>
+                <p:cond evt="onPrev" delay="0">
+                  <p:tgtEl>
+                    <p:sldTgt/>
+                  </p:tgtEl>
+                </p:cond>
+              </p:prevCondLst>
+              <p:nextCondLst>
+                <p:cond evt="onNext" delay="0">
+                  <p:tgtEl>
+                    <p:sldTgt/>
+                  </p:tgtEl>
+                </p:cond>
+              </p:nextCondLst>
+            </p:seq>
+          </p:childTnLst>
+        </p:cTn>
+      </p:par>
+    </p:tnLst>
+  </p:timing>
 </p:sld>
 </file>
 
@@ -20450,6 +21644,13 @@
   <p:clrMapOvr>
     <a:masterClrMapping/>
   </p:clrMapOvr>
+  <p:timing>
+    <p:tnLst>
+      <p:par>
+        <p:cTn id="1" dur="indefinite" restart="never" nodeType="tmRoot"/>
+      </p:par>
+    </p:tnLst>
+  </p:timing>
 </p:sld>
 </file>
 
@@ -21477,11 +22678,7 @@
           <a:p>
             <a:r>
               <a:rPr lang="en-US" dirty="0" smtClean="0"/>
-              <a:t>Functional </a:t>
-            </a:r>
-            <a:r>
-              <a:rPr lang="en-US" dirty="0" smtClean="0"/>
-              <a:t>Languages</a:t>
+              <a:t>Functional Languages</a:t>
             </a:r>
             <a:endParaRPr lang="en-US" dirty="0"/>
           </a:p>

</xml_diff>

<commit_message>
Brian: Updated slide formatting.
</commit_message>
<xml_diff>
--- a/FoundationsOfFunctionalProgramming.pptx
+++ b/FoundationsOfFunctionalProgramming.pptx
@@ -10,8 +10,8 @@
     <p:sldId id="309" r:id="rId4"/>
     <p:sldId id="262" r:id="rId5"/>
     <p:sldId id="274" r:id="rId6"/>
-    <p:sldId id="264" r:id="rId7"/>
-    <p:sldId id="307" r:id="rId8"/>
+    <p:sldId id="307" r:id="rId7"/>
+    <p:sldId id="264" r:id="rId8"/>
     <p:sldId id="306" r:id="rId9"/>
     <p:sldId id="308" r:id="rId10"/>
     <p:sldId id="311" r:id="rId11"/>
@@ -49,9 +49,10 @@
     <p:sldId id="290" r:id="rId43"/>
     <p:sldId id="303" r:id="rId44"/>
     <p:sldId id="304" r:id="rId45"/>
-    <p:sldId id="270" r:id="rId46"/>
-    <p:sldId id="263" r:id="rId47"/>
-    <p:sldId id="310" r:id="rId48"/>
+    <p:sldId id="312" r:id="rId46"/>
+    <p:sldId id="270" r:id="rId47"/>
+    <p:sldId id="263" r:id="rId48"/>
+    <p:sldId id="310" r:id="rId49"/>
   </p:sldIdLst>
   <p:sldSz cx="9144000" cy="6858000" type="screen4x3"/>
   <p:notesSz cx="7315200" cy="9601200"/>
@@ -160,8 +161,8 @@
             <p14:sldId id="309"/>
             <p14:sldId id="262"/>
             <p14:sldId id="274"/>
+            <p14:sldId id="307"/>
             <p14:sldId id="264"/>
-            <p14:sldId id="307"/>
             <p14:sldId id="306"/>
             <p14:sldId id="308"/>
             <p14:sldId id="311"/>
@@ -199,6 +200,7 @@
             <p14:sldId id="290"/>
             <p14:sldId id="303"/>
             <p14:sldId id="304"/>
+            <p14:sldId id="312"/>
             <p14:sldId id="270"/>
             <p14:sldId id="263"/>
             <p14:sldId id="310"/>
@@ -17865,200 +17867,6 @@
           </a:graphicData>
         </a:graphic>
       </p:graphicFrame>
-      <p:sp>
-        <p:nvSpPr>
-          <p:cNvPr id="6" name="Content Placeholder 2"/>
-          <p:cNvSpPr txBox="1">
-            <a:spLocks/>
-          </p:cNvSpPr>
-          <p:nvPr/>
-        </p:nvSpPr>
-        <p:spPr>
-          <a:xfrm>
-            <a:off x="457200" y="5791200"/>
-            <a:ext cx="7620000" cy="609600"/>
-          </a:xfrm>
-          <a:prstGeom prst="rect">
-            <a:avLst/>
-          </a:prstGeom>
-        </p:spPr>
-        <p:txBody>
-          <a:bodyPr vert="horz" lIns="91440" tIns="45720" rIns="91440" bIns="45720" rtlCol="0">
-            <a:normAutofit/>
-          </a:bodyPr>
-          <a:lstStyle>
-            <a:lvl1pPr marL="342900" indent="-228600" algn="l" defTabSz="914400" rtl="0" eaLnBrk="1" latinLnBrk="0" hangingPunct="1">
-              <a:spcBef>
-                <a:spcPct val="20000"/>
-              </a:spcBef>
-              <a:buClr>
-                <a:schemeClr val="accent1"/>
-              </a:buClr>
-              <a:buFont typeface="Arial" pitchFamily="34" charset="0"/>
-              <a:buChar char="•"/>
-              <a:defRPr sz="2200" kern="1200">
-                <a:solidFill>
-                  <a:schemeClr val="tx1"/>
-                </a:solidFill>
-                <a:latin typeface="+mn-lt"/>
-                <a:ea typeface="+mn-ea"/>
-                <a:cs typeface="+mn-cs"/>
-              </a:defRPr>
-            </a:lvl1pPr>
-            <a:lvl2pPr marL="640080" indent="-228600" algn="l" defTabSz="914400" rtl="0" eaLnBrk="1" latinLnBrk="0" hangingPunct="1">
-              <a:spcBef>
-                <a:spcPct val="20000"/>
-              </a:spcBef>
-              <a:buClr>
-                <a:schemeClr val="accent2"/>
-              </a:buClr>
-              <a:buFont typeface="Arial" pitchFamily="34" charset="0"/>
-              <a:buChar char="•"/>
-              <a:defRPr sz="2000" kern="1200">
-                <a:solidFill>
-                  <a:schemeClr val="tx1"/>
-                </a:solidFill>
-                <a:latin typeface="+mn-lt"/>
-                <a:ea typeface="+mn-ea"/>
-                <a:cs typeface="+mn-cs"/>
-              </a:defRPr>
-            </a:lvl2pPr>
-            <a:lvl3pPr marL="1005840" indent="-228600" algn="l" defTabSz="914400" rtl="0" eaLnBrk="1" latinLnBrk="0" hangingPunct="1">
-              <a:spcBef>
-                <a:spcPct val="20000"/>
-              </a:spcBef>
-              <a:buClr>
-                <a:schemeClr val="accent3"/>
-              </a:buClr>
-              <a:buFont typeface="Arial" pitchFamily="34" charset="0"/>
-              <a:buChar char="•"/>
-              <a:defRPr sz="1800" kern="1200">
-                <a:solidFill>
-                  <a:schemeClr val="tx1"/>
-                </a:solidFill>
-                <a:latin typeface="+mn-lt"/>
-                <a:ea typeface="+mn-ea"/>
-                <a:cs typeface="+mn-cs"/>
-              </a:defRPr>
-            </a:lvl3pPr>
-            <a:lvl4pPr marL="1280160" indent="-228600" algn="l" defTabSz="914400" rtl="0" eaLnBrk="1" latinLnBrk="0" hangingPunct="1">
-              <a:spcBef>
-                <a:spcPct val="20000"/>
-              </a:spcBef>
-              <a:buClr>
-                <a:schemeClr val="accent4"/>
-              </a:buClr>
-              <a:buFont typeface="Arial" pitchFamily="34" charset="0"/>
-              <a:buChar char="•"/>
-              <a:defRPr sz="1600" kern="1200">
-                <a:solidFill>
-                  <a:schemeClr val="tx1"/>
-                </a:solidFill>
-                <a:latin typeface="+mn-lt"/>
-                <a:ea typeface="+mn-ea"/>
-                <a:cs typeface="+mn-cs"/>
-              </a:defRPr>
-            </a:lvl4pPr>
-            <a:lvl5pPr marL="1554480" indent="-228600" algn="l" defTabSz="914400" rtl="0" eaLnBrk="1" latinLnBrk="0" hangingPunct="1">
-              <a:spcBef>
-                <a:spcPct val="20000"/>
-              </a:spcBef>
-              <a:buClr>
-                <a:schemeClr val="accent5"/>
-              </a:buClr>
-              <a:buFont typeface="Arial" pitchFamily="34" charset="0"/>
-              <a:buChar char="•"/>
-              <a:defRPr sz="1400" kern="1200" baseline="0">
-                <a:solidFill>
-                  <a:schemeClr val="tx1"/>
-                </a:solidFill>
-                <a:latin typeface="+mn-lt"/>
-                <a:ea typeface="+mn-ea"/>
-                <a:cs typeface="+mn-cs"/>
-              </a:defRPr>
-            </a:lvl5pPr>
-            <a:lvl6pPr marL="1737360" indent="-182880" algn="l" defTabSz="914400" rtl="0" eaLnBrk="1" latinLnBrk="0" hangingPunct="1">
-              <a:spcBef>
-                <a:spcPct val="20000"/>
-              </a:spcBef>
-              <a:buClr>
-                <a:schemeClr val="accent1"/>
-              </a:buClr>
-              <a:buFont typeface="Arial" pitchFamily="34" charset="0"/>
-              <a:buChar char="•"/>
-              <a:defRPr sz="1400" kern="1200" baseline="0">
-                <a:solidFill>
-                  <a:schemeClr val="tx1"/>
-                </a:solidFill>
-                <a:latin typeface="+mn-lt"/>
-                <a:ea typeface="+mn-ea"/>
-                <a:cs typeface="+mn-cs"/>
-              </a:defRPr>
-            </a:lvl6pPr>
-            <a:lvl7pPr marL="1920240" indent="-182880" algn="l" defTabSz="914400" rtl="0" eaLnBrk="1" latinLnBrk="0" hangingPunct="1">
-              <a:spcBef>
-                <a:spcPct val="20000"/>
-              </a:spcBef>
-              <a:buClr>
-                <a:schemeClr val="accent2"/>
-              </a:buClr>
-              <a:buFont typeface="Arial" pitchFamily="34" charset="0"/>
-              <a:buChar char="•"/>
-              <a:defRPr sz="1400" kern="1200">
-                <a:solidFill>
-                  <a:schemeClr val="tx1"/>
-                </a:solidFill>
-                <a:latin typeface="+mn-lt"/>
-                <a:ea typeface="+mn-ea"/>
-                <a:cs typeface="+mn-cs"/>
-              </a:defRPr>
-            </a:lvl7pPr>
-            <a:lvl8pPr marL="2103120" indent="-182880" algn="l" defTabSz="914400" rtl="0" eaLnBrk="1" latinLnBrk="0" hangingPunct="1">
-              <a:spcBef>
-                <a:spcPct val="20000"/>
-              </a:spcBef>
-              <a:buClr>
-                <a:schemeClr val="accent3"/>
-              </a:buClr>
-              <a:buFont typeface="Arial" pitchFamily="34" charset="0"/>
-              <a:buChar char="•"/>
-              <a:defRPr sz="1400" kern="1200">
-                <a:solidFill>
-                  <a:schemeClr val="tx1"/>
-                </a:solidFill>
-                <a:latin typeface="+mn-lt"/>
-                <a:ea typeface="+mn-ea"/>
-                <a:cs typeface="+mn-cs"/>
-              </a:defRPr>
-            </a:lvl8pPr>
-            <a:lvl9pPr marL="2286000" indent="-182880" algn="l" defTabSz="914400" rtl="0" eaLnBrk="1" latinLnBrk="0" hangingPunct="1">
-              <a:spcBef>
-                <a:spcPct val="20000"/>
-              </a:spcBef>
-              <a:buClr>
-                <a:schemeClr val="accent4"/>
-              </a:buClr>
-              <a:buFont typeface="Arial" pitchFamily="34" charset="0"/>
-              <a:buChar char="•"/>
-              <a:defRPr sz="1400" kern="1200">
-                <a:solidFill>
-                  <a:schemeClr val="tx1"/>
-                </a:solidFill>
-                <a:latin typeface="+mn-lt"/>
-                <a:ea typeface="+mn-ea"/>
-                <a:cs typeface="+mn-cs"/>
-              </a:defRPr>
-            </a:lvl9pPr>
-          </a:lstStyle>
-          <a:p>
-            <a:r>
-              <a:rPr lang="en-US" dirty="0" smtClean="0"/>
-              <a:t>Allows fine control over performance</a:t>
-            </a:r>
-            <a:endParaRPr lang="en-US" dirty="0"/>
-          </a:p>
-        </p:txBody>
-      </p:sp>
     </p:spTree>
     <p:extLst>
       <p:ext uri="{BB962C8B-B14F-4D97-AF65-F5344CB8AC3E}">
@@ -18313,59 +18121,6 @@
                       </p:childTnLst>
                     </p:cTn>
                   </p:par>
-                  <p:par>
-                    <p:cTn id="23" fill="hold">
-                      <p:stCondLst>
-                        <p:cond delay="indefinite"/>
-                      </p:stCondLst>
-                      <p:childTnLst>
-                        <p:par>
-                          <p:cTn id="24" fill="hold">
-                            <p:stCondLst>
-                              <p:cond delay="0"/>
-                            </p:stCondLst>
-                            <p:childTnLst>
-                              <p:par>
-                                <p:cTn id="25" presetID="10" presetClass="entr" presetSubtype="0" fill="hold" grpId="0" nodeType="clickEffect">
-                                  <p:stCondLst>
-                                    <p:cond delay="0"/>
-                                  </p:stCondLst>
-                                  <p:childTnLst>
-                                    <p:set>
-                                      <p:cBhvr>
-                                        <p:cTn id="26" dur="1" fill="hold">
-                                          <p:stCondLst>
-                                            <p:cond delay="0"/>
-                                          </p:stCondLst>
-                                        </p:cTn>
-                                        <p:tgtEl>
-                                          <p:spTgt spid="6"/>
-                                        </p:tgtEl>
-                                        <p:attrNameLst>
-                                          <p:attrName>style.visibility</p:attrName>
-                                        </p:attrNameLst>
-                                      </p:cBhvr>
-                                      <p:to>
-                                        <p:strVal val="visible"/>
-                                      </p:to>
-                                    </p:set>
-                                    <p:animEffect transition="in" filter="fade">
-                                      <p:cBhvr>
-                                        <p:cTn id="27" dur="500"/>
-                                        <p:tgtEl>
-                                          <p:spTgt spid="6"/>
-                                        </p:tgtEl>
-                                      </p:cBhvr>
-                                    </p:animEffect>
-                                  </p:childTnLst>
-                                </p:cTn>
-                              </p:par>
-                            </p:childTnLst>
-                          </p:cTn>
-                        </p:par>
-                      </p:childTnLst>
-                    </p:cTn>
-                  </p:par>
                 </p:childTnLst>
               </p:cTn>
               <p:prevCondLst>
@@ -18389,7 +18144,6 @@
     </p:tnLst>
     <p:bldLst>
       <p:bldP spid="3" grpId="0" uiExpand="1" build="p"/>
-      <p:bldP spid="6" grpId="0"/>
     </p:bldLst>
   </p:timing>
 </p:sld>
@@ -20286,7 +20040,7 @@
           <a:p>
             <a:r>
               <a:rPr lang="en-US" dirty="0" smtClean="0"/>
-              <a:t>Related, Interesting Topics</a:t>
+              <a:t>Introducing FP on Your Team</a:t>
             </a:r>
             <a:endParaRPr lang="en-US" dirty="0"/>
           </a:p>
@@ -20304,45 +20058,75 @@
         </p:nvSpPr>
         <p:spPr/>
         <p:txBody>
-          <a:bodyPr/>
+          <a:bodyPr>
+            <a:normAutofit/>
+          </a:bodyPr>
           <a:lstStyle/>
           <a:p>
             <a:r>
               <a:rPr lang="en-US" dirty="0" smtClean="0"/>
-              <a:t>Non-Von Neumann computer architectures</a:t>
-            </a:r>
-          </a:p>
-          <a:p>
-            <a:r>
-              <a:rPr lang="en-US" dirty="0" smtClean="0"/>
-              <a:t>Lambda calculus</a:t>
-            </a:r>
-          </a:p>
-          <a:p>
-            <a:r>
-              <a:rPr lang="en-US" dirty="0" smtClean="0"/>
-              <a:t>Applying functional thinking outside your program</a:t>
-            </a:r>
-          </a:p>
-          <a:p>
-            <a:r>
-              <a:rPr lang="en-US" dirty="0" smtClean="0"/>
-              <a:t>Logic programming</a:t>
+              <a:t>Start with the core concepts</a:t>
+            </a:r>
+          </a:p>
+          <a:p>
+            <a:r>
+              <a:rPr lang="en-US" dirty="0" smtClean="0"/>
+              <a:t>Consider starting with test code</a:t>
             </a:r>
           </a:p>
           <a:p>
             <a:pPr lvl="1"/>
-            <a:endParaRPr lang="en-US" dirty="0" smtClean="0"/>
-          </a:p>
-          <a:p>
-            <a:endParaRPr lang="en-US" dirty="0" smtClean="0"/>
+            <a:r>
+              <a:rPr lang="en-US" dirty="0" smtClean="0"/>
+              <a:t>Or a single module</a:t>
+            </a:r>
+          </a:p>
+          <a:p>
+            <a:r>
+              <a:rPr lang="en-US" dirty="0" smtClean="0"/>
+              <a:t>Consider introducing one concept per iteration, e.g. immutability or reducing shared state</a:t>
+            </a:r>
+          </a:p>
+          <a:p>
+            <a:r>
+              <a:rPr lang="en-US" dirty="0" smtClean="0"/>
+              <a:t>Consider turning on some build-time checks to help guide you</a:t>
+            </a:r>
+          </a:p>
+          <a:p>
+            <a:pPr lvl="1"/>
+            <a:r>
+              <a:rPr lang="en-US" dirty="0" smtClean="0"/>
+              <a:t>Run tests in random order</a:t>
+            </a:r>
+          </a:p>
+          <a:p>
+            <a:pPr lvl="1"/>
+            <a:r>
+              <a:rPr lang="en-US" dirty="0" smtClean="0"/>
+              <a:t>Run tests in parallel</a:t>
+            </a:r>
+          </a:p>
+          <a:p>
+            <a:pPr lvl="1"/>
+            <a:r>
+              <a:rPr lang="en-US" dirty="0" smtClean="0"/>
+              <a:t>Possibly enforce rules such as ‘all classes in module X are immutable”</a:t>
+            </a:r>
+          </a:p>
+          <a:p>
+            <a:r>
+              <a:rPr lang="en-US" dirty="0" smtClean="0"/>
+              <a:t>Be wary of introducing many strange new idioms at once</a:t>
+            </a:r>
+            <a:endParaRPr lang="en-US" dirty="0"/>
           </a:p>
         </p:txBody>
       </p:sp>
     </p:spTree>
     <p:extLst>
       <p:ext uri="{BB962C8B-B14F-4D97-AF65-F5344CB8AC3E}">
-        <p14:creationId xmlns:p14="http://schemas.microsoft.com/office/powerpoint/2010/main" val="4057990024"/>
+        <p14:creationId xmlns:p14="http://schemas.microsoft.com/office/powerpoint/2010/main" val="1840116009"/>
       </p:ext>
     </p:extLst>
   </p:cSld>
@@ -20386,6 +20170,106 @@
           <a:p>
             <a:r>
               <a:rPr lang="en-US" dirty="0" smtClean="0"/>
+              <a:t>Related, Interesting Topics</a:t>
+            </a:r>
+            <a:endParaRPr lang="en-US" dirty="0"/>
+          </a:p>
+        </p:txBody>
+      </p:sp>
+      <p:sp>
+        <p:nvSpPr>
+          <p:cNvPr id="3" name="Content Placeholder 2"/>
+          <p:cNvSpPr>
+            <a:spLocks noGrp="1"/>
+          </p:cNvSpPr>
+          <p:nvPr>
+            <p:ph idx="1"/>
+          </p:nvPr>
+        </p:nvSpPr>
+        <p:spPr/>
+        <p:txBody>
+          <a:bodyPr/>
+          <a:lstStyle/>
+          <a:p>
+            <a:r>
+              <a:rPr lang="en-US" dirty="0" smtClean="0"/>
+              <a:t>Non-Von Neumann computer architectures</a:t>
+            </a:r>
+          </a:p>
+          <a:p>
+            <a:r>
+              <a:rPr lang="en-US" dirty="0" smtClean="0"/>
+              <a:t>Lambda calculus</a:t>
+            </a:r>
+          </a:p>
+          <a:p>
+            <a:r>
+              <a:rPr lang="en-US" dirty="0" smtClean="0"/>
+              <a:t>Applying functional thinking outside your program</a:t>
+            </a:r>
+          </a:p>
+          <a:p>
+            <a:r>
+              <a:rPr lang="en-US" dirty="0" smtClean="0"/>
+              <a:t>Logic programming</a:t>
+            </a:r>
+          </a:p>
+          <a:p>
+            <a:pPr lvl="1"/>
+            <a:endParaRPr lang="en-US" dirty="0" smtClean="0"/>
+          </a:p>
+          <a:p>
+            <a:endParaRPr lang="en-US" dirty="0" smtClean="0"/>
+          </a:p>
+        </p:txBody>
+      </p:sp>
+    </p:spTree>
+    <p:extLst>
+      <p:ext uri="{BB962C8B-B14F-4D97-AF65-F5344CB8AC3E}">
+        <p14:creationId xmlns:p14="http://schemas.microsoft.com/office/powerpoint/2010/main" val="4057990024"/>
+      </p:ext>
+    </p:extLst>
+  </p:cSld>
+  <p:clrMapOvr>
+    <a:masterClrMapping/>
+  </p:clrMapOvr>
+</p:sld>
+</file>
+
+<file path=ppt/slides/slide47.xml><?xml version="1.0" encoding="utf-8"?>
+<p:sld xmlns:a="http://schemas.openxmlformats.org/drawingml/2006/main" xmlns:r="http://schemas.openxmlformats.org/officeDocument/2006/relationships" xmlns:p="http://schemas.openxmlformats.org/presentationml/2006/main">
+  <p:cSld>
+    <p:spTree>
+      <p:nvGrpSpPr>
+        <p:cNvPr id="1" name=""/>
+        <p:cNvGrpSpPr/>
+        <p:nvPr/>
+      </p:nvGrpSpPr>
+      <p:grpSpPr>
+        <a:xfrm>
+          <a:off x="0" y="0"/>
+          <a:ext cx="0" cy="0"/>
+          <a:chOff x="0" y="0"/>
+          <a:chExt cx="0" cy="0"/>
+        </a:xfrm>
+      </p:grpSpPr>
+      <p:sp>
+        <p:nvSpPr>
+          <p:cNvPr id="2" name="Title 1"/>
+          <p:cNvSpPr>
+            <a:spLocks noGrp="1"/>
+          </p:cNvSpPr>
+          <p:nvPr>
+            <p:ph type="title"/>
+          </p:nvPr>
+        </p:nvSpPr>
+        <p:spPr/>
+        <p:txBody>
+          <a:bodyPr/>
+          <a:lstStyle/>
+          <a:p>
+            <a:r>
+              <a:rPr lang="en-US" dirty="0" smtClean="0"/>
               <a:t>References</a:t>
             </a:r>
             <a:endParaRPr lang="en-US" dirty="0"/>
@@ -20639,7 +20523,7 @@
 </p:sld>
 </file>
 
-<file path=ppt/slides/slide47.xml><?xml version="1.0" encoding="utf-8"?>
+<file path=ppt/slides/slide48.xml><?xml version="1.0" encoding="utf-8"?>
 <p:sld xmlns:a="http://schemas.openxmlformats.org/drawingml/2006/main" xmlns:r="http://schemas.openxmlformats.org/officeDocument/2006/relationships" xmlns:p="http://schemas.openxmlformats.org/presentationml/2006/main">
   <p:cSld>
     <p:spTree>
@@ -21538,155 +21422,6 @@
           <a:lstStyle/>
           <a:p>
             <a:r>
-              <a:rPr lang="en-US" sz="4000" dirty="0" smtClean="0"/>
-              <a:t>Von Neumann Languages, cont.</a:t>
-            </a:r>
-            <a:endParaRPr lang="en-US" sz="4000" dirty="0"/>
-          </a:p>
-        </p:txBody>
-      </p:sp>
-      <p:sp>
-        <p:nvSpPr>
-          <p:cNvPr id="3" name="Content Placeholder 2"/>
-          <p:cNvSpPr>
-            <a:spLocks noGrp="1"/>
-          </p:cNvSpPr>
-          <p:nvPr>
-            <p:ph idx="1"/>
-          </p:nvPr>
-        </p:nvSpPr>
-        <p:spPr/>
-        <p:txBody>
-          <a:bodyPr>
-            <a:normAutofit/>
-          </a:bodyPr>
-          <a:lstStyle/>
-          <a:p>
-            <a:r>
-              <a:rPr lang="en-US" dirty="0"/>
-              <a:t>Backus proposed a language in which:</a:t>
-            </a:r>
-          </a:p>
-          <a:p>
-            <a:pPr lvl="1"/>
-            <a:r>
-              <a:rPr lang="en-US" dirty="0"/>
-              <a:t>Computations are mathematical </a:t>
-            </a:r>
-            <a:r>
-              <a:rPr lang="en-US" dirty="0" smtClean="0"/>
-              <a:t>functions</a:t>
-            </a:r>
-          </a:p>
-          <a:p>
-            <a:pPr lvl="1"/>
-            <a:r>
-              <a:rPr lang="en-US" dirty="0" smtClean="0"/>
-              <a:t>Everything is an expression (no statements)</a:t>
-            </a:r>
-            <a:endParaRPr lang="en-US" dirty="0"/>
-          </a:p>
-          <a:p>
-            <a:pPr lvl="1"/>
-            <a:r>
-              <a:rPr lang="en-US" dirty="0"/>
-              <a:t>Shared state is prohibited</a:t>
-            </a:r>
-          </a:p>
-          <a:p>
-            <a:pPr lvl="1"/>
-            <a:r>
-              <a:rPr lang="en-US" dirty="0"/>
-              <a:t>Mutable state is prohibited</a:t>
-            </a:r>
-          </a:p>
-          <a:p>
-            <a:pPr lvl="1"/>
-            <a:r>
-              <a:rPr lang="en-US" dirty="0"/>
-              <a:t>Programs had useful mathematical properties</a:t>
-            </a:r>
-          </a:p>
-          <a:p>
-            <a:pPr lvl="1"/>
-            <a:r>
-              <a:rPr lang="en-US" dirty="0"/>
-              <a:t>provably correct</a:t>
-            </a:r>
-          </a:p>
-          <a:p>
-            <a:pPr lvl="1"/>
-            <a:r>
-              <a:rPr lang="en-US" dirty="0"/>
-              <a:t>combined via composition</a:t>
-            </a:r>
-          </a:p>
-          <a:p>
-            <a:pPr lvl="1"/>
-            <a:r>
-              <a:rPr lang="en-US" dirty="0"/>
-              <a:t>automatic </a:t>
-            </a:r>
-            <a:r>
-              <a:rPr lang="en-US" dirty="0" smtClean="0"/>
-              <a:t>program simplification/reduction</a:t>
-            </a:r>
-          </a:p>
-        </p:txBody>
-      </p:sp>
-    </p:spTree>
-    <p:extLst>
-      <p:ext uri="{BB962C8B-B14F-4D97-AF65-F5344CB8AC3E}">
-        <p14:creationId xmlns:p14="http://schemas.microsoft.com/office/powerpoint/2010/main" val="2001531990"/>
-      </p:ext>
-    </p:extLst>
-  </p:cSld>
-  <p:clrMapOvr>
-    <a:masterClrMapping/>
-  </p:clrMapOvr>
-  <p:timing>
-    <p:tnLst>
-      <p:par>
-        <p:cTn id="1" dur="indefinite" restart="never" nodeType="tmRoot"/>
-      </p:par>
-    </p:tnLst>
-  </p:timing>
-</p:sld>
-</file>
-
-<file path=ppt/slides/slide7.xml><?xml version="1.0" encoding="utf-8"?>
-<p:sld xmlns:a="http://schemas.openxmlformats.org/drawingml/2006/main" xmlns:r="http://schemas.openxmlformats.org/officeDocument/2006/relationships" xmlns:p="http://schemas.openxmlformats.org/presentationml/2006/main">
-  <p:cSld>
-    <p:spTree>
-      <p:nvGrpSpPr>
-        <p:cNvPr id="1" name=""/>
-        <p:cNvGrpSpPr/>
-        <p:nvPr/>
-      </p:nvGrpSpPr>
-      <p:grpSpPr>
-        <a:xfrm>
-          <a:off x="0" y="0"/>
-          <a:ext cx="0" cy="0"/>
-          <a:chOff x="0" y="0"/>
-          <a:chExt cx="0" cy="0"/>
-        </a:xfrm>
-      </p:grpSpPr>
-      <p:sp>
-        <p:nvSpPr>
-          <p:cNvPr id="2" name="Title 1"/>
-          <p:cNvSpPr>
-            <a:spLocks noGrp="1"/>
-          </p:cNvSpPr>
-          <p:nvPr>
-            <p:ph type="title"/>
-          </p:nvPr>
-        </p:nvSpPr>
-        <p:spPr/>
-        <p:txBody>
-          <a:bodyPr/>
-          <a:lstStyle/>
-          <a:p>
-            <a:r>
               <a:rPr lang="en-US" dirty="0" smtClean="0"/>
               <a:t>Complexity</a:t>
             </a:r>
@@ -21709,10 +21444,6 @@
           <a:bodyPr/>
           <a:lstStyle/>
           <a:p>
-            <a:r>
-              <a:rPr lang="en-US" dirty="0" smtClean="0"/>
-              <a:t>Consider the following code</a:t>
-            </a:r>
             <a:endParaRPr lang="en-US" dirty="0"/>
           </a:p>
         </p:txBody>
@@ -21891,6 +21622,155 @@
   <p:clrMapOvr>
     <a:masterClrMapping/>
   </p:clrMapOvr>
+</p:sld>
+</file>
+
+<file path=ppt/slides/slide7.xml><?xml version="1.0" encoding="utf-8"?>
+<p:sld xmlns:a="http://schemas.openxmlformats.org/drawingml/2006/main" xmlns:r="http://schemas.openxmlformats.org/officeDocument/2006/relationships" xmlns:p="http://schemas.openxmlformats.org/presentationml/2006/main">
+  <p:cSld>
+    <p:spTree>
+      <p:nvGrpSpPr>
+        <p:cNvPr id="1" name=""/>
+        <p:cNvGrpSpPr/>
+        <p:nvPr/>
+      </p:nvGrpSpPr>
+      <p:grpSpPr>
+        <a:xfrm>
+          <a:off x="0" y="0"/>
+          <a:ext cx="0" cy="0"/>
+          <a:chOff x="0" y="0"/>
+          <a:chExt cx="0" cy="0"/>
+        </a:xfrm>
+      </p:grpSpPr>
+      <p:sp>
+        <p:nvSpPr>
+          <p:cNvPr id="2" name="Title 1"/>
+          <p:cNvSpPr>
+            <a:spLocks noGrp="1"/>
+          </p:cNvSpPr>
+          <p:nvPr>
+            <p:ph type="title"/>
+          </p:nvPr>
+        </p:nvSpPr>
+        <p:spPr/>
+        <p:txBody>
+          <a:bodyPr/>
+          <a:lstStyle/>
+          <a:p>
+            <a:r>
+              <a:rPr lang="en-US" sz="4000" dirty="0" smtClean="0"/>
+              <a:t>Von Neumann Languages, cont.</a:t>
+            </a:r>
+            <a:endParaRPr lang="en-US" sz="4000" dirty="0"/>
+          </a:p>
+        </p:txBody>
+      </p:sp>
+      <p:sp>
+        <p:nvSpPr>
+          <p:cNvPr id="3" name="Content Placeholder 2"/>
+          <p:cNvSpPr>
+            <a:spLocks noGrp="1"/>
+          </p:cNvSpPr>
+          <p:nvPr>
+            <p:ph idx="1"/>
+          </p:nvPr>
+        </p:nvSpPr>
+        <p:spPr/>
+        <p:txBody>
+          <a:bodyPr>
+            <a:normAutofit/>
+          </a:bodyPr>
+          <a:lstStyle/>
+          <a:p>
+            <a:r>
+              <a:rPr lang="en-US" dirty="0"/>
+              <a:t>Backus proposed a language in which:</a:t>
+            </a:r>
+          </a:p>
+          <a:p>
+            <a:pPr lvl="1"/>
+            <a:r>
+              <a:rPr lang="en-US" dirty="0"/>
+              <a:t>Computations are mathematical </a:t>
+            </a:r>
+            <a:r>
+              <a:rPr lang="en-US" dirty="0" smtClean="0"/>
+              <a:t>functions</a:t>
+            </a:r>
+          </a:p>
+          <a:p>
+            <a:pPr lvl="1"/>
+            <a:r>
+              <a:rPr lang="en-US" dirty="0" smtClean="0"/>
+              <a:t>Everything is an expression (no statements)</a:t>
+            </a:r>
+            <a:endParaRPr lang="en-US" dirty="0"/>
+          </a:p>
+          <a:p>
+            <a:pPr lvl="1"/>
+            <a:r>
+              <a:rPr lang="en-US" dirty="0"/>
+              <a:t>Shared state is prohibited</a:t>
+            </a:r>
+          </a:p>
+          <a:p>
+            <a:pPr lvl="1"/>
+            <a:r>
+              <a:rPr lang="en-US" dirty="0"/>
+              <a:t>Mutable state is prohibited</a:t>
+            </a:r>
+          </a:p>
+          <a:p>
+            <a:pPr lvl="1"/>
+            <a:r>
+              <a:rPr lang="en-US" dirty="0"/>
+              <a:t>Programs had useful mathematical properties</a:t>
+            </a:r>
+          </a:p>
+          <a:p>
+            <a:pPr lvl="1"/>
+            <a:r>
+              <a:rPr lang="en-US" dirty="0"/>
+              <a:t>provably correct</a:t>
+            </a:r>
+          </a:p>
+          <a:p>
+            <a:pPr lvl="1"/>
+            <a:r>
+              <a:rPr lang="en-US" dirty="0"/>
+              <a:t>combined via composition</a:t>
+            </a:r>
+          </a:p>
+          <a:p>
+            <a:pPr lvl="1"/>
+            <a:r>
+              <a:rPr lang="en-US" dirty="0"/>
+              <a:t>automatic </a:t>
+            </a:r>
+            <a:r>
+              <a:rPr lang="en-US" dirty="0" smtClean="0"/>
+              <a:t>program simplification/reduction</a:t>
+            </a:r>
+          </a:p>
+        </p:txBody>
+      </p:sp>
+    </p:spTree>
+    <p:extLst>
+      <p:ext uri="{BB962C8B-B14F-4D97-AF65-F5344CB8AC3E}">
+        <p14:creationId xmlns:p14="http://schemas.microsoft.com/office/powerpoint/2010/main" val="2001531990"/>
+      </p:ext>
+    </p:extLst>
+  </p:cSld>
+  <p:clrMapOvr>
+    <a:masterClrMapping/>
+  </p:clrMapOvr>
+  <p:timing>
+    <p:tnLst>
+      <p:par>
+        <p:cTn id="1" dur="indefinite" restart="never" nodeType="tmRoot"/>
+      </p:par>
+    </p:tnLst>
+  </p:timing>
 </p:sld>
 </file>
 

</xml_diff>